<commit_message>
Changed some formatting in the presentation
</commit_message>
<xml_diff>
--- a/Paper - Presentation.pptx
+++ b/Paper - Presentation.pptx
@@ -119,6 +119,11 @@
       </a:defRPr>
     </a:lvl9pPr>
   </p:defaultTextStyle>
+  <p:extLst>
+    <p:ext uri="{EFAFB233-063F-42B5-8137-9DF3F51BA10A}">
+      <p15:sldGuideLst xmlns:p15="http://schemas.microsoft.com/office/powerpoint/2012/main"/>
+    </p:ext>
+  </p:extLst>
 </p:presentation>
 </file>
 
@@ -4625,16 +4630,8 @@
           <a:lstStyle/>
           <a:p>
             <a:r>
-              <a:rPr lang="en-US" u="sng" dirty="0"/>
-              <a:t>Missing information</a:t>
-            </a:r>
-            <a:r>
               <a:rPr lang="en-US" dirty="0"/>
-              <a:t> leads to </a:t>
-            </a:r>
-            <a:r>
-              <a:rPr lang="en-US" u="sng" dirty="0"/>
-              <a:t>lack of content variety</a:t>
+              <a:t>Missing information leads to lack of content variety</a:t>
             </a:r>
           </a:p>
           <a:p>
@@ -4642,16 +4639,8 @@
           </a:p>
           <a:p>
             <a:r>
-              <a:rPr lang="en-US" u="sng" dirty="0"/>
-              <a:t>Lack of content variety</a:t>
-            </a:r>
-            <a:r>
               <a:rPr lang="en-US" dirty="0"/>
-              <a:t> leads to </a:t>
-            </a:r>
-            <a:r>
-              <a:rPr lang="en-US" u="sng" dirty="0"/>
-              <a:t>bias</a:t>
+              <a:t>Lack of content variety leads to bias</a:t>
             </a:r>
           </a:p>
           <a:p>
@@ -4659,16 +4648,8 @@
           </a:p>
           <a:p>
             <a:r>
-              <a:rPr lang="en-US" u="sng" dirty="0"/>
-              <a:t>Bias</a:t>
-            </a:r>
-            <a:r>
               <a:rPr lang="en-US" dirty="0"/>
-              <a:t> leads to </a:t>
-            </a:r>
-            <a:r>
-              <a:rPr lang="en-US" u="sng" dirty="0"/>
-              <a:t>discrimination</a:t>
+              <a:t>Bias leads to discrimination</a:t>
             </a:r>
           </a:p>
         </p:txBody>

</xml_diff>

<commit_message>
Added Female Participants in CS & Women in FLOSS to presentation
</commit_message>
<xml_diff>
--- a/Paper - Presentation.pptx
+++ b/Paper - Presentation.pptx
@@ -5,7 +5,7 @@
     <p:sldMasterId id="2147483648" r:id="rId1"/>
   </p:sldMasterIdLst>
   <p:notesMasterIdLst>
-    <p:notesMasterId r:id="rId15"/>
+    <p:notesMasterId r:id="rId21"/>
   </p:notesMasterIdLst>
   <p:sldIdLst>
     <p:sldId id="256" r:id="rId2"/>
@@ -21,6 +21,12 @@
     <p:sldId id="266" r:id="rId12"/>
     <p:sldId id="267" r:id="rId13"/>
     <p:sldId id="268" r:id="rId14"/>
+    <p:sldId id="269" r:id="rId15"/>
+    <p:sldId id="270" r:id="rId16"/>
+    <p:sldId id="271" r:id="rId17"/>
+    <p:sldId id="272" r:id="rId18"/>
+    <p:sldId id="273" r:id="rId19"/>
+    <p:sldId id="274" r:id="rId20"/>
   </p:sldIdLst>
   <p:sldSz cx="12192000" cy="6858000"/>
   <p:notesSz cx="6858000" cy="9144000"/>
@@ -127,6 +133,827 @@
 </p:presentation>
 </file>
 
+<file path=ppt/charts/chart1.xml><?xml version="1.0" encoding="utf-8"?>
+<c:chartSpace xmlns:c="http://schemas.openxmlformats.org/drawingml/2006/chart" xmlns:a="http://schemas.openxmlformats.org/drawingml/2006/main" xmlns:r="http://schemas.openxmlformats.org/officeDocument/2006/relationships" xmlns:c16r2="http://schemas.microsoft.com/office/drawing/2015/06/chart">
+  <c:date1904 val="0"/>
+  <c:lang val="de-DE"/>
+  <c:roundedCorners val="0"/>
+  <mc:AlternateContent xmlns:mc="http://schemas.openxmlformats.org/markup-compatibility/2006">
+    <mc:Choice xmlns:c14="http://schemas.microsoft.com/office/drawing/2007/8/2/chart" Requires="c14">
+      <c14:style val="102"/>
+    </mc:Choice>
+    <mc:Fallback>
+      <c:style val="2"/>
+    </mc:Fallback>
+  </mc:AlternateContent>
+  <c:chart>
+    <c:title>
+      <c:overlay val="0"/>
+      <c:spPr>
+        <a:noFill/>
+        <a:ln>
+          <a:noFill/>
+        </a:ln>
+        <a:effectLst/>
+      </c:spPr>
+      <c:txPr>
+        <a:bodyPr rot="0" spcFirstLastPara="1" vertOverflow="ellipsis" vert="horz" wrap="square" anchor="ctr" anchorCtr="1"/>
+        <a:lstStyle/>
+        <a:p>
+          <a:pPr>
+            <a:defRPr sz="1862" b="0" i="0" u="none" strike="noStrike" kern="1200" spc="0" baseline="0">
+              <a:solidFill>
+                <a:schemeClr val="tx1">
+                  <a:lumMod val="65000"/>
+                  <a:lumOff val="35000"/>
+                </a:schemeClr>
+              </a:solidFill>
+              <a:latin typeface="+mn-lt"/>
+              <a:ea typeface="+mn-ea"/>
+              <a:cs typeface="+mn-cs"/>
+            </a:defRPr>
+          </a:pPr>
+          <a:endParaRPr lang="de-DE"/>
+        </a:p>
+      </c:txPr>
+    </c:title>
+    <c:autoTitleDeleted val="0"/>
+    <c:plotArea>
+      <c:layout/>
+      <c:barChart>
+        <c:barDir val="col"/>
+        <c:grouping val="clustered"/>
+        <c:varyColors val="0"/>
+        <c:ser>
+          <c:idx val="0"/>
+          <c:order val="0"/>
+          <c:tx>
+            <c:strRef>
+              <c:f>Tabelle1!$B$1</c:f>
+              <c:strCache>
+                <c:ptCount val="1"/>
+                <c:pt idx="0">
+                  <c:v>Women in US starting Computer Science major</c:v>
+                </c:pt>
+              </c:strCache>
+            </c:strRef>
+          </c:tx>
+          <c:spPr>
+            <a:solidFill>
+              <a:schemeClr val="accent1"/>
+            </a:solidFill>
+            <a:ln>
+              <a:noFill/>
+            </a:ln>
+            <a:effectLst/>
+          </c:spPr>
+          <c:invertIfNegative val="0"/>
+          <c:cat>
+            <c:strRef>
+              <c:f>Tabelle1!$A$2:$A$4</c:f>
+              <c:strCache>
+                <c:ptCount val="3"/>
+                <c:pt idx="0">
+                  <c:v>1970s</c:v>
+                </c:pt>
+                <c:pt idx="1">
+                  <c:v>1980s</c:v>
+                </c:pt>
+                <c:pt idx="2">
+                  <c:v>1990s</c:v>
+                </c:pt>
+              </c:strCache>
+            </c:strRef>
+          </c:cat>
+          <c:val>
+            <c:numRef>
+              <c:f>Tabelle1!$B$2:$B$4</c:f>
+              <c:numCache>
+                <c:formatCode>0%</c:formatCode>
+                <c:ptCount val="3"/>
+                <c:pt idx="0">
+                  <c:v>0.14000000000000001</c:v>
+                </c:pt>
+                <c:pt idx="1">
+                  <c:v>0.37</c:v>
+                </c:pt>
+                <c:pt idx="2">
+                  <c:v>0.27</c:v>
+                </c:pt>
+              </c:numCache>
+            </c:numRef>
+          </c:val>
+          <c:extLst>
+            <c:ext xmlns:c16="http://schemas.microsoft.com/office/drawing/2014/chart" uri="{C3380CC4-5D6E-409C-BE32-E72D297353CC}">
+              <c16:uniqueId val="{00000000-1B61-42E2-904E-36268E75634F}"/>
+            </c:ext>
+          </c:extLst>
+        </c:ser>
+        <c:dLbls>
+          <c:showLegendKey val="0"/>
+          <c:showVal val="0"/>
+          <c:showCatName val="0"/>
+          <c:showSerName val="0"/>
+          <c:showPercent val="0"/>
+          <c:showBubbleSize val="0"/>
+        </c:dLbls>
+        <c:gapWidth val="219"/>
+        <c:overlap val="-27"/>
+        <c:axId val="1926732080"/>
+        <c:axId val="1877788272"/>
+      </c:barChart>
+      <c:catAx>
+        <c:axId val="1926732080"/>
+        <c:scaling>
+          <c:orientation val="minMax"/>
+        </c:scaling>
+        <c:delete val="0"/>
+        <c:axPos val="b"/>
+        <c:numFmt formatCode="General" sourceLinked="1"/>
+        <c:majorTickMark val="none"/>
+        <c:minorTickMark val="none"/>
+        <c:tickLblPos val="nextTo"/>
+        <c:spPr>
+          <a:noFill/>
+          <a:ln w="9525" cap="flat" cmpd="sng" algn="ctr">
+            <a:solidFill>
+              <a:schemeClr val="tx1">
+                <a:lumMod val="15000"/>
+                <a:lumOff val="85000"/>
+              </a:schemeClr>
+            </a:solidFill>
+            <a:round/>
+          </a:ln>
+          <a:effectLst/>
+        </c:spPr>
+        <c:txPr>
+          <a:bodyPr rot="-60000000" spcFirstLastPara="1" vertOverflow="ellipsis" vert="horz" wrap="square" anchor="ctr" anchorCtr="1"/>
+          <a:lstStyle/>
+          <a:p>
+            <a:pPr>
+              <a:defRPr sz="1197" b="0" i="0" u="none" strike="noStrike" kern="1200" baseline="0">
+                <a:solidFill>
+                  <a:schemeClr val="tx1">
+                    <a:lumMod val="65000"/>
+                    <a:lumOff val="35000"/>
+                  </a:schemeClr>
+                </a:solidFill>
+                <a:latin typeface="+mn-lt"/>
+                <a:ea typeface="+mn-ea"/>
+                <a:cs typeface="+mn-cs"/>
+              </a:defRPr>
+            </a:pPr>
+            <a:endParaRPr lang="de-DE"/>
+          </a:p>
+        </c:txPr>
+        <c:crossAx val="1877788272"/>
+        <c:crosses val="autoZero"/>
+        <c:auto val="1"/>
+        <c:lblAlgn val="ctr"/>
+        <c:lblOffset val="100"/>
+        <c:noMultiLvlLbl val="0"/>
+      </c:catAx>
+      <c:valAx>
+        <c:axId val="1877788272"/>
+        <c:scaling>
+          <c:orientation val="minMax"/>
+        </c:scaling>
+        <c:delete val="0"/>
+        <c:axPos val="l"/>
+        <c:majorGridlines>
+          <c:spPr>
+            <a:ln w="9525" cap="flat" cmpd="sng" algn="ctr">
+              <a:solidFill>
+                <a:schemeClr val="tx1">
+                  <a:lumMod val="15000"/>
+                  <a:lumOff val="85000"/>
+                </a:schemeClr>
+              </a:solidFill>
+              <a:round/>
+            </a:ln>
+            <a:effectLst/>
+          </c:spPr>
+        </c:majorGridlines>
+        <c:numFmt formatCode="0%" sourceLinked="1"/>
+        <c:majorTickMark val="none"/>
+        <c:minorTickMark val="none"/>
+        <c:tickLblPos val="nextTo"/>
+        <c:spPr>
+          <a:noFill/>
+          <a:ln>
+            <a:noFill/>
+          </a:ln>
+          <a:effectLst/>
+        </c:spPr>
+        <c:txPr>
+          <a:bodyPr rot="-60000000" spcFirstLastPara="1" vertOverflow="ellipsis" vert="horz" wrap="square" anchor="ctr" anchorCtr="1"/>
+          <a:lstStyle/>
+          <a:p>
+            <a:pPr>
+              <a:defRPr sz="1197" b="0" i="0" u="none" strike="noStrike" kern="1200" baseline="0">
+                <a:solidFill>
+                  <a:schemeClr val="tx1">
+                    <a:lumMod val="65000"/>
+                    <a:lumOff val="35000"/>
+                  </a:schemeClr>
+                </a:solidFill>
+                <a:latin typeface="+mn-lt"/>
+                <a:ea typeface="+mn-ea"/>
+                <a:cs typeface="+mn-cs"/>
+              </a:defRPr>
+            </a:pPr>
+            <a:endParaRPr lang="de-DE"/>
+          </a:p>
+        </c:txPr>
+        <c:crossAx val="1926732080"/>
+        <c:crosses val="autoZero"/>
+        <c:crossBetween val="between"/>
+      </c:valAx>
+      <c:spPr>
+        <a:noFill/>
+        <a:ln>
+          <a:noFill/>
+        </a:ln>
+        <a:effectLst/>
+      </c:spPr>
+    </c:plotArea>
+    <c:plotVisOnly val="1"/>
+    <c:dispBlanksAs val="gap"/>
+    <c:extLst>
+      <c:ext xmlns:c16r3="http://schemas.microsoft.com/office/drawing/2017/03/chart" uri="{56B9EC1D-385E-4148-901F-78D8002777C0}">
+        <c16r3:dataDisplayOptions16>
+          <c16r3:dispNaAsBlank val="1"/>
+        </c16r3:dataDisplayOptions16>
+      </c:ext>
+    </c:extLst>
+    <c:showDLblsOverMax val="0"/>
+  </c:chart>
+  <c:spPr>
+    <a:noFill/>
+    <a:ln>
+      <a:noFill/>
+    </a:ln>
+    <a:effectLst/>
+  </c:spPr>
+  <c:txPr>
+    <a:bodyPr/>
+    <a:lstStyle/>
+    <a:p>
+      <a:pPr>
+        <a:defRPr/>
+      </a:pPr>
+      <a:endParaRPr lang="de-DE"/>
+    </a:p>
+  </c:txPr>
+  <c:externalData r:id="rId3">
+    <c:autoUpdate val="0"/>
+  </c:externalData>
+</c:chartSpace>
+</file>
+
+<file path=ppt/charts/colors1.xml><?xml version="1.0" encoding="utf-8"?>
+<cs:colorStyle xmlns:cs="http://schemas.microsoft.com/office/drawing/2012/chartStyle" xmlns:a="http://schemas.openxmlformats.org/drawingml/2006/main" meth="cycle" id="10">
+  <a:schemeClr val="accent1"/>
+  <a:schemeClr val="accent2"/>
+  <a:schemeClr val="accent3"/>
+  <a:schemeClr val="accent4"/>
+  <a:schemeClr val="accent5"/>
+  <a:schemeClr val="accent6"/>
+  <cs:variation/>
+  <cs:variation>
+    <a:lumMod val="60000"/>
+  </cs:variation>
+  <cs:variation>
+    <a:lumMod val="80000"/>
+    <a:lumOff val="20000"/>
+  </cs:variation>
+  <cs:variation>
+    <a:lumMod val="80000"/>
+  </cs:variation>
+  <cs:variation>
+    <a:lumMod val="60000"/>
+    <a:lumOff val="40000"/>
+  </cs:variation>
+  <cs:variation>
+    <a:lumMod val="50000"/>
+  </cs:variation>
+  <cs:variation>
+    <a:lumMod val="70000"/>
+    <a:lumOff val="30000"/>
+  </cs:variation>
+  <cs:variation>
+    <a:lumMod val="70000"/>
+  </cs:variation>
+  <cs:variation>
+    <a:lumMod val="50000"/>
+    <a:lumOff val="50000"/>
+  </cs:variation>
+</cs:colorStyle>
+</file>
+
+<file path=ppt/charts/style1.xml><?xml version="1.0" encoding="utf-8"?>
+<cs:chartStyle xmlns:cs="http://schemas.microsoft.com/office/drawing/2012/chartStyle" xmlns:a="http://schemas.openxmlformats.org/drawingml/2006/main" id="201">
+  <cs:axisTitle>
+    <cs:lnRef idx="0"/>
+    <cs:fillRef idx="0"/>
+    <cs:effectRef idx="0"/>
+    <cs:fontRef idx="minor">
+      <a:schemeClr val="tx1">
+        <a:lumMod val="65000"/>
+        <a:lumOff val="35000"/>
+      </a:schemeClr>
+    </cs:fontRef>
+    <cs:defRPr sz="1330" kern="1200"/>
+  </cs:axisTitle>
+  <cs:categoryAxis>
+    <cs:lnRef idx="0"/>
+    <cs:fillRef idx="0"/>
+    <cs:effectRef idx="0"/>
+    <cs:fontRef idx="minor">
+      <a:schemeClr val="tx1">
+        <a:lumMod val="65000"/>
+        <a:lumOff val="35000"/>
+      </a:schemeClr>
+    </cs:fontRef>
+    <cs:spPr>
+      <a:ln w="9525" cap="flat" cmpd="sng" algn="ctr">
+        <a:solidFill>
+          <a:schemeClr val="tx1">
+            <a:lumMod val="15000"/>
+            <a:lumOff val="85000"/>
+          </a:schemeClr>
+        </a:solidFill>
+        <a:round/>
+      </a:ln>
+    </cs:spPr>
+    <cs:defRPr sz="1197" kern="1200"/>
+  </cs:categoryAxis>
+  <cs:chartArea mods="allowNoFillOverride allowNoLineOverride">
+    <cs:lnRef idx="0"/>
+    <cs:fillRef idx="0"/>
+    <cs:effectRef idx="0"/>
+    <cs:fontRef idx="minor">
+      <a:schemeClr val="tx1"/>
+    </cs:fontRef>
+    <cs:spPr>
+      <a:solidFill>
+        <a:schemeClr val="bg1"/>
+      </a:solidFill>
+      <a:ln w="9525" cap="flat" cmpd="sng" algn="ctr">
+        <a:solidFill>
+          <a:schemeClr val="tx1">
+            <a:lumMod val="15000"/>
+            <a:lumOff val="85000"/>
+          </a:schemeClr>
+        </a:solidFill>
+        <a:round/>
+      </a:ln>
+    </cs:spPr>
+    <cs:defRPr sz="1330" kern="1200"/>
+  </cs:chartArea>
+  <cs:dataLabel>
+    <cs:lnRef idx="0"/>
+    <cs:fillRef idx="0"/>
+    <cs:effectRef idx="0"/>
+    <cs:fontRef idx="minor">
+      <a:schemeClr val="tx1">
+        <a:lumMod val="75000"/>
+        <a:lumOff val="25000"/>
+      </a:schemeClr>
+    </cs:fontRef>
+    <cs:defRPr sz="1197" kern="1200"/>
+  </cs:dataLabel>
+  <cs:dataLabelCallout>
+    <cs:lnRef idx="0"/>
+    <cs:fillRef idx="0"/>
+    <cs:effectRef idx="0"/>
+    <cs:fontRef idx="minor">
+      <a:schemeClr val="dk1">
+        <a:lumMod val="65000"/>
+        <a:lumOff val="35000"/>
+      </a:schemeClr>
+    </cs:fontRef>
+    <cs:spPr>
+      <a:solidFill>
+        <a:schemeClr val="lt1"/>
+      </a:solidFill>
+      <a:ln>
+        <a:solidFill>
+          <a:schemeClr val="dk1">
+            <a:lumMod val="25000"/>
+            <a:lumOff val="75000"/>
+          </a:schemeClr>
+        </a:solidFill>
+      </a:ln>
+    </cs:spPr>
+    <cs:defRPr sz="1197" kern="1200"/>
+    <cs:bodyPr rot="0" spcFirstLastPara="1" vertOverflow="clip" horzOverflow="clip" vert="horz" wrap="square" lIns="36576" tIns="18288" rIns="36576" bIns="18288" anchor="ctr" anchorCtr="1">
+      <a:spAutoFit/>
+    </cs:bodyPr>
+  </cs:dataLabelCallout>
+  <cs:dataPoint>
+    <cs:lnRef idx="0"/>
+    <cs:fillRef idx="1">
+      <cs:styleClr val="auto"/>
+    </cs:fillRef>
+    <cs:effectRef idx="0"/>
+    <cs:fontRef idx="minor">
+      <a:schemeClr val="tx1"/>
+    </cs:fontRef>
+  </cs:dataPoint>
+  <cs:dataPoint3D>
+    <cs:lnRef idx="0"/>
+    <cs:fillRef idx="1">
+      <cs:styleClr val="auto"/>
+    </cs:fillRef>
+    <cs:effectRef idx="0"/>
+    <cs:fontRef idx="minor">
+      <a:schemeClr val="tx1"/>
+    </cs:fontRef>
+  </cs:dataPoint3D>
+  <cs:dataPointLine>
+    <cs:lnRef idx="0">
+      <cs:styleClr val="auto"/>
+    </cs:lnRef>
+    <cs:fillRef idx="1"/>
+    <cs:effectRef idx="0"/>
+    <cs:fontRef idx="minor">
+      <a:schemeClr val="tx1"/>
+    </cs:fontRef>
+    <cs:spPr>
+      <a:ln w="28575" cap="rnd">
+        <a:solidFill>
+          <a:schemeClr val="phClr"/>
+        </a:solidFill>
+        <a:round/>
+      </a:ln>
+    </cs:spPr>
+  </cs:dataPointLine>
+  <cs:dataPointMarker>
+    <cs:lnRef idx="0">
+      <cs:styleClr val="auto"/>
+    </cs:lnRef>
+    <cs:fillRef idx="1">
+      <cs:styleClr val="auto"/>
+    </cs:fillRef>
+    <cs:effectRef idx="0"/>
+    <cs:fontRef idx="minor">
+      <a:schemeClr val="tx1"/>
+    </cs:fontRef>
+    <cs:spPr>
+      <a:ln w="9525">
+        <a:solidFill>
+          <a:schemeClr val="phClr"/>
+        </a:solidFill>
+      </a:ln>
+    </cs:spPr>
+  </cs:dataPointMarker>
+  <cs:dataPointMarkerLayout symbol="circle" size="5"/>
+  <cs:dataPointWireframe>
+    <cs:lnRef idx="0">
+      <cs:styleClr val="auto"/>
+    </cs:lnRef>
+    <cs:fillRef idx="1"/>
+    <cs:effectRef idx="0"/>
+    <cs:fontRef idx="minor">
+      <a:schemeClr val="tx1"/>
+    </cs:fontRef>
+    <cs:spPr>
+      <a:ln w="9525" cap="rnd">
+        <a:solidFill>
+          <a:schemeClr val="phClr"/>
+        </a:solidFill>
+        <a:round/>
+      </a:ln>
+    </cs:spPr>
+  </cs:dataPointWireframe>
+  <cs:dataTable>
+    <cs:lnRef idx="0"/>
+    <cs:fillRef idx="0"/>
+    <cs:effectRef idx="0"/>
+    <cs:fontRef idx="minor">
+      <a:schemeClr val="tx1">
+        <a:lumMod val="65000"/>
+        <a:lumOff val="35000"/>
+      </a:schemeClr>
+    </cs:fontRef>
+    <cs:spPr>
+      <a:noFill/>
+      <a:ln w="9525" cap="flat" cmpd="sng" algn="ctr">
+        <a:solidFill>
+          <a:schemeClr val="tx1">
+            <a:lumMod val="15000"/>
+            <a:lumOff val="85000"/>
+          </a:schemeClr>
+        </a:solidFill>
+        <a:round/>
+      </a:ln>
+    </cs:spPr>
+    <cs:defRPr sz="1197" kern="1200"/>
+  </cs:dataTable>
+  <cs:downBar>
+    <cs:lnRef idx="0"/>
+    <cs:fillRef idx="0"/>
+    <cs:effectRef idx="0"/>
+    <cs:fontRef idx="minor">
+      <a:schemeClr val="dk1"/>
+    </cs:fontRef>
+    <cs:spPr>
+      <a:solidFill>
+        <a:schemeClr val="dk1">
+          <a:lumMod val="65000"/>
+          <a:lumOff val="35000"/>
+        </a:schemeClr>
+      </a:solidFill>
+      <a:ln w="9525">
+        <a:solidFill>
+          <a:schemeClr val="tx1">
+            <a:lumMod val="65000"/>
+            <a:lumOff val="35000"/>
+          </a:schemeClr>
+        </a:solidFill>
+      </a:ln>
+    </cs:spPr>
+  </cs:downBar>
+  <cs:dropLine>
+    <cs:lnRef idx="0"/>
+    <cs:fillRef idx="0"/>
+    <cs:effectRef idx="0"/>
+    <cs:fontRef idx="minor">
+      <a:schemeClr val="tx1"/>
+    </cs:fontRef>
+    <cs:spPr>
+      <a:ln w="9525" cap="flat" cmpd="sng" algn="ctr">
+        <a:solidFill>
+          <a:schemeClr val="tx1">
+            <a:lumMod val="35000"/>
+            <a:lumOff val="65000"/>
+          </a:schemeClr>
+        </a:solidFill>
+        <a:round/>
+      </a:ln>
+    </cs:spPr>
+  </cs:dropLine>
+  <cs:errorBar>
+    <cs:lnRef idx="0"/>
+    <cs:fillRef idx="0"/>
+    <cs:effectRef idx="0"/>
+    <cs:fontRef idx="minor">
+      <a:schemeClr val="tx1"/>
+    </cs:fontRef>
+    <cs:spPr>
+      <a:ln w="9525" cap="flat" cmpd="sng" algn="ctr">
+        <a:solidFill>
+          <a:schemeClr val="tx1">
+            <a:lumMod val="65000"/>
+            <a:lumOff val="35000"/>
+          </a:schemeClr>
+        </a:solidFill>
+        <a:round/>
+      </a:ln>
+    </cs:spPr>
+  </cs:errorBar>
+  <cs:floor>
+    <cs:lnRef idx="0"/>
+    <cs:fillRef idx="0"/>
+    <cs:effectRef idx="0"/>
+    <cs:fontRef idx="minor">
+      <a:schemeClr val="tx1"/>
+    </cs:fontRef>
+    <cs:spPr>
+      <a:noFill/>
+      <a:ln>
+        <a:noFill/>
+      </a:ln>
+    </cs:spPr>
+  </cs:floor>
+  <cs:gridlineMajor>
+    <cs:lnRef idx="0"/>
+    <cs:fillRef idx="0"/>
+    <cs:effectRef idx="0"/>
+    <cs:fontRef idx="minor">
+      <a:schemeClr val="tx1"/>
+    </cs:fontRef>
+    <cs:spPr>
+      <a:ln w="9525" cap="flat" cmpd="sng" algn="ctr">
+        <a:solidFill>
+          <a:schemeClr val="tx1">
+            <a:lumMod val="15000"/>
+            <a:lumOff val="85000"/>
+          </a:schemeClr>
+        </a:solidFill>
+        <a:round/>
+      </a:ln>
+    </cs:spPr>
+  </cs:gridlineMajor>
+  <cs:gridlineMinor>
+    <cs:lnRef idx="0"/>
+    <cs:fillRef idx="0"/>
+    <cs:effectRef idx="0"/>
+    <cs:fontRef idx="minor">
+      <a:schemeClr val="tx1"/>
+    </cs:fontRef>
+    <cs:spPr>
+      <a:ln w="9525" cap="flat" cmpd="sng" algn="ctr">
+        <a:solidFill>
+          <a:schemeClr val="tx1">
+            <a:lumMod val="5000"/>
+            <a:lumOff val="95000"/>
+          </a:schemeClr>
+        </a:solidFill>
+        <a:round/>
+      </a:ln>
+    </cs:spPr>
+  </cs:gridlineMinor>
+  <cs:hiLoLine>
+    <cs:lnRef idx="0"/>
+    <cs:fillRef idx="0"/>
+    <cs:effectRef idx="0"/>
+    <cs:fontRef idx="minor">
+      <a:schemeClr val="tx1"/>
+    </cs:fontRef>
+    <cs:spPr>
+      <a:ln w="9525" cap="flat" cmpd="sng" algn="ctr">
+        <a:solidFill>
+          <a:schemeClr val="tx1">
+            <a:lumMod val="75000"/>
+            <a:lumOff val="25000"/>
+          </a:schemeClr>
+        </a:solidFill>
+        <a:round/>
+      </a:ln>
+    </cs:spPr>
+  </cs:hiLoLine>
+  <cs:leaderLine>
+    <cs:lnRef idx="0"/>
+    <cs:fillRef idx="0"/>
+    <cs:effectRef idx="0"/>
+    <cs:fontRef idx="minor">
+      <a:schemeClr val="tx1"/>
+    </cs:fontRef>
+    <cs:spPr>
+      <a:ln w="9525" cap="flat" cmpd="sng" algn="ctr">
+        <a:solidFill>
+          <a:schemeClr val="tx1">
+            <a:lumMod val="35000"/>
+            <a:lumOff val="65000"/>
+          </a:schemeClr>
+        </a:solidFill>
+        <a:round/>
+      </a:ln>
+    </cs:spPr>
+  </cs:leaderLine>
+  <cs:legend>
+    <cs:lnRef idx="0"/>
+    <cs:fillRef idx="0"/>
+    <cs:effectRef idx="0"/>
+    <cs:fontRef idx="minor">
+      <a:schemeClr val="tx1">
+        <a:lumMod val="65000"/>
+        <a:lumOff val="35000"/>
+      </a:schemeClr>
+    </cs:fontRef>
+    <cs:defRPr sz="1197" kern="1200"/>
+  </cs:legend>
+  <cs:plotArea mods="allowNoFillOverride allowNoLineOverride">
+    <cs:lnRef idx="0"/>
+    <cs:fillRef idx="0"/>
+    <cs:effectRef idx="0"/>
+    <cs:fontRef idx="minor">
+      <a:schemeClr val="tx1"/>
+    </cs:fontRef>
+  </cs:plotArea>
+  <cs:plotArea3D mods="allowNoFillOverride allowNoLineOverride">
+    <cs:lnRef idx="0"/>
+    <cs:fillRef idx="0"/>
+    <cs:effectRef idx="0"/>
+    <cs:fontRef idx="minor">
+      <a:schemeClr val="tx1"/>
+    </cs:fontRef>
+  </cs:plotArea3D>
+  <cs:seriesAxis>
+    <cs:lnRef idx="0"/>
+    <cs:fillRef idx="0"/>
+    <cs:effectRef idx="0"/>
+    <cs:fontRef idx="minor">
+      <a:schemeClr val="tx1">
+        <a:lumMod val="65000"/>
+        <a:lumOff val="35000"/>
+      </a:schemeClr>
+    </cs:fontRef>
+    <cs:defRPr sz="1197" kern="1200"/>
+  </cs:seriesAxis>
+  <cs:seriesLine>
+    <cs:lnRef idx="0"/>
+    <cs:fillRef idx="0"/>
+    <cs:effectRef idx="0"/>
+    <cs:fontRef idx="minor">
+      <a:schemeClr val="tx1"/>
+    </cs:fontRef>
+    <cs:spPr>
+      <a:ln w="9525" cap="flat" cmpd="sng" algn="ctr">
+        <a:solidFill>
+          <a:schemeClr val="tx1">
+            <a:lumMod val="35000"/>
+            <a:lumOff val="65000"/>
+          </a:schemeClr>
+        </a:solidFill>
+        <a:round/>
+      </a:ln>
+    </cs:spPr>
+  </cs:seriesLine>
+  <cs:title>
+    <cs:lnRef idx="0"/>
+    <cs:fillRef idx="0"/>
+    <cs:effectRef idx="0"/>
+    <cs:fontRef idx="minor">
+      <a:schemeClr val="tx1">
+        <a:lumMod val="65000"/>
+        <a:lumOff val="35000"/>
+      </a:schemeClr>
+    </cs:fontRef>
+    <cs:defRPr sz="1862" b="0" kern="1200" spc="0" baseline="0"/>
+  </cs:title>
+  <cs:trendline>
+    <cs:lnRef idx="0">
+      <cs:styleClr val="auto"/>
+    </cs:lnRef>
+    <cs:fillRef idx="0"/>
+    <cs:effectRef idx="0"/>
+    <cs:fontRef idx="minor">
+      <a:schemeClr val="tx1"/>
+    </cs:fontRef>
+    <cs:spPr>
+      <a:ln w="19050" cap="rnd">
+        <a:solidFill>
+          <a:schemeClr val="phClr"/>
+        </a:solidFill>
+        <a:prstDash val="sysDot"/>
+      </a:ln>
+    </cs:spPr>
+  </cs:trendline>
+  <cs:trendlineLabel>
+    <cs:lnRef idx="0"/>
+    <cs:fillRef idx="0"/>
+    <cs:effectRef idx="0"/>
+    <cs:fontRef idx="minor">
+      <a:schemeClr val="tx1">
+        <a:lumMod val="65000"/>
+        <a:lumOff val="35000"/>
+      </a:schemeClr>
+    </cs:fontRef>
+    <cs:defRPr sz="1197" kern="1200"/>
+  </cs:trendlineLabel>
+  <cs:upBar>
+    <cs:lnRef idx="0"/>
+    <cs:fillRef idx="0"/>
+    <cs:effectRef idx="0"/>
+    <cs:fontRef idx="minor">
+      <a:schemeClr val="dk1"/>
+    </cs:fontRef>
+    <cs:spPr>
+      <a:solidFill>
+        <a:schemeClr val="lt1"/>
+      </a:solidFill>
+      <a:ln w="9525">
+        <a:solidFill>
+          <a:schemeClr val="tx1">
+            <a:lumMod val="15000"/>
+            <a:lumOff val="85000"/>
+          </a:schemeClr>
+        </a:solidFill>
+      </a:ln>
+    </cs:spPr>
+  </cs:upBar>
+  <cs:valueAxis>
+    <cs:lnRef idx="0"/>
+    <cs:fillRef idx="0"/>
+    <cs:effectRef idx="0"/>
+    <cs:fontRef idx="minor">
+      <a:schemeClr val="tx1">
+        <a:lumMod val="65000"/>
+        <a:lumOff val="35000"/>
+      </a:schemeClr>
+    </cs:fontRef>
+    <cs:defRPr sz="1197" kern="1200"/>
+  </cs:valueAxis>
+  <cs:wall>
+    <cs:lnRef idx="0"/>
+    <cs:fillRef idx="0"/>
+    <cs:effectRef idx="0"/>
+    <cs:fontRef idx="minor">
+      <a:schemeClr val="tx1"/>
+    </cs:fontRef>
+    <cs:spPr>
+      <a:noFill/>
+      <a:ln>
+        <a:noFill/>
+      </a:ln>
+    </cs:spPr>
+  </cs:wall>
+</cs:chartStyle>
+</file>
+
 <file path=ppt/notesMasters/notesMaster1.xml><?xml version="1.0" encoding="utf-8"?>
 <p:notesMaster xmlns:a="http://schemas.openxmlformats.org/drawingml/2006/main" xmlns:r="http://schemas.openxmlformats.org/officeDocument/2006/relationships" xmlns:p="http://schemas.openxmlformats.org/presentationml/2006/main">
   <p:cSld>
@@ -209,7 +1036,7 @@
           <a:p>
             <a:fld id="{EEACC300-3D7C-4E77-ACC5-ED72B3E2514D}" type="datetimeFigureOut">
               <a:rPr lang="en-US" smtClean="0"/>
-              <a:t>1/30/2020</a:t>
+              <a:t>1/31/2020</a:t>
             </a:fld>
             <a:endParaRPr lang="en-US"/>
           </a:p>
@@ -367,7 +1194,7 @@
           <a:p>
             <a:fld id="{3A08C91C-33B4-40AA-981F-C4EDAC7C6C8B}" type="slidenum">
               <a:rPr lang="en-US" smtClean="0"/>
-              <a:t>‹#›</a:t>
+              <a:t>‹Nr.›</a:t>
             </a:fld>
             <a:endParaRPr lang="en-US"/>
           </a:p>
@@ -560,6 +1387,773 @@
 </p:notes>
 </file>
 
+<file path=ppt/notesSlides/notesSlide2.xml><?xml version="1.0" encoding="utf-8"?>
+<p:notes xmlns:a="http://schemas.openxmlformats.org/drawingml/2006/main" xmlns:r="http://schemas.openxmlformats.org/officeDocument/2006/relationships" xmlns:p="http://schemas.openxmlformats.org/presentationml/2006/main">
+  <p:cSld>
+    <p:spTree>
+      <p:nvGrpSpPr>
+        <p:cNvPr id="1" name=""/>
+        <p:cNvGrpSpPr/>
+        <p:nvPr/>
+      </p:nvGrpSpPr>
+      <p:grpSpPr>
+        <a:xfrm>
+          <a:off x="0" y="0"/>
+          <a:ext cx="0" cy="0"/>
+          <a:chOff x="0" y="0"/>
+          <a:chExt cx="0" cy="0"/>
+        </a:xfrm>
+      </p:grpSpPr>
+      <p:sp>
+        <p:nvSpPr>
+          <p:cNvPr id="2" name="Folienbildplatzhalter 1"/>
+          <p:cNvSpPr>
+            <a:spLocks noGrp="1" noRot="1" noChangeAspect="1"/>
+          </p:cNvSpPr>
+          <p:nvPr>
+            <p:ph type="sldImg"/>
+          </p:nvPr>
+        </p:nvSpPr>
+        <p:spPr/>
+      </p:sp>
+      <p:sp>
+        <p:nvSpPr>
+          <p:cNvPr id="3" name="Notizenplatzhalter 2"/>
+          <p:cNvSpPr>
+            <a:spLocks noGrp="1"/>
+          </p:cNvSpPr>
+          <p:nvPr>
+            <p:ph type="body" idx="1"/>
+          </p:nvPr>
+        </p:nvSpPr>
+        <p:spPr/>
+        <p:txBody>
+          <a:bodyPr/>
+          <a:lstStyle/>
+          <a:p>
+            <a:pPr marL="171450" indent="-171450">
+              <a:buFontTx/>
+              <a:buChar char="-"/>
+            </a:pPr>
+            <a:r>
+              <a:rPr lang="de-AT" dirty="0"/>
+              <a:t>Odd; </a:t>
+            </a:r>
+            <a:r>
+              <a:rPr lang="de-AT" dirty="0" err="1"/>
+              <a:t>some</a:t>
+            </a:r>
+            <a:r>
+              <a:rPr lang="de-AT" dirty="0"/>
+              <a:t> </a:t>
+            </a:r>
+            <a:r>
+              <a:rPr lang="de-AT" dirty="0" err="1"/>
+              <a:t>women</a:t>
+            </a:r>
+            <a:r>
+              <a:rPr lang="de-AT" dirty="0"/>
+              <a:t> </a:t>
+            </a:r>
+            <a:r>
+              <a:rPr lang="de-AT" dirty="0" err="1"/>
+              <a:t>pioneers</a:t>
+            </a:r>
+            <a:r>
+              <a:rPr lang="de-AT" dirty="0"/>
+              <a:t> in </a:t>
+            </a:r>
+            <a:r>
+              <a:rPr lang="de-AT" dirty="0" err="1"/>
+              <a:t>the</a:t>
+            </a:r>
+            <a:r>
+              <a:rPr lang="de-AT" dirty="0"/>
+              <a:t> CS </a:t>
+            </a:r>
+            <a:r>
+              <a:rPr lang="de-AT" dirty="0" err="1"/>
+              <a:t>field</a:t>
+            </a:r>
+            <a:r>
+              <a:rPr lang="de-AT" dirty="0"/>
+              <a:t> (Ada Lovelace, Grace Hopper)</a:t>
+            </a:r>
+          </a:p>
+          <a:p>
+            <a:pPr marL="171450" indent="-171450">
+              <a:buFontTx/>
+              <a:buChar char="-"/>
+            </a:pPr>
+            <a:r>
+              <a:rPr lang="de-AT" dirty="0" err="1"/>
+              <a:t>Describe</a:t>
+            </a:r>
+            <a:r>
+              <a:rPr lang="de-AT" dirty="0"/>
+              <a:t> </a:t>
+            </a:r>
+            <a:r>
+              <a:rPr lang="de-AT" dirty="0" err="1"/>
+              <a:t>the</a:t>
+            </a:r>
+            <a:r>
+              <a:rPr lang="de-AT" dirty="0"/>
+              <a:t> </a:t>
+            </a:r>
+            <a:r>
+              <a:rPr lang="de-AT" dirty="0" err="1"/>
+              <a:t>contributions</a:t>
+            </a:r>
+            <a:r>
+              <a:rPr lang="de-AT" dirty="0"/>
+              <a:t> </a:t>
+            </a:r>
+            <a:r>
+              <a:rPr lang="de-AT" dirty="0" err="1"/>
+              <a:t>to</a:t>
+            </a:r>
+            <a:r>
+              <a:rPr lang="de-AT" dirty="0"/>
+              <a:t> </a:t>
+            </a:r>
+            <a:r>
+              <a:rPr lang="de-AT" dirty="0" err="1"/>
+              <a:t>absence</a:t>
+            </a:r>
+            <a:r>
+              <a:rPr lang="de-AT" dirty="0"/>
+              <a:t> </a:t>
+            </a:r>
+            <a:r>
+              <a:rPr lang="de-AT" dirty="0" err="1"/>
+              <a:t>of</a:t>
+            </a:r>
+            <a:r>
+              <a:rPr lang="de-AT" dirty="0"/>
+              <a:t> </a:t>
+            </a:r>
+            <a:r>
+              <a:rPr lang="de-AT" dirty="0" err="1"/>
+              <a:t>female</a:t>
+            </a:r>
+            <a:r>
+              <a:rPr lang="de-AT" dirty="0"/>
+              <a:t> </a:t>
+            </a:r>
+            <a:r>
+              <a:rPr lang="de-AT" dirty="0" err="1"/>
+              <a:t>participation</a:t>
+            </a:r>
+            <a:endParaRPr lang="de-AT" dirty="0"/>
+          </a:p>
+        </p:txBody>
+      </p:sp>
+      <p:sp>
+        <p:nvSpPr>
+          <p:cNvPr id="4" name="Foliennummernplatzhalter 3"/>
+          <p:cNvSpPr>
+            <a:spLocks noGrp="1"/>
+          </p:cNvSpPr>
+          <p:nvPr>
+            <p:ph type="sldNum" sz="quarter" idx="5"/>
+          </p:nvPr>
+        </p:nvSpPr>
+        <p:spPr/>
+        <p:txBody>
+          <a:bodyPr/>
+          <a:lstStyle/>
+          <a:p>
+            <a:fld id="{3A08C91C-33B4-40AA-981F-C4EDAC7C6C8B}" type="slidenum">
+              <a:rPr lang="en-US" smtClean="0"/>
+              <a:t>14</a:t>
+            </a:fld>
+            <a:endParaRPr lang="en-US"/>
+          </a:p>
+        </p:txBody>
+      </p:sp>
+    </p:spTree>
+    <p:extLst>
+      <p:ext uri="{BB962C8B-B14F-4D97-AF65-F5344CB8AC3E}">
+        <p14:creationId xmlns:p14="http://schemas.microsoft.com/office/powerpoint/2010/main" val="175075914"/>
+      </p:ext>
+    </p:extLst>
+  </p:cSld>
+  <p:clrMapOvr>
+    <a:masterClrMapping/>
+  </p:clrMapOvr>
+</p:notes>
+</file>
+
+<file path=ppt/notesSlides/notesSlide3.xml><?xml version="1.0" encoding="utf-8"?>
+<p:notes xmlns:a="http://schemas.openxmlformats.org/drawingml/2006/main" xmlns:r="http://schemas.openxmlformats.org/officeDocument/2006/relationships" xmlns:p="http://schemas.openxmlformats.org/presentationml/2006/main">
+  <p:cSld>
+    <p:spTree>
+      <p:nvGrpSpPr>
+        <p:cNvPr id="1" name=""/>
+        <p:cNvGrpSpPr/>
+        <p:nvPr/>
+      </p:nvGrpSpPr>
+      <p:grpSpPr>
+        <a:xfrm>
+          <a:off x="0" y="0"/>
+          <a:ext cx="0" cy="0"/>
+          <a:chOff x="0" y="0"/>
+          <a:chExt cx="0" cy="0"/>
+        </a:xfrm>
+      </p:grpSpPr>
+      <p:sp>
+        <p:nvSpPr>
+          <p:cNvPr id="2" name="Folienbildplatzhalter 1"/>
+          <p:cNvSpPr>
+            <a:spLocks noGrp="1" noRot="1" noChangeAspect="1"/>
+          </p:cNvSpPr>
+          <p:nvPr>
+            <p:ph type="sldImg"/>
+          </p:nvPr>
+        </p:nvSpPr>
+        <p:spPr/>
+      </p:sp>
+      <p:sp>
+        <p:nvSpPr>
+          <p:cNvPr id="3" name="Notizenplatzhalter 2"/>
+          <p:cNvSpPr>
+            <a:spLocks noGrp="1"/>
+          </p:cNvSpPr>
+          <p:nvPr>
+            <p:ph type="body" idx="1"/>
+          </p:nvPr>
+        </p:nvSpPr>
+        <p:spPr/>
+        <p:txBody>
+          <a:bodyPr/>
+          <a:lstStyle/>
+          <a:p>
+            <a:pPr marL="171450" indent="-171450">
+              <a:buFontTx/>
+              <a:buChar char="-"/>
+            </a:pPr>
+            <a:r>
+              <a:rPr lang="de-AT" dirty="0"/>
+              <a:t>Experiment: </a:t>
+            </a:r>
+            <a:r>
+              <a:rPr lang="de-AT" dirty="0" err="1"/>
+              <a:t>performed</a:t>
+            </a:r>
+            <a:r>
+              <a:rPr lang="de-AT" dirty="0"/>
+              <a:t> </a:t>
+            </a:r>
+            <a:r>
+              <a:rPr lang="de-AT" dirty="0" err="1"/>
+              <a:t>introductionary</a:t>
+            </a:r>
+            <a:r>
+              <a:rPr lang="de-AT" dirty="0"/>
+              <a:t> CS </a:t>
+            </a:r>
+            <a:r>
+              <a:rPr lang="de-AT" dirty="0" err="1"/>
+              <a:t>lessons</a:t>
+            </a:r>
+            <a:r>
+              <a:rPr lang="de-AT" dirty="0"/>
+              <a:t> in </a:t>
+            </a:r>
+            <a:r>
+              <a:rPr lang="de-AT" dirty="0" err="1"/>
+              <a:t>classroom</a:t>
+            </a:r>
+            <a:r>
+              <a:rPr lang="de-AT" dirty="0"/>
+              <a:t> </a:t>
+            </a:r>
+            <a:r>
+              <a:rPr lang="de-AT" dirty="0" err="1"/>
+              <a:t>without</a:t>
+            </a:r>
+            <a:r>
+              <a:rPr lang="de-AT" dirty="0"/>
+              <a:t> </a:t>
+            </a:r>
+            <a:r>
+              <a:rPr lang="de-AT" dirty="0" err="1"/>
+              <a:t>stereotypical</a:t>
+            </a:r>
+            <a:r>
+              <a:rPr lang="de-AT" dirty="0"/>
+              <a:t> </a:t>
+            </a:r>
+            <a:r>
+              <a:rPr lang="de-AT" dirty="0" err="1"/>
+              <a:t>decoration</a:t>
+            </a:r>
+            <a:r>
+              <a:rPr lang="de-AT" dirty="0"/>
+              <a:t> -&gt; </a:t>
+            </a:r>
+            <a:r>
+              <a:rPr lang="de-AT" dirty="0" err="1"/>
+              <a:t>women</a:t>
+            </a:r>
+            <a:r>
+              <a:rPr lang="de-AT" dirty="0"/>
+              <a:t> </a:t>
+            </a:r>
+            <a:r>
+              <a:rPr lang="de-AT" dirty="0" err="1"/>
+              <a:t>were</a:t>
+            </a:r>
+            <a:r>
+              <a:rPr lang="de-AT" dirty="0"/>
+              <a:t> </a:t>
+            </a:r>
+            <a:r>
+              <a:rPr lang="de-AT" dirty="0" err="1"/>
+              <a:t>more</a:t>
+            </a:r>
+            <a:r>
+              <a:rPr lang="de-AT" dirty="0"/>
+              <a:t> </a:t>
+            </a:r>
+            <a:r>
+              <a:rPr lang="de-AT" dirty="0" err="1"/>
+              <a:t>interested</a:t>
+            </a:r>
+            <a:r>
+              <a:rPr lang="de-AT" dirty="0"/>
+              <a:t> in </a:t>
+            </a:r>
+            <a:r>
+              <a:rPr lang="de-AT" dirty="0" err="1"/>
+              <a:t>further</a:t>
+            </a:r>
+            <a:r>
+              <a:rPr lang="de-AT" dirty="0"/>
+              <a:t> </a:t>
+            </a:r>
+            <a:r>
+              <a:rPr lang="de-AT" dirty="0" err="1"/>
+              <a:t>pursing</a:t>
+            </a:r>
+            <a:r>
+              <a:rPr lang="de-AT" dirty="0"/>
+              <a:t> </a:t>
+            </a:r>
+            <a:r>
+              <a:rPr lang="de-AT" dirty="0" err="1"/>
+              <a:t>the</a:t>
+            </a:r>
+            <a:r>
+              <a:rPr lang="de-AT" dirty="0"/>
+              <a:t> </a:t>
+            </a:r>
+            <a:r>
+              <a:rPr lang="de-AT" dirty="0" err="1"/>
+              <a:t>field</a:t>
+            </a:r>
+            <a:endParaRPr lang="de-AT" dirty="0"/>
+          </a:p>
+          <a:p>
+            <a:pPr marL="171450" indent="-171450">
+              <a:buFontTx/>
+              <a:buChar char="-"/>
+            </a:pPr>
+            <a:r>
+              <a:rPr lang="de-AT" dirty="0" err="1"/>
+              <a:t>Decoration</a:t>
+            </a:r>
+            <a:r>
+              <a:rPr lang="de-AT" dirty="0"/>
+              <a:t> </a:t>
+            </a:r>
+            <a:r>
+              <a:rPr lang="de-AT" dirty="0" err="1"/>
+              <a:t>gave</a:t>
+            </a:r>
+            <a:r>
+              <a:rPr lang="de-AT" dirty="0"/>
+              <a:t> </a:t>
+            </a:r>
+            <a:r>
+              <a:rPr lang="de-AT" dirty="0" err="1"/>
+              <a:t>them</a:t>
+            </a:r>
+            <a:r>
+              <a:rPr lang="de-AT" dirty="0"/>
+              <a:t> </a:t>
+            </a:r>
+            <a:r>
+              <a:rPr lang="de-AT" dirty="0" err="1"/>
+              <a:t>the</a:t>
+            </a:r>
+            <a:r>
+              <a:rPr lang="de-AT" dirty="0"/>
+              <a:t> </a:t>
+            </a:r>
+            <a:r>
+              <a:rPr lang="de-AT" dirty="0" err="1"/>
+              <a:t>feeling</a:t>
+            </a:r>
+            <a:r>
+              <a:rPr lang="de-AT" dirty="0"/>
+              <a:t> </a:t>
+            </a:r>
+            <a:r>
+              <a:rPr lang="de-AT" dirty="0" err="1"/>
+              <a:t>they</a:t>
+            </a:r>
+            <a:r>
+              <a:rPr lang="de-AT" dirty="0"/>
+              <a:t> </a:t>
+            </a:r>
+            <a:r>
+              <a:rPr lang="de-AT" dirty="0" err="1"/>
+              <a:t>didn‘t</a:t>
+            </a:r>
+            <a:r>
+              <a:rPr lang="de-AT" dirty="0"/>
+              <a:t> </a:t>
+            </a:r>
+            <a:r>
+              <a:rPr lang="de-AT" dirty="0" err="1"/>
+              <a:t>belong</a:t>
+            </a:r>
+            <a:r>
+              <a:rPr lang="de-AT" dirty="0"/>
+              <a:t> </a:t>
+            </a:r>
+            <a:r>
+              <a:rPr lang="de-AT" dirty="0" err="1"/>
+              <a:t>there</a:t>
+            </a:r>
+            <a:endParaRPr lang="de-AT" dirty="0"/>
+          </a:p>
+        </p:txBody>
+      </p:sp>
+      <p:sp>
+        <p:nvSpPr>
+          <p:cNvPr id="4" name="Foliennummernplatzhalter 3"/>
+          <p:cNvSpPr>
+            <a:spLocks noGrp="1"/>
+          </p:cNvSpPr>
+          <p:nvPr>
+            <p:ph type="sldNum" sz="quarter" idx="5"/>
+          </p:nvPr>
+        </p:nvSpPr>
+        <p:spPr/>
+        <p:txBody>
+          <a:bodyPr/>
+          <a:lstStyle/>
+          <a:p>
+            <a:fld id="{3A08C91C-33B4-40AA-981F-C4EDAC7C6C8B}" type="slidenum">
+              <a:rPr lang="en-US" smtClean="0"/>
+              <a:t>15</a:t>
+            </a:fld>
+            <a:endParaRPr lang="en-US"/>
+          </a:p>
+        </p:txBody>
+      </p:sp>
+    </p:spTree>
+    <p:extLst>
+      <p:ext uri="{BB962C8B-B14F-4D97-AF65-F5344CB8AC3E}">
+        <p14:creationId xmlns:p14="http://schemas.microsoft.com/office/powerpoint/2010/main" val="4195915271"/>
+      </p:ext>
+    </p:extLst>
+  </p:cSld>
+  <p:clrMapOvr>
+    <a:masterClrMapping/>
+  </p:clrMapOvr>
+</p:notes>
+</file>
+
+<file path=ppt/notesSlides/notesSlide4.xml><?xml version="1.0" encoding="utf-8"?>
+<p:notes xmlns:a="http://schemas.openxmlformats.org/drawingml/2006/main" xmlns:r="http://schemas.openxmlformats.org/officeDocument/2006/relationships" xmlns:p="http://schemas.openxmlformats.org/presentationml/2006/main">
+  <p:cSld>
+    <p:spTree>
+      <p:nvGrpSpPr>
+        <p:cNvPr id="1" name=""/>
+        <p:cNvGrpSpPr/>
+        <p:nvPr/>
+      </p:nvGrpSpPr>
+      <p:grpSpPr>
+        <a:xfrm>
+          <a:off x="0" y="0"/>
+          <a:ext cx="0" cy="0"/>
+          <a:chOff x="0" y="0"/>
+          <a:chExt cx="0" cy="0"/>
+        </a:xfrm>
+      </p:grpSpPr>
+      <p:sp>
+        <p:nvSpPr>
+          <p:cNvPr id="2" name="Folienbildplatzhalter 1"/>
+          <p:cNvSpPr>
+            <a:spLocks noGrp="1" noRot="1" noChangeAspect="1"/>
+          </p:cNvSpPr>
+          <p:nvPr>
+            <p:ph type="sldImg"/>
+          </p:nvPr>
+        </p:nvSpPr>
+        <p:spPr/>
+      </p:sp>
+      <p:sp>
+        <p:nvSpPr>
+          <p:cNvPr id="3" name="Notizenplatzhalter 2"/>
+          <p:cNvSpPr>
+            <a:spLocks noGrp="1"/>
+          </p:cNvSpPr>
+          <p:nvPr>
+            <p:ph type="body" idx="1"/>
+          </p:nvPr>
+        </p:nvSpPr>
+        <p:spPr/>
+        <p:txBody>
+          <a:bodyPr/>
+          <a:lstStyle/>
+          <a:p>
+            <a:r>
+              <a:rPr lang="de-AT" dirty="0"/>
+              <a:t>Video </a:t>
+            </a:r>
+            <a:r>
+              <a:rPr lang="de-AT" dirty="0" err="1"/>
+              <a:t>games</a:t>
+            </a:r>
+            <a:r>
+              <a:rPr lang="de-AT" dirty="0"/>
+              <a:t> </a:t>
+            </a:r>
+            <a:r>
+              <a:rPr lang="de-AT" dirty="0" err="1"/>
+              <a:t>tailored</a:t>
+            </a:r>
+            <a:r>
+              <a:rPr lang="de-AT" dirty="0"/>
+              <a:t> </a:t>
+            </a:r>
+            <a:r>
+              <a:rPr lang="de-AT" dirty="0" err="1"/>
+              <a:t>to</a:t>
+            </a:r>
+            <a:r>
+              <a:rPr lang="de-AT" dirty="0"/>
+              <a:t> </a:t>
+            </a:r>
+            <a:r>
+              <a:rPr lang="de-AT" dirty="0" err="1"/>
+              <a:t>boys</a:t>
+            </a:r>
+            <a:endParaRPr lang="de-AT" dirty="0"/>
+          </a:p>
+        </p:txBody>
+      </p:sp>
+      <p:sp>
+        <p:nvSpPr>
+          <p:cNvPr id="4" name="Foliennummernplatzhalter 3"/>
+          <p:cNvSpPr>
+            <a:spLocks noGrp="1"/>
+          </p:cNvSpPr>
+          <p:nvPr>
+            <p:ph type="sldNum" sz="quarter" idx="5"/>
+          </p:nvPr>
+        </p:nvSpPr>
+        <p:spPr/>
+        <p:txBody>
+          <a:bodyPr/>
+          <a:lstStyle/>
+          <a:p>
+            <a:fld id="{3A08C91C-33B4-40AA-981F-C4EDAC7C6C8B}" type="slidenum">
+              <a:rPr lang="en-US" smtClean="0"/>
+              <a:t>18</a:t>
+            </a:fld>
+            <a:endParaRPr lang="en-US"/>
+          </a:p>
+        </p:txBody>
+      </p:sp>
+    </p:spTree>
+    <p:extLst>
+      <p:ext uri="{BB962C8B-B14F-4D97-AF65-F5344CB8AC3E}">
+        <p14:creationId xmlns:p14="http://schemas.microsoft.com/office/powerpoint/2010/main" val="4272259150"/>
+      </p:ext>
+    </p:extLst>
+  </p:cSld>
+  <p:clrMapOvr>
+    <a:masterClrMapping/>
+  </p:clrMapOvr>
+</p:notes>
+</file>
+
+<file path=ppt/notesSlides/notesSlide5.xml><?xml version="1.0" encoding="utf-8"?>
+<p:notes xmlns:a="http://schemas.openxmlformats.org/drawingml/2006/main" xmlns:r="http://schemas.openxmlformats.org/officeDocument/2006/relationships" xmlns:p="http://schemas.openxmlformats.org/presentationml/2006/main">
+  <p:cSld>
+    <p:spTree>
+      <p:nvGrpSpPr>
+        <p:cNvPr id="1" name=""/>
+        <p:cNvGrpSpPr/>
+        <p:nvPr/>
+      </p:nvGrpSpPr>
+      <p:grpSpPr>
+        <a:xfrm>
+          <a:off x="0" y="0"/>
+          <a:ext cx="0" cy="0"/>
+          <a:chOff x="0" y="0"/>
+          <a:chExt cx="0" cy="0"/>
+        </a:xfrm>
+      </p:grpSpPr>
+      <p:sp>
+        <p:nvSpPr>
+          <p:cNvPr id="2" name="Folienbildplatzhalter 1"/>
+          <p:cNvSpPr>
+            <a:spLocks noGrp="1" noRot="1" noChangeAspect="1"/>
+          </p:cNvSpPr>
+          <p:nvPr>
+            <p:ph type="sldImg"/>
+          </p:nvPr>
+        </p:nvSpPr>
+        <p:spPr/>
+      </p:sp>
+      <p:sp>
+        <p:nvSpPr>
+          <p:cNvPr id="3" name="Notizenplatzhalter 2"/>
+          <p:cNvSpPr>
+            <a:spLocks noGrp="1"/>
+          </p:cNvSpPr>
+          <p:nvPr>
+            <p:ph type="body" idx="1"/>
+          </p:nvPr>
+        </p:nvSpPr>
+        <p:spPr/>
+        <p:txBody>
+          <a:bodyPr/>
+          <a:lstStyle/>
+          <a:p>
+            <a:r>
+              <a:rPr lang="de-AT" dirty="0"/>
+              <a:t>Men -&gt; </a:t>
+            </a:r>
+            <a:r>
+              <a:rPr lang="de-AT" dirty="0" err="1"/>
+              <a:t>start</a:t>
+            </a:r>
+            <a:r>
+              <a:rPr lang="de-AT" dirty="0"/>
+              <a:t> </a:t>
+            </a:r>
+            <a:r>
+              <a:rPr lang="de-AT" dirty="0" err="1"/>
+              <a:t>of</a:t>
+            </a:r>
+            <a:r>
+              <a:rPr lang="de-AT" dirty="0"/>
+              <a:t> </a:t>
+            </a:r>
+            <a:r>
+              <a:rPr lang="de-AT" dirty="0" err="1"/>
+              <a:t>university</a:t>
+            </a:r>
+            <a:r>
+              <a:rPr lang="de-AT" dirty="0"/>
+              <a:t>; Women -&gt; </a:t>
+            </a:r>
+            <a:r>
+              <a:rPr lang="de-AT" dirty="0" err="1"/>
+              <a:t>pursue</a:t>
+            </a:r>
+            <a:r>
+              <a:rPr lang="de-AT" dirty="0"/>
+              <a:t> a </a:t>
+            </a:r>
+            <a:r>
+              <a:rPr lang="de-AT" dirty="0" err="1"/>
+              <a:t>career</a:t>
+            </a:r>
+            <a:endParaRPr lang="de-AT" dirty="0"/>
+          </a:p>
+          <a:p>
+            <a:r>
+              <a:rPr lang="de-AT" dirty="0"/>
+              <a:t>Men -&gt; source code </a:t>
+            </a:r>
+            <a:r>
+              <a:rPr lang="de-AT" dirty="0" err="1"/>
+              <a:t>contributions</a:t>
+            </a:r>
+            <a:r>
+              <a:rPr lang="de-AT" dirty="0"/>
+              <a:t>; </a:t>
+            </a:r>
+            <a:r>
+              <a:rPr lang="de-AT" dirty="0" err="1"/>
+              <a:t>women</a:t>
+            </a:r>
+            <a:r>
+              <a:rPr lang="de-AT" dirty="0"/>
+              <a:t>: </a:t>
+            </a:r>
+            <a:r>
+              <a:rPr lang="de-AT" dirty="0" err="1"/>
+              <a:t>documentation</a:t>
+            </a:r>
+            <a:r>
+              <a:rPr lang="de-AT" dirty="0"/>
+              <a:t>, </a:t>
+            </a:r>
+            <a:r>
+              <a:rPr lang="de-AT" dirty="0" err="1"/>
+              <a:t>testing</a:t>
+            </a:r>
+            <a:r>
+              <a:rPr lang="de-AT" dirty="0"/>
+              <a:t>, </a:t>
+            </a:r>
+            <a:r>
+              <a:rPr lang="de-AT" dirty="0" err="1"/>
+              <a:t>translations</a:t>
+            </a:r>
+            <a:r>
+              <a:rPr lang="de-AT" dirty="0"/>
+              <a:t>, etc.</a:t>
+            </a:r>
+          </a:p>
+        </p:txBody>
+      </p:sp>
+      <p:sp>
+        <p:nvSpPr>
+          <p:cNvPr id="4" name="Foliennummernplatzhalter 3"/>
+          <p:cNvSpPr>
+            <a:spLocks noGrp="1"/>
+          </p:cNvSpPr>
+          <p:nvPr>
+            <p:ph type="sldNum" sz="quarter" idx="5"/>
+          </p:nvPr>
+        </p:nvSpPr>
+        <p:spPr/>
+        <p:txBody>
+          <a:bodyPr/>
+          <a:lstStyle/>
+          <a:p>
+            <a:fld id="{3A08C91C-33B4-40AA-981F-C4EDAC7C6C8B}" type="slidenum">
+              <a:rPr lang="en-US" smtClean="0"/>
+              <a:t>19</a:t>
+            </a:fld>
+            <a:endParaRPr lang="en-US"/>
+          </a:p>
+        </p:txBody>
+      </p:sp>
+    </p:spTree>
+    <p:extLst>
+      <p:ext uri="{BB962C8B-B14F-4D97-AF65-F5344CB8AC3E}">
+        <p14:creationId xmlns:p14="http://schemas.microsoft.com/office/powerpoint/2010/main" val="1000988566"/>
+      </p:ext>
+    </p:extLst>
+  </p:cSld>
+  <p:clrMapOvr>
+    <a:masterClrMapping/>
+  </p:clrMapOvr>
+</p:notes>
+</file>
+
 <file path=ppt/slideLayouts/slideLayout1.xml><?xml version="1.0" encoding="utf-8"?>
 <p:sldLayout xmlns:a="http://schemas.openxmlformats.org/drawingml/2006/main" xmlns:r="http://schemas.openxmlformats.org/officeDocument/2006/relationships" xmlns:p="http://schemas.openxmlformats.org/presentationml/2006/main" type="title" preserve="1">
   <p:cSld name="Title Slide">
@@ -707,7 +2301,7 @@
           <a:p>
             <a:fld id="{DCDACB0D-BBD2-40D0-A893-CF04513F27FC}" type="datetimeFigureOut">
               <a:rPr lang="en-US" smtClean="0"/>
-              <a:t>1/30/2020</a:t>
+              <a:t>1/31/2020</a:t>
             </a:fld>
             <a:endParaRPr lang="en-US"/>
           </a:p>
@@ -761,7 +2355,7 @@
           <a:p>
             <a:fld id="{C5DB2A98-4B90-4FDA-B1BD-5751ADF6E510}" type="slidenum">
               <a:rPr lang="en-US" smtClean="0"/>
-              <a:t>‹#›</a:t>
+              <a:t>‹Nr.›</a:t>
             </a:fld>
             <a:endParaRPr lang="en-US"/>
           </a:p>
@@ -905,7 +2499,7 @@
           <a:p>
             <a:fld id="{DCDACB0D-BBD2-40D0-A893-CF04513F27FC}" type="datetimeFigureOut">
               <a:rPr lang="en-US" smtClean="0"/>
-              <a:t>1/30/2020</a:t>
+              <a:t>1/31/2020</a:t>
             </a:fld>
             <a:endParaRPr lang="en-US"/>
           </a:p>
@@ -959,7 +2553,7 @@
           <a:p>
             <a:fld id="{C5DB2A98-4B90-4FDA-B1BD-5751ADF6E510}" type="slidenum">
               <a:rPr lang="en-US" smtClean="0"/>
-              <a:t>‹#›</a:t>
+              <a:t>‹Nr.›</a:t>
             </a:fld>
             <a:endParaRPr lang="en-US"/>
           </a:p>
@@ -1113,7 +2707,7 @@
           <a:p>
             <a:fld id="{DCDACB0D-BBD2-40D0-A893-CF04513F27FC}" type="datetimeFigureOut">
               <a:rPr lang="en-US" smtClean="0"/>
-              <a:t>1/30/2020</a:t>
+              <a:t>1/31/2020</a:t>
             </a:fld>
             <a:endParaRPr lang="en-US"/>
           </a:p>
@@ -1167,7 +2761,7 @@
           <a:p>
             <a:fld id="{C5DB2A98-4B90-4FDA-B1BD-5751ADF6E510}" type="slidenum">
               <a:rPr lang="en-US" smtClean="0"/>
-              <a:t>‹#›</a:t>
+              <a:t>‹Nr.›</a:t>
             </a:fld>
             <a:endParaRPr lang="en-US"/>
           </a:p>
@@ -1311,7 +2905,7 @@
           <a:p>
             <a:fld id="{DCDACB0D-BBD2-40D0-A893-CF04513F27FC}" type="datetimeFigureOut">
               <a:rPr lang="en-US" smtClean="0"/>
-              <a:t>1/30/2020</a:t>
+              <a:t>1/31/2020</a:t>
             </a:fld>
             <a:endParaRPr lang="en-US"/>
           </a:p>
@@ -1365,7 +2959,7 @@
           <a:p>
             <a:fld id="{C5DB2A98-4B90-4FDA-B1BD-5751ADF6E510}" type="slidenum">
               <a:rPr lang="en-US" smtClean="0"/>
-              <a:t>‹#›</a:t>
+              <a:t>‹Nr.›</a:t>
             </a:fld>
             <a:endParaRPr lang="en-US"/>
           </a:p>
@@ -1586,7 +3180,7 @@
           <a:p>
             <a:fld id="{DCDACB0D-BBD2-40D0-A893-CF04513F27FC}" type="datetimeFigureOut">
               <a:rPr lang="en-US" smtClean="0"/>
-              <a:t>1/30/2020</a:t>
+              <a:t>1/31/2020</a:t>
             </a:fld>
             <a:endParaRPr lang="en-US"/>
           </a:p>
@@ -1640,7 +3234,7 @@
           <a:p>
             <a:fld id="{C5DB2A98-4B90-4FDA-B1BD-5751ADF6E510}" type="slidenum">
               <a:rPr lang="en-US" smtClean="0"/>
-              <a:t>‹#›</a:t>
+              <a:t>‹Nr.›</a:t>
             </a:fld>
             <a:endParaRPr lang="en-US"/>
           </a:p>
@@ -1851,7 +3445,7 @@
           <a:p>
             <a:fld id="{DCDACB0D-BBD2-40D0-A893-CF04513F27FC}" type="datetimeFigureOut">
               <a:rPr lang="en-US" smtClean="0"/>
-              <a:t>1/30/2020</a:t>
+              <a:t>1/31/2020</a:t>
             </a:fld>
             <a:endParaRPr lang="en-US"/>
           </a:p>
@@ -1905,7 +3499,7 @@
           <a:p>
             <a:fld id="{C5DB2A98-4B90-4FDA-B1BD-5751ADF6E510}" type="slidenum">
               <a:rPr lang="en-US" smtClean="0"/>
-              <a:t>‹#›</a:t>
+              <a:t>‹Nr.›</a:t>
             </a:fld>
             <a:endParaRPr lang="en-US"/>
           </a:p>
@@ -2263,7 +3857,7 @@
           <a:p>
             <a:fld id="{DCDACB0D-BBD2-40D0-A893-CF04513F27FC}" type="datetimeFigureOut">
               <a:rPr lang="en-US" smtClean="0"/>
-              <a:t>1/30/2020</a:t>
+              <a:t>1/31/2020</a:t>
             </a:fld>
             <a:endParaRPr lang="en-US"/>
           </a:p>
@@ -2317,7 +3911,7 @@
           <a:p>
             <a:fld id="{C5DB2A98-4B90-4FDA-B1BD-5751ADF6E510}" type="slidenum">
               <a:rPr lang="en-US" smtClean="0"/>
-              <a:t>‹#›</a:t>
+              <a:t>‹Nr.›</a:t>
             </a:fld>
             <a:endParaRPr lang="en-US"/>
           </a:p>
@@ -2404,7 +3998,7 @@
           <a:p>
             <a:fld id="{DCDACB0D-BBD2-40D0-A893-CF04513F27FC}" type="datetimeFigureOut">
               <a:rPr lang="en-US" smtClean="0"/>
-              <a:t>1/30/2020</a:t>
+              <a:t>1/31/2020</a:t>
             </a:fld>
             <a:endParaRPr lang="en-US"/>
           </a:p>
@@ -2458,7 +4052,7 @@
           <a:p>
             <a:fld id="{C5DB2A98-4B90-4FDA-B1BD-5751ADF6E510}" type="slidenum">
               <a:rPr lang="en-US" smtClean="0"/>
-              <a:t>‹#›</a:t>
+              <a:t>‹Nr.›</a:t>
             </a:fld>
             <a:endParaRPr lang="en-US"/>
           </a:p>
@@ -2517,7 +4111,7 @@
           <a:p>
             <a:fld id="{DCDACB0D-BBD2-40D0-A893-CF04513F27FC}" type="datetimeFigureOut">
               <a:rPr lang="en-US" smtClean="0"/>
-              <a:t>1/30/2020</a:t>
+              <a:t>1/31/2020</a:t>
             </a:fld>
             <a:endParaRPr lang="en-US"/>
           </a:p>
@@ -2571,7 +4165,7 @@
           <a:p>
             <a:fld id="{C5DB2A98-4B90-4FDA-B1BD-5751ADF6E510}" type="slidenum">
               <a:rPr lang="en-US" smtClean="0"/>
-              <a:t>‹#›</a:t>
+              <a:t>‹Nr.›</a:t>
             </a:fld>
             <a:endParaRPr lang="en-US"/>
           </a:p>
@@ -2828,7 +4422,7 @@
           <a:p>
             <a:fld id="{DCDACB0D-BBD2-40D0-A893-CF04513F27FC}" type="datetimeFigureOut">
               <a:rPr lang="en-US" smtClean="0"/>
-              <a:t>1/30/2020</a:t>
+              <a:t>1/31/2020</a:t>
             </a:fld>
             <a:endParaRPr lang="en-US"/>
           </a:p>
@@ -2882,7 +4476,7 @@
           <a:p>
             <a:fld id="{C5DB2A98-4B90-4FDA-B1BD-5751ADF6E510}" type="slidenum">
               <a:rPr lang="en-US" smtClean="0"/>
-              <a:t>‹#›</a:t>
+              <a:t>‹Nr.›</a:t>
             </a:fld>
             <a:endParaRPr lang="en-US"/>
           </a:p>
@@ -3116,7 +4710,7 @@
           <a:p>
             <a:fld id="{DCDACB0D-BBD2-40D0-A893-CF04513F27FC}" type="datetimeFigureOut">
               <a:rPr lang="en-US" smtClean="0"/>
-              <a:t>1/30/2020</a:t>
+              <a:t>1/31/2020</a:t>
             </a:fld>
             <a:endParaRPr lang="en-US"/>
           </a:p>
@@ -3170,7 +4764,7 @@
           <a:p>
             <a:fld id="{C5DB2A98-4B90-4FDA-B1BD-5751ADF6E510}" type="slidenum">
               <a:rPr lang="en-US" smtClean="0"/>
-              <a:t>‹#›</a:t>
+              <a:t>‹Nr.›</a:t>
             </a:fld>
             <a:endParaRPr lang="en-US"/>
           </a:p>
@@ -3357,7 +4951,7 @@
           <a:p>
             <a:fld id="{DCDACB0D-BBD2-40D0-A893-CF04513F27FC}" type="datetimeFigureOut">
               <a:rPr lang="en-US" smtClean="0"/>
-              <a:t>1/30/2020</a:t>
+              <a:t>1/31/2020</a:t>
             </a:fld>
             <a:endParaRPr lang="en-US"/>
           </a:p>
@@ -3447,7 +5041,7 @@
           <a:p>
             <a:fld id="{C5DB2A98-4B90-4FDA-B1BD-5751ADF6E510}" type="slidenum">
               <a:rPr lang="en-US" smtClean="0"/>
-              <a:t>‹#›</a:t>
+              <a:t>‹Nr.›</a:t>
             </a:fld>
             <a:endParaRPr lang="en-US"/>
           </a:p>
@@ -4346,6 +5940,1648 @@
     <p:extLst>
       <p:ext uri="{BB962C8B-B14F-4D97-AF65-F5344CB8AC3E}">
         <p14:creationId xmlns:p14="http://schemas.microsoft.com/office/powerpoint/2010/main" val="851255195"/>
+      </p:ext>
+    </p:extLst>
+  </p:cSld>
+  <p:clrMapOvr>
+    <a:masterClrMapping/>
+  </p:clrMapOvr>
+</p:sld>
+</file>
+
+<file path=ppt/slides/slide14.xml><?xml version="1.0" encoding="utf-8"?>
+<p:sld xmlns:a="http://schemas.openxmlformats.org/drawingml/2006/main" xmlns:r="http://schemas.openxmlformats.org/officeDocument/2006/relationships" xmlns:p="http://schemas.openxmlformats.org/presentationml/2006/main">
+  <p:cSld>
+    <p:spTree>
+      <p:nvGrpSpPr>
+        <p:cNvPr id="1" name=""/>
+        <p:cNvGrpSpPr/>
+        <p:nvPr/>
+      </p:nvGrpSpPr>
+      <p:grpSpPr>
+        <a:xfrm>
+          <a:off x="0" y="0"/>
+          <a:ext cx="0" cy="0"/>
+          <a:chOff x="0" y="0"/>
+          <a:chExt cx="0" cy="0"/>
+        </a:xfrm>
+      </p:grpSpPr>
+      <p:sp>
+        <p:nvSpPr>
+          <p:cNvPr id="2" name="Titel 1">
+            <a:extLst>
+              <a:ext uri="{FF2B5EF4-FFF2-40B4-BE49-F238E27FC236}">
+                <a16:creationId xmlns:a16="http://schemas.microsoft.com/office/drawing/2014/main" id="{12645892-AC38-45BC-9601-AC51F32FB708}"/>
+              </a:ext>
+            </a:extLst>
+          </p:cNvPr>
+          <p:cNvSpPr>
+            <a:spLocks noGrp="1"/>
+          </p:cNvSpPr>
+          <p:nvPr>
+            <p:ph type="title"/>
+          </p:nvPr>
+        </p:nvSpPr>
+        <p:spPr/>
+        <p:txBody>
+          <a:bodyPr/>
+          <a:lstStyle/>
+          <a:p>
+            <a:r>
+              <a:rPr lang="de-AT" dirty="0" err="1"/>
+              <a:t>Female</a:t>
+            </a:r>
+            <a:r>
+              <a:rPr lang="de-AT" dirty="0"/>
+              <a:t> </a:t>
+            </a:r>
+            <a:r>
+              <a:rPr lang="de-AT" dirty="0" err="1"/>
+              <a:t>Participation</a:t>
+            </a:r>
+            <a:r>
+              <a:rPr lang="de-AT" dirty="0"/>
+              <a:t> in Computer Science</a:t>
+            </a:r>
+          </a:p>
+        </p:txBody>
+      </p:sp>
+      <p:graphicFrame>
+        <p:nvGraphicFramePr>
+          <p:cNvPr id="6" name="Inhaltsplatzhalter 5">
+            <a:extLst>
+              <a:ext uri="{FF2B5EF4-FFF2-40B4-BE49-F238E27FC236}">
+                <a16:creationId xmlns:a16="http://schemas.microsoft.com/office/drawing/2014/main" id="{CC6F54AD-866F-4066-8549-83E4CE92EF4E}"/>
+              </a:ext>
+            </a:extLst>
+          </p:cNvPr>
+          <p:cNvGraphicFramePr>
+            <a:graphicFrameLocks noGrp="1"/>
+          </p:cNvGraphicFramePr>
+          <p:nvPr>
+            <p:ph idx="1"/>
+            <p:extLst>
+              <p:ext uri="{D42A27DB-BD31-4B8C-83A1-F6EECF244321}">
+                <p14:modId xmlns:p14="http://schemas.microsoft.com/office/powerpoint/2010/main" val="626852798"/>
+              </p:ext>
+            </p:extLst>
+          </p:nvPr>
+        </p:nvGraphicFramePr>
+        <p:xfrm>
+          <a:off x="838200" y="1825625"/>
+          <a:ext cx="10515600" cy="4351338"/>
+        </p:xfrm>
+        <a:graphic>
+          <a:graphicData uri="http://schemas.openxmlformats.org/drawingml/2006/chart">
+            <c:chart xmlns:c="http://schemas.openxmlformats.org/drawingml/2006/chart" xmlns:r="http://schemas.openxmlformats.org/officeDocument/2006/relationships" r:id="rId3"/>
+          </a:graphicData>
+        </a:graphic>
+      </p:graphicFrame>
+      <p:sp>
+        <p:nvSpPr>
+          <p:cNvPr id="7" name="Textfeld 6">
+            <a:extLst>
+              <a:ext uri="{FF2B5EF4-FFF2-40B4-BE49-F238E27FC236}">
+                <a16:creationId xmlns:a16="http://schemas.microsoft.com/office/drawing/2014/main" id="{9E3DA11B-A7B7-4B92-8817-D4AA2FBA9488}"/>
+              </a:ext>
+            </a:extLst>
+          </p:cNvPr>
+          <p:cNvSpPr txBox="1"/>
+          <p:nvPr/>
+        </p:nvSpPr>
+        <p:spPr>
+          <a:xfrm>
+            <a:off x="0" y="6627168"/>
+            <a:ext cx="12192000" cy="230832"/>
+          </a:xfrm>
+          <a:prstGeom prst="rect">
+            <a:avLst/>
+          </a:prstGeom>
+          <a:noFill/>
+        </p:spPr>
+        <p:txBody>
+          <a:bodyPr wrap="square" rtlCol="0">
+            <a:spAutoFit/>
+          </a:bodyPr>
+          <a:lstStyle/>
+          <a:p>
+            <a:r>
+              <a:rPr lang="en-US" sz="900" b="1" dirty="0">
+                <a:solidFill>
+                  <a:schemeClr val="tx1">
+                    <a:lumMod val="65000"/>
+                    <a:lumOff val="35000"/>
+                  </a:schemeClr>
+                </a:solidFill>
+              </a:rPr>
+              <a:t>Source:</a:t>
+            </a:r>
+            <a:r>
+              <a:rPr lang="en-US" sz="900" dirty="0">
+                <a:solidFill>
+                  <a:schemeClr val="tx1">
+                    <a:lumMod val="65000"/>
+                    <a:lumOff val="35000"/>
+                  </a:schemeClr>
+                </a:solidFill>
+              </a:rPr>
+              <a:t> Master, Allison &amp; </a:t>
+            </a:r>
+            <a:r>
+              <a:rPr lang="en-US" sz="900" dirty="0" err="1">
+                <a:solidFill>
+                  <a:schemeClr val="tx1">
+                    <a:lumMod val="65000"/>
+                    <a:lumOff val="35000"/>
+                  </a:schemeClr>
+                </a:solidFill>
+              </a:rPr>
+              <a:t>Cheryan</a:t>
+            </a:r>
+            <a:r>
+              <a:rPr lang="en-US" sz="900" dirty="0">
+                <a:solidFill>
+                  <a:schemeClr val="tx1">
+                    <a:lumMod val="65000"/>
+                    <a:lumOff val="35000"/>
+                  </a:schemeClr>
+                </a:solidFill>
+              </a:rPr>
+              <a:t>, Sapna &amp; Meltzoff, Andrew. (2016). Computing Whether She Belongs: Stereotypes Undermine Girls' Interest and Sense of Belonging in Computer Science. Journal of Educational Psychology. 108. 10.1037/edu0000061. </a:t>
+            </a:r>
+            <a:endParaRPr lang="de-AT" sz="900" dirty="0">
+              <a:solidFill>
+                <a:schemeClr val="tx1">
+                  <a:lumMod val="65000"/>
+                  <a:lumOff val="35000"/>
+                </a:schemeClr>
+              </a:solidFill>
+            </a:endParaRPr>
+          </a:p>
+        </p:txBody>
+      </p:sp>
+    </p:spTree>
+    <p:extLst>
+      <p:ext uri="{BB962C8B-B14F-4D97-AF65-F5344CB8AC3E}">
+        <p14:creationId xmlns:p14="http://schemas.microsoft.com/office/powerpoint/2010/main" val="389832164"/>
+      </p:ext>
+    </p:extLst>
+  </p:cSld>
+  <p:clrMapOvr>
+    <a:masterClrMapping/>
+  </p:clrMapOvr>
+</p:sld>
+</file>
+
+<file path=ppt/slides/slide15.xml><?xml version="1.0" encoding="utf-8"?>
+<p:sld xmlns:a="http://schemas.openxmlformats.org/drawingml/2006/main" xmlns:r="http://schemas.openxmlformats.org/officeDocument/2006/relationships" xmlns:p="http://schemas.openxmlformats.org/presentationml/2006/main">
+  <p:cSld>
+    <p:spTree>
+      <p:nvGrpSpPr>
+        <p:cNvPr id="1" name=""/>
+        <p:cNvGrpSpPr/>
+        <p:nvPr/>
+      </p:nvGrpSpPr>
+      <p:grpSpPr>
+        <a:xfrm>
+          <a:off x="0" y="0"/>
+          <a:ext cx="0" cy="0"/>
+          <a:chOff x="0" y="0"/>
+          <a:chExt cx="0" cy="0"/>
+        </a:xfrm>
+      </p:grpSpPr>
+      <p:sp>
+        <p:nvSpPr>
+          <p:cNvPr id="2" name="Titel 1">
+            <a:extLst>
+              <a:ext uri="{FF2B5EF4-FFF2-40B4-BE49-F238E27FC236}">
+                <a16:creationId xmlns:a16="http://schemas.microsoft.com/office/drawing/2014/main" id="{C9EBCD7B-1E59-4B7D-AE11-95BFE525BBE6}"/>
+              </a:ext>
+            </a:extLst>
+          </p:cNvPr>
+          <p:cNvSpPr>
+            <a:spLocks noGrp="1"/>
+          </p:cNvSpPr>
+          <p:nvPr>
+            <p:ph type="title"/>
+          </p:nvPr>
+        </p:nvSpPr>
+        <p:spPr/>
+        <p:txBody>
+          <a:bodyPr/>
+          <a:lstStyle/>
+          <a:p>
+            <a:r>
+              <a:rPr lang="de-AT" dirty="0"/>
+              <a:t>Stereotypes</a:t>
+            </a:r>
+          </a:p>
+        </p:txBody>
+      </p:sp>
+      <p:sp>
+        <p:nvSpPr>
+          <p:cNvPr id="3" name="Inhaltsplatzhalter 2">
+            <a:extLst>
+              <a:ext uri="{FF2B5EF4-FFF2-40B4-BE49-F238E27FC236}">
+                <a16:creationId xmlns:a16="http://schemas.microsoft.com/office/drawing/2014/main" id="{AAA47B34-AEB3-4F3B-A08F-6B4E73843E23}"/>
+              </a:ext>
+            </a:extLst>
+          </p:cNvPr>
+          <p:cNvSpPr>
+            <a:spLocks noGrp="1"/>
+          </p:cNvSpPr>
+          <p:nvPr>
+            <p:ph idx="1"/>
+          </p:nvPr>
+        </p:nvSpPr>
+        <p:spPr/>
+        <p:txBody>
+          <a:bodyPr>
+            <a:normAutofit/>
+          </a:bodyPr>
+          <a:lstStyle/>
+          <a:p>
+            <a:r>
+              <a:rPr lang="de-AT" dirty="0" err="1"/>
+              <a:t>Examples</a:t>
+            </a:r>
+            <a:r>
+              <a:rPr lang="de-AT" dirty="0"/>
+              <a:t>: male-</a:t>
+            </a:r>
+            <a:r>
+              <a:rPr lang="de-AT" dirty="0" err="1"/>
+              <a:t>dominated</a:t>
+            </a:r>
+            <a:r>
+              <a:rPr lang="de-AT" dirty="0"/>
+              <a:t>, </a:t>
+            </a:r>
+            <a:r>
+              <a:rPr lang="de-AT" dirty="0" err="1"/>
+              <a:t>brilliant</a:t>
+            </a:r>
+            <a:r>
+              <a:rPr lang="de-AT" dirty="0"/>
+              <a:t>, </a:t>
+            </a:r>
+            <a:r>
+              <a:rPr lang="de-AT" dirty="0" err="1"/>
+              <a:t>nerdy</a:t>
+            </a:r>
+            <a:r>
+              <a:rPr lang="de-AT" dirty="0"/>
+              <a:t>, lack social-</a:t>
+            </a:r>
+            <a:r>
+              <a:rPr lang="de-AT" dirty="0" err="1"/>
+              <a:t>skills</a:t>
+            </a:r>
+            <a:endParaRPr lang="de-AT" dirty="0"/>
+          </a:p>
+          <a:p>
+            <a:pPr marL="0" indent="0">
+              <a:buNone/>
+            </a:pPr>
+            <a:endParaRPr lang="de-AT" dirty="0"/>
+          </a:p>
+          <a:p>
+            <a:r>
+              <a:rPr lang="de-AT" dirty="0"/>
+              <a:t>Media </a:t>
+            </a:r>
+            <a:r>
+              <a:rPr lang="de-AT" dirty="0" err="1"/>
+              <a:t>portrays</a:t>
+            </a:r>
+            <a:r>
+              <a:rPr lang="de-AT" dirty="0"/>
+              <a:t> </a:t>
+            </a:r>
+            <a:r>
+              <a:rPr lang="de-AT" dirty="0" err="1"/>
+              <a:t>computer</a:t>
+            </a:r>
+            <a:r>
+              <a:rPr lang="de-AT" dirty="0"/>
+              <a:t> </a:t>
+            </a:r>
+            <a:r>
+              <a:rPr lang="de-AT" dirty="0" err="1"/>
+              <a:t>scientists</a:t>
+            </a:r>
+            <a:r>
+              <a:rPr lang="de-AT" dirty="0"/>
+              <a:t> in a </a:t>
+            </a:r>
+            <a:r>
+              <a:rPr lang="de-AT" dirty="0" err="1"/>
+              <a:t>stereotypical</a:t>
+            </a:r>
+            <a:r>
+              <a:rPr lang="de-AT" dirty="0"/>
+              <a:t> </a:t>
+            </a:r>
+            <a:r>
+              <a:rPr lang="de-AT" dirty="0" err="1"/>
+              <a:t>manner</a:t>
+            </a:r>
+            <a:endParaRPr lang="de-AT" dirty="0"/>
+          </a:p>
+          <a:p>
+            <a:endParaRPr lang="de-AT" dirty="0"/>
+          </a:p>
+          <a:p>
+            <a:r>
+              <a:rPr lang="de-AT" dirty="0"/>
+              <a:t>Hypothesis: Women </a:t>
+            </a:r>
+            <a:r>
+              <a:rPr lang="de-AT" dirty="0" err="1"/>
+              <a:t>don‘t</a:t>
+            </a:r>
+            <a:r>
+              <a:rPr lang="de-AT" dirty="0"/>
+              <a:t> </a:t>
+            </a:r>
+            <a:r>
+              <a:rPr lang="de-AT" dirty="0" err="1"/>
+              <a:t>consider</a:t>
+            </a:r>
+            <a:r>
+              <a:rPr lang="de-AT" dirty="0"/>
+              <a:t> Computer Science </a:t>
+            </a:r>
+            <a:r>
+              <a:rPr lang="de-AT" dirty="0" err="1"/>
+              <a:t>careers</a:t>
+            </a:r>
+            <a:r>
+              <a:rPr lang="de-AT" dirty="0"/>
+              <a:t> </a:t>
+            </a:r>
+            <a:r>
+              <a:rPr lang="de-AT" dirty="0" err="1"/>
+              <a:t>because</a:t>
+            </a:r>
+            <a:r>
+              <a:rPr lang="de-AT" dirty="0"/>
+              <a:t> </a:t>
+            </a:r>
+            <a:r>
+              <a:rPr lang="de-AT" dirty="0" err="1"/>
+              <a:t>of</a:t>
+            </a:r>
+            <a:r>
+              <a:rPr lang="de-AT" dirty="0"/>
+              <a:t> stereotypes</a:t>
+            </a:r>
+          </a:p>
+          <a:p>
+            <a:endParaRPr lang="de-AT" dirty="0"/>
+          </a:p>
+          <a:p>
+            <a:r>
+              <a:rPr lang="de-AT" dirty="0"/>
+              <a:t>Stereotypes in </a:t>
+            </a:r>
+            <a:r>
+              <a:rPr lang="de-AT" dirty="0" err="1"/>
+              <a:t>childhood</a:t>
+            </a:r>
+            <a:r>
+              <a:rPr lang="de-AT" dirty="0"/>
+              <a:t> </a:t>
+            </a:r>
+            <a:r>
+              <a:rPr lang="de-AT" dirty="0" err="1"/>
+              <a:t>with</a:t>
+            </a:r>
+            <a:r>
+              <a:rPr lang="de-AT" dirty="0"/>
+              <a:t> </a:t>
+            </a:r>
+            <a:r>
+              <a:rPr lang="de-AT" dirty="0" err="1"/>
+              <a:t>occupation</a:t>
+            </a:r>
+            <a:r>
+              <a:rPr lang="de-AT" dirty="0"/>
+              <a:t> </a:t>
+            </a:r>
+            <a:r>
+              <a:rPr lang="de-AT" dirty="0" err="1"/>
+              <a:t>choice</a:t>
+            </a:r>
+            <a:endParaRPr lang="de-AT" dirty="0"/>
+          </a:p>
+          <a:p>
+            <a:endParaRPr lang="de-AT" dirty="0"/>
+          </a:p>
+        </p:txBody>
+      </p:sp>
+    </p:spTree>
+    <p:extLst>
+      <p:ext uri="{BB962C8B-B14F-4D97-AF65-F5344CB8AC3E}">
+        <p14:creationId xmlns:p14="http://schemas.microsoft.com/office/powerpoint/2010/main" val="1039466081"/>
+      </p:ext>
+    </p:extLst>
+  </p:cSld>
+  <p:clrMapOvr>
+    <a:masterClrMapping/>
+  </p:clrMapOvr>
+</p:sld>
+</file>
+
+<file path=ppt/slides/slide16.xml><?xml version="1.0" encoding="utf-8"?>
+<p:sld xmlns:a="http://schemas.openxmlformats.org/drawingml/2006/main" xmlns:r="http://schemas.openxmlformats.org/officeDocument/2006/relationships" xmlns:p="http://schemas.openxmlformats.org/presentationml/2006/main">
+  <p:cSld>
+    <p:spTree>
+      <p:nvGrpSpPr>
+        <p:cNvPr id="1" name=""/>
+        <p:cNvGrpSpPr/>
+        <p:nvPr/>
+      </p:nvGrpSpPr>
+      <p:grpSpPr>
+        <a:xfrm>
+          <a:off x="0" y="0"/>
+          <a:ext cx="0" cy="0"/>
+          <a:chOff x="0" y="0"/>
+          <a:chExt cx="0" cy="0"/>
+        </a:xfrm>
+      </p:grpSpPr>
+      <p:sp>
+        <p:nvSpPr>
+          <p:cNvPr id="2" name="Titel 1">
+            <a:extLst>
+              <a:ext uri="{FF2B5EF4-FFF2-40B4-BE49-F238E27FC236}">
+                <a16:creationId xmlns:a16="http://schemas.microsoft.com/office/drawing/2014/main" id="{0914F9E9-F256-46E6-AFD7-0C96C53C2347}"/>
+              </a:ext>
+            </a:extLst>
+          </p:cNvPr>
+          <p:cNvSpPr>
+            <a:spLocks noGrp="1"/>
+          </p:cNvSpPr>
+          <p:nvPr>
+            <p:ph type="title"/>
+          </p:nvPr>
+        </p:nvSpPr>
+        <p:spPr/>
+        <p:txBody>
+          <a:bodyPr/>
+          <a:lstStyle/>
+          <a:p>
+            <a:r>
+              <a:rPr lang="de-AT" dirty="0" err="1"/>
+              <a:t>Social</a:t>
+            </a:r>
+            <a:r>
+              <a:rPr lang="de-AT" dirty="0"/>
+              <a:t> </a:t>
+            </a:r>
+            <a:r>
+              <a:rPr lang="de-AT" dirty="0" err="1"/>
+              <a:t>Barrier</a:t>
+            </a:r>
+            <a:endParaRPr lang="de-AT" dirty="0"/>
+          </a:p>
+        </p:txBody>
+      </p:sp>
+      <p:sp>
+        <p:nvSpPr>
+          <p:cNvPr id="3" name="Inhaltsplatzhalter 2">
+            <a:extLst>
+              <a:ext uri="{FF2B5EF4-FFF2-40B4-BE49-F238E27FC236}">
+                <a16:creationId xmlns:a16="http://schemas.microsoft.com/office/drawing/2014/main" id="{D89E313D-1530-44F4-8A8B-29B8E8AB07A0}"/>
+              </a:ext>
+            </a:extLst>
+          </p:cNvPr>
+          <p:cNvSpPr>
+            <a:spLocks noGrp="1"/>
+          </p:cNvSpPr>
+          <p:nvPr>
+            <p:ph idx="1"/>
+          </p:nvPr>
+        </p:nvSpPr>
+        <p:spPr/>
+        <p:txBody>
+          <a:bodyPr/>
+          <a:lstStyle/>
+          <a:p>
+            <a:r>
+              <a:rPr lang="de-AT" dirty="0"/>
+              <a:t>Personal</a:t>
+            </a:r>
+          </a:p>
+          <a:p>
+            <a:pPr lvl="1"/>
+            <a:r>
+              <a:rPr lang="de-AT" dirty="0" err="1"/>
+              <a:t>Hesitation</a:t>
+            </a:r>
+            <a:r>
+              <a:rPr lang="de-AT" dirty="0"/>
+              <a:t> in </a:t>
+            </a:r>
+            <a:r>
+              <a:rPr lang="de-AT" dirty="0" err="1"/>
+              <a:t>beginning</a:t>
+            </a:r>
+            <a:r>
+              <a:rPr lang="de-AT" dirty="0"/>
+              <a:t> a </a:t>
+            </a:r>
+            <a:r>
+              <a:rPr lang="de-AT" dirty="0" err="1"/>
+              <a:t>career</a:t>
+            </a:r>
+            <a:r>
+              <a:rPr lang="de-AT" dirty="0"/>
+              <a:t> in </a:t>
+            </a:r>
+            <a:r>
+              <a:rPr lang="de-AT" dirty="0" err="1"/>
+              <a:t>masculine</a:t>
+            </a:r>
+            <a:r>
+              <a:rPr lang="de-AT" dirty="0"/>
+              <a:t> </a:t>
+            </a:r>
+            <a:r>
+              <a:rPr lang="de-AT" dirty="0" err="1"/>
+              <a:t>field</a:t>
+            </a:r>
+            <a:endParaRPr lang="de-AT" dirty="0"/>
+          </a:p>
+          <a:p>
+            <a:pPr lvl="1"/>
+            <a:r>
+              <a:rPr lang="de-AT" dirty="0"/>
+              <a:t>Work-</a:t>
+            </a:r>
+            <a:r>
+              <a:rPr lang="de-AT" dirty="0" err="1"/>
+              <a:t>family</a:t>
+            </a:r>
+            <a:r>
+              <a:rPr lang="de-AT" dirty="0"/>
+              <a:t> </a:t>
+            </a:r>
+            <a:r>
+              <a:rPr lang="de-AT" dirty="0" err="1"/>
+              <a:t>balance</a:t>
+            </a:r>
+            <a:r>
+              <a:rPr lang="de-AT" dirty="0"/>
+              <a:t>?</a:t>
+            </a:r>
+          </a:p>
+          <a:p>
+            <a:pPr lvl="1"/>
+            <a:r>
+              <a:rPr lang="de-AT" dirty="0" err="1"/>
+              <a:t>Under-estimation</a:t>
+            </a:r>
+            <a:endParaRPr lang="de-AT" dirty="0"/>
+          </a:p>
+          <a:p>
+            <a:pPr lvl="1"/>
+            <a:r>
+              <a:rPr lang="de-AT" dirty="0"/>
+              <a:t>Put at </a:t>
+            </a:r>
+            <a:r>
+              <a:rPr lang="de-AT" dirty="0" err="1"/>
+              <a:t>disadvantage</a:t>
+            </a:r>
+            <a:r>
+              <a:rPr lang="de-AT" dirty="0"/>
+              <a:t> </a:t>
+            </a:r>
+            <a:r>
+              <a:rPr lang="de-AT" dirty="0" err="1"/>
+              <a:t>for</a:t>
+            </a:r>
+            <a:r>
+              <a:rPr lang="de-AT" dirty="0"/>
+              <a:t> </a:t>
+            </a:r>
+            <a:r>
+              <a:rPr lang="de-AT" dirty="0" err="1"/>
+              <a:t>displaying</a:t>
+            </a:r>
+            <a:r>
+              <a:rPr lang="de-AT" dirty="0"/>
+              <a:t> </a:t>
+            </a:r>
+            <a:r>
+              <a:rPr lang="de-AT" dirty="0" err="1"/>
+              <a:t>expertise</a:t>
+            </a:r>
+            <a:endParaRPr lang="de-AT" dirty="0"/>
+          </a:p>
+          <a:p>
+            <a:r>
+              <a:rPr lang="de-AT" dirty="0"/>
+              <a:t>Outside</a:t>
+            </a:r>
+          </a:p>
+          <a:p>
+            <a:pPr lvl="1"/>
+            <a:r>
+              <a:rPr lang="de-AT" dirty="0"/>
+              <a:t>People lack </a:t>
+            </a:r>
+            <a:r>
+              <a:rPr lang="de-AT" dirty="0" err="1"/>
+              <a:t>understanding</a:t>
+            </a:r>
+            <a:r>
+              <a:rPr lang="de-AT" dirty="0"/>
+              <a:t> </a:t>
+            </a:r>
+            <a:r>
+              <a:rPr lang="de-AT" dirty="0" err="1"/>
+              <a:t>of</a:t>
+            </a:r>
+            <a:r>
+              <a:rPr lang="de-AT" dirty="0"/>
+              <a:t> </a:t>
+            </a:r>
+            <a:r>
+              <a:rPr lang="de-AT" dirty="0" err="1"/>
+              <a:t>the</a:t>
+            </a:r>
+            <a:r>
+              <a:rPr lang="de-AT" dirty="0"/>
+              <a:t> </a:t>
+            </a:r>
+            <a:r>
+              <a:rPr lang="de-AT" dirty="0" err="1"/>
+              <a:t>field</a:t>
+            </a:r>
+            <a:endParaRPr lang="de-AT" dirty="0"/>
+          </a:p>
+          <a:p>
+            <a:pPr lvl="1"/>
+            <a:r>
+              <a:rPr lang="de-AT" dirty="0" err="1"/>
+              <a:t>Don‘t</a:t>
+            </a:r>
+            <a:r>
+              <a:rPr lang="de-AT" dirty="0"/>
+              <a:t> </a:t>
+            </a:r>
+            <a:r>
+              <a:rPr lang="de-AT" dirty="0" err="1"/>
+              <a:t>recommend</a:t>
+            </a:r>
+            <a:r>
+              <a:rPr lang="de-AT" dirty="0"/>
+              <a:t> </a:t>
+            </a:r>
+            <a:r>
+              <a:rPr lang="de-AT" dirty="0" err="1"/>
+              <a:t>because</a:t>
+            </a:r>
+            <a:r>
+              <a:rPr lang="de-AT" dirty="0"/>
+              <a:t> </a:t>
+            </a:r>
+            <a:r>
+              <a:rPr lang="de-AT" dirty="0" err="1"/>
+              <a:t>it‘s</a:t>
+            </a:r>
+            <a:r>
+              <a:rPr lang="de-AT" dirty="0"/>
+              <a:t> </a:t>
+            </a:r>
+            <a:r>
+              <a:rPr lang="de-AT" dirty="0" err="1"/>
+              <a:t>perceived</a:t>
+            </a:r>
+            <a:r>
+              <a:rPr lang="de-AT" dirty="0"/>
+              <a:t> </a:t>
+            </a:r>
+            <a:r>
+              <a:rPr lang="de-AT" dirty="0" err="1"/>
+              <a:t>more</a:t>
+            </a:r>
+            <a:r>
+              <a:rPr lang="de-AT" dirty="0"/>
+              <a:t> </a:t>
+            </a:r>
+            <a:r>
+              <a:rPr lang="de-AT" dirty="0" err="1"/>
+              <a:t>appropriate</a:t>
+            </a:r>
+            <a:r>
+              <a:rPr lang="de-AT" dirty="0"/>
+              <a:t> </a:t>
+            </a:r>
+            <a:r>
+              <a:rPr lang="de-AT" dirty="0" err="1"/>
+              <a:t>for</a:t>
+            </a:r>
+            <a:r>
+              <a:rPr lang="de-AT" dirty="0"/>
+              <a:t> </a:t>
+            </a:r>
+            <a:r>
+              <a:rPr lang="de-AT" dirty="0" err="1"/>
+              <a:t>men</a:t>
+            </a:r>
+            <a:endParaRPr lang="de-AT" dirty="0"/>
+          </a:p>
+          <a:p>
+            <a:pPr lvl="1"/>
+            <a:endParaRPr lang="de-AT" dirty="0"/>
+          </a:p>
+          <a:p>
+            <a:r>
+              <a:rPr lang="de-AT" dirty="0"/>
+              <a:t>More </a:t>
+            </a:r>
+            <a:r>
+              <a:rPr lang="de-AT" dirty="0" err="1"/>
+              <a:t>likely</a:t>
+            </a:r>
+            <a:r>
+              <a:rPr lang="de-AT" dirty="0"/>
+              <a:t> </a:t>
+            </a:r>
+            <a:r>
+              <a:rPr lang="de-AT" dirty="0" err="1"/>
+              <a:t>to</a:t>
+            </a:r>
+            <a:r>
+              <a:rPr lang="de-AT" dirty="0"/>
+              <a:t> </a:t>
+            </a:r>
+            <a:r>
+              <a:rPr lang="de-AT" dirty="0" err="1"/>
+              <a:t>pursue</a:t>
+            </a:r>
+            <a:r>
+              <a:rPr lang="de-AT" dirty="0"/>
+              <a:t> CS </a:t>
+            </a:r>
+            <a:r>
+              <a:rPr lang="de-AT" dirty="0" err="1"/>
+              <a:t>when</a:t>
+            </a:r>
+            <a:r>
+              <a:rPr lang="de-AT" dirty="0"/>
+              <a:t> </a:t>
+            </a:r>
+            <a:r>
+              <a:rPr lang="de-AT" dirty="0" err="1"/>
+              <a:t>family</a:t>
+            </a:r>
+            <a:r>
+              <a:rPr lang="de-AT" dirty="0"/>
+              <a:t> </a:t>
+            </a:r>
+            <a:r>
+              <a:rPr lang="de-AT" dirty="0" err="1"/>
+              <a:t>supports</a:t>
+            </a:r>
+            <a:r>
+              <a:rPr lang="de-AT" dirty="0"/>
+              <a:t> </a:t>
+            </a:r>
+            <a:r>
+              <a:rPr lang="de-AT" dirty="0" err="1"/>
+              <a:t>it</a:t>
+            </a:r>
+            <a:endParaRPr lang="de-AT" dirty="0"/>
+          </a:p>
+        </p:txBody>
+      </p:sp>
+    </p:spTree>
+    <p:extLst>
+      <p:ext uri="{BB962C8B-B14F-4D97-AF65-F5344CB8AC3E}">
+        <p14:creationId xmlns:p14="http://schemas.microsoft.com/office/powerpoint/2010/main" val="2465465099"/>
+      </p:ext>
+    </p:extLst>
+  </p:cSld>
+  <p:clrMapOvr>
+    <a:masterClrMapping/>
+  </p:clrMapOvr>
+</p:sld>
+</file>
+
+<file path=ppt/slides/slide17.xml><?xml version="1.0" encoding="utf-8"?>
+<p:sld xmlns:a="http://schemas.openxmlformats.org/drawingml/2006/main" xmlns:r="http://schemas.openxmlformats.org/officeDocument/2006/relationships" xmlns:p="http://schemas.openxmlformats.org/presentationml/2006/main">
+  <p:cSld>
+    <p:spTree>
+      <p:nvGrpSpPr>
+        <p:cNvPr id="1" name=""/>
+        <p:cNvGrpSpPr/>
+        <p:nvPr/>
+      </p:nvGrpSpPr>
+      <p:grpSpPr>
+        <a:xfrm>
+          <a:off x="0" y="0"/>
+          <a:ext cx="0" cy="0"/>
+          <a:chOff x="0" y="0"/>
+          <a:chExt cx="0" cy="0"/>
+        </a:xfrm>
+      </p:grpSpPr>
+      <p:sp>
+        <p:nvSpPr>
+          <p:cNvPr id="2" name="Titel 1">
+            <a:extLst>
+              <a:ext uri="{FF2B5EF4-FFF2-40B4-BE49-F238E27FC236}">
+                <a16:creationId xmlns:a16="http://schemas.microsoft.com/office/drawing/2014/main" id="{76CA7E32-2F52-4ED4-96DE-8C97DAB13868}"/>
+              </a:ext>
+            </a:extLst>
+          </p:cNvPr>
+          <p:cNvSpPr>
+            <a:spLocks noGrp="1"/>
+          </p:cNvSpPr>
+          <p:nvPr>
+            <p:ph type="title"/>
+          </p:nvPr>
+        </p:nvSpPr>
+        <p:spPr/>
+        <p:txBody>
+          <a:bodyPr/>
+          <a:lstStyle/>
+          <a:p>
+            <a:r>
+              <a:rPr lang="de-AT" dirty="0" err="1"/>
+              <a:t>Role</a:t>
+            </a:r>
+            <a:r>
+              <a:rPr lang="de-AT" dirty="0"/>
+              <a:t> Models</a:t>
+            </a:r>
+          </a:p>
+        </p:txBody>
+      </p:sp>
+      <p:sp>
+        <p:nvSpPr>
+          <p:cNvPr id="3" name="Inhaltsplatzhalter 2">
+            <a:extLst>
+              <a:ext uri="{FF2B5EF4-FFF2-40B4-BE49-F238E27FC236}">
+                <a16:creationId xmlns:a16="http://schemas.microsoft.com/office/drawing/2014/main" id="{41039DC8-EC34-4EFE-AE1C-3C466BF03FC6}"/>
+              </a:ext>
+            </a:extLst>
+          </p:cNvPr>
+          <p:cNvSpPr>
+            <a:spLocks noGrp="1"/>
+          </p:cNvSpPr>
+          <p:nvPr>
+            <p:ph idx="1"/>
+          </p:nvPr>
+        </p:nvSpPr>
+        <p:spPr/>
+        <p:txBody>
+          <a:bodyPr/>
+          <a:lstStyle/>
+          <a:p>
+            <a:r>
+              <a:rPr lang="de-AT" dirty="0"/>
+              <a:t>Lack </a:t>
+            </a:r>
+            <a:r>
+              <a:rPr lang="de-AT" dirty="0" err="1"/>
+              <a:t>of</a:t>
+            </a:r>
+            <a:r>
+              <a:rPr lang="de-AT" dirty="0"/>
+              <a:t> </a:t>
+            </a:r>
+            <a:r>
+              <a:rPr lang="de-AT" dirty="0" err="1"/>
+              <a:t>female</a:t>
+            </a:r>
+            <a:r>
+              <a:rPr lang="de-AT" dirty="0"/>
+              <a:t> </a:t>
+            </a:r>
+            <a:r>
+              <a:rPr lang="de-AT" dirty="0" err="1"/>
+              <a:t>role</a:t>
+            </a:r>
+            <a:r>
+              <a:rPr lang="de-AT" dirty="0"/>
+              <a:t> </a:t>
+            </a:r>
+            <a:r>
+              <a:rPr lang="de-AT" dirty="0" err="1"/>
+              <a:t>models</a:t>
+            </a:r>
+            <a:r>
+              <a:rPr lang="de-AT" dirty="0"/>
+              <a:t> </a:t>
+            </a:r>
+            <a:r>
+              <a:rPr lang="de-AT" dirty="0" err="1"/>
+              <a:t>nowadays</a:t>
+            </a:r>
+            <a:endParaRPr lang="de-AT" dirty="0"/>
+          </a:p>
+          <a:p>
+            <a:endParaRPr lang="de-AT" dirty="0"/>
+          </a:p>
+          <a:p>
+            <a:r>
+              <a:rPr lang="de-AT" dirty="0" err="1"/>
+              <a:t>Richest</a:t>
+            </a:r>
+            <a:r>
+              <a:rPr lang="de-AT" dirty="0"/>
+              <a:t> and </a:t>
+            </a:r>
+            <a:r>
+              <a:rPr lang="de-AT" dirty="0" err="1"/>
+              <a:t>most</a:t>
+            </a:r>
+            <a:r>
+              <a:rPr lang="de-AT" dirty="0"/>
+              <a:t> </a:t>
+            </a:r>
+            <a:r>
+              <a:rPr lang="de-AT" dirty="0" err="1"/>
+              <a:t>influential</a:t>
+            </a:r>
+            <a:r>
+              <a:rPr lang="de-AT" dirty="0"/>
+              <a:t> </a:t>
+            </a:r>
+            <a:r>
+              <a:rPr lang="de-AT" dirty="0" err="1"/>
+              <a:t>computer</a:t>
+            </a:r>
+            <a:r>
+              <a:rPr lang="de-AT" dirty="0"/>
+              <a:t> </a:t>
+            </a:r>
+            <a:r>
+              <a:rPr lang="de-AT" dirty="0" err="1"/>
+              <a:t>scientists</a:t>
+            </a:r>
+            <a:r>
+              <a:rPr lang="de-AT" dirty="0"/>
+              <a:t> </a:t>
+            </a:r>
+            <a:r>
+              <a:rPr lang="de-AT" dirty="0" err="1"/>
+              <a:t>usually</a:t>
+            </a:r>
+            <a:r>
+              <a:rPr lang="de-AT" dirty="0"/>
+              <a:t> </a:t>
+            </a:r>
+            <a:r>
+              <a:rPr lang="de-AT" dirty="0" err="1"/>
+              <a:t>men</a:t>
+            </a:r>
+            <a:endParaRPr lang="de-AT" dirty="0"/>
+          </a:p>
+        </p:txBody>
+      </p:sp>
+    </p:spTree>
+    <p:extLst>
+      <p:ext uri="{BB962C8B-B14F-4D97-AF65-F5344CB8AC3E}">
+        <p14:creationId xmlns:p14="http://schemas.microsoft.com/office/powerpoint/2010/main" val="3940104942"/>
+      </p:ext>
+    </p:extLst>
+  </p:cSld>
+  <p:clrMapOvr>
+    <a:masterClrMapping/>
+  </p:clrMapOvr>
+</p:sld>
+</file>
+
+<file path=ppt/slides/slide18.xml><?xml version="1.0" encoding="utf-8"?>
+<p:sld xmlns:a="http://schemas.openxmlformats.org/drawingml/2006/main" xmlns:r="http://schemas.openxmlformats.org/officeDocument/2006/relationships" xmlns:p="http://schemas.openxmlformats.org/presentationml/2006/main">
+  <p:cSld>
+    <p:spTree>
+      <p:nvGrpSpPr>
+        <p:cNvPr id="1" name=""/>
+        <p:cNvGrpSpPr/>
+        <p:nvPr/>
+      </p:nvGrpSpPr>
+      <p:grpSpPr>
+        <a:xfrm>
+          <a:off x="0" y="0"/>
+          <a:ext cx="0" cy="0"/>
+          <a:chOff x="0" y="0"/>
+          <a:chExt cx="0" cy="0"/>
+        </a:xfrm>
+      </p:grpSpPr>
+      <p:sp>
+        <p:nvSpPr>
+          <p:cNvPr id="2" name="Titel 1">
+            <a:extLst>
+              <a:ext uri="{FF2B5EF4-FFF2-40B4-BE49-F238E27FC236}">
+                <a16:creationId xmlns:a16="http://schemas.microsoft.com/office/drawing/2014/main" id="{756B7891-065D-49EF-A44C-E05152561E4B}"/>
+              </a:ext>
+            </a:extLst>
+          </p:cNvPr>
+          <p:cNvSpPr>
+            <a:spLocks noGrp="1"/>
+          </p:cNvSpPr>
+          <p:nvPr>
+            <p:ph type="title"/>
+          </p:nvPr>
+        </p:nvSpPr>
+        <p:spPr/>
+        <p:txBody>
+          <a:bodyPr/>
+          <a:lstStyle/>
+          <a:p>
+            <a:r>
+              <a:rPr lang="de-AT" dirty="0" err="1"/>
+              <a:t>Exposure</a:t>
+            </a:r>
+            <a:r>
+              <a:rPr lang="de-AT" dirty="0"/>
+              <a:t> </a:t>
+            </a:r>
+            <a:r>
+              <a:rPr lang="de-AT" dirty="0" err="1"/>
+              <a:t>to</a:t>
+            </a:r>
+            <a:r>
+              <a:rPr lang="de-AT" dirty="0"/>
+              <a:t> Computers</a:t>
+            </a:r>
+          </a:p>
+        </p:txBody>
+      </p:sp>
+      <p:sp>
+        <p:nvSpPr>
+          <p:cNvPr id="3" name="Inhaltsplatzhalter 2">
+            <a:extLst>
+              <a:ext uri="{FF2B5EF4-FFF2-40B4-BE49-F238E27FC236}">
+                <a16:creationId xmlns:a16="http://schemas.microsoft.com/office/drawing/2014/main" id="{7F5114A0-9CD5-4A55-A2B1-284B75A5AE88}"/>
+              </a:ext>
+            </a:extLst>
+          </p:cNvPr>
+          <p:cNvSpPr>
+            <a:spLocks noGrp="1"/>
+          </p:cNvSpPr>
+          <p:nvPr>
+            <p:ph idx="1"/>
+          </p:nvPr>
+        </p:nvSpPr>
+        <p:spPr/>
+        <p:txBody>
+          <a:bodyPr/>
+          <a:lstStyle/>
+          <a:p>
+            <a:r>
+              <a:rPr lang="de-AT" dirty="0"/>
+              <a:t>Financial </a:t>
+            </a:r>
+            <a:r>
+              <a:rPr lang="de-AT" dirty="0" err="1"/>
+              <a:t>situation</a:t>
+            </a:r>
+            <a:endParaRPr lang="de-AT" dirty="0"/>
+          </a:p>
+          <a:p>
+            <a:pPr lvl="1"/>
+            <a:r>
+              <a:rPr lang="de-AT" dirty="0"/>
+              <a:t>High-</a:t>
+            </a:r>
+            <a:r>
+              <a:rPr lang="de-AT" dirty="0" err="1"/>
+              <a:t>poverty</a:t>
+            </a:r>
+            <a:r>
+              <a:rPr lang="de-AT" dirty="0"/>
+              <a:t> </a:t>
+            </a:r>
+            <a:r>
+              <a:rPr lang="de-AT" dirty="0" err="1"/>
+              <a:t>school</a:t>
+            </a:r>
+            <a:r>
+              <a:rPr lang="de-AT" dirty="0"/>
+              <a:t> </a:t>
+            </a:r>
+            <a:r>
+              <a:rPr lang="de-AT" dirty="0">
+                <a:sym typeface="Wingdings" panose="05000000000000000000" pitchFamily="2" charset="2"/>
+              </a:rPr>
+              <a:t> </a:t>
+            </a:r>
+            <a:r>
+              <a:rPr lang="de-AT" dirty="0" err="1">
+                <a:sym typeface="Wingdings" panose="05000000000000000000" pitchFamily="2" charset="2"/>
+              </a:rPr>
+              <a:t>little</a:t>
+            </a:r>
+            <a:r>
+              <a:rPr lang="de-AT" dirty="0">
+                <a:sym typeface="Wingdings" panose="05000000000000000000" pitchFamily="2" charset="2"/>
+              </a:rPr>
+              <a:t> </a:t>
+            </a:r>
+            <a:r>
+              <a:rPr lang="de-AT" dirty="0" err="1">
+                <a:sym typeface="Wingdings" panose="05000000000000000000" pitchFamily="2" charset="2"/>
+              </a:rPr>
+              <a:t>access</a:t>
+            </a:r>
+            <a:r>
+              <a:rPr lang="de-AT" dirty="0">
+                <a:sym typeface="Wingdings" panose="05000000000000000000" pitchFamily="2" charset="2"/>
+              </a:rPr>
+              <a:t> </a:t>
+            </a:r>
+            <a:r>
+              <a:rPr lang="de-AT" dirty="0" err="1">
+                <a:sym typeface="Wingdings" panose="05000000000000000000" pitchFamily="2" charset="2"/>
+              </a:rPr>
+              <a:t>to</a:t>
+            </a:r>
+            <a:r>
+              <a:rPr lang="de-AT" dirty="0">
+                <a:sym typeface="Wingdings" panose="05000000000000000000" pitchFamily="2" charset="2"/>
+              </a:rPr>
+              <a:t> </a:t>
+            </a:r>
+            <a:r>
+              <a:rPr lang="de-AT" dirty="0" err="1">
+                <a:sym typeface="Wingdings" panose="05000000000000000000" pitchFamily="2" charset="2"/>
+              </a:rPr>
+              <a:t>computers</a:t>
+            </a:r>
+            <a:endParaRPr lang="de-AT" dirty="0">
+              <a:sym typeface="Wingdings" panose="05000000000000000000" pitchFamily="2" charset="2"/>
+            </a:endParaRPr>
+          </a:p>
+          <a:p>
+            <a:endParaRPr lang="de-AT" dirty="0"/>
+          </a:p>
+          <a:p>
+            <a:r>
+              <a:rPr lang="de-AT" dirty="0"/>
+              <a:t>Gender</a:t>
+            </a:r>
+          </a:p>
+          <a:p>
+            <a:pPr lvl="1"/>
+            <a:r>
+              <a:rPr lang="de-AT" dirty="0" err="1"/>
+              <a:t>Difference</a:t>
+            </a:r>
+            <a:r>
+              <a:rPr lang="de-AT" dirty="0"/>
+              <a:t> in </a:t>
+            </a:r>
+            <a:r>
+              <a:rPr lang="de-AT" dirty="0" err="1"/>
+              <a:t>use</a:t>
+            </a:r>
+            <a:r>
+              <a:rPr lang="de-AT" dirty="0"/>
+              <a:t> </a:t>
+            </a:r>
+            <a:r>
+              <a:rPr lang="de-AT" dirty="0" err="1"/>
+              <a:t>of</a:t>
+            </a:r>
+            <a:r>
+              <a:rPr lang="de-AT" dirty="0"/>
+              <a:t> </a:t>
+            </a:r>
+            <a:r>
+              <a:rPr lang="de-AT" dirty="0" err="1"/>
+              <a:t>computers</a:t>
+            </a:r>
+            <a:endParaRPr lang="de-AT" dirty="0"/>
+          </a:p>
+          <a:p>
+            <a:pPr lvl="1"/>
+            <a:r>
+              <a:rPr lang="de-AT" dirty="0"/>
+              <a:t>Boys </a:t>
+            </a:r>
+            <a:r>
+              <a:rPr lang="de-AT" dirty="0" err="1"/>
+              <a:t>more</a:t>
+            </a:r>
+            <a:r>
+              <a:rPr lang="de-AT" dirty="0"/>
+              <a:t> </a:t>
+            </a:r>
+            <a:r>
+              <a:rPr lang="de-AT" dirty="0" err="1"/>
+              <a:t>likely</a:t>
+            </a:r>
+            <a:r>
+              <a:rPr lang="de-AT" dirty="0"/>
+              <a:t> </a:t>
+            </a:r>
+            <a:r>
+              <a:rPr lang="de-AT" dirty="0" err="1"/>
+              <a:t>to</a:t>
+            </a:r>
+            <a:r>
+              <a:rPr lang="de-AT" dirty="0"/>
+              <a:t> </a:t>
+            </a:r>
+            <a:r>
+              <a:rPr lang="de-AT" dirty="0" err="1"/>
+              <a:t>have</a:t>
+            </a:r>
+            <a:r>
+              <a:rPr lang="de-AT" dirty="0"/>
+              <a:t> </a:t>
+            </a:r>
+            <a:r>
+              <a:rPr lang="de-AT" dirty="0" err="1"/>
+              <a:t>access</a:t>
+            </a:r>
+            <a:r>
+              <a:rPr lang="de-AT" dirty="0"/>
+              <a:t> </a:t>
+            </a:r>
+            <a:r>
+              <a:rPr lang="de-AT" dirty="0" err="1"/>
+              <a:t>to</a:t>
+            </a:r>
+            <a:r>
+              <a:rPr lang="de-AT" dirty="0"/>
+              <a:t> </a:t>
+            </a:r>
+            <a:r>
+              <a:rPr lang="de-AT" dirty="0" err="1"/>
+              <a:t>computers</a:t>
+            </a:r>
+            <a:endParaRPr lang="de-AT" dirty="0"/>
+          </a:p>
+          <a:p>
+            <a:pPr lvl="1"/>
+            <a:r>
+              <a:rPr lang="de-AT" dirty="0"/>
+              <a:t>First </a:t>
+            </a:r>
+            <a:r>
+              <a:rPr lang="de-AT" dirty="0" err="1"/>
+              <a:t>experience</a:t>
+            </a:r>
+            <a:r>
+              <a:rPr lang="de-AT" dirty="0"/>
+              <a:t> </a:t>
+            </a:r>
+            <a:r>
+              <a:rPr lang="de-AT" dirty="0" err="1"/>
+              <a:t>with</a:t>
+            </a:r>
+            <a:r>
+              <a:rPr lang="de-AT" dirty="0"/>
+              <a:t> </a:t>
+            </a:r>
+            <a:r>
+              <a:rPr lang="de-AT" dirty="0" err="1"/>
+              <a:t>computers</a:t>
+            </a:r>
+            <a:r>
+              <a:rPr lang="de-AT" dirty="0"/>
+              <a:t> </a:t>
+            </a:r>
+            <a:r>
+              <a:rPr lang="de-AT" dirty="0" err="1"/>
+              <a:t>because</a:t>
+            </a:r>
+            <a:r>
+              <a:rPr lang="de-AT" dirty="0"/>
+              <a:t> </a:t>
+            </a:r>
+            <a:r>
+              <a:rPr lang="de-AT" dirty="0" err="1"/>
+              <a:t>of</a:t>
+            </a:r>
+            <a:r>
+              <a:rPr lang="de-AT" dirty="0"/>
+              <a:t> </a:t>
+            </a:r>
+            <a:r>
+              <a:rPr lang="de-AT" dirty="0" err="1"/>
+              <a:t>video</a:t>
+            </a:r>
+            <a:r>
+              <a:rPr lang="de-AT" dirty="0"/>
+              <a:t> </a:t>
+            </a:r>
+            <a:r>
+              <a:rPr lang="de-AT" dirty="0" err="1"/>
+              <a:t>games</a:t>
+            </a:r>
+            <a:endParaRPr lang="de-AT" dirty="0"/>
+          </a:p>
+          <a:p>
+            <a:pPr lvl="1"/>
+            <a:r>
+              <a:rPr lang="de-AT" dirty="0"/>
+              <a:t>Boys </a:t>
+            </a:r>
+            <a:r>
+              <a:rPr lang="de-AT" dirty="0" err="1"/>
+              <a:t>more</a:t>
+            </a:r>
+            <a:r>
+              <a:rPr lang="de-AT" dirty="0"/>
+              <a:t> </a:t>
+            </a:r>
+            <a:r>
+              <a:rPr lang="de-AT" dirty="0" err="1"/>
+              <a:t>likely</a:t>
+            </a:r>
+            <a:r>
+              <a:rPr lang="de-AT" dirty="0"/>
+              <a:t> </a:t>
+            </a:r>
+            <a:r>
+              <a:rPr lang="de-AT" dirty="0" err="1"/>
+              <a:t>to</a:t>
+            </a:r>
+            <a:r>
+              <a:rPr lang="de-AT" dirty="0"/>
+              <a:t> </a:t>
+            </a:r>
+            <a:r>
+              <a:rPr lang="de-AT" dirty="0" err="1"/>
+              <a:t>use</a:t>
+            </a:r>
+            <a:r>
+              <a:rPr lang="de-AT" dirty="0"/>
+              <a:t> </a:t>
+            </a:r>
+            <a:r>
+              <a:rPr lang="de-AT" dirty="0" err="1"/>
+              <a:t>computer</a:t>
+            </a:r>
+            <a:r>
+              <a:rPr lang="de-AT" dirty="0"/>
+              <a:t> </a:t>
+            </a:r>
+            <a:r>
+              <a:rPr lang="de-AT" dirty="0" err="1"/>
+              <a:t>for</a:t>
+            </a:r>
+            <a:r>
+              <a:rPr lang="de-AT" dirty="0"/>
+              <a:t> </a:t>
+            </a:r>
+            <a:r>
+              <a:rPr lang="de-AT" dirty="0" err="1"/>
+              <a:t>coding</a:t>
+            </a:r>
+            <a:endParaRPr lang="de-AT" dirty="0"/>
+          </a:p>
+          <a:p>
+            <a:pPr lvl="1"/>
+            <a:r>
+              <a:rPr lang="de-AT" dirty="0"/>
+              <a:t>Girls </a:t>
+            </a:r>
+            <a:r>
+              <a:rPr lang="de-AT" dirty="0" err="1"/>
+              <a:t>start</a:t>
+            </a:r>
+            <a:r>
+              <a:rPr lang="de-AT" dirty="0"/>
+              <a:t> </a:t>
+            </a:r>
+            <a:r>
+              <a:rPr lang="de-AT" dirty="0" err="1"/>
+              <a:t>using</a:t>
+            </a:r>
+            <a:r>
+              <a:rPr lang="de-AT" dirty="0"/>
+              <a:t> </a:t>
+            </a:r>
+            <a:r>
+              <a:rPr lang="de-AT" dirty="0" err="1"/>
+              <a:t>computer</a:t>
+            </a:r>
+            <a:r>
+              <a:rPr lang="de-AT" dirty="0"/>
+              <a:t> </a:t>
+            </a:r>
+            <a:r>
+              <a:rPr lang="de-AT" dirty="0" err="1"/>
+              <a:t>later</a:t>
+            </a:r>
+            <a:endParaRPr lang="de-AT" dirty="0"/>
+          </a:p>
+        </p:txBody>
+      </p:sp>
+    </p:spTree>
+    <p:extLst>
+      <p:ext uri="{BB962C8B-B14F-4D97-AF65-F5344CB8AC3E}">
+        <p14:creationId xmlns:p14="http://schemas.microsoft.com/office/powerpoint/2010/main" val="1370200298"/>
+      </p:ext>
+    </p:extLst>
+  </p:cSld>
+  <p:clrMapOvr>
+    <a:masterClrMapping/>
+  </p:clrMapOvr>
+</p:sld>
+</file>
+
+<file path=ppt/slides/slide19.xml><?xml version="1.0" encoding="utf-8"?>
+<p:sld xmlns:a="http://schemas.openxmlformats.org/drawingml/2006/main" xmlns:r="http://schemas.openxmlformats.org/officeDocument/2006/relationships" xmlns:p="http://schemas.openxmlformats.org/presentationml/2006/main">
+  <p:cSld>
+    <p:spTree>
+      <p:nvGrpSpPr>
+        <p:cNvPr id="1" name=""/>
+        <p:cNvGrpSpPr/>
+        <p:nvPr/>
+      </p:nvGrpSpPr>
+      <p:grpSpPr>
+        <a:xfrm>
+          <a:off x="0" y="0"/>
+          <a:ext cx="0" cy="0"/>
+          <a:chOff x="0" y="0"/>
+          <a:chExt cx="0" cy="0"/>
+        </a:xfrm>
+      </p:grpSpPr>
+      <p:sp>
+        <p:nvSpPr>
+          <p:cNvPr id="2" name="Titel 1">
+            <a:extLst>
+              <a:ext uri="{FF2B5EF4-FFF2-40B4-BE49-F238E27FC236}">
+                <a16:creationId xmlns:a16="http://schemas.microsoft.com/office/drawing/2014/main" id="{5D0657ED-4773-4312-A05E-E7C6F3E0CDCF}"/>
+              </a:ext>
+            </a:extLst>
+          </p:cNvPr>
+          <p:cNvSpPr>
+            <a:spLocks noGrp="1"/>
+          </p:cNvSpPr>
+          <p:nvPr>
+            <p:ph type="title"/>
+          </p:nvPr>
+        </p:nvSpPr>
+        <p:spPr/>
+        <p:txBody>
+          <a:bodyPr/>
+          <a:lstStyle/>
+          <a:p>
+            <a:r>
+              <a:rPr lang="de-AT" dirty="0"/>
+              <a:t>Women in FLOSS</a:t>
+            </a:r>
+          </a:p>
+        </p:txBody>
+      </p:sp>
+      <p:sp>
+        <p:nvSpPr>
+          <p:cNvPr id="3" name="Inhaltsplatzhalter 2">
+            <a:extLst>
+              <a:ext uri="{FF2B5EF4-FFF2-40B4-BE49-F238E27FC236}">
+                <a16:creationId xmlns:a16="http://schemas.microsoft.com/office/drawing/2014/main" id="{7EC31AEF-1FBD-4C12-82E9-43AD495B7D25}"/>
+              </a:ext>
+            </a:extLst>
+          </p:cNvPr>
+          <p:cNvSpPr>
+            <a:spLocks noGrp="1"/>
+          </p:cNvSpPr>
+          <p:nvPr>
+            <p:ph idx="1"/>
+          </p:nvPr>
+        </p:nvSpPr>
+        <p:spPr>
+          <a:xfrm>
+            <a:off x="838200" y="1825625"/>
+            <a:ext cx="10515600" cy="4220612"/>
+          </a:xfrm>
+        </p:spPr>
+        <p:txBody>
+          <a:bodyPr/>
+          <a:lstStyle/>
+          <a:p>
+            <a:r>
+              <a:rPr lang="de-AT" dirty="0"/>
+              <a:t>Women </a:t>
+            </a:r>
+            <a:r>
+              <a:rPr lang="de-AT" dirty="0" err="1"/>
+              <a:t>make</a:t>
+            </a:r>
+            <a:r>
+              <a:rPr lang="de-AT" dirty="0"/>
+              <a:t> </a:t>
+            </a:r>
+            <a:r>
+              <a:rPr lang="de-AT" dirty="0" err="1"/>
+              <a:t>first</a:t>
+            </a:r>
+            <a:r>
+              <a:rPr lang="de-AT" dirty="0"/>
+              <a:t> </a:t>
+            </a:r>
+            <a:r>
+              <a:rPr lang="de-AT" dirty="0" err="1"/>
+              <a:t>contributions</a:t>
+            </a:r>
+            <a:r>
+              <a:rPr lang="de-AT" dirty="0"/>
+              <a:t> </a:t>
+            </a:r>
+            <a:r>
+              <a:rPr lang="de-AT" dirty="0" err="1"/>
+              <a:t>later</a:t>
+            </a:r>
+            <a:r>
+              <a:rPr lang="de-AT" dirty="0"/>
+              <a:t> in </a:t>
+            </a:r>
+            <a:r>
+              <a:rPr lang="de-AT" dirty="0" err="1"/>
+              <a:t>life</a:t>
+            </a:r>
+            <a:endParaRPr lang="de-AT" dirty="0"/>
+          </a:p>
+          <a:p>
+            <a:endParaRPr lang="de-AT" dirty="0"/>
+          </a:p>
+          <a:p>
+            <a:r>
+              <a:rPr lang="de-AT" dirty="0"/>
+              <a:t>2010-2013</a:t>
+            </a:r>
+          </a:p>
+          <a:p>
+            <a:pPr lvl="1"/>
+            <a:r>
+              <a:rPr lang="de-AT" dirty="0"/>
+              <a:t>39% </a:t>
+            </a:r>
+            <a:r>
+              <a:rPr lang="de-AT" dirty="0" err="1"/>
+              <a:t>new</a:t>
+            </a:r>
+            <a:r>
+              <a:rPr lang="de-AT" dirty="0"/>
+              <a:t> </a:t>
+            </a:r>
+            <a:r>
+              <a:rPr lang="de-AT" dirty="0" err="1"/>
+              <a:t>female</a:t>
+            </a:r>
+            <a:r>
+              <a:rPr lang="de-AT" dirty="0"/>
+              <a:t> </a:t>
+            </a:r>
+            <a:r>
+              <a:rPr lang="de-AT" dirty="0" err="1"/>
+              <a:t>contributors</a:t>
+            </a:r>
+            <a:endParaRPr lang="de-AT" dirty="0"/>
+          </a:p>
+          <a:p>
+            <a:pPr lvl="1"/>
+            <a:r>
+              <a:rPr lang="de-AT" dirty="0"/>
+              <a:t>19% </a:t>
+            </a:r>
+            <a:r>
+              <a:rPr lang="de-AT" dirty="0" err="1"/>
+              <a:t>new</a:t>
+            </a:r>
+            <a:r>
+              <a:rPr lang="de-AT" dirty="0"/>
+              <a:t> male </a:t>
+            </a:r>
+            <a:r>
+              <a:rPr lang="de-AT" dirty="0" err="1"/>
+              <a:t>contributors</a:t>
+            </a:r>
+            <a:endParaRPr lang="de-AT" dirty="0"/>
+          </a:p>
+          <a:p>
+            <a:pPr lvl="1"/>
+            <a:endParaRPr lang="de-AT" dirty="0"/>
+          </a:p>
+          <a:p>
+            <a:r>
+              <a:rPr lang="de-AT" dirty="0"/>
+              <a:t>Women code </a:t>
+            </a:r>
+            <a:r>
+              <a:rPr lang="de-AT" dirty="0" err="1"/>
+              <a:t>less</a:t>
+            </a:r>
+            <a:endParaRPr lang="de-AT" dirty="0"/>
+          </a:p>
+        </p:txBody>
+      </p:sp>
+    </p:spTree>
+    <p:extLst>
+      <p:ext uri="{BB962C8B-B14F-4D97-AF65-F5344CB8AC3E}">
+        <p14:creationId xmlns:p14="http://schemas.microsoft.com/office/powerpoint/2010/main" val="712326883"/>
       </p:ext>
     </p:extLst>
   </p:cSld>

</xml_diff>

<commit_message>
Added our names to the presentation slides
</commit_message>
<xml_diff>
--- a/Paper - Presentation.pptx
+++ b/Paper - Presentation.pptx
@@ -209,7 +209,7 @@
           <a:p>
             <a:fld id="{EEACC300-3D7C-4E77-ACC5-ED72B3E2514D}" type="datetimeFigureOut">
               <a:rPr lang="en-US" smtClean="0"/>
-              <a:t>1/30/2020</a:t>
+              <a:t>1/31/2020</a:t>
             </a:fld>
             <a:endParaRPr lang="en-US"/>
           </a:p>
@@ -707,7 +707,7 @@
           <a:p>
             <a:fld id="{DCDACB0D-BBD2-40D0-A893-CF04513F27FC}" type="datetimeFigureOut">
               <a:rPr lang="en-US" smtClean="0"/>
-              <a:t>1/30/2020</a:t>
+              <a:t>1/31/2020</a:t>
             </a:fld>
             <a:endParaRPr lang="en-US"/>
           </a:p>
@@ -905,7 +905,7 @@
           <a:p>
             <a:fld id="{DCDACB0D-BBD2-40D0-A893-CF04513F27FC}" type="datetimeFigureOut">
               <a:rPr lang="en-US" smtClean="0"/>
-              <a:t>1/30/2020</a:t>
+              <a:t>1/31/2020</a:t>
             </a:fld>
             <a:endParaRPr lang="en-US"/>
           </a:p>
@@ -1113,7 +1113,7 @@
           <a:p>
             <a:fld id="{DCDACB0D-BBD2-40D0-A893-CF04513F27FC}" type="datetimeFigureOut">
               <a:rPr lang="en-US" smtClean="0"/>
-              <a:t>1/30/2020</a:t>
+              <a:t>1/31/2020</a:t>
             </a:fld>
             <a:endParaRPr lang="en-US"/>
           </a:p>
@@ -1311,7 +1311,7 @@
           <a:p>
             <a:fld id="{DCDACB0D-BBD2-40D0-A893-CF04513F27FC}" type="datetimeFigureOut">
               <a:rPr lang="en-US" smtClean="0"/>
-              <a:t>1/30/2020</a:t>
+              <a:t>1/31/2020</a:t>
             </a:fld>
             <a:endParaRPr lang="en-US"/>
           </a:p>
@@ -1586,7 +1586,7 @@
           <a:p>
             <a:fld id="{DCDACB0D-BBD2-40D0-A893-CF04513F27FC}" type="datetimeFigureOut">
               <a:rPr lang="en-US" smtClean="0"/>
-              <a:t>1/30/2020</a:t>
+              <a:t>1/31/2020</a:t>
             </a:fld>
             <a:endParaRPr lang="en-US"/>
           </a:p>
@@ -1851,7 +1851,7 @@
           <a:p>
             <a:fld id="{DCDACB0D-BBD2-40D0-A893-CF04513F27FC}" type="datetimeFigureOut">
               <a:rPr lang="en-US" smtClean="0"/>
-              <a:t>1/30/2020</a:t>
+              <a:t>1/31/2020</a:t>
             </a:fld>
             <a:endParaRPr lang="en-US"/>
           </a:p>
@@ -2263,7 +2263,7 @@
           <a:p>
             <a:fld id="{DCDACB0D-BBD2-40D0-A893-CF04513F27FC}" type="datetimeFigureOut">
               <a:rPr lang="en-US" smtClean="0"/>
-              <a:t>1/30/2020</a:t>
+              <a:t>1/31/2020</a:t>
             </a:fld>
             <a:endParaRPr lang="en-US"/>
           </a:p>
@@ -2404,7 +2404,7 @@
           <a:p>
             <a:fld id="{DCDACB0D-BBD2-40D0-A893-CF04513F27FC}" type="datetimeFigureOut">
               <a:rPr lang="en-US" smtClean="0"/>
-              <a:t>1/30/2020</a:t>
+              <a:t>1/31/2020</a:t>
             </a:fld>
             <a:endParaRPr lang="en-US"/>
           </a:p>
@@ -2517,7 +2517,7 @@
           <a:p>
             <a:fld id="{DCDACB0D-BBD2-40D0-A893-CF04513F27FC}" type="datetimeFigureOut">
               <a:rPr lang="en-US" smtClean="0"/>
-              <a:t>1/30/2020</a:t>
+              <a:t>1/31/2020</a:t>
             </a:fld>
             <a:endParaRPr lang="en-US"/>
           </a:p>
@@ -2828,7 +2828,7 @@
           <a:p>
             <a:fld id="{DCDACB0D-BBD2-40D0-A893-CF04513F27FC}" type="datetimeFigureOut">
               <a:rPr lang="en-US" smtClean="0"/>
-              <a:t>1/30/2020</a:t>
+              <a:t>1/31/2020</a:t>
             </a:fld>
             <a:endParaRPr lang="en-US"/>
           </a:p>
@@ -3116,7 +3116,7 @@
           <a:p>
             <a:fld id="{DCDACB0D-BBD2-40D0-A893-CF04513F27FC}" type="datetimeFigureOut">
               <a:rPr lang="en-US" smtClean="0"/>
-              <a:t>1/30/2020</a:t>
+              <a:t>1/31/2020</a:t>
             </a:fld>
             <a:endParaRPr lang="en-US"/>
           </a:p>
@@ -3357,7 +3357,7 @@
           <a:p>
             <a:fld id="{DCDACB0D-BBD2-40D0-A893-CF04513F27FC}" type="datetimeFigureOut">
               <a:rPr lang="en-US" smtClean="0"/>
-              <a:t>1/30/2020</a:t>
+              <a:t>1/31/2020</a:t>
             </a:fld>
             <a:endParaRPr lang="en-US"/>
           </a:p>
@@ -3822,13 +3822,36 @@
         </p:nvSpPr>
         <p:spPr/>
         <p:txBody>
-          <a:bodyPr/>
+          <a:bodyPr>
+            <a:normAutofit/>
+          </a:bodyPr>
           <a:lstStyle/>
           <a:p>
             <a:r>
               <a:rPr lang="en-US" dirty="0"/>
               <a:t>A report on developments and the status quo</a:t>
             </a:r>
+          </a:p>
+          <a:p>
+            <a:r>
+              <a:rPr lang="en-US" sz="1600" dirty="0"/>
+              <a:t>by </a:t>
+            </a:r>
+          </a:p>
+          <a:p>
+            <a:r>
+              <a:rPr lang="en-US" sz="1600" dirty="0"/>
+              <a:t>Eva Jobst (51824341)</a:t>
+            </a:r>
+          </a:p>
+          <a:p>
+            <a:r>
+              <a:rPr lang="en-US" sz="1600" dirty="0"/>
+              <a:t>Mohammad Zandpour (01425603)</a:t>
+            </a:r>
+          </a:p>
+          <a:p>
+            <a:endParaRPr lang="en-US" dirty="0"/>
           </a:p>
         </p:txBody>
       </p:sp>

</xml_diff>

<commit_message>
Restored Eva's changes and added our names to the slides
</commit_message>
<xml_diff>
--- a/Paper - Presentation.pptx
+++ b/Paper - Presentation.pptx
@@ -5,7 +5,7 @@
     <p:sldMasterId id="2147483648" r:id="rId1"/>
   </p:sldMasterIdLst>
   <p:notesMasterIdLst>
-    <p:notesMasterId r:id="rId15"/>
+    <p:notesMasterId r:id="rId21"/>
   </p:notesMasterIdLst>
   <p:sldIdLst>
     <p:sldId id="256" r:id="rId2"/>
@@ -21,6 +21,12 @@
     <p:sldId id="266" r:id="rId12"/>
     <p:sldId id="267" r:id="rId13"/>
     <p:sldId id="268" r:id="rId14"/>
+    <p:sldId id="269" r:id="rId15"/>
+    <p:sldId id="270" r:id="rId16"/>
+    <p:sldId id="271" r:id="rId17"/>
+    <p:sldId id="272" r:id="rId18"/>
+    <p:sldId id="273" r:id="rId19"/>
+    <p:sldId id="274" r:id="rId20"/>
   </p:sldIdLst>
   <p:sldSz cx="12192000" cy="6858000"/>
   <p:notesSz cx="6858000" cy="9144000"/>
@@ -127,6 +133,827 @@
 </p:presentation>
 </file>
 
+<file path=ppt/charts/chart1.xml><?xml version="1.0" encoding="utf-8"?>
+<c:chartSpace xmlns:c="http://schemas.openxmlformats.org/drawingml/2006/chart" xmlns:a="http://schemas.openxmlformats.org/drawingml/2006/main" xmlns:r="http://schemas.openxmlformats.org/officeDocument/2006/relationships" xmlns:c16r2="http://schemas.microsoft.com/office/drawing/2015/06/chart">
+  <c:date1904 val="0"/>
+  <c:lang val="en-US"/>
+  <c:roundedCorners val="0"/>
+  <mc:AlternateContent xmlns:mc="http://schemas.openxmlformats.org/markup-compatibility/2006">
+    <mc:Choice xmlns:c14="http://schemas.microsoft.com/office/drawing/2007/8/2/chart" Requires="c14">
+      <c14:style val="102"/>
+    </mc:Choice>
+    <mc:Fallback>
+      <c:style val="2"/>
+    </mc:Fallback>
+  </mc:AlternateContent>
+  <c:chart>
+    <c:title>
+      <c:overlay val="0"/>
+      <c:spPr>
+        <a:noFill/>
+        <a:ln>
+          <a:noFill/>
+        </a:ln>
+        <a:effectLst/>
+      </c:spPr>
+      <c:txPr>
+        <a:bodyPr rot="0" spcFirstLastPara="1" vertOverflow="ellipsis" vert="horz" wrap="square" anchor="ctr" anchorCtr="1"/>
+        <a:lstStyle/>
+        <a:p>
+          <a:pPr>
+            <a:defRPr sz="1862" b="0" i="0" u="none" strike="noStrike" kern="1200" spc="0" baseline="0">
+              <a:solidFill>
+                <a:schemeClr val="tx1">
+                  <a:lumMod val="65000"/>
+                  <a:lumOff val="35000"/>
+                </a:schemeClr>
+              </a:solidFill>
+              <a:latin typeface="+mn-lt"/>
+              <a:ea typeface="+mn-ea"/>
+              <a:cs typeface="+mn-cs"/>
+            </a:defRPr>
+          </a:pPr>
+          <a:endParaRPr lang="en-US"/>
+        </a:p>
+      </c:txPr>
+    </c:title>
+    <c:autoTitleDeleted val="0"/>
+    <c:plotArea>
+      <c:layout/>
+      <c:barChart>
+        <c:barDir val="col"/>
+        <c:grouping val="clustered"/>
+        <c:varyColors val="0"/>
+        <c:ser>
+          <c:idx val="0"/>
+          <c:order val="0"/>
+          <c:tx>
+            <c:strRef>
+              <c:f>Tabelle1!$B$1</c:f>
+              <c:strCache>
+                <c:ptCount val="1"/>
+                <c:pt idx="0">
+                  <c:v>Women in US starting Computer Science major</c:v>
+                </c:pt>
+              </c:strCache>
+            </c:strRef>
+          </c:tx>
+          <c:spPr>
+            <a:solidFill>
+              <a:schemeClr val="accent1"/>
+            </a:solidFill>
+            <a:ln>
+              <a:noFill/>
+            </a:ln>
+            <a:effectLst/>
+          </c:spPr>
+          <c:invertIfNegative val="0"/>
+          <c:cat>
+            <c:strRef>
+              <c:f>Tabelle1!$A$2:$A$4</c:f>
+              <c:strCache>
+                <c:ptCount val="3"/>
+                <c:pt idx="0">
+                  <c:v>1970s</c:v>
+                </c:pt>
+                <c:pt idx="1">
+                  <c:v>1980s</c:v>
+                </c:pt>
+                <c:pt idx="2">
+                  <c:v>1990s</c:v>
+                </c:pt>
+              </c:strCache>
+            </c:strRef>
+          </c:cat>
+          <c:val>
+            <c:numRef>
+              <c:f>Tabelle1!$B$2:$B$4</c:f>
+              <c:numCache>
+                <c:formatCode>0%</c:formatCode>
+                <c:ptCount val="3"/>
+                <c:pt idx="0">
+                  <c:v>0.14000000000000001</c:v>
+                </c:pt>
+                <c:pt idx="1">
+                  <c:v>0.37</c:v>
+                </c:pt>
+                <c:pt idx="2">
+                  <c:v>0.27</c:v>
+                </c:pt>
+              </c:numCache>
+            </c:numRef>
+          </c:val>
+          <c:extLst>
+            <c:ext xmlns:c16="http://schemas.microsoft.com/office/drawing/2014/chart" uri="{C3380CC4-5D6E-409C-BE32-E72D297353CC}">
+              <c16:uniqueId val="{00000000-1B61-42E2-904E-36268E75634F}"/>
+            </c:ext>
+          </c:extLst>
+        </c:ser>
+        <c:dLbls>
+          <c:showLegendKey val="0"/>
+          <c:showVal val="0"/>
+          <c:showCatName val="0"/>
+          <c:showSerName val="0"/>
+          <c:showPercent val="0"/>
+          <c:showBubbleSize val="0"/>
+        </c:dLbls>
+        <c:gapWidth val="219"/>
+        <c:overlap val="-27"/>
+        <c:axId val="1926732080"/>
+        <c:axId val="1877788272"/>
+      </c:barChart>
+      <c:catAx>
+        <c:axId val="1926732080"/>
+        <c:scaling>
+          <c:orientation val="minMax"/>
+        </c:scaling>
+        <c:delete val="0"/>
+        <c:axPos val="b"/>
+        <c:numFmt formatCode="General" sourceLinked="1"/>
+        <c:majorTickMark val="none"/>
+        <c:minorTickMark val="none"/>
+        <c:tickLblPos val="nextTo"/>
+        <c:spPr>
+          <a:noFill/>
+          <a:ln w="9525" cap="flat" cmpd="sng" algn="ctr">
+            <a:solidFill>
+              <a:schemeClr val="tx1">
+                <a:lumMod val="15000"/>
+                <a:lumOff val="85000"/>
+              </a:schemeClr>
+            </a:solidFill>
+            <a:round/>
+          </a:ln>
+          <a:effectLst/>
+        </c:spPr>
+        <c:txPr>
+          <a:bodyPr rot="-60000000" spcFirstLastPara="1" vertOverflow="ellipsis" vert="horz" wrap="square" anchor="ctr" anchorCtr="1"/>
+          <a:lstStyle/>
+          <a:p>
+            <a:pPr>
+              <a:defRPr sz="1197" b="0" i="0" u="none" strike="noStrike" kern="1200" baseline="0">
+                <a:solidFill>
+                  <a:schemeClr val="tx1">
+                    <a:lumMod val="65000"/>
+                    <a:lumOff val="35000"/>
+                  </a:schemeClr>
+                </a:solidFill>
+                <a:latin typeface="+mn-lt"/>
+                <a:ea typeface="+mn-ea"/>
+                <a:cs typeface="+mn-cs"/>
+              </a:defRPr>
+            </a:pPr>
+            <a:endParaRPr lang="en-US"/>
+          </a:p>
+        </c:txPr>
+        <c:crossAx val="1877788272"/>
+        <c:crosses val="autoZero"/>
+        <c:auto val="1"/>
+        <c:lblAlgn val="ctr"/>
+        <c:lblOffset val="100"/>
+        <c:noMultiLvlLbl val="0"/>
+      </c:catAx>
+      <c:valAx>
+        <c:axId val="1877788272"/>
+        <c:scaling>
+          <c:orientation val="minMax"/>
+        </c:scaling>
+        <c:delete val="0"/>
+        <c:axPos val="l"/>
+        <c:majorGridlines>
+          <c:spPr>
+            <a:ln w="9525" cap="flat" cmpd="sng" algn="ctr">
+              <a:solidFill>
+                <a:schemeClr val="tx1">
+                  <a:lumMod val="15000"/>
+                  <a:lumOff val="85000"/>
+                </a:schemeClr>
+              </a:solidFill>
+              <a:round/>
+            </a:ln>
+            <a:effectLst/>
+          </c:spPr>
+        </c:majorGridlines>
+        <c:numFmt formatCode="0%" sourceLinked="1"/>
+        <c:majorTickMark val="none"/>
+        <c:minorTickMark val="none"/>
+        <c:tickLblPos val="nextTo"/>
+        <c:spPr>
+          <a:noFill/>
+          <a:ln>
+            <a:noFill/>
+          </a:ln>
+          <a:effectLst/>
+        </c:spPr>
+        <c:txPr>
+          <a:bodyPr rot="-60000000" spcFirstLastPara="1" vertOverflow="ellipsis" vert="horz" wrap="square" anchor="ctr" anchorCtr="1"/>
+          <a:lstStyle/>
+          <a:p>
+            <a:pPr>
+              <a:defRPr sz="1197" b="0" i="0" u="none" strike="noStrike" kern="1200" baseline="0">
+                <a:solidFill>
+                  <a:schemeClr val="tx1">
+                    <a:lumMod val="65000"/>
+                    <a:lumOff val="35000"/>
+                  </a:schemeClr>
+                </a:solidFill>
+                <a:latin typeface="+mn-lt"/>
+                <a:ea typeface="+mn-ea"/>
+                <a:cs typeface="+mn-cs"/>
+              </a:defRPr>
+            </a:pPr>
+            <a:endParaRPr lang="en-US"/>
+          </a:p>
+        </c:txPr>
+        <c:crossAx val="1926732080"/>
+        <c:crosses val="autoZero"/>
+        <c:crossBetween val="between"/>
+      </c:valAx>
+      <c:spPr>
+        <a:noFill/>
+        <a:ln>
+          <a:noFill/>
+        </a:ln>
+        <a:effectLst/>
+      </c:spPr>
+    </c:plotArea>
+    <c:plotVisOnly val="1"/>
+    <c:dispBlanksAs val="gap"/>
+    <c:extLst>
+      <c:ext xmlns:c16r3="http://schemas.microsoft.com/office/drawing/2017/03/chart" uri="{56B9EC1D-385E-4148-901F-78D8002777C0}">
+        <c16r3:dataDisplayOptions16>
+          <c16r3:dispNaAsBlank val="1"/>
+        </c16r3:dataDisplayOptions16>
+      </c:ext>
+    </c:extLst>
+    <c:showDLblsOverMax val="0"/>
+  </c:chart>
+  <c:spPr>
+    <a:noFill/>
+    <a:ln>
+      <a:noFill/>
+    </a:ln>
+    <a:effectLst/>
+  </c:spPr>
+  <c:txPr>
+    <a:bodyPr/>
+    <a:lstStyle/>
+    <a:p>
+      <a:pPr>
+        <a:defRPr/>
+      </a:pPr>
+      <a:endParaRPr lang="en-US"/>
+    </a:p>
+  </c:txPr>
+  <c:externalData r:id="rId3">
+    <c:autoUpdate val="0"/>
+  </c:externalData>
+</c:chartSpace>
+</file>
+
+<file path=ppt/charts/colors1.xml><?xml version="1.0" encoding="utf-8"?>
+<cs:colorStyle xmlns:cs="http://schemas.microsoft.com/office/drawing/2012/chartStyle" xmlns:a="http://schemas.openxmlformats.org/drawingml/2006/main" meth="cycle" id="10">
+  <a:schemeClr val="accent1"/>
+  <a:schemeClr val="accent2"/>
+  <a:schemeClr val="accent3"/>
+  <a:schemeClr val="accent4"/>
+  <a:schemeClr val="accent5"/>
+  <a:schemeClr val="accent6"/>
+  <cs:variation/>
+  <cs:variation>
+    <a:lumMod val="60000"/>
+  </cs:variation>
+  <cs:variation>
+    <a:lumMod val="80000"/>
+    <a:lumOff val="20000"/>
+  </cs:variation>
+  <cs:variation>
+    <a:lumMod val="80000"/>
+  </cs:variation>
+  <cs:variation>
+    <a:lumMod val="60000"/>
+    <a:lumOff val="40000"/>
+  </cs:variation>
+  <cs:variation>
+    <a:lumMod val="50000"/>
+  </cs:variation>
+  <cs:variation>
+    <a:lumMod val="70000"/>
+    <a:lumOff val="30000"/>
+  </cs:variation>
+  <cs:variation>
+    <a:lumMod val="70000"/>
+  </cs:variation>
+  <cs:variation>
+    <a:lumMod val="50000"/>
+    <a:lumOff val="50000"/>
+  </cs:variation>
+</cs:colorStyle>
+</file>
+
+<file path=ppt/charts/style1.xml><?xml version="1.0" encoding="utf-8"?>
+<cs:chartStyle xmlns:cs="http://schemas.microsoft.com/office/drawing/2012/chartStyle" xmlns:a="http://schemas.openxmlformats.org/drawingml/2006/main" id="201">
+  <cs:axisTitle>
+    <cs:lnRef idx="0"/>
+    <cs:fillRef idx="0"/>
+    <cs:effectRef idx="0"/>
+    <cs:fontRef idx="minor">
+      <a:schemeClr val="tx1">
+        <a:lumMod val="65000"/>
+        <a:lumOff val="35000"/>
+      </a:schemeClr>
+    </cs:fontRef>
+    <cs:defRPr sz="1330" kern="1200"/>
+  </cs:axisTitle>
+  <cs:categoryAxis>
+    <cs:lnRef idx="0"/>
+    <cs:fillRef idx="0"/>
+    <cs:effectRef idx="0"/>
+    <cs:fontRef idx="minor">
+      <a:schemeClr val="tx1">
+        <a:lumMod val="65000"/>
+        <a:lumOff val="35000"/>
+      </a:schemeClr>
+    </cs:fontRef>
+    <cs:spPr>
+      <a:ln w="9525" cap="flat" cmpd="sng" algn="ctr">
+        <a:solidFill>
+          <a:schemeClr val="tx1">
+            <a:lumMod val="15000"/>
+            <a:lumOff val="85000"/>
+          </a:schemeClr>
+        </a:solidFill>
+        <a:round/>
+      </a:ln>
+    </cs:spPr>
+    <cs:defRPr sz="1197" kern="1200"/>
+  </cs:categoryAxis>
+  <cs:chartArea mods="allowNoFillOverride allowNoLineOverride">
+    <cs:lnRef idx="0"/>
+    <cs:fillRef idx="0"/>
+    <cs:effectRef idx="0"/>
+    <cs:fontRef idx="minor">
+      <a:schemeClr val="tx1"/>
+    </cs:fontRef>
+    <cs:spPr>
+      <a:solidFill>
+        <a:schemeClr val="bg1"/>
+      </a:solidFill>
+      <a:ln w="9525" cap="flat" cmpd="sng" algn="ctr">
+        <a:solidFill>
+          <a:schemeClr val="tx1">
+            <a:lumMod val="15000"/>
+            <a:lumOff val="85000"/>
+          </a:schemeClr>
+        </a:solidFill>
+        <a:round/>
+      </a:ln>
+    </cs:spPr>
+    <cs:defRPr sz="1330" kern="1200"/>
+  </cs:chartArea>
+  <cs:dataLabel>
+    <cs:lnRef idx="0"/>
+    <cs:fillRef idx="0"/>
+    <cs:effectRef idx="0"/>
+    <cs:fontRef idx="minor">
+      <a:schemeClr val="tx1">
+        <a:lumMod val="75000"/>
+        <a:lumOff val="25000"/>
+      </a:schemeClr>
+    </cs:fontRef>
+    <cs:defRPr sz="1197" kern="1200"/>
+  </cs:dataLabel>
+  <cs:dataLabelCallout>
+    <cs:lnRef idx="0"/>
+    <cs:fillRef idx="0"/>
+    <cs:effectRef idx="0"/>
+    <cs:fontRef idx="minor">
+      <a:schemeClr val="dk1">
+        <a:lumMod val="65000"/>
+        <a:lumOff val="35000"/>
+      </a:schemeClr>
+    </cs:fontRef>
+    <cs:spPr>
+      <a:solidFill>
+        <a:schemeClr val="lt1"/>
+      </a:solidFill>
+      <a:ln>
+        <a:solidFill>
+          <a:schemeClr val="dk1">
+            <a:lumMod val="25000"/>
+            <a:lumOff val="75000"/>
+          </a:schemeClr>
+        </a:solidFill>
+      </a:ln>
+    </cs:spPr>
+    <cs:defRPr sz="1197" kern="1200"/>
+    <cs:bodyPr rot="0" spcFirstLastPara="1" vertOverflow="clip" horzOverflow="clip" vert="horz" wrap="square" lIns="36576" tIns="18288" rIns="36576" bIns="18288" anchor="ctr" anchorCtr="1">
+      <a:spAutoFit/>
+    </cs:bodyPr>
+  </cs:dataLabelCallout>
+  <cs:dataPoint>
+    <cs:lnRef idx="0"/>
+    <cs:fillRef idx="1">
+      <cs:styleClr val="auto"/>
+    </cs:fillRef>
+    <cs:effectRef idx="0"/>
+    <cs:fontRef idx="minor">
+      <a:schemeClr val="tx1"/>
+    </cs:fontRef>
+  </cs:dataPoint>
+  <cs:dataPoint3D>
+    <cs:lnRef idx="0"/>
+    <cs:fillRef idx="1">
+      <cs:styleClr val="auto"/>
+    </cs:fillRef>
+    <cs:effectRef idx="0"/>
+    <cs:fontRef idx="minor">
+      <a:schemeClr val="tx1"/>
+    </cs:fontRef>
+  </cs:dataPoint3D>
+  <cs:dataPointLine>
+    <cs:lnRef idx="0">
+      <cs:styleClr val="auto"/>
+    </cs:lnRef>
+    <cs:fillRef idx="1"/>
+    <cs:effectRef idx="0"/>
+    <cs:fontRef idx="minor">
+      <a:schemeClr val="tx1"/>
+    </cs:fontRef>
+    <cs:spPr>
+      <a:ln w="28575" cap="rnd">
+        <a:solidFill>
+          <a:schemeClr val="phClr"/>
+        </a:solidFill>
+        <a:round/>
+      </a:ln>
+    </cs:spPr>
+  </cs:dataPointLine>
+  <cs:dataPointMarker>
+    <cs:lnRef idx="0">
+      <cs:styleClr val="auto"/>
+    </cs:lnRef>
+    <cs:fillRef idx="1">
+      <cs:styleClr val="auto"/>
+    </cs:fillRef>
+    <cs:effectRef idx="0"/>
+    <cs:fontRef idx="minor">
+      <a:schemeClr val="tx1"/>
+    </cs:fontRef>
+    <cs:spPr>
+      <a:ln w="9525">
+        <a:solidFill>
+          <a:schemeClr val="phClr"/>
+        </a:solidFill>
+      </a:ln>
+    </cs:spPr>
+  </cs:dataPointMarker>
+  <cs:dataPointMarkerLayout symbol="circle" size="5"/>
+  <cs:dataPointWireframe>
+    <cs:lnRef idx="0">
+      <cs:styleClr val="auto"/>
+    </cs:lnRef>
+    <cs:fillRef idx="1"/>
+    <cs:effectRef idx="0"/>
+    <cs:fontRef idx="minor">
+      <a:schemeClr val="tx1"/>
+    </cs:fontRef>
+    <cs:spPr>
+      <a:ln w="9525" cap="rnd">
+        <a:solidFill>
+          <a:schemeClr val="phClr"/>
+        </a:solidFill>
+        <a:round/>
+      </a:ln>
+    </cs:spPr>
+  </cs:dataPointWireframe>
+  <cs:dataTable>
+    <cs:lnRef idx="0"/>
+    <cs:fillRef idx="0"/>
+    <cs:effectRef idx="0"/>
+    <cs:fontRef idx="minor">
+      <a:schemeClr val="tx1">
+        <a:lumMod val="65000"/>
+        <a:lumOff val="35000"/>
+      </a:schemeClr>
+    </cs:fontRef>
+    <cs:spPr>
+      <a:noFill/>
+      <a:ln w="9525" cap="flat" cmpd="sng" algn="ctr">
+        <a:solidFill>
+          <a:schemeClr val="tx1">
+            <a:lumMod val="15000"/>
+            <a:lumOff val="85000"/>
+          </a:schemeClr>
+        </a:solidFill>
+        <a:round/>
+      </a:ln>
+    </cs:spPr>
+    <cs:defRPr sz="1197" kern="1200"/>
+  </cs:dataTable>
+  <cs:downBar>
+    <cs:lnRef idx="0"/>
+    <cs:fillRef idx="0"/>
+    <cs:effectRef idx="0"/>
+    <cs:fontRef idx="minor">
+      <a:schemeClr val="dk1"/>
+    </cs:fontRef>
+    <cs:spPr>
+      <a:solidFill>
+        <a:schemeClr val="dk1">
+          <a:lumMod val="65000"/>
+          <a:lumOff val="35000"/>
+        </a:schemeClr>
+      </a:solidFill>
+      <a:ln w="9525">
+        <a:solidFill>
+          <a:schemeClr val="tx1">
+            <a:lumMod val="65000"/>
+            <a:lumOff val="35000"/>
+          </a:schemeClr>
+        </a:solidFill>
+      </a:ln>
+    </cs:spPr>
+  </cs:downBar>
+  <cs:dropLine>
+    <cs:lnRef idx="0"/>
+    <cs:fillRef idx="0"/>
+    <cs:effectRef idx="0"/>
+    <cs:fontRef idx="minor">
+      <a:schemeClr val="tx1"/>
+    </cs:fontRef>
+    <cs:spPr>
+      <a:ln w="9525" cap="flat" cmpd="sng" algn="ctr">
+        <a:solidFill>
+          <a:schemeClr val="tx1">
+            <a:lumMod val="35000"/>
+            <a:lumOff val="65000"/>
+          </a:schemeClr>
+        </a:solidFill>
+        <a:round/>
+      </a:ln>
+    </cs:spPr>
+  </cs:dropLine>
+  <cs:errorBar>
+    <cs:lnRef idx="0"/>
+    <cs:fillRef idx="0"/>
+    <cs:effectRef idx="0"/>
+    <cs:fontRef idx="minor">
+      <a:schemeClr val="tx1"/>
+    </cs:fontRef>
+    <cs:spPr>
+      <a:ln w="9525" cap="flat" cmpd="sng" algn="ctr">
+        <a:solidFill>
+          <a:schemeClr val="tx1">
+            <a:lumMod val="65000"/>
+            <a:lumOff val="35000"/>
+          </a:schemeClr>
+        </a:solidFill>
+        <a:round/>
+      </a:ln>
+    </cs:spPr>
+  </cs:errorBar>
+  <cs:floor>
+    <cs:lnRef idx="0"/>
+    <cs:fillRef idx="0"/>
+    <cs:effectRef idx="0"/>
+    <cs:fontRef idx="minor">
+      <a:schemeClr val="tx1"/>
+    </cs:fontRef>
+    <cs:spPr>
+      <a:noFill/>
+      <a:ln>
+        <a:noFill/>
+      </a:ln>
+    </cs:spPr>
+  </cs:floor>
+  <cs:gridlineMajor>
+    <cs:lnRef idx="0"/>
+    <cs:fillRef idx="0"/>
+    <cs:effectRef idx="0"/>
+    <cs:fontRef idx="minor">
+      <a:schemeClr val="tx1"/>
+    </cs:fontRef>
+    <cs:spPr>
+      <a:ln w="9525" cap="flat" cmpd="sng" algn="ctr">
+        <a:solidFill>
+          <a:schemeClr val="tx1">
+            <a:lumMod val="15000"/>
+            <a:lumOff val="85000"/>
+          </a:schemeClr>
+        </a:solidFill>
+        <a:round/>
+      </a:ln>
+    </cs:spPr>
+  </cs:gridlineMajor>
+  <cs:gridlineMinor>
+    <cs:lnRef idx="0"/>
+    <cs:fillRef idx="0"/>
+    <cs:effectRef idx="0"/>
+    <cs:fontRef idx="minor">
+      <a:schemeClr val="tx1"/>
+    </cs:fontRef>
+    <cs:spPr>
+      <a:ln w="9525" cap="flat" cmpd="sng" algn="ctr">
+        <a:solidFill>
+          <a:schemeClr val="tx1">
+            <a:lumMod val="5000"/>
+            <a:lumOff val="95000"/>
+          </a:schemeClr>
+        </a:solidFill>
+        <a:round/>
+      </a:ln>
+    </cs:spPr>
+  </cs:gridlineMinor>
+  <cs:hiLoLine>
+    <cs:lnRef idx="0"/>
+    <cs:fillRef idx="0"/>
+    <cs:effectRef idx="0"/>
+    <cs:fontRef idx="minor">
+      <a:schemeClr val="tx1"/>
+    </cs:fontRef>
+    <cs:spPr>
+      <a:ln w="9525" cap="flat" cmpd="sng" algn="ctr">
+        <a:solidFill>
+          <a:schemeClr val="tx1">
+            <a:lumMod val="75000"/>
+            <a:lumOff val="25000"/>
+          </a:schemeClr>
+        </a:solidFill>
+        <a:round/>
+      </a:ln>
+    </cs:spPr>
+  </cs:hiLoLine>
+  <cs:leaderLine>
+    <cs:lnRef idx="0"/>
+    <cs:fillRef idx="0"/>
+    <cs:effectRef idx="0"/>
+    <cs:fontRef idx="minor">
+      <a:schemeClr val="tx1"/>
+    </cs:fontRef>
+    <cs:spPr>
+      <a:ln w="9525" cap="flat" cmpd="sng" algn="ctr">
+        <a:solidFill>
+          <a:schemeClr val="tx1">
+            <a:lumMod val="35000"/>
+            <a:lumOff val="65000"/>
+          </a:schemeClr>
+        </a:solidFill>
+        <a:round/>
+      </a:ln>
+    </cs:spPr>
+  </cs:leaderLine>
+  <cs:legend>
+    <cs:lnRef idx="0"/>
+    <cs:fillRef idx="0"/>
+    <cs:effectRef idx="0"/>
+    <cs:fontRef idx="minor">
+      <a:schemeClr val="tx1">
+        <a:lumMod val="65000"/>
+        <a:lumOff val="35000"/>
+      </a:schemeClr>
+    </cs:fontRef>
+    <cs:defRPr sz="1197" kern="1200"/>
+  </cs:legend>
+  <cs:plotArea mods="allowNoFillOverride allowNoLineOverride">
+    <cs:lnRef idx="0"/>
+    <cs:fillRef idx="0"/>
+    <cs:effectRef idx="0"/>
+    <cs:fontRef idx="minor">
+      <a:schemeClr val="tx1"/>
+    </cs:fontRef>
+  </cs:plotArea>
+  <cs:plotArea3D mods="allowNoFillOverride allowNoLineOverride">
+    <cs:lnRef idx="0"/>
+    <cs:fillRef idx="0"/>
+    <cs:effectRef idx="0"/>
+    <cs:fontRef idx="minor">
+      <a:schemeClr val="tx1"/>
+    </cs:fontRef>
+  </cs:plotArea3D>
+  <cs:seriesAxis>
+    <cs:lnRef idx="0"/>
+    <cs:fillRef idx="0"/>
+    <cs:effectRef idx="0"/>
+    <cs:fontRef idx="minor">
+      <a:schemeClr val="tx1">
+        <a:lumMod val="65000"/>
+        <a:lumOff val="35000"/>
+      </a:schemeClr>
+    </cs:fontRef>
+    <cs:defRPr sz="1197" kern="1200"/>
+  </cs:seriesAxis>
+  <cs:seriesLine>
+    <cs:lnRef idx="0"/>
+    <cs:fillRef idx="0"/>
+    <cs:effectRef idx="0"/>
+    <cs:fontRef idx="minor">
+      <a:schemeClr val="tx1"/>
+    </cs:fontRef>
+    <cs:spPr>
+      <a:ln w="9525" cap="flat" cmpd="sng" algn="ctr">
+        <a:solidFill>
+          <a:schemeClr val="tx1">
+            <a:lumMod val="35000"/>
+            <a:lumOff val="65000"/>
+          </a:schemeClr>
+        </a:solidFill>
+        <a:round/>
+      </a:ln>
+    </cs:spPr>
+  </cs:seriesLine>
+  <cs:title>
+    <cs:lnRef idx="0"/>
+    <cs:fillRef idx="0"/>
+    <cs:effectRef idx="0"/>
+    <cs:fontRef idx="minor">
+      <a:schemeClr val="tx1">
+        <a:lumMod val="65000"/>
+        <a:lumOff val="35000"/>
+      </a:schemeClr>
+    </cs:fontRef>
+    <cs:defRPr sz="1862" b="0" kern="1200" spc="0" baseline="0"/>
+  </cs:title>
+  <cs:trendline>
+    <cs:lnRef idx="0">
+      <cs:styleClr val="auto"/>
+    </cs:lnRef>
+    <cs:fillRef idx="0"/>
+    <cs:effectRef idx="0"/>
+    <cs:fontRef idx="minor">
+      <a:schemeClr val="tx1"/>
+    </cs:fontRef>
+    <cs:spPr>
+      <a:ln w="19050" cap="rnd">
+        <a:solidFill>
+          <a:schemeClr val="phClr"/>
+        </a:solidFill>
+        <a:prstDash val="sysDot"/>
+      </a:ln>
+    </cs:spPr>
+  </cs:trendline>
+  <cs:trendlineLabel>
+    <cs:lnRef idx="0"/>
+    <cs:fillRef idx="0"/>
+    <cs:effectRef idx="0"/>
+    <cs:fontRef idx="minor">
+      <a:schemeClr val="tx1">
+        <a:lumMod val="65000"/>
+        <a:lumOff val="35000"/>
+      </a:schemeClr>
+    </cs:fontRef>
+    <cs:defRPr sz="1197" kern="1200"/>
+  </cs:trendlineLabel>
+  <cs:upBar>
+    <cs:lnRef idx="0"/>
+    <cs:fillRef idx="0"/>
+    <cs:effectRef idx="0"/>
+    <cs:fontRef idx="minor">
+      <a:schemeClr val="dk1"/>
+    </cs:fontRef>
+    <cs:spPr>
+      <a:solidFill>
+        <a:schemeClr val="lt1"/>
+      </a:solidFill>
+      <a:ln w="9525">
+        <a:solidFill>
+          <a:schemeClr val="tx1">
+            <a:lumMod val="15000"/>
+            <a:lumOff val="85000"/>
+          </a:schemeClr>
+        </a:solidFill>
+      </a:ln>
+    </cs:spPr>
+  </cs:upBar>
+  <cs:valueAxis>
+    <cs:lnRef idx="0"/>
+    <cs:fillRef idx="0"/>
+    <cs:effectRef idx="0"/>
+    <cs:fontRef idx="minor">
+      <a:schemeClr val="tx1">
+        <a:lumMod val="65000"/>
+        <a:lumOff val="35000"/>
+      </a:schemeClr>
+    </cs:fontRef>
+    <cs:defRPr sz="1197" kern="1200"/>
+  </cs:valueAxis>
+  <cs:wall>
+    <cs:lnRef idx="0"/>
+    <cs:fillRef idx="0"/>
+    <cs:effectRef idx="0"/>
+    <cs:fontRef idx="minor">
+      <a:schemeClr val="tx1"/>
+    </cs:fontRef>
+    <cs:spPr>
+      <a:noFill/>
+      <a:ln>
+        <a:noFill/>
+      </a:ln>
+    </cs:spPr>
+  </cs:wall>
+</cs:chartStyle>
+</file>
+
 <file path=ppt/notesMasters/notesMaster1.xml><?xml version="1.0" encoding="utf-8"?>
 <p:notesMaster xmlns:a="http://schemas.openxmlformats.org/drawingml/2006/main" xmlns:r="http://schemas.openxmlformats.org/officeDocument/2006/relationships" xmlns:p="http://schemas.openxmlformats.org/presentationml/2006/main">
   <p:cSld>
@@ -209,7 +1036,7 @@
           <a:p>
             <a:fld id="{EEACC300-3D7C-4E77-ACC5-ED72B3E2514D}" type="datetimeFigureOut">
               <a:rPr lang="en-US" smtClean="0"/>
-              <a:t>1/30/2020</a:t>
+              <a:t>1/31/2020</a:t>
             </a:fld>
             <a:endParaRPr lang="en-US"/>
           </a:p>
@@ -560,6 +1387,773 @@
 </p:notes>
 </file>
 
+<file path=ppt/notesSlides/notesSlide2.xml><?xml version="1.0" encoding="utf-8"?>
+<p:notes xmlns:a="http://schemas.openxmlformats.org/drawingml/2006/main" xmlns:r="http://schemas.openxmlformats.org/officeDocument/2006/relationships" xmlns:p="http://schemas.openxmlformats.org/presentationml/2006/main">
+  <p:cSld>
+    <p:spTree>
+      <p:nvGrpSpPr>
+        <p:cNvPr id="1" name=""/>
+        <p:cNvGrpSpPr/>
+        <p:nvPr/>
+      </p:nvGrpSpPr>
+      <p:grpSpPr>
+        <a:xfrm>
+          <a:off x="0" y="0"/>
+          <a:ext cx="0" cy="0"/>
+          <a:chOff x="0" y="0"/>
+          <a:chExt cx="0" cy="0"/>
+        </a:xfrm>
+      </p:grpSpPr>
+      <p:sp>
+        <p:nvSpPr>
+          <p:cNvPr id="2" name="Folienbildplatzhalter 1"/>
+          <p:cNvSpPr>
+            <a:spLocks noGrp="1" noRot="1" noChangeAspect="1"/>
+          </p:cNvSpPr>
+          <p:nvPr>
+            <p:ph type="sldImg"/>
+          </p:nvPr>
+        </p:nvSpPr>
+        <p:spPr/>
+      </p:sp>
+      <p:sp>
+        <p:nvSpPr>
+          <p:cNvPr id="3" name="Notizenplatzhalter 2"/>
+          <p:cNvSpPr>
+            <a:spLocks noGrp="1"/>
+          </p:cNvSpPr>
+          <p:nvPr>
+            <p:ph type="body" idx="1"/>
+          </p:nvPr>
+        </p:nvSpPr>
+        <p:spPr/>
+        <p:txBody>
+          <a:bodyPr/>
+          <a:lstStyle/>
+          <a:p>
+            <a:pPr marL="171450" indent="-171450">
+              <a:buFontTx/>
+              <a:buChar char="-"/>
+            </a:pPr>
+            <a:r>
+              <a:rPr lang="de-AT" dirty="0"/>
+              <a:t>Odd; </a:t>
+            </a:r>
+            <a:r>
+              <a:rPr lang="de-AT" dirty="0" err="1"/>
+              <a:t>some</a:t>
+            </a:r>
+            <a:r>
+              <a:rPr lang="de-AT" dirty="0"/>
+              <a:t> </a:t>
+            </a:r>
+            <a:r>
+              <a:rPr lang="de-AT" dirty="0" err="1"/>
+              <a:t>women</a:t>
+            </a:r>
+            <a:r>
+              <a:rPr lang="de-AT" dirty="0"/>
+              <a:t> </a:t>
+            </a:r>
+            <a:r>
+              <a:rPr lang="de-AT" dirty="0" err="1"/>
+              <a:t>pioneers</a:t>
+            </a:r>
+            <a:r>
+              <a:rPr lang="de-AT" dirty="0"/>
+              <a:t> in </a:t>
+            </a:r>
+            <a:r>
+              <a:rPr lang="de-AT" dirty="0" err="1"/>
+              <a:t>the</a:t>
+            </a:r>
+            <a:r>
+              <a:rPr lang="de-AT" dirty="0"/>
+              <a:t> CS </a:t>
+            </a:r>
+            <a:r>
+              <a:rPr lang="de-AT" dirty="0" err="1"/>
+              <a:t>field</a:t>
+            </a:r>
+            <a:r>
+              <a:rPr lang="de-AT" dirty="0"/>
+              <a:t> (Ada Lovelace, Grace Hopper)</a:t>
+            </a:r>
+          </a:p>
+          <a:p>
+            <a:pPr marL="171450" indent="-171450">
+              <a:buFontTx/>
+              <a:buChar char="-"/>
+            </a:pPr>
+            <a:r>
+              <a:rPr lang="de-AT" dirty="0" err="1"/>
+              <a:t>Describe</a:t>
+            </a:r>
+            <a:r>
+              <a:rPr lang="de-AT" dirty="0"/>
+              <a:t> </a:t>
+            </a:r>
+            <a:r>
+              <a:rPr lang="de-AT" dirty="0" err="1"/>
+              <a:t>the</a:t>
+            </a:r>
+            <a:r>
+              <a:rPr lang="de-AT" dirty="0"/>
+              <a:t> </a:t>
+            </a:r>
+            <a:r>
+              <a:rPr lang="de-AT" dirty="0" err="1"/>
+              <a:t>contributions</a:t>
+            </a:r>
+            <a:r>
+              <a:rPr lang="de-AT" dirty="0"/>
+              <a:t> </a:t>
+            </a:r>
+            <a:r>
+              <a:rPr lang="de-AT" dirty="0" err="1"/>
+              <a:t>to</a:t>
+            </a:r>
+            <a:r>
+              <a:rPr lang="de-AT" dirty="0"/>
+              <a:t> </a:t>
+            </a:r>
+            <a:r>
+              <a:rPr lang="de-AT" dirty="0" err="1"/>
+              <a:t>absence</a:t>
+            </a:r>
+            <a:r>
+              <a:rPr lang="de-AT" dirty="0"/>
+              <a:t> </a:t>
+            </a:r>
+            <a:r>
+              <a:rPr lang="de-AT" dirty="0" err="1"/>
+              <a:t>of</a:t>
+            </a:r>
+            <a:r>
+              <a:rPr lang="de-AT" dirty="0"/>
+              <a:t> </a:t>
+            </a:r>
+            <a:r>
+              <a:rPr lang="de-AT" dirty="0" err="1"/>
+              <a:t>female</a:t>
+            </a:r>
+            <a:r>
+              <a:rPr lang="de-AT" dirty="0"/>
+              <a:t> </a:t>
+            </a:r>
+            <a:r>
+              <a:rPr lang="de-AT" dirty="0" err="1"/>
+              <a:t>participation</a:t>
+            </a:r>
+            <a:endParaRPr lang="de-AT" dirty="0"/>
+          </a:p>
+        </p:txBody>
+      </p:sp>
+      <p:sp>
+        <p:nvSpPr>
+          <p:cNvPr id="4" name="Foliennummernplatzhalter 3"/>
+          <p:cNvSpPr>
+            <a:spLocks noGrp="1"/>
+          </p:cNvSpPr>
+          <p:nvPr>
+            <p:ph type="sldNum" sz="quarter" idx="5"/>
+          </p:nvPr>
+        </p:nvSpPr>
+        <p:spPr/>
+        <p:txBody>
+          <a:bodyPr/>
+          <a:lstStyle/>
+          <a:p>
+            <a:fld id="{3A08C91C-33B4-40AA-981F-C4EDAC7C6C8B}" type="slidenum">
+              <a:rPr lang="en-US" smtClean="0"/>
+              <a:t>14</a:t>
+            </a:fld>
+            <a:endParaRPr lang="en-US"/>
+          </a:p>
+        </p:txBody>
+      </p:sp>
+    </p:spTree>
+    <p:extLst>
+      <p:ext uri="{BB962C8B-B14F-4D97-AF65-F5344CB8AC3E}">
+        <p14:creationId xmlns:p14="http://schemas.microsoft.com/office/powerpoint/2010/main" val="175075914"/>
+      </p:ext>
+    </p:extLst>
+  </p:cSld>
+  <p:clrMapOvr>
+    <a:masterClrMapping/>
+  </p:clrMapOvr>
+</p:notes>
+</file>
+
+<file path=ppt/notesSlides/notesSlide3.xml><?xml version="1.0" encoding="utf-8"?>
+<p:notes xmlns:a="http://schemas.openxmlformats.org/drawingml/2006/main" xmlns:r="http://schemas.openxmlformats.org/officeDocument/2006/relationships" xmlns:p="http://schemas.openxmlformats.org/presentationml/2006/main">
+  <p:cSld>
+    <p:spTree>
+      <p:nvGrpSpPr>
+        <p:cNvPr id="1" name=""/>
+        <p:cNvGrpSpPr/>
+        <p:nvPr/>
+      </p:nvGrpSpPr>
+      <p:grpSpPr>
+        <a:xfrm>
+          <a:off x="0" y="0"/>
+          <a:ext cx="0" cy="0"/>
+          <a:chOff x="0" y="0"/>
+          <a:chExt cx="0" cy="0"/>
+        </a:xfrm>
+      </p:grpSpPr>
+      <p:sp>
+        <p:nvSpPr>
+          <p:cNvPr id="2" name="Folienbildplatzhalter 1"/>
+          <p:cNvSpPr>
+            <a:spLocks noGrp="1" noRot="1" noChangeAspect="1"/>
+          </p:cNvSpPr>
+          <p:nvPr>
+            <p:ph type="sldImg"/>
+          </p:nvPr>
+        </p:nvSpPr>
+        <p:spPr/>
+      </p:sp>
+      <p:sp>
+        <p:nvSpPr>
+          <p:cNvPr id="3" name="Notizenplatzhalter 2"/>
+          <p:cNvSpPr>
+            <a:spLocks noGrp="1"/>
+          </p:cNvSpPr>
+          <p:nvPr>
+            <p:ph type="body" idx="1"/>
+          </p:nvPr>
+        </p:nvSpPr>
+        <p:spPr/>
+        <p:txBody>
+          <a:bodyPr/>
+          <a:lstStyle/>
+          <a:p>
+            <a:pPr marL="171450" indent="-171450">
+              <a:buFontTx/>
+              <a:buChar char="-"/>
+            </a:pPr>
+            <a:r>
+              <a:rPr lang="de-AT" dirty="0"/>
+              <a:t>Experiment: </a:t>
+            </a:r>
+            <a:r>
+              <a:rPr lang="de-AT" dirty="0" err="1"/>
+              <a:t>performed</a:t>
+            </a:r>
+            <a:r>
+              <a:rPr lang="de-AT" dirty="0"/>
+              <a:t> </a:t>
+            </a:r>
+            <a:r>
+              <a:rPr lang="de-AT" dirty="0" err="1"/>
+              <a:t>introductionary</a:t>
+            </a:r>
+            <a:r>
+              <a:rPr lang="de-AT" dirty="0"/>
+              <a:t> CS </a:t>
+            </a:r>
+            <a:r>
+              <a:rPr lang="de-AT" dirty="0" err="1"/>
+              <a:t>lessons</a:t>
+            </a:r>
+            <a:r>
+              <a:rPr lang="de-AT" dirty="0"/>
+              <a:t> in </a:t>
+            </a:r>
+            <a:r>
+              <a:rPr lang="de-AT" dirty="0" err="1"/>
+              <a:t>classroom</a:t>
+            </a:r>
+            <a:r>
+              <a:rPr lang="de-AT" dirty="0"/>
+              <a:t> </a:t>
+            </a:r>
+            <a:r>
+              <a:rPr lang="de-AT" dirty="0" err="1"/>
+              <a:t>without</a:t>
+            </a:r>
+            <a:r>
+              <a:rPr lang="de-AT" dirty="0"/>
+              <a:t> </a:t>
+            </a:r>
+            <a:r>
+              <a:rPr lang="de-AT" dirty="0" err="1"/>
+              <a:t>stereotypical</a:t>
+            </a:r>
+            <a:r>
+              <a:rPr lang="de-AT" dirty="0"/>
+              <a:t> </a:t>
+            </a:r>
+            <a:r>
+              <a:rPr lang="de-AT" dirty="0" err="1"/>
+              <a:t>decoration</a:t>
+            </a:r>
+            <a:r>
+              <a:rPr lang="de-AT" dirty="0"/>
+              <a:t> -&gt; </a:t>
+            </a:r>
+            <a:r>
+              <a:rPr lang="de-AT" dirty="0" err="1"/>
+              <a:t>women</a:t>
+            </a:r>
+            <a:r>
+              <a:rPr lang="de-AT" dirty="0"/>
+              <a:t> </a:t>
+            </a:r>
+            <a:r>
+              <a:rPr lang="de-AT" dirty="0" err="1"/>
+              <a:t>were</a:t>
+            </a:r>
+            <a:r>
+              <a:rPr lang="de-AT" dirty="0"/>
+              <a:t> </a:t>
+            </a:r>
+            <a:r>
+              <a:rPr lang="de-AT" dirty="0" err="1"/>
+              <a:t>more</a:t>
+            </a:r>
+            <a:r>
+              <a:rPr lang="de-AT" dirty="0"/>
+              <a:t> </a:t>
+            </a:r>
+            <a:r>
+              <a:rPr lang="de-AT" dirty="0" err="1"/>
+              <a:t>interested</a:t>
+            </a:r>
+            <a:r>
+              <a:rPr lang="de-AT" dirty="0"/>
+              <a:t> in </a:t>
+            </a:r>
+            <a:r>
+              <a:rPr lang="de-AT" dirty="0" err="1"/>
+              <a:t>further</a:t>
+            </a:r>
+            <a:r>
+              <a:rPr lang="de-AT" dirty="0"/>
+              <a:t> </a:t>
+            </a:r>
+            <a:r>
+              <a:rPr lang="de-AT" dirty="0" err="1"/>
+              <a:t>pursing</a:t>
+            </a:r>
+            <a:r>
+              <a:rPr lang="de-AT" dirty="0"/>
+              <a:t> </a:t>
+            </a:r>
+            <a:r>
+              <a:rPr lang="de-AT" dirty="0" err="1"/>
+              <a:t>the</a:t>
+            </a:r>
+            <a:r>
+              <a:rPr lang="de-AT" dirty="0"/>
+              <a:t> </a:t>
+            </a:r>
+            <a:r>
+              <a:rPr lang="de-AT" dirty="0" err="1"/>
+              <a:t>field</a:t>
+            </a:r>
+            <a:endParaRPr lang="de-AT" dirty="0"/>
+          </a:p>
+          <a:p>
+            <a:pPr marL="171450" indent="-171450">
+              <a:buFontTx/>
+              <a:buChar char="-"/>
+            </a:pPr>
+            <a:r>
+              <a:rPr lang="de-AT" dirty="0" err="1"/>
+              <a:t>Decoration</a:t>
+            </a:r>
+            <a:r>
+              <a:rPr lang="de-AT" dirty="0"/>
+              <a:t> </a:t>
+            </a:r>
+            <a:r>
+              <a:rPr lang="de-AT" dirty="0" err="1"/>
+              <a:t>gave</a:t>
+            </a:r>
+            <a:r>
+              <a:rPr lang="de-AT" dirty="0"/>
+              <a:t> </a:t>
+            </a:r>
+            <a:r>
+              <a:rPr lang="de-AT" dirty="0" err="1"/>
+              <a:t>them</a:t>
+            </a:r>
+            <a:r>
+              <a:rPr lang="de-AT" dirty="0"/>
+              <a:t> </a:t>
+            </a:r>
+            <a:r>
+              <a:rPr lang="de-AT" dirty="0" err="1"/>
+              <a:t>the</a:t>
+            </a:r>
+            <a:r>
+              <a:rPr lang="de-AT" dirty="0"/>
+              <a:t> </a:t>
+            </a:r>
+            <a:r>
+              <a:rPr lang="de-AT" dirty="0" err="1"/>
+              <a:t>feeling</a:t>
+            </a:r>
+            <a:r>
+              <a:rPr lang="de-AT" dirty="0"/>
+              <a:t> </a:t>
+            </a:r>
+            <a:r>
+              <a:rPr lang="de-AT" dirty="0" err="1"/>
+              <a:t>they</a:t>
+            </a:r>
+            <a:r>
+              <a:rPr lang="de-AT" dirty="0"/>
+              <a:t> </a:t>
+            </a:r>
+            <a:r>
+              <a:rPr lang="de-AT" dirty="0" err="1"/>
+              <a:t>didn‘t</a:t>
+            </a:r>
+            <a:r>
+              <a:rPr lang="de-AT" dirty="0"/>
+              <a:t> </a:t>
+            </a:r>
+            <a:r>
+              <a:rPr lang="de-AT" dirty="0" err="1"/>
+              <a:t>belong</a:t>
+            </a:r>
+            <a:r>
+              <a:rPr lang="de-AT" dirty="0"/>
+              <a:t> </a:t>
+            </a:r>
+            <a:r>
+              <a:rPr lang="de-AT" dirty="0" err="1"/>
+              <a:t>there</a:t>
+            </a:r>
+            <a:endParaRPr lang="de-AT" dirty="0"/>
+          </a:p>
+        </p:txBody>
+      </p:sp>
+      <p:sp>
+        <p:nvSpPr>
+          <p:cNvPr id="4" name="Foliennummernplatzhalter 3"/>
+          <p:cNvSpPr>
+            <a:spLocks noGrp="1"/>
+          </p:cNvSpPr>
+          <p:nvPr>
+            <p:ph type="sldNum" sz="quarter" idx="5"/>
+          </p:nvPr>
+        </p:nvSpPr>
+        <p:spPr/>
+        <p:txBody>
+          <a:bodyPr/>
+          <a:lstStyle/>
+          <a:p>
+            <a:fld id="{3A08C91C-33B4-40AA-981F-C4EDAC7C6C8B}" type="slidenum">
+              <a:rPr lang="en-US" smtClean="0"/>
+              <a:t>15</a:t>
+            </a:fld>
+            <a:endParaRPr lang="en-US"/>
+          </a:p>
+        </p:txBody>
+      </p:sp>
+    </p:spTree>
+    <p:extLst>
+      <p:ext uri="{BB962C8B-B14F-4D97-AF65-F5344CB8AC3E}">
+        <p14:creationId xmlns:p14="http://schemas.microsoft.com/office/powerpoint/2010/main" val="4195915271"/>
+      </p:ext>
+    </p:extLst>
+  </p:cSld>
+  <p:clrMapOvr>
+    <a:masterClrMapping/>
+  </p:clrMapOvr>
+</p:notes>
+</file>
+
+<file path=ppt/notesSlides/notesSlide4.xml><?xml version="1.0" encoding="utf-8"?>
+<p:notes xmlns:a="http://schemas.openxmlformats.org/drawingml/2006/main" xmlns:r="http://schemas.openxmlformats.org/officeDocument/2006/relationships" xmlns:p="http://schemas.openxmlformats.org/presentationml/2006/main">
+  <p:cSld>
+    <p:spTree>
+      <p:nvGrpSpPr>
+        <p:cNvPr id="1" name=""/>
+        <p:cNvGrpSpPr/>
+        <p:nvPr/>
+      </p:nvGrpSpPr>
+      <p:grpSpPr>
+        <a:xfrm>
+          <a:off x="0" y="0"/>
+          <a:ext cx="0" cy="0"/>
+          <a:chOff x="0" y="0"/>
+          <a:chExt cx="0" cy="0"/>
+        </a:xfrm>
+      </p:grpSpPr>
+      <p:sp>
+        <p:nvSpPr>
+          <p:cNvPr id="2" name="Folienbildplatzhalter 1"/>
+          <p:cNvSpPr>
+            <a:spLocks noGrp="1" noRot="1" noChangeAspect="1"/>
+          </p:cNvSpPr>
+          <p:nvPr>
+            <p:ph type="sldImg"/>
+          </p:nvPr>
+        </p:nvSpPr>
+        <p:spPr/>
+      </p:sp>
+      <p:sp>
+        <p:nvSpPr>
+          <p:cNvPr id="3" name="Notizenplatzhalter 2"/>
+          <p:cNvSpPr>
+            <a:spLocks noGrp="1"/>
+          </p:cNvSpPr>
+          <p:nvPr>
+            <p:ph type="body" idx="1"/>
+          </p:nvPr>
+        </p:nvSpPr>
+        <p:spPr/>
+        <p:txBody>
+          <a:bodyPr/>
+          <a:lstStyle/>
+          <a:p>
+            <a:r>
+              <a:rPr lang="de-AT" dirty="0"/>
+              <a:t>Video </a:t>
+            </a:r>
+            <a:r>
+              <a:rPr lang="de-AT" dirty="0" err="1"/>
+              <a:t>games</a:t>
+            </a:r>
+            <a:r>
+              <a:rPr lang="de-AT" dirty="0"/>
+              <a:t> </a:t>
+            </a:r>
+            <a:r>
+              <a:rPr lang="de-AT" dirty="0" err="1"/>
+              <a:t>tailored</a:t>
+            </a:r>
+            <a:r>
+              <a:rPr lang="de-AT" dirty="0"/>
+              <a:t> </a:t>
+            </a:r>
+            <a:r>
+              <a:rPr lang="de-AT" dirty="0" err="1"/>
+              <a:t>to</a:t>
+            </a:r>
+            <a:r>
+              <a:rPr lang="de-AT" dirty="0"/>
+              <a:t> </a:t>
+            </a:r>
+            <a:r>
+              <a:rPr lang="de-AT" dirty="0" err="1"/>
+              <a:t>boys</a:t>
+            </a:r>
+            <a:endParaRPr lang="de-AT" dirty="0"/>
+          </a:p>
+        </p:txBody>
+      </p:sp>
+      <p:sp>
+        <p:nvSpPr>
+          <p:cNvPr id="4" name="Foliennummernplatzhalter 3"/>
+          <p:cNvSpPr>
+            <a:spLocks noGrp="1"/>
+          </p:cNvSpPr>
+          <p:nvPr>
+            <p:ph type="sldNum" sz="quarter" idx="5"/>
+          </p:nvPr>
+        </p:nvSpPr>
+        <p:spPr/>
+        <p:txBody>
+          <a:bodyPr/>
+          <a:lstStyle/>
+          <a:p>
+            <a:fld id="{3A08C91C-33B4-40AA-981F-C4EDAC7C6C8B}" type="slidenum">
+              <a:rPr lang="en-US" smtClean="0"/>
+              <a:t>18</a:t>
+            </a:fld>
+            <a:endParaRPr lang="en-US"/>
+          </a:p>
+        </p:txBody>
+      </p:sp>
+    </p:spTree>
+    <p:extLst>
+      <p:ext uri="{BB962C8B-B14F-4D97-AF65-F5344CB8AC3E}">
+        <p14:creationId xmlns:p14="http://schemas.microsoft.com/office/powerpoint/2010/main" val="4272259150"/>
+      </p:ext>
+    </p:extLst>
+  </p:cSld>
+  <p:clrMapOvr>
+    <a:masterClrMapping/>
+  </p:clrMapOvr>
+</p:notes>
+</file>
+
+<file path=ppt/notesSlides/notesSlide5.xml><?xml version="1.0" encoding="utf-8"?>
+<p:notes xmlns:a="http://schemas.openxmlformats.org/drawingml/2006/main" xmlns:r="http://schemas.openxmlformats.org/officeDocument/2006/relationships" xmlns:p="http://schemas.openxmlformats.org/presentationml/2006/main">
+  <p:cSld>
+    <p:spTree>
+      <p:nvGrpSpPr>
+        <p:cNvPr id="1" name=""/>
+        <p:cNvGrpSpPr/>
+        <p:nvPr/>
+      </p:nvGrpSpPr>
+      <p:grpSpPr>
+        <a:xfrm>
+          <a:off x="0" y="0"/>
+          <a:ext cx="0" cy="0"/>
+          <a:chOff x="0" y="0"/>
+          <a:chExt cx="0" cy="0"/>
+        </a:xfrm>
+      </p:grpSpPr>
+      <p:sp>
+        <p:nvSpPr>
+          <p:cNvPr id="2" name="Folienbildplatzhalter 1"/>
+          <p:cNvSpPr>
+            <a:spLocks noGrp="1" noRot="1" noChangeAspect="1"/>
+          </p:cNvSpPr>
+          <p:nvPr>
+            <p:ph type="sldImg"/>
+          </p:nvPr>
+        </p:nvSpPr>
+        <p:spPr/>
+      </p:sp>
+      <p:sp>
+        <p:nvSpPr>
+          <p:cNvPr id="3" name="Notizenplatzhalter 2"/>
+          <p:cNvSpPr>
+            <a:spLocks noGrp="1"/>
+          </p:cNvSpPr>
+          <p:nvPr>
+            <p:ph type="body" idx="1"/>
+          </p:nvPr>
+        </p:nvSpPr>
+        <p:spPr/>
+        <p:txBody>
+          <a:bodyPr/>
+          <a:lstStyle/>
+          <a:p>
+            <a:r>
+              <a:rPr lang="de-AT" dirty="0"/>
+              <a:t>Men -&gt; </a:t>
+            </a:r>
+            <a:r>
+              <a:rPr lang="de-AT" dirty="0" err="1"/>
+              <a:t>start</a:t>
+            </a:r>
+            <a:r>
+              <a:rPr lang="de-AT" dirty="0"/>
+              <a:t> </a:t>
+            </a:r>
+            <a:r>
+              <a:rPr lang="de-AT" dirty="0" err="1"/>
+              <a:t>of</a:t>
+            </a:r>
+            <a:r>
+              <a:rPr lang="de-AT" dirty="0"/>
+              <a:t> </a:t>
+            </a:r>
+            <a:r>
+              <a:rPr lang="de-AT" dirty="0" err="1"/>
+              <a:t>university</a:t>
+            </a:r>
+            <a:r>
+              <a:rPr lang="de-AT" dirty="0"/>
+              <a:t>; Women -&gt; </a:t>
+            </a:r>
+            <a:r>
+              <a:rPr lang="de-AT" dirty="0" err="1"/>
+              <a:t>pursue</a:t>
+            </a:r>
+            <a:r>
+              <a:rPr lang="de-AT" dirty="0"/>
+              <a:t> a </a:t>
+            </a:r>
+            <a:r>
+              <a:rPr lang="de-AT" dirty="0" err="1"/>
+              <a:t>career</a:t>
+            </a:r>
+            <a:endParaRPr lang="de-AT" dirty="0"/>
+          </a:p>
+          <a:p>
+            <a:r>
+              <a:rPr lang="de-AT" dirty="0"/>
+              <a:t>Men -&gt; source code </a:t>
+            </a:r>
+            <a:r>
+              <a:rPr lang="de-AT" dirty="0" err="1"/>
+              <a:t>contributions</a:t>
+            </a:r>
+            <a:r>
+              <a:rPr lang="de-AT" dirty="0"/>
+              <a:t>; </a:t>
+            </a:r>
+            <a:r>
+              <a:rPr lang="de-AT" dirty="0" err="1"/>
+              <a:t>women</a:t>
+            </a:r>
+            <a:r>
+              <a:rPr lang="de-AT" dirty="0"/>
+              <a:t>: </a:t>
+            </a:r>
+            <a:r>
+              <a:rPr lang="de-AT" dirty="0" err="1"/>
+              <a:t>documentation</a:t>
+            </a:r>
+            <a:r>
+              <a:rPr lang="de-AT" dirty="0"/>
+              <a:t>, </a:t>
+            </a:r>
+            <a:r>
+              <a:rPr lang="de-AT" dirty="0" err="1"/>
+              <a:t>testing</a:t>
+            </a:r>
+            <a:r>
+              <a:rPr lang="de-AT" dirty="0"/>
+              <a:t>, </a:t>
+            </a:r>
+            <a:r>
+              <a:rPr lang="de-AT" dirty="0" err="1"/>
+              <a:t>translations</a:t>
+            </a:r>
+            <a:r>
+              <a:rPr lang="de-AT" dirty="0"/>
+              <a:t>, etc.</a:t>
+            </a:r>
+          </a:p>
+        </p:txBody>
+      </p:sp>
+      <p:sp>
+        <p:nvSpPr>
+          <p:cNvPr id="4" name="Foliennummernplatzhalter 3"/>
+          <p:cNvSpPr>
+            <a:spLocks noGrp="1"/>
+          </p:cNvSpPr>
+          <p:nvPr>
+            <p:ph type="sldNum" sz="quarter" idx="5"/>
+          </p:nvPr>
+        </p:nvSpPr>
+        <p:spPr/>
+        <p:txBody>
+          <a:bodyPr/>
+          <a:lstStyle/>
+          <a:p>
+            <a:fld id="{3A08C91C-33B4-40AA-981F-C4EDAC7C6C8B}" type="slidenum">
+              <a:rPr lang="en-US" smtClean="0"/>
+              <a:t>19</a:t>
+            </a:fld>
+            <a:endParaRPr lang="en-US"/>
+          </a:p>
+        </p:txBody>
+      </p:sp>
+    </p:spTree>
+    <p:extLst>
+      <p:ext uri="{BB962C8B-B14F-4D97-AF65-F5344CB8AC3E}">
+        <p14:creationId xmlns:p14="http://schemas.microsoft.com/office/powerpoint/2010/main" val="1000988566"/>
+      </p:ext>
+    </p:extLst>
+  </p:cSld>
+  <p:clrMapOvr>
+    <a:masterClrMapping/>
+  </p:clrMapOvr>
+</p:notes>
+</file>
+
 <file path=ppt/slideLayouts/slideLayout1.xml><?xml version="1.0" encoding="utf-8"?>
 <p:sldLayout xmlns:a="http://schemas.openxmlformats.org/drawingml/2006/main" xmlns:r="http://schemas.openxmlformats.org/officeDocument/2006/relationships" xmlns:p="http://schemas.openxmlformats.org/presentationml/2006/main" type="title" preserve="1">
   <p:cSld name="Title Slide">
@@ -707,7 +2301,7 @@
           <a:p>
             <a:fld id="{DCDACB0D-BBD2-40D0-A893-CF04513F27FC}" type="datetimeFigureOut">
               <a:rPr lang="en-US" smtClean="0"/>
-              <a:t>1/30/2020</a:t>
+              <a:t>1/31/2020</a:t>
             </a:fld>
             <a:endParaRPr lang="en-US"/>
           </a:p>
@@ -905,7 +2499,7 @@
           <a:p>
             <a:fld id="{DCDACB0D-BBD2-40D0-A893-CF04513F27FC}" type="datetimeFigureOut">
               <a:rPr lang="en-US" smtClean="0"/>
-              <a:t>1/30/2020</a:t>
+              <a:t>1/31/2020</a:t>
             </a:fld>
             <a:endParaRPr lang="en-US"/>
           </a:p>
@@ -1113,7 +2707,7 @@
           <a:p>
             <a:fld id="{DCDACB0D-BBD2-40D0-A893-CF04513F27FC}" type="datetimeFigureOut">
               <a:rPr lang="en-US" smtClean="0"/>
-              <a:t>1/30/2020</a:t>
+              <a:t>1/31/2020</a:t>
             </a:fld>
             <a:endParaRPr lang="en-US"/>
           </a:p>
@@ -1311,7 +2905,7 @@
           <a:p>
             <a:fld id="{DCDACB0D-BBD2-40D0-A893-CF04513F27FC}" type="datetimeFigureOut">
               <a:rPr lang="en-US" smtClean="0"/>
-              <a:t>1/30/2020</a:t>
+              <a:t>1/31/2020</a:t>
             </a:fld>
             <a:endParaRPr lang="en-US"/>
           </a:p>
@@ -1586,7 +3180,7 @@
           <a:p>
             <a:fld id="{DCDACB0D-BBD2-40D0-A893-CF04513F27FC}" type="datetimeFigureOut">
               <a:rPr lang="en-US" smtClean="0"/>
-              <a:t>1/30/2020</a:t>
+              <a:t>1/31/2020</a:t>
             </a:fld>
             <a:endParaRPr lang="en-US"/>
           </a:p>
@@ -1851,7 +3445,7 @@
           <a:p>
             <a:fld id="{DCDACB0D-BBD2-40D0-A893-CF04513F27FC}" type="datetimeFigureOut">
               <a:rPr lang="en-US" smtClean="0"/>
-              <a:t>1/30/2020</a:t>
+              <a:t>1/31/2020</a:t>
             </a:fld>
             <a:endParaRPr lang="en-US"/>
           </a:p>
@@ -2263,7 +3857,7 @@
           <a:p>
             <a:fld id="{DCDACB0D-BBD2-40D0-A893-CF04513F27FC}" type="datetimeFigureOut">
               <a:rPr lang="en-US" smtClean="0"/>
-              <a:t>1/30/2020</a:t>
+              <a:t>1/31/2020</a:t>
             </a:fld>
             <a:endParaRPr lang="en-US"/>
           </a:p>
@@ -2404,7 +3998,7 @@
           <a:p>
             <a:fld id="{DCDACB0D-BBD2-40D0-A893-CF04513F27FC}" type="datetimeFigureOut">
               <a:rPr lang="en-US" smtClean="0"/>
-              <a:t>1/30/2020</a:t>
+              <a:t>1/31/2020</a:t>
             </a:fld>
             <a:endParaRPr lang="en-US"/>
           </a:p>
@@ -2517,7 +4111,7 @@
           <a:p>
             <a:fld id="{DCDACB0D-BBD2-40D0-A893-CF04513F27FC}" type="datetimeFigureOut">
               <a:rPr lang="en-US" smtClean="0"/>
-              <a:t>1/30/2020</a:t>
+              <a:t>1/31/2020</a:t>
             </a:fld>
             <a:endParaRPr lang="en-US"/>
           </a:p>
@@ -2828,7 +4422,7 @@
           <a:p>
             <a:fld id="{DCDACB0D-BBD2-40D0-A893-CF04513F27FC}" type="datetimeFigureOut">
               <a:rPr lang="en-US" smtClean="0"/>
-              <a:t>1/30/2020</a:t>
+              <a:t>1/31/2020</a:t>
             </a:fld>
             <a:endParaRPr lang="en-US"/>
           </a:p>
@@ -3116,7 +4710,7 @@
           <a:p>
             <a:fld id="{DCDACB0D-BBD2-40D0-A893-CF04513F27FC}" type="datetimeFigureOut">
               <a:rPr lang="en-US" smtClean="0"/>
-              <a:t>1/30/2020</a:t>
+              <a:t>1/31/2020</a:t>
             </a:fld>
             <a:endParaRPr lang="en-US"/>
           </a:p>
@@ -3357,7 +4951,7 @@
           <a:p>
             <a:fld id="{DCDACB0D-BBD2-40D0-A893-CF04513F27FC}" type="datetimeFigureOut">
               <a:rPr lang="en-US" smtClean="0"/>
-              <a:t>1/30/2020</a:t>
+              <a:t>1/31/2020</a:t>
             </a:fld>
             <a:endParaRPr lang="en-US"/>
           </a:p>
@@ -3822,13 +5416,33 @@
         </p:nvSpPr>
         <p:spPr/>
         <p:txBody>
-          <a:bodyPr/>
+          <a:bodyPr>
+            <a:normAutofit/>
+          </a:bodyPr>
           <a:lstStyle/>
           <a:p>
             <a:r>
               <a:rPr lang="en-US" dirty="0"/>
               <a:t>A report on developments and the status quo</a:t>
             </a:r>
+          </a:p>
+          <a:p>
+            <a:endParaRPr lang="en-US" dirty="0"/>
+          </a:p>
+          <a:p>
+            <a:r>
+              <a:rPr lang="en-US" sz="1600" dirty="0"/>
+              <a:t>Eva Jobst (51824341)</a:t>
+            </a:r>
+          </a:p>
+          <a:p>
+            <a:r>
+              <a:rPr lang="en-US" sz="1600" dirty="0"/>
+              <a:t>Mohammad Zandpour (01425603)</a:t>
+            </a:r>
+          </a:p>
+          <a:p>
+            <a:endParaRPr lang="en-US" dirty="0"/>
           </a:p>
         </p:txBody>
       </p:sp>
@@ -4346,6 +5960,1648 @@
     <p:extLst>
       <p:ext uri="{BB962C8B-B14F-4D97-AF65-F5344CB8AC3E}">
         <p14:creationId xmlns:p14="http://schemas.microsoft.com/office/powerpoint/2010/main" val="851255195"/>
+      </p:ext>
+    </p:extLst>
+  </p:cSld>
+  <p:clrMapOvr>
+    <a:masterClrMapping/>
+  </p:clrMapOvr>
+</p:sld>
+</file>
+
+<file path=ppt/slides/slide14.xml><?xml version="1.0" encoding="utf-8"?>
+<p:sld xmlns:a="http://schemas.openxmlformats.org/drawingml/2006/main" xmlns:r="http://schemas.openxmlformats.org/officeDocument/2006/relationships" xmlns:p="http://schemas.openxmlformats.org/presentationml/2006/main">
+  <p:cSld>
+    <p:spTree>
+      <p:nvGrpSpPr>
+        <p:cNvPr id="1" name=""/>
+        <p:cNvGrpSpPr/>
+        <p:nvPr/>
+      </p:nvGrpSpPr>
+      <p:grpSpPr>
+        <a:xfrm>
+          <a:off x="0" y="0"/>
+          <a:ext cx="0" cy="0"/>
+          <a:chOff x="0" y="0"/>
+          <a:chExt cx="0" cy="0"/>
+        </a:xfrm>
+      </p:grpSpPr>
+      <p:sp>
+        <p:nvSpPr>
+          <p:cNvPr id="2" name="Titel 1">
+            <a:extLst>
+              <a:ext uri="{FF2B5EF4-FFF2-40B4-BE49-F238E27FC236}">
+                <a16:creationId xmlns:a16="http://schemas.microsoft.com/office/drawing/2014/main" id="{12645892-AC38-45BC-9601-AC51F32FB708}"/>
+              </a:ext>
+            </a:extLst>
+          </p:cNvPr>
+          <p:cNvSpPr>
+            <a:spLocks noGrp="1"/>
+          </p:cNvSpPr>
+          <p:nvPr>
+            <p:ph type="title"/>
+          </p:nvPr>
+        </p:nvSpPr>
+        <p:spPr/>
+        <p:txBody>
+          <a:bodyPr/>
+          <a:lstStyle/>
+          <a:p>
+            <a:r>
+              <a:rPr lang="de-AT" dirty="0" err="1"/>
+              <a:t>Female</a:t>
+            </a:r>
+            <a:r>
+              <a:rPr lang="de-AT" dirty="0"/>
+              <a:t> </a:t>
+            </a:r>
+            <a:r>
+              <a:rPr lang="de-AT" dirty="0" err="1"/>
+              <a:t>Participation</a:t>
+            </a:r>
+            <a:r>
+              <a:rPr lang="de-AT" dirty="0"/>
+              <a:t> in Computer Science</a:t>
+            </a:r>
+          </a:p>
+        </p:txBody>
+      </p:sp>
+      <p:graphicFrame>
+        <p:nvGraphicFramePr>
+          <p:cNvPr id="6" name="Inhaltsplatzhalter 5">
+            <a:extLst>
+              <a:ext uri="{FF2B5EF4-FFF2-40B4-BE49-F238E27FC236}">
+                <a16:creationId xmlns:a16="http://schemas.microsoft.com/office/drawing/2014/main" id="{CC6F54AD-866F-4066-8549-83E4CE92EF4E}"/>
+              </a:ext>
+            </a:extLst>
+          </p:cNvPr>
+          <p:cNvGraphicFramePr>
+            <a:graphicFrameLocks noGrp="1"/>
+          </p:cNvGraphicFramePr>
+          <p:nvPr>
+            <p:ph idx="1"/>
+            <p:extLst>
+              <p:ext uri="{D42A27DB-BD31-4B8C-83A1-F6EECF244321}">
+                <p14:modId xmlns:p14="http://schemas.microsoft.com/office/powerpoint/2010/main" val="626852798"/>
+              </p:ext>
+            </p:extLst>
+          </p:nvPr>
+        </p:nvGraphicFramePr>
+        <p:xfrm>
+          <a:off x="838200" y="1825625"/>
+          <a:ext cx="10515600" cy="4351338"/>
+        </p:xfrm>
+        <a:graphic>
+          <a:graphicData uri="http://schemas.openxmlformats.org/drawingml/2006/chart">
+            <c:chart xmlns:c="http://schemas.openxmlformats.org/drawingml/2006/chart" xmlns:r="http://schemas.openxmlformats.org/officeDocument/2006/relationships" r:id="rId3"/>
+          </a:graphicData>
+        </a:graphic>
+      </p:graphicFrame>
+      <p:sp>
+        <p:nvSpPr>
+          <p:cNvPr id="7" name="Textfeld 6">
+            <a:extLst>
+              <a:ext uri="{FF2B5EF4-FFF2-40B4-BE49-F238E27FC236}">
+                <a16:creationId xmlns:a16="http://schemas.microsoft.com/office/drawing/2014/main" id="{9E3DA11B-A7B7-4B92-8817-D4AA2FBA9488}"/>
+              </a:ext>
+            </a:extLst>
+          </p:cNvPr>
+          <p:cNvSpPr txBox="1"/>
+          <p:nvPr/>
+        </p:nvSpPr>
+        <p:spPr>
+          <a:xfrm>
+            <a:off x="0" y="6627168"/>
+            <a:ext cx="12192000" cy="230832"/>
+          </a:xfrm>
+          <a:prstGeom prst="rect">
+            <a:avLst/>
+          </a:prstGeom>
+          <a:noFill/>
+        </p:spPr>
+        <p:txBody>
+          <a:bodyPr wrap="square" rtlCol="0">
+            <a:spAutoFit/>
+          </a:bodyPr>
+          <a:lstStyle/>
+          <a:p>
+            <a:r>
+              <a:rPr lang="en-US" sz="900" b="1" dirty="0">
+                <a:solidFill>
+                  <a:schemeClr val="tx1">
+                    <a:lumMod val="65000"/>
+                    <a:lumOff val="35000"/>
+                  </a:schemeClr>
+                </a:solidFill>
+              </a:rPr>
+              <a:t>Source:</a:t>
+            </a:r>
+            <a:r>
+              <a:rPr lang="en-US" sz="900" dirty="0">
+                <a:solidFill>
+                  <a:schemeClr val="tx1">
+                    <a:lumMod val="65000"/>
+                    <a:lumOff val="35000"/>
+                  </a:schemeClr>
+                </a:solidFill>
+              </a:rPr>
+              <a:t> Master, Allison &amp; </a:t>
+            </a:r>
+            <a:r>
+              <a:rPr lang="en-US" sz="900" dirty="0" err="1">
+                <a:solidFill>
+                  <a:schemeClr val="tx1">
+                    <a:lumMod val="65000"/>
+                    <a:lumOff val="35000"/>
+                  </a:schemeClr>
+                </a:solidFill>
+              </a:rPr>
+              <a:t>Cheryan</a:t>
+            </a:r>
+            <a:r>
+              <a:rPr lang="en-US" sz="900" dirty="0">
+                <a:solidFill>
+                  <a:schemeClr val="tx1">
+                    <a:lumMod val="65000"/>
+                    <a:lumOff val="35000"/>
+                  </a:schemeClr>
+                </a:solidFill>
+              </a:rPr>
+              <a:t>, Sapna &amp; Meltzoff, Andrew. (2016). Computing Whether She Belongs: Stereotypes Undermine Girls' Interest and Sense of Belonging in Computer Science. Journal of Educational Psychology. 108. 10.1037/edu0000061. </a:t>
+            </a:r>
+            <a:endParaRPr lang="de-AT" sz="900" dirty="0">
+              <a:solidFill>
+                <a:schemeClr val="tx1">
+                  <a:lumMod val="65000"/>
+                  <a:lumOff val="35000"/>
+                </a:schemeClr>
+              </a:solidFill>
+            </a:endParaRPr>
+          </a:p>
+        </p:txBody>
+      </p:sp>
+    </p:spTree>
+    <p:extLst>
+      <p:ext uri="{BB962C8B-B14F-4D97-AF65-F5344CB8AC3E}">
+        <p14:creationId xmlns:p14="http://schemas.microsoft.com/office/powerpoint/2010/main" val="389832164"/>
+      </p:ext>
+    </p:extLst>
+  </p:cSld>
+  <p:clrMapOvr>
+    <a:masterClrMapping/>
+  </p:clrMapOvr>
+</p:sld>
+</file>
+
+<file path=ppt/slides/slide15.xml><?xml version="1.0" encoding="utf-8"?>
+<p:sld xmlns:a="http://schemas.openxmlformats.org/drawingml/2006/main" xmlns:r="http://schemas.openxmlformats.org/officeDocument/2006/relationships" xmlns:p="http://schemas.openxmlformats.org/presentationml/2006/main">
+  <p:cSld>
+    <p:spTree>
+      <p:nvGrpSpPr>
+        <p:cNvPr id="1" name=""/>
+        <p:cNvGrpSpPr/>
+        <p:nvPr/>
+      </p:nvGrpSpPr>
+      <p:grpSpPr>
+        <a:xfrm>
+          <a:off x="0" y="0"/>
+          <a:ext cx="0" cy="0"/>
+          <a:chOff x="0" y="0"/>
+          <a:chExt cx="0" cy="0"/>
+        </a:xfrm>
+      </p:grpSpPr>
+      <p:sp>
+        <p:nvSpPr>
+          <p:cNvPr id="2" name="Titel 1">
+            <a:extLst>
+              <a:ext uri="{FF2B5EF4-FFF2-40B4-BE49-F238E27FC236}">
+                <a16:creationId xmlns:a16="http://schemas.microsoft.com/office/drawing/2014/main" id="{C9EBCD7B-1E59-4B7D-AE11-95BFE525BBE6}"/>
+              </a:ext>
+            </a:extLst>
+          </p:cNvPr>
+          <p:cNvSpPr>
+            <a:spLocks noGrp="1"/>
+          </p:cNvSpPr>
+          <p:nvPr>
+            <p:ph type="title"/>
+          </p:nvPr>
+        </p:nvSpPr>
+        <p:spPr/>
+        <p:txBody>
+          <a:bodyPr/>
+          <a:lstStyle/>
+          <a:p>
+            <a:r>
+              <a:rPr lang="de-AT" dirty="0"/>
+              <a:t>Stereotypes</a:t>
+            </a:r>
+          </a:p>
+        </p:txBody>
+      </p:sp>
+      <p:sp>
+        <p:nvSpPr>
+          <p:cNvPr id="3" name="Inhaltsplatzhalter 2">
+            <a:extLst>
+              <a:ext uri="{FF2B5EF4-FFF2-40B4-BE49-F238E27FC236}">
+                <a16:creationId xmlns:a16="http://schemas.microsoft.com/office/drawing/2014/main" id="{AAA47B34-AEB3-4F3B-A08F-6B4E73843E23}"/>
+              </a:ext>
+            </a:extLst>
+          </p:cNvPr>
+          <p:cNvSpPr>
+            <a:spLocks noGrp="1"/>
+          </p:cNvSpPr>
+          <p:nvPr>
+            <p:ph idx="1"/>
+          </p:nvPr>
+        </p:nvSpPr>
+        <p:spPr/>
+        <p:txBody>
+          <a:bodyPr>
+            <a:normAutofit/>
+          </a:bodyPr>
+          <a:lstStyle/>
+          <a:p>
+            <a:r>
+              <a:rPr lang="de-AT" dirty="0" err="1"/>
+              <a:t>Examples</a:t>
+            </a:r>
+            <a:r>
+              <a:rPr lang="de-AT" dirty="0"/>
+              <a:t>: male-</a:t>
+            </a:r>
+            <a:r>
+              <a:rPr lang="de-AT" dirty="0" err="1"/>
+              <a:t>dominated</a:t>
+            </a:r>
+            <a:r>
+              <a:rPr lang="de-AT" dirty="0"/>
+              <a:t>, </a:t>
+            </a:r>
+            <a:r>
+              <a:rPr lang="de-AT" dirty="0" err="1"/>
+              <a:t>brilliant</a:t>
+            </a:r>
+            <a:r>
+              <a:rPr lang="de-AT" dirty="0"/>
+              <a:t>, </a:t>
+            </a:r>
+            <a:r>
+              <a:rPr lang="de-AT" dirty="0" err="1"/>
+              <a:t>nerdy</a:t>
+            </a:r>
+            <a:r>
+              <a:rPr lang="de-AT" dirty="0"/>
+              <a:t>, lack social-</a:t>
+            </a:r>
+            <a:r>
+              <a:rPr lang="de-AT" dirty="0" err="1"/>
+              <a:t>skills</a:t>
+            </a:r>
+            <a:endParaRPr lang="de-AT" dirty="0"/>
+          </a:p>
+          <a:p>
+            <a:pPr marL="0" indent="0">
+              <a:buNone/>
+            </a:pPr>
+            <a:endParaRPr lang="de-AT" dirty="0"/>
+          </a:p>
+          <a:p>
+            <a:r>
+              <a:rPr lang="de-AT" dirty="0"/>
+              <a:t>Media </a:t>
+            </a:r>
+            <a:r>
+              <a:rPr lang="de-AT" dirty="0" err="1"/>
+              <a:t>portrays</a:t>
+            </a:r>
+            <a:r>
+              <a:rPr lang="de-AT" dirty="0"/>
+              <a:t> </a:t>
+            </a:r>
+            <a:r>
+              <a:rPr lang="de-AT" dirty="0" err="1"/>
+              <a:t>computer</a:t>
+            </a:r>
+            <a:r>
+              <a:rPr lang="de-AT" dirty="0"/>
+              <a:t> </a:t>
+            </a:r>
+            <a:r>
+              <a:rPr lang="de-AT" dirty="0" err="1"/>
+              <a:t>scientists</a:t>
+            </a:r>
+            <a:r>
+              <a:rPr lang="de-AT" dirty="0"/>
+              <a:t> in a </a:t>
+            </a:r>
+            <a:r>
+              <a:rPr lang="de-AT" dirty="0" err="1"/>
+              <a:t>stereotypical</a:t>
+            </a:r>
+            <a:r>
+              <a:rPr lang="de-AT" dirty="0"/>
+              <a:t> </a:t>
+            </a:r>
+            <a:r>
+              <a:rPr lang="de-AT" dirty="0" err="1"/>
+              <a:t>manner</a:t>
+            </a:r>
+            <a:endParaRPr lang="de-AT" dirty="0"/>
+          </a:p>
+          <a:p>
+            <a:endParaRPr lang="de-AT" dirty="0"/>
+          </a:p>
+          <a:p>
+            <a:r>
+              <a:rPr lang="de-AT" dirty="0"/>
+              <a:t>Hypothesis: Women </a:t>
+            </a:r>
+            <a:r>
+              <a:rPr lang="de-AT" dirty="0" err="1"/>
+              <a:t>don‘t</a:t>
+            </a:r>
+            <a:r>
+              <a:rPr lang="de-AT" dirty="0"/>
+              <a:t> </a:t>
+            </a:r>
+            <a:r>
+              <a:rPr lang="de-AT" dirty="0" err="1"/>
+              <a:t>consider</a:t>
+            </a:r>
+            <a:r>
+              <a:rPr lang="de-AT" dirty="0"/>
+              <a:t> Computer Science </a:t>
+            </a:r>
+            <a:r>
+              <a:rPr lang="de-AT" dirty="0" err="1"/>
+              <a:t>careers</a:t>
+            </a:r>
+            <a:r>
+              <a:rPr lang="de-AT" dirty="0"/>
+              <a:t> </a:t>
+            </a:r>
+            <a:r>
+              <a:rPr lang="de-AT" dirty="0" err="1"/>
+              <a:t>because</a:t>
+            </a:r>
+            <a:r>
+              <a:rPr lang="de-AT" dirty="0"/>
+              <a:t> </a:t>
+            </a:r>
+            <a:r>
+              <a:rPr lang="de-AT" dirty="0" err="1"/>
+              <a:t>of</a:t>
+            </a:r>
+            <a:r>
+              <a:rPr lang="de-AT" dirty="0"/>
+              <a:t> stereotypes</a:t>
+            </a:r>
+          </a:p>
+          <a:p>
+            <a:endParaRPr lang="de-AT" dirty="0"/>
+          </a:p>
+          <a:p>
+            <a:r>
+              <a:rPr lang="de-AT" dirty="0"/>
+              <a:t>Stereotypes in </a:t>
+            </a:r>
+            <a:r>
+              <a:rPr lang="de-AT" dirty="0" err="1"/>
+              <a:t>childhood</a:t>
+            </a:r>
+            <a:r>
+              <a:rPr lang="de-AT" dirty="0"/>
+              <a:t> </a:t>
+            </a:r>
+            <a:r>
+              <a:rPr lang="de-AT" dirty="0" err="1"/>
+              <a:t>with</a:t>
+            </a:r>
+            <a:r>
+              <a:rPr lang="de-AT" dirty="0"/>
+              <a:t> </a:t>
+            </a:r>
+            <a:r>
+              <a:rPr lang="de-AT" dirty="0" err="1"/>
+              <a:t>occupation</a:t>
+            </a:r>
+            <a:r>
+              <a:rPr lang="de-AT" dirty="0"/>
+              <a:t> </a:t>
+            </a:r>
+            <a:r>
+              <a:rPr lang="de-AT" dirty="0" err="1"/>
+              <a:t>choice</a:t>
+            </a:r>
+            <a:endParaRPr lang="de-AT" dirty="0"/>
+          </a:p>
+          <a:p>
+            <a:endParaRPr lang="de-AT" dirty="0"/>
+          </a:p>
+        </p:txBody>
+      </p:sp>
+    </p:spTree>
+    <p:extLst>
+      <p:ext uri="{BB962C8B-B14F-4D97-AF65-F5344CB8AC3E}">
+        <p14:creationId xmlns:p14="http://schemas.microsoft.com/office/powerpoint/2010/main" val="1039466081"/>
+      </p:ext>
+    </p:extLst>
+  </p:cSld>
+  <p:clrMapOvr>
+    <a:masterClrMapping/>
+  </p:clrMapOvr>
+</p:sld>
+</file>
+
+<file path=ppt/slides/slide16.xml><?xml version="1.0" encoding="utf-8"?>
+<p:sld xmlns:a="http://schemas.openxmlformats.org/drawingml/2006/main" xmlns:r="http://schemas.openxmlformats.org/officeDocument/2006/relationships" xmlns:p="http://schemas.openxmlformats.org/presentationml/2006/main">
+  <p:cSld>
+    <p:spTree>
+      <p:nvGrpSpPr>
+        <p:cNvPr id="1" name=""/>
+        <p:cNvGrpSpPr/>
+        <p:nvPr/>
+      </p:nvGrpSpPr>
+      <p:grpSpPr>
+        <a:xfrm>
+          <a:off x="0" y="0"/>
+          <a:ext cx="0" cy="0"/>
+          <a:chOff x="0" y="0"/>
+          <a:chExt cx="0" cy="0"/>
+        </a:xfrm>
+      </p:grpSpPr>
+      <p:sp>
+        <p:nvSpPr>
+          <p:cNvPr id="2" name="Titel 1">
+            <a:extLst>
+              <a:ext uri="{FF2B5EF4-FFF2-40B4-BE49-F238E27FC236}">
+                <a16:creationId xmlns:a16="http://schemas.microsoft.com/office/drawing/2014/main" id="{0914F9E9-F256-46E6-AFD7-0C96C53C2347}"/>
+              </a:ext>
+            </a:extLst>
+          </p:cNvPr>
+          <p:cNvSpPr>
+            <a:spLocks noGrp="1"/>
+          </p:cNvSpPr>
+          <p:nvPr>
+            <p:ph type="title"/>
+          </p:nvPr>
+        </p:nvSpPr>
+        <p:spPr/>
+        <p:txBody>
+          <a:bodyPr/>
+          <a:lstStyle/>
+          <a:p>
+            <a:r>
+              <a:rPr lang="de-AT" dirty="0" err="1"/>
+              <a:t>Social</a:t>
+            </a:r>
+            <a:r>
+              <a:rPr lang="de-AT" dirty="0"/>
+              <a:t> </a:t>
+            </a:r>
+            <a:r>
+              <a:rPr lang="de-AT" dirty="0" err="1"/>
+              <a:t>Barrier</a:t>
+            </a:r>
+            <a:endParaRPr lang="de-AT" dirty="0"/>
+          </a:p>
+        </p:txBody>
+      </p:sp>
+      <p:sp>
+        <p:nvSpPr>
+          <p:cNvPr id="3" name="Inhaltsplatzhalter 2">
+            <a:extLst>
+              <a:ext uri="{FF2B5EF4-FFF2-40B4-BE49-F238E27FC236}">
+                <a16:creationId xmlns:a16="http://schemas.microsoft.com/office/drawing/2014/main" id="{D89E313D-1530-44F4-8A8B-29B8E8AB07A0}"/>
+              </a:ext>
+            </a:extLst>
+          </p:cNvPr>
+          <p:cNvSpPr>
+            <a:spLocks noGrp="1"/>
+          </p:cNvSpPr>
+          <p:nvPr>
+            <p:ph idx="1"/>
+          </p:nvPr>
+        </p:nvSpPr>
+        <p:spPr/>
+        <p:txBody>
+          <a:bodyPr/>
+          <a:lstStyle/>
+          <a:p>
+            <a:r>
+              <a:rPr lang="de-AT" dirty="0"/>
+              <a:t>Personal</a:t>
+            </a:r>
+          </a:p>
+          <a:p>
+            <a:pPr lvl="1"/>
+            <a:r>
+              <a:rPr lang="de-AT" dirty="0" err="1"/>
+              <a:t>Hesitation</a:t>
+            </a:r>
+            <a:r>
+              <a:rPr lang="de-AT" dirty="0"/>
+              <a:t> in </a:t>
+            </a:r>
+            <a:r>
+              <a:rPr lang="de-AT" dirty="0" err="1"/>
+              <a:t>beginning</a:t>
+            </a:r>
+            <a:r>
+              <a:rPr lang="de-AT" dirty="0"/>
+              <a:t> a </a:t>
+            </a:r>
+            <a:r>
+              <a:rPr lang="de-AT" dirty="0" err="1"/>
+              <a:t>career</a:t>
+            </a:r>
+            <a:r>
+              <a:rPr lang="de-AT" dirty="0"/>
+              <a:t> in </a:t>
+            </a:r>
+            <a:r>
+              <a:rPr lang="de-AT" dirty="0" err="1"/>
+              <a:t>masculine</a:t>
+            </a:r>
+            <a:r>
+              <a:rPr lang="de-AT" dirty="0"/>
+              <a:t> </a:t>
+            </a:r>
+            <a:r>
+              <a:rPr lang="de-AT" dirty="0" err="1"/>
+              <a:t>field</a:t>
+            </a:r>
+            <a:endParaRPr lang="de-AT" dirty="0"/>
+          </a:p>
+          <a:p>
+            <a:pPr lvl="1"/>
+            <a:r>
+              <a:rPr lang="de-AT" dirty="0"/>
+              <a:t>Work-</a:t>
+            </a:r>
+            <a:r>
+              <a:rPr lang="de-AT" dirty="0" err="1"/>
+              <a:t>family</a:t>
+            </a:r>
+            <a:r>
+              <a:rPr lang="de-AT" dirty="0"/>
+              <a:t> </a:t>
+            </a:r>
+            <a:r>
+              <a:rPr lang="de-AT" dirty="0" err="1"/>
+              <a:t>balance</a:t>
+            </a:r>
+            <a:r>
+              <a:rPr lang="de-AT" dirty="0"/>
+              <a:t>?</a:t>
+            </a:r>
+          </a:p>
+          <a:p>
+            <a:pPr lvl="1"/>
+            <a:r>
+              <a:rPr lang="de-AT" dirty="0" err="1"/>
+              <a:t>Under-estimation</a:t>
+            </a:r>
+            <a:endParaRPr lang="de-AT" dirty="0"/>
+          </a:p>
+          <a:p>
+            <a:pPr lvl="1"/>
+            <a:r>
+              <a:rPr lang="de-AT" dirty="0"/>
+              <a:t>Put at </a:t>
+            </a:r>
+            <a:r>
+              <a:rPr lang="de-AT" dirty="0" err="1"/>
+              <a:t>disadvantage</a:t>
+            </a:r>
+            <a:r>
+              <a:rPr lang="de-AT" dirty="0"/>
+              <a:t> </a:t>
+            </a:r>
+            <a:r>
+              <a:rPr lang="de-AT" dirty="0" err="1"/>
+              <a:t>for</a:t>
+            </a:r>
+            <a:r>
+              <a:rPr lang="de-AT" dirty="0"/>
+              <a:t> </a:t>
+            </a:r>
+            <a:r>
+              <a:rPr lang="de-AT" dirty="0" err="1"/>
+              <a:t>displaying</a:t>
+            </a:r>
+            <a:r>
+              <a:rPr lang="de-AT" dirty="0"/>
+              <a:t> </a:t>
+            </a:r>
+            <a:r>
+              <a:rPr lang="de-AT" dirty="0" err="1"/>
+              <a:t>expertise</a:t>
+            </a:r>
+            <a:endParaRPr lang="de-AT" dirty="0"/>
+          </a:p>
+          <a:p>
+            <a:r>
+              <a:rPr lang="de-AT" dirty="0"/>
+              <a:t>Outside</a:t>
+            </a:r>
+          </a:p>
+          <a:p>
+            <a:pPr lvl="1"/>
+            <a:r>
+              <a:rPr lang="de-AT" dirty="0"/>
+              <a:t>People lack </a:t>
+            </a:r>
+            <a:r>
+              <a:rPr lang="de-AT" dirty="0" err="1"/>
+              <a:t>understanding</a:t>
+            </a:r>
+            <a:r>
+              <a:rPr lang="de-AT" dirty="0"/>
+              <a:t> </a:t>
+            </a:r>
+            <a:r>
+              <a:rPr lang="de-AT" dirty="0" err="1"/>
+              <a:t>of</a:t>
+            </a:r>
+            <a:r>
+              <a:rPr lang="de-AT" dirty="0"/>
+              <a:t> </a:t>
+            </a:r>
+            <a:r>
+              <a:rPr lang="de-AT" dirty="0" err="1"/>
+              <a:t>the</a:t>
+            </a:r>
+            <a:r>
+              <a:rPr lang="de-AT" dirty="0"/>
+              <a:t> </a:t>
+            </a:r>
+            <a:r>
+              <a:rPr lang="de-AT" dirty="0" err="1"/>
+              <a:t>field</a:t>
+            </a:r>
+            <a:endParaRPr lang="de-AT" dirty="0"/>
+          </a:p>
+          <a:p>
+            <a:pPr lvl="1"/>
+            <a:r>
+              <a:rPr lang="de-AT" dirty="0" err="1"/>
+              <a:t>Don‘t</a:t>
+            </a:r>
+            <a:r>
+              <a:rPr lang="de-AT" dirty="0"/>
+              <a:t> </a:t>
+            </a:r>
+            <a:r>
+              <a:rPr lang="de-AT" dirty="0" err="1"/>
+              <a:t>recommend</a:t>
+            </a:r>
+            <a:r>
+              <a:rPr lang="de-AT" dirty="0"/>
+              <a:t> </a:t>
+            </a:r>
+            <a:r>
+              <a:rPr lang="de-AT" dirty="0" err="1"/>
+              <a:t>because</a:t>
+            </a:r>
+            <a:r>
+              <a:rPr lang="de-AT" dirty="0"/>
+              <a:t> </a:t>
+            </a:r>
+            <a:r>
+              <a:rPr lang="de-AT" dirty="0" err="1"/>
+              <a:t>it‘s</a:t>
+            </a:r>
+            <a:r>
+              <a:rPr lang="de-AT" dirty="0"/>
+              <a:t> </a:t>
+            </a:r>
+            <a:r>
+              <a:rPr lang="de-AT" dirty="0" err="1"/>
+              <a:t>perceived</a:t>
+            </a:r>
+            <a:r>
+              <a:rPr lang="de-AT" dirty="0"/>
+              <a:t> </a:t>
+            </a:r>
+            <a:r>
+              <a:rPr lang="de-AT" dirty="0" err="1"/>
+              <a:t>more</a:t>
+            </a:r>
+            <a:r>
+              <a:rPr lang="de-AT" dirty="0"/>
+              <a:t> </a:t>
+            </a:r>
+            <a:r>
+              <a:rPr lang="de-AT" dirty="0" err="1"/>
+              <a:t>appropriate</a:t>
+            </a:r>
+            <a:r>
+              <a:rPr lang="de-AT" dirty="0"/>
+              <a:t> </a:t>
+            </a:r>
+            <a:r>
+              <a:rPr lang="de-AT" dirty="0" err="1"/>
+              <a:t>for</a:t>
+            </a:r>
+            <a:r>
+              <a:rPr lang="de-AT" dirty="0"/>
+              <a:t> </a:t>
+            </a:r>
+            <a:r>
+              <a:rPr lang="de-AT" dirty="0" err="1"/>
+              <a:t>men</a:t>
+            </a:r>
+            <a:endParaRPr lang="de-AT" dirty="0"/>
+          </a:p>
+          <a:p>
+            <a:pPr lvl="1"/>
+            <a:endParaRPr lang="de-AT" dirty="0"/>
+          </a:p>
+          <a:p>
+            <a:r>
+              <a:rPr lang="de-AT" dirty="0"/>
+              <a:t>More </a:t>
+            </a:r>
+            <a:r>
+              <a:rPr lang="de-AT" dirty="0" err="1"/>
+              <a:t>likely</a:t>
+            </a:r>
+            <a:r>
+              <a:rPr lang="de-AT" dirty="0"/>
+              <a:t> </a:t>
+            </a:r>
+            <a:r>
+              <a:rPr lang="de-AT" dirty="0" err="1"/>
+              <a:t>to</a:t>
+            </a:r>
+            <a:r>
+              <a:rPr lang="de-AT" dirty="0"/>
+              <a:t> </a:t>
+            </a:r>
+            <a:r>
+              <a:rPr lang="de-AT" dirty="0" err="1"/>
+              <a:t>pursue</a:t>
+            </a:r>
+            <a:r>
+              <a:rPr lang="de-AT" dirty="0"/>
+              <a:t> CS </a:t>
+            </a:r>
+            <a:r>
+              <a:rPr lang="de-AT" dirty="0" err="1"/>
+              <a:t>when</a:t>
+            </a:r>
+            <a:r>
+              <a:rPr lang="de-AT" dirty="0"/>
+              <a:t> </a:t>
+            </a:r>
+            <a:r>
+              <a:rPr lang="de-AT" dirty="0" err="1"/>
+              <a:t>family</a:t>
+            </a:r>
+            <a:r>
+              <a:rPr lang="de-AT" dirty="0"/>
+              <a:t> </a:t>
+            </a:r>
+            <a:r>
+              <a:rPr lang="de-AT" dirty="0" err="1"/>
+              <a:t>supports</a:t>
+            </a:r>
+            <a:r>
+              <a:rPr lang="de-AT" dirty="0"/>
+              <a:t> </a:t>
+            </a:r>
+            <a:r>
+              <a:rPr lang="de-AT" dirty="0" err="1"/>
+              <a:t>it</a:t>
+            </a:r>
+            <a:endParaRPr lang="de-AT" dirty="0"/>
+          </a:p>
+        </p:txBody>
+      </p:sp>
+    </p:spTree>
+    <p:extLst>
+      <p:ext uri="{BB962C8B-B14F-4D97-AF65-F5344CB8AC3E}">
+        <p14:creationId xmlns:p14="http://schemas.microsoft.com/office/powerpoint/2010/main" val="2465465099"/>
+      </p:ext>
+    </p:extLst>
+  </p:cSld>
+  <p:clrMapOvr>
+    <a:masterClrMapping/>
+  </p:clrMapOvr>
+</p:sld>
+</file>
+
+<file path=ppt/slides/slide17.xml><?xml version="1.0" encoding="utf-8"?>
+<p:sld xmlns:a="http://schemas.openxmlformats.org/drawingml/2006/main" xmlns:r="http://schemas.openxmlformats.org/officeDocument/2006/relationships" xmlns:p="http://schemas.openxmlformats.org/presentationml/2006/main">
+  <p:cSld>
+    <p:spTree>
+      <p:nvGrpSpPr>
+        <p:cNvPr id="1" name=""/>
+        <p:cNvGrpSpPr/>
+        <p:nvPr/>
+      </p:nvGrpSpPr>
+      <p:grpSpPr>
+        <a:xfrm>
+          <a:off x="0" y="0"/>
+          <a:ext cx="0" cy="0"/>
+          <a:chOff x="0" y="0"/>
+          <a:chExt cx="0" cy="0"/>
+        </a:xfrm>
+      </p:grpSpPr>
+      <p:sp>
+        <p:nvSpPr>
+          <p:cNvPr id="2" name="Titel 1">
+            <a:extLst>
+              <a:ext uri="{FF2B5EF4-FFF2-40B4-BE49-F238E27FC236}">
+                <a16:creationId xmlns:a16="http://schemas.microsoft.com/office/drawing/2014/main" id="{76CA7E32-2F52-4ED4-96DE-8C97DAB13868}"/>
+              </a:ext>
+            </a:extLst>
+          </p:cNvPr>
+          <p:cNvSpPr>
+            <a:spLocks noGrp="1"/>
+          </p:cNvSpPr>
+          <p:nvPr>
+            <p:ph type="title"/>
+          </p:nvPr>
+        </p:nvSpPr>
+        <p:spPr/>
+        <p:txBody>
+          <a:bodyPr/>
+          <a:lstStyle/>
+          <a:p>
+            <a:r>
+              <a:rPr lang="de-AT" dirty="0" err="1"/>
+              <a:t>Role</a:t>
+            </a:r>
+            <a:r>
+              <a:rPr lang="de-AT" dirty="0"/>
+              <a:t> Models</a:t>
+            </a:r>
+          </a:p>
+        </p:txBody>
+      </p:sp>
+      <p:sp>
+        <p:nvSpPr>
+          <p:cNvPr id="3" name="Inhaltsplatzhalter 2">
+            <a:extLst>
+              <a:ext uri="{FF2B5EF4-FFF2-40B4-BE49-F238E27FC236}">
+                <a16:creationId xmlns:a16="http://schemas.microsoft.com/office/drawing/2014/main" id="{41039DC8-EC34-4EFE-AE1C-3C466BF03FC6}"/>
+              </a:ext>
+            </a:extLst>
+          </p:cNvPr>
+          <p:cNvSpPr>
+            <a:spLocks noGrp="1"/>
+          </p:cNvSpPr>
+          <p:nvPr>
+            <p:ph idx="1"/>
+          </p:nvPr>
+        </p:nvSpPr>
+        <p:spPr/>
+        <p:txBody>
+          <a:bodyPr/>
+          <a:lstStyle/>
+          <a:p>
+            <a:r>
+              <a:rPr lang="de-AT" dirty="0"/>
+              <a:t>Lack </a:t>
+            </a:r>
+            <a:r>
+              <a:rPr lang="de-AT" dirty="0" err="1"/>
+              <a:t>of</a:t>
+            </a:r>
+            <a:r>
+              <a:rPr lang="de-AT" dirty="0"/>
+              <a:t> </a:t>
+            </a:r>
+            <a:r>
+              <a:rPr lang="de-AT" dirty="0" err="1"/>
+              <a:t>female</a:t>
+            </a:r>
+            <a:r>
+              <a:rPr lang="de-AT" dirty="0"/>
+              <a:t> </a:t>
+            </a:r>
+            <a:r>
+              <a:rPr lang="de-AT" dirty="0" err="1"/>
+              <a:t>role</a:t>
+            </a:r>
+            <a:r>
+              <a:rPr lang="de-AT" dirty="0"/>
+              <a:t> </a:t>
+            </a:r>
+            <a:r>
+              <a:rPr lang="de-AT" dirty="0" err="1"/>
+              <a:t>models</a:t>
+            </a:r>
+            <a:r>
+              <a:rPr lang="de-AT" dirty="0"/>
+              <a:t> </a:t>
+            </a:r>
+            <a:r>
+              <a:rPr lang="de-AT" dirty="0" err="1"/>
+              <a:t>nowadays</a:t>
+            </a:r>
+            <a:endParaRPr lang="de-AT" dirty="0"/>
+          </a:p>
+          <a:p>
+            <a:endParaRPr lang="de-AT" dirty="0"/>
+          </a:p>
+          <a:p>
+            <a:r>
+              <a:rPr lang="de-AT" dirty="0" err="1"/>
+              <a:t>Richest</a:t>
+            </a:r>
+            <a:r>
+              <a:rPr lang="de-AT" dirty="0"/>
+              <a:t> and </a:t>
+            </a:r>
+            <a:r>
+              <a:rPr lang="de-AT" dirty="0" err="1"/>
+              <a:t>most</a:t>
+            </a:r>
+            <a:r>
+              <a:rPr lang="de-AT" dirty="0"/>
+              <a:t> </a:t>
+            </a:r>
+            <a:r>
+              <a:rPr lang="de-AT" dirty="0" err="1"/>
+              <a:t>influential</a:t>
+            </a:r>
+            <a:r>
+              <a:rPr lang="de-AT" dirty="0"/>
+              <a:t> </a:t>
+            </a:r>
+            <a:r>
+              <a:rPr lang="de-AT" dirty="0" err="1"/>
+              <a:t>computer</a:t>
+            </a:r>
+            <a:r>
+              <a:rPr lang="de-AT" dirty="0"/>
+              <a:t> </a:t>
+            </a:r>
+            <a:r>
+              <a:rPr lang="de-AT" dirty="0" err="1"/>
+              <a:t>scientists</a:t>
+            </a:r>
+            <a:r>
+              <a:rPr lang="de-AT" dirty="0"/>
+              <a:t> </a:t>
+            </a:r>
+            <a:r>
+              <a:rPr lang="de-AT" dirty="0" err="1"/>
+              <a:t>usually</a:t>
+            </a:r>
+            <a:r>
+              <a:rPr lang="de-AT" dirty="0"/>
+              <a:t> </a:t>
+            </a:r>
+            <a:r>
+              <a:rPr lang="de-AT" dirty="0" err="1"/>
+              <a:t>men</a:t>
+            </a:r>
+            <a:endParaRPr lang="de-AT" dirty="0"/>
+          </a:p>
+        </p:txBody>
+      </p:sp>
+    </p:spTree>
+    <p:extLst>
+      <p:ext uri="{BB962C8B-B14F-4D97-AF65-F5344CB8AC3E}">
+        <p14:creationId xmlns:p14="http://schemas.microsoft.com/office/powerpoint/2010/main" val="3940104942"/>
+      </p:ext>
+    </p:extLst>
+  </p:cSld>
+  <p:clrMapOvr>
+    <a:masterClrMapping/>
+  </p:clrMapOvr>
+</p:sld>
+</file>
+
+<file path=ppt/slides/slide18.xml><?xml version="1.0" encoding="utf-8"?>
+<p:sld xmlns:a="http://schemas.openxmlformats.org/drawingml/2006/main" xmlns:r="http://schemas.openxmlformats.org/officeDocument/2006/relationships" xmlns:p="http://schemas.openxmlformats.org/presentationml/2006/main">
+  <p:cSld>
+    <p:spTree>
+      <p:nvGrpSpPr>
+        <p:cNvPr id="1" name=""/>
+        <p:cNvGrpSpPr/>
+        <p:nvPr/>
+      </p:nvGrpSpPr>
+      <p:grpSpPr>
+        <a:xfrm>
+          <a:off x="0" y="0"/>
+          <a:ext cx="0" cy="0"/>
+          <a:chOff x="0" y="0"/>
+          <a:chExt cx="0" cy="0"/>
+        </a:xfrm>
+      </p:grpSpPr>
+      <p:sp>
+        <p:nvSpPr>
+          <p:cNvPr id="2" name="Titel 1">
+            <a:extLst>
+              <a:ext uri="{FF2B5EF4-FFF2-40B4-BE49-F238E27FC236}">
+                <a16:creationId xmlns:a16="http://schemas.microsoft.com/office/drawing/2014/main" id="{756B7891-065D-49EF-A44C-E05152561E4B}"/>
+              </a:ext>
+            </a:extLst>
+          </p:cNvPr>
+          <p:cNvSpPr>
+            <a:spLocks noGrp="1"/>
+          </p:cNvSpPr>
+          <p:nvPr>
+            <p:ph type="title"/>
+          </p:nvPr>
+        </p:nvSpPr>
+        <p:spPr/>
+        <p:txBody>
+          <a:bodyPr/>
+          <a:lstStyle/>
+          <a:p>
+            <a:r>
+              <a:rPr lang="de-AT" dirty="0" err="1"/>
+              <a:t>Exposure</a:t>
+            </a:r>
+            <a:r>
+              <a:rPr lang="de-AT" dirty="0"/>
+              <a:t> </a:t>
+            </a:r>
+            <a:r>
+              <a:rPr lang="de-AT" dirty="0" err="1"/>
+              <a:t>to</a:t>
+            </a:r>
+            <a:r>
+              <a:rPr lang="de-AT" dirty="0"/>
+              <a:t> Computers</a:t>
+            </a:r>
+          </a:p>
+        </p:txBody>
+      </p:sp>
+      <p:sp>
+        <p:nvSpPr>
+          <p:cNvPr id="3" name="Inhaltsplatzhalter 2">
+            <a:extLst>
+              <a:ext uri="{FF2B5EF4-FFF2-40B4-BE49-F238E27FC236}">
+                <a16:creationId xmlns:a16="http://schemas.microsoft.com/office/drawing/2014/main" id="{7F5114A0-9CD5-4A55-A2B1-284B75A5AE88}"/>
+              </a:ext>
+            </a:extLst>
+          </p:cNvPr>
+          <p:cNvSpPr>
+            <a:spLocks noGrp="1"/>
+          </p:cNvSpPr>
+          <p:nvPr>
+            <p:ph idx="1"/>
+          </p:nvPr>
+        </p:nvSpPr>
+        <p:spPr/>
+        <p:txBody>
+          <a:bodyPr/>
+          <a:lstStyle/>
+          <a:p>
+            <a:r>
+              <a:rPr lang="de-AT" dirty="0"/>
+              <a:t>Financial </a:t>
+            </a:r>
+            <a:r>
+              <a:rPr lang="de-AT" dirty="0" err="1"/>
+              <a:t>situation</a:t>
+            </a:r>
+            <a:endParaRPr lang="de-AT" dirty="0"/>
+          </a:p>
+          <a:p>
+            <a:pPr lvl="1"/>
+            <a:r>
+              <a:rPr lang="de-AT" dirty="0"/>
+              <a:t>High-</a:t>
+            </a:r>
+            <a:r>
+              <a:rPr lang="de-AT" dirty="0" err="1"/>
+              <a:t>poverty</a:t>
+            </a:r>
+            <a:r>
+              <a:rPr lang="de-AT" dirty="0"/>
+              <a:t> </a:t>
+            </a:r>
+            <a:r>
+              <a:rPr lang="de-AT" dirty="0" err="1"/>
+              <a:t>school</a:t>
+            </a:r>
+            <a:r>
+              <a:rPr lang="de-AT" dirty="0"/>
+              <a:t> </a:t>
+            </a:r>
+            <a:r>
+              <a:rPr lang="de-AT" dirty="0">
+                <a:sym typeface="Wingdings" panose="05000000000000000000" pitchFamily="2" charset="2"/>
+              </a:rPr>
+              <a:t> </a:t>
+            </a:r>
+            <a:r>
+              <a:rPr lang="de-AT" dirty="0" err="1">
+                <a:sym typeface="Wingdings" panose="05000000000000000000" pitchFamily="2" charset="2"/>
+              </a:rPr>
+              <a:t>little</a:t>
+            </a:r>
+            <a:r>
+              <a:rPr lang="de-AT" dirty="0">
+                <a:sym typeface="Wingdings" panose="05000000000000000000" pitchFamily="2" charset="2"/>
+              </a:rPr>
+              <a:t> </a:t>
+            </a:r>
+            <a:r>
+              <a:rPr lang="de-AT" dirty="0" err="1">
+                <a:sym typeface="Wingdings" panose="05000000000000000000" pitchFamily="2" charset="2"/>
+              </a:rPr>
+              <a:t>access</a:t>
+            </a:r>
+            <a:r>
+              <a:rPr lang="de-AT" dirty="0">
+                <a:sym typeface="Wingdings" panose="05000000000000000000" pitchFamily="2" charset="2"/>
+              </a:rPr>
+              <a:t> </a:t>
+            </a:r>
+            <a:r>
+              <a:rPr lang="de-AT" dirty="0" err="1">
+                <a:sym typeface="Wingdings" panose="05000000000000000000" pitchFamily="2" charset="2"/>
+              </a:rPr>
+              <a:t>to</a:t>
+            </a:r>
+            <a:r>
+              <a:rPr lang="de-AT" dirty="0">
+                <a:sym typeface="Wingdings" panose="05000000000000000000" pitchFamily="2" charset="2"/>
+              </a:rPr>
+              <a:t> </a:t>
+            </a:r>
+            <a:r>
+              <a:rPr lang="de-AT" dirty="0" err="1">
+                <a:sym typeface="Wingdings" panose="05000000000000000000" pitchFamily="2" charset="2"/>
+              </a:rPr>
+              <a:t>computers</a:t>
+            </a:r>
+            <a:endParaRPr lang="de-AT" dirty="0">
+              <a:sym typeface="Wingdings" panose="05000000000000000000" pitchFamily="2" charset="2"/>
+            </a:endParaRPr>
+          </a:p>
+          <a:p>
+            <a:endParaRPr lang="de-AT" dirty="0"/>
+          </a:p>
+          <a:p>
+            <a:r>
+              <a:rPr lang="de-AT" dirty="0"/>
+              <a:t>Gender</a:t>
+            </a:r>
+          </a:p>
+          <a:p>
+            <a:pPr lvl="1"/>
+            <a:r>
+              <a:rPr lang="de-AT" dirty="0" err="1"/>
+              <a:t>Difference</a:t>
+            </a:r>
+            <a:r>
+              <a:rPr lang="de-AT" dirty="0"/>
+              <a:t> in </a:t>
+            </a:r>
+            <a:r>
+              <a:rPr lang="de-AT" dirty="0" err="1"/>
+              <a:t>use</a:t>
+            </a:r>
+            <a:r>
+              <a:rPr lang="de-AT" dirty="0"/>
+              <a:t> </a:t>
+            </a:r>
+            <a:r>
+              <a:rPr lang="de-AT" dirty="0" err="1"/>
+              <a:t>of</a:t>
+            </a:r>
+            <a:r>
+              <a:rPr lang="de-AT" dirty="0"/>
+              <a:t> </a:t>
+            </a:r>
+            <a:r>
+              <a:rPr lang="de-AT" dirty="0" err="1"/>
+              <a:t>computers</a:t>
+            </a:r>
+            <a:endParaRPr lang="de-AT" dirty="0"/>
+          </a:p>
+          <a:p>
+            <a:pPr lvl="1"/>
+            <a:r>
+              <a:rPr lang="de-AT" dirty="0"/>
+              <a:t>Boys </a:t>
+            </a:r>
+            <a:r>
+              <a:rPr lang="de-AT" dirty="0" err="1"/>
+              <a:t>more</a:t>
+            </a:r>
+            <a:r>
+              <a:rPr lang="de-AT" dirty="0"/>
+              <a:t> </a:t>
+            </a:r>
+            <a:r>
+              <a:rPr lang="de-AT" dirty="0" err="1"/>
+              <a:t>likely</a:t>
+            </a:r>
+            <a:r>
+              <a:rPr lang="de-AT" dirty="0"/>
+              <a:t> </a:t>
+            </a:r>
+            <a:r>
+              <a:rPr lang="de-AT" dirty="0" err="1"/>
+              <a:t>to</a:t>
+            </a:r>
+            <a:r>
+              <a:rPr lang="de-AT" dirty="0"/>
+              <a:t> </a:t>
+            </a:r>
+            <a:r>
+              <a:rPr lang="de-AT" dirty="0" err="1"/>
+              <a:t>have</a:t>
+            </a:r>
+            <a:r>
+              <a:rPr lang="de-AT" dirty="0"/>
+              <a:t> </a:t>
+            </a:r>
+            <a:r>
+              <a:rPr lang="de-AT" dirty="0" err="1"/>
+              <a:t>access</a:t>
+            </a:r>
+            <a:r>
+              <a:rPr lang="de-AT" dirty="0"/>
+              <a:t> </a:t>
+            </a:r>
+            <a:r>
+              <a:rPr lang="de-AT" dirty="0" err="1"/>
+              <a:t>to</a:t>
+            </a:r>
+            <a:r>
+              <a:rPr lang="de-AT" dirty="0"/>
+              <a:t> </a:t>
+            </a:r>
+            <a:r>
+              <a:rPr lang="de-AT" dirty="0" err="1"/>
+              <a:t>computers</a:t>
+            </a:r>
+            <a:endParaRPr lang="de-AT" dirty="0"/>
+          </a:p>
+          <a:p>
+            <a:pPr lvl="1"/>
+            <a:r>
+              <a:rPr lang="de-AT" dirty="0"/>
+              <a:t>First </a:t>
+            </a:r>
+            <a:r>
+              <a:rPr lang="de-AT" dirty="0" err="1"/>
+              <a:t>experience</a:t>
+            </a:r>
+            <a:r>
+              <a:rPr lang="de-AT" dirty="0"/>
+              <a:t> </a:t>
+            </a:r>
+            <a:r>
+              <a:rPr lang="de-AT" dirty="0" err="1"/>
+              <a:t>with</a:t>
+            </a:r>
+            <a:r>
+              <a:rPr lang="de-AT" dirty="0"/>
+              <a:t> </a:t>
+            </a:r>
+            <a:r>
+              <a:rPr lang="de-AT" dirty="0" err="1"/>
+              <a:t>computers</a:t>
+            </a:r>
+            <a:r>
+              <a:rPr lang="de-AT" dirty="0"/>
+              <a:t> </a:t>
+            </a:r>
+            <a:r>
+              <a:rPr lang="de-AT" dirty="0" err="1"/>
+              <a:t>because</a:t>
+            </a:r>
+            <a:r>
+              <a:rPr lang="de-AT" dirty="0"/>
+              <a:t> </a:t>
+            </a:r>
+            <a:r>
+              <a:rPr lang="de-AT" dirty="0" err="1"/>
+              <a:t>of</a:t>
+            </a:r>
+            <a:r>
+              <a:rPr lang="de-AT" dirty="0"/>
+              <a:t> </a:t>
+            </a:r>
+            <a:r>
+              <a:rPr lang="de-AT" dirty="0" err="1"/>
+              <a:t>video</a:t>
+            </a:r>
+            <a:r>
+              <a:rPr lang="de-AT" dirty="0"/>
+              <a:t> </a:t>
+            </a:r>
+            <a:r>
+              <a:rPr lang="de-AT" dirty="0" err="1"/>
+              <a:t>games</a:t>
+            </a:r>
+            <a:endParaRPr lang="de-AT" dirty="0"/>
+          </a:p>
+          <a:p>
+            <a:pPr lvl="1"/>
+            <a:r>
+              <a:rPr lang="de-AT" dirty="0"/>
+              <a:t>Boys </a:t>
+            </a:r>
+            <a:r>
+              <a:rPr lang="de-AT" dirty="0" err="1"/>
+              <a:t>more</a:t>
+            </a:r>
+            <a:r>
+              <a:rPr lang="de-AT" dirty="0"/>
+              <a:t> </a:t>
+            </a:r>
+            <a:r>
+              <a:rPr lang="de-AT" dirty="0" err="1"/>
+              <a:t>likely</a:t>
+            </a:r>
+            <a:r>
+              <a:rPr lang="de-AT" dirty="0"/>
+              <a:t> </a:t>
+            </a:r>
+            <a:r>
+              <a:rPr lang="de-AT" dirty="0" err="1"/>
+              <a:t>to</a:t>
+            </a:r>
+            <a:r>
+              <a:rPr lang="de-AT" dirty="0"/>
+              <a:t> </a:t>
+            </a:r>
+            <a:r>
+              <a:rPr lang="de-AT" dirty="0" err="1"/>
+              <a:t>use</a:t>
+            </a:r>
+            <a:r>
+              <a:rPr lang="de-AT" dirty="0"/>
+              <a:t> </a:t>
+            </a:r>
+            <a:r>
+              <a:rPr lang="de-AT" dirty="0" err="1"/>
+              <a:t>computer</a:t>
+            </a:r>
+            <a:r>
+              <a:rPr lang="de-AT" dirty="0"/>
+              <a:t> </a:t>
+            </a:r>
+            <a:r>
+              <a:rPr lang="de-AT" dirty="0" err="1"/>
+              <a:t>for</a:t>
+            </a:r>
+            <a:r>
+              <a:rPr lang="de-AT" dirty="0"/>
+              <a:t> </a:t>
+            </a:r>
+            <a:r>
+              <a:rPr lang="de-AT" dirty="0" err="1"/>
+              <a:t>coding</a:t>
+            </a:r>
+            <a:endParaRPr lang="de-AT" dirty="0"/>
+          </a:p>
+          <a:p>
+            <a:pPr lvl="1"/>
+            <a:r>
+              <a:rPr lang="de-AT" dirty="0"/>
+              <a:t>Girls </a:t>
+            </a:r>
+            <a:r>
+              <a:rPr lang="de-AT" dirty="0" err="1"/>
+              <a:t>start</a:t>
+            </a:r>
+            <a:r>
+              <a:rPr lang="de-AT" dirty="0"/>
+              <a:t> </a:t>
+            </a:r>
+            <a:r>
+              <a:rPr lang="de-AT" dirty="0" err="1"/>
+              <a:t>using</a:t>
+            </a:r>
+            <a:r>
+              <a:rPr lang="de-AT" dirty="0"/>
+              <a:t> </a:t>
+            </a:r>
+            <a:r>
+              <a:rPr lang="de-AT" dirty="0" err="1"/>
+              <a:t>computer</a:t>
+            </a:r>
+            <a:r>
+              <a:rPr lang="de-AT" dirty="0"/>
+              <a:t> </a:t>
+            </a:r>
+            <a:r>
+              <a:rPr lang="de-AT" dirty="0" err="1"/>
+              <a:t>later</a:t>
+            </a:r>
+            <a:endParaRPr lang="de-AT" dirty="0"/>
+          </a:p>
+        </p:txBody>
+      </p:sp>
+    </p:spTree>
+    <p:extLst>
+      <p:ext uri="{BB962C8B-B14F-4D97-AF65-F5344CB8AC3E}">
+        <p14:creationId xmlns:p14="http://schemas.microsoft.com/office/powerpoint/2010/main" val="1370200298"/>
+      </p:ext>
+    </p:extLst>
+  </p:cSld>
+  <p:clrMapOvr>
+    <a:masterClrMapping/>
+  </p:clrMapOvr>
+</p:sld>
+</file>
+
+<file path=ppt/slides/slide19.xml><?xml version="1.0" encoding="utf-8"?>
+<p:sld xmlns:a="http://schemas.openxmlformats.org/drawingml/2006/main" xmlns:r="http://schemas.openxmlformats.org/officeDocument/2006/relationships" xmlns:p="http://schemas.openxmlformats.org/presentationml/2006/main">
+  <p:cSld>
+    <p:spTree>
+      <p:nvGrpSpPr>
+        <p:cNvPr id="1" name=""/>
+        <p:cNvGrpSpPr/>
+        <p:nvPr/>
+      </p:nvGrpSpPr>
+      <p:grpSpPr>
+        <a:xfrm>
+          <a:off x="0" y="0"/>
+          <a:ext cx="0" cy="0"/>
+          <a:chOff x="0" y="0"/>
+          <a:chExt cx="0" cy="0"/>
+        </a:xfrm>
+      </p:grpSpPr>
+      <p:sp>
+        <p:nvSpPr>
+          <p:cNvPr id="2" name="Titel 1">
+            <a:extLst>
+              <a:ext uri="{FF2B5EF4-FFF2-40B4-BE49-F238E27FC236}">
+                <a16:creationId xmlns:a16="http://schemas.microsoft.com/office/drawing/2014/main" id="{5D0657ED-4773-4312-A05E-E7C6F3E0CDCF}"/>
+              </a:ext>
+            </a:extLst>
+          </p:cNvPr>
+          <p:cNvSpPr>
+            <a:spLocks noGrp="1"/>
+          </p:cNvSpPr>
+          <p:nvPr>
+            <p:ph type="title"/>
+          </p:nvPr>
+        </p:nvSpPr>
+        <p:spPr/>
+        <p:txBody>
+          <a:bodyPr/>
+          <a:lstStyle/>
+          <a:p>
+            <a:r>
+              <a:rPr lang="de-AT" dirty="0"/>
+              <a:t>Women in FLOSS</a:t>
+            </a:r>
+          </a:p>
+        </p:txBody>
+      </p:sp>
+      <p:sp>
+        <p:nvSpPr>
+          <p:cNvPr id="3" name="Inhaltsplatzhalter 2">
+            <a:extLst>
+              <a:ext uri="{FF2B5EF4-FFF2-40B4-BE49-F238E27FC236}">
+                <a16:creationId xmlns:a16="http://schemas.microsoft.com/office/drawing/2014/main" id="{7EC31AEF-1FBD-4C12-82E9-43AD495B7D25}"/>
+              </a:ext>
+            </a:extLst>
+          </p:cNvPr>
+          <p:cNvSpPr>
+            <a:spLocks noGrp="1"/>
+          </p:cNvSpPr>
+          <p:nvPr>
+            <p:ph idx="1"/>
+          </p:nvPr>
+        </p:nvSpPr>
+        <p:spPr>
+          <a:xfrm>
+            <a:off x="838200" y="1825625"/>
+            <a:ext cx="10515600" cy="4220612"/>
+          </a:xfrm>
+        </p:spPr>
+        <p:txBody>
+          <a:bodyPr/>
+          <a:lstStyle/>
+          <a:p>
+            <a:r>
+              <a:rPr lang="de-AT" dirty="0"/>
+              <a:t>Women </a:t>
+            </a:r>
+            <a:r>
+              <a:rPr lang="de-AT" dirty="0" err="1"/>
+              <a:t>make</a:t>
+            </a:r>
+            <a:r>
+              <a:rPr lang="de-AT" dirty="0"/>
+              <a:t> </a:t>
+            </a:r>
+            <a:r>
+              <a:rPr lang="de-AT" dirty="0" err="1"/>
+              <a:t>first</a:t>
+            </a:r>
+            <a:r>
+              <a:rPr lang="de-AT" dirty="0"/>
+              <a:t> </a:t>
+            </a:r>
+            <a:r>
+              <a:rPr lang="de-AT" dirty="0" err="1"/>
+              <a:t>contributions</a:t>
+            </a:r>
+            <a:r>
+              <a:rPr lang="de-AT" dirty="0"/>
+              <a:t> </a:t>
+            </a:r>
+            <a:r>
+              <a:rPr lang="de-AT" dirty="0" err="1"/>
+              <a:t>later</a:t>
+            </a:r>
+            <a:r>
+              <a:rPr lang="de-AT" dirty="0"/>
+              <a:t> in </a:t>
+            </a:r>
+            <a:r>
+              <a:rPr lang="de-AT" dirty="0" err="1"/>
+              <a:t>life</a:t>
+            </a:r>
+            <a:endParaRPr lang="de-AT" dirty="0"/>
+          </a:p>
+          <a:p>
+            <a:endParaRPr lang="de-AT" dirty="0"/>
+          </a:p>
+          <a:p>
+            <a:r>
+              <a:rPr lang="de-AT" dirty="0"/>
+              <a:t>2010-2013</a:t>
+            </a:r>
+          </a:p>
+          <a:p>
+            <a:pPr lvl="1"/>
+            <a:r>
+              <a:rPr lang="de-AT" dirty="0"/>
+              <a:t>39% </a:t>
+            </a:r>
+            <a:r>
+              <a:rPr lang="de-AT" dirty="0" err="1"/>
+              <a:t>new</a:t>
+            </a:r>
+            <a:r>
+              <a:rPr lang="de-AT" dirty="0"/>
+              <a:t> </a:t>
+            </a:r>
+            <a:r>
+              <a:rPr lang="de-AT" dirty="0" err="1"/>
+              <a:t>female</a:t>
+            </a:r>
+            <a:r>
+              <a:rPr lang="de-AT" dirty="0"/>
+              <a:t> </a:t>
+            </a:r>
+            <a:r>
+              <a:rPr lang="de-AT" dirty="0" err="1"/>
+              <a:t>contributors</a:t>
+            </a:r>
+            <a:endParaRPr lang="de-AT" dirty="0"/>
+          </a:p>
+          <a:p>
+            <a:pPr lvl="1"/>
+            <a:r>
+              <a:rPr lang="de-AT" dirty="0"/>
+              <a:t>19% </a:t>
+            </a:r>
+            <a:r>
+              <a:rPr lang="de-AT" dirty="0" err="1"/>
+              <a:t>new</a:t>
+            </a:r>
+            <a:r>
+              <a:rPr lang="de-AT" dirty="0"/>
+              <a:t> male </a:t>
+            </a:r>
+            <a:r>
+              <a:rPr lang="de-AT" dirty="0" err="1"/>
+              <a:t>contributors</a:t>
+            </a:r>
+            <a:endParaRPr lang="de-AT" dirty="0"/>
+          </a:p>
+          <a:p>
+            <a:pPr lvl="1"/>
+            <a:endParaRPr lang="de-AT" dirty="0"/>
+          </a:p>
+          <a:p>
+            <a:r>
+              <a:rPr lang="de-AT" dirty="0"/>
+              <a:t>Women code </a:t>
+            </a:r>
+            <a:r>
+              <a:rPr lang="de-AT" dirty="0" err="1"/>
+              <a:t>less</a:t>
+            </a:r>
+            <a:endParaRPr lang="de-AT" dirty="0"/>
+          </a:p>
+        </p:txBody>
+      </p:sp>
+    </p:spTree>
+    <p:extLst>
+      <p:ext uri="{BB962C8B-B14F-4D97-AF65-F5344CB8AC3E}">
+        <p14:creationId xmlns:p14="http://schemas.microsoft.com/office/powerpoint/2010/main" val="712326883"/>
       </p:ext>
     </p:extLst>
   </p:cSld>

</xml_diff>

<commit_message>
Fixed little things in the presentation
</commit_message>
<xml_diff>
--- a/Paper - Presentation.pptx
+++ b/Paper - Presentation.pptx
@@ -2,7 +2,7 @@
 <file path=ppt/presentation.xml><?xml version="1.0" encoding="utf-8"?>
 <p:presentation xmlns:a="http://schemas.openxmlformats.org/drawingml/2006/main" xmlns:r="http://schemas.openxmlformats.org/officeDocument/2006/relationships" xmlns:p="http://schemas.openxmlformats.org/presentationml/2006/main" saveSubsetFonts="1">
   <p:sldMasterIdLst>
-    <p:sldMasterId id="2147483648" r:id="rId1"/>
+    <p:sldMasterId id="2147483696" r:id="rId1"/>
   </p:sldMasterIdLst>
   <p:notesMasterIdLst>
     <p:notesMasterId r:id="rId21"/>
@@ -34,7 +34,7 @@
     <a:defPPr>
       <a:defRPr lang="en-US"/>
     </a:defPPr>
-    <a:lvl1pPr marL="0" algn="l" defTabSz="914400" rtl="0" eaLnBrk="1" latinLnBrk="0" hangingPunct="1">
+    <a:lvl1pPr marL="0" algn="l" defTabSz="457200" rtl="0" eaLnBrk="1" latinLnBrk="0" hangingPunct="1">
       <a:defRPr sz="1800" kern="1200">
         <a:solidFill>
           <a:schemeClr val="tx1"/>
@@ -44,7 +44,7 @@
         <a:cs typeface="+mn-cs"/>
       </a:defRPr>
     </a:lvl1pPr>
-    <a:lvl2pPr marL="457200" algn="l" defTabSz="914400" rtl="0" eaLnBrk="1" latinLnBrk="0" hangingPunct="1">
+    <a:lvl2pPr marL="457200" algn="l" defTabSz="457200" rtl="0" eaLnBrk="1" latinLnBrk="0" hangingPunct="1">
       <a:defRPr sz="1800" kern="1200">
         <a:solidFill>
           <a:schemeClr val="tx1"/>
@@ -54,7 +54,7 @@
         <a:cs typeface="+mn-cs"/>
       </a:defRPr>
     </a:lvl2pPr>
-    <a:lvl3pPr marL="914400" algn="l" defTabSz="914400" rtl="0" eaLnBrk="1" latinLnBrk="0" hangingPunct="1">
+    <a:lvl3pPr marL="914400" algn="l" defTabSz="457200" rtl="0" eaLnBrk="1" latinLnBrk="0" hangingPunct="1">
       <a:defRPr sz="1800" kern="1200">
         <a:solidFill>
           <a:schemeClr val="tx1"/>
@@ -64,7 +64,7 @@
         <a:cs typeface="+mn-cs"/>
       </a:defRPr>
     </a:lvl3pPr>
-    <a:lvl4pPr marL="1371600" algn="l" defTabSz="914400" rtl="0" eaLnBrk="1" latinLnBrk="0" hangingPunct="1">
+    <a:lvl4pPr marL="1371600" algn="l" defTabSz="457200" rtl="0" eaLnBrk="1" latinLnBrk="0" hangingPunct="1">
       <a:defRPr sz="1800" kern="1200">
         <a:solidFill>
           <a:schemeClr val="tx1"/>
@@ -74,7 +74,7 @@
         <a:cs typeface="+mn-cs"/>
       </a:defRPr>
     </a:lvl4pPr>
-    <a:lvl5pPr marL="1828800" algn="l" defTabSz="914400" rtl="0" eaLnBrk="1" latinLnBrk="0" hangingPunct="1">
+    <a:lvl5pPr marL="1828800" algn="l" defTabSz="457200" rtl="0" eaLnBrk="1" latinLnBrk="0" hangingPunct="1">
       <a:defRPr sz="1800" kern="1200">
         <a:solidFill>
           <a:schemeClr val="tx1"/>
@@ -84,7 +84,7 @@
         <a:cs typeface="+mn-cs"/>
       </a:defRPr>
     </a:lvl5pPr>
-    <a:lvl6pPr marL="2286000" algn="l" defTabSz="914400" rtl="0" eaLnBrk="1" latinLnBrk="0" hangingPunct="1">
+    <a:lvl6pPr marL="2286000" algn="l" defTabSz="457200" rtl="0" eaLnBrk="1" latinLnBrk="0" hangingPunct="1">
       <a:defRPr sz="1800" kern="1200">
         <a:solidFill>
           <a:schemeClr val="tx1"/>
@@ -94,7 +94,7 @@
         <a:cs typeface="+mn-cs"/>
       </a:defRPr>
     </a:lvl6pPr>
-    <a:lvl7pPr marL="2743200" algn="l" defTabSz="914400" rtl="0" eaLnBrk="1" latinLnBrk="0" hangingPunct="1">
+    <a:lvl7pPr marL="2743200" algn="l" defTabSz="457200" rtl="0" eaLnBrk="1" latinLnBrk="0" hangingPunct="1">
       <a:defRPr sz="1800" kern="1200">
         <a:solidFill>
           <a:schemeClr val="tx1"/>
@@ -104,7 +104,7 @@
         <a:cs typeface="+mn-cs"/>
       </a:defRPr>
     </a:lvl7pPr>
-    <a:lvl8pPr marL="3200400" algn="l" defTabSz="914400" rtl="0" eaLnBrk="1" latinLnBrk="0" hangingPunct="1">
+    <a:lvl8pPr marL="3200400" algn="l" defTabSz="457200" rtl="0" eaLnBrk="1" latinLnBrk="0" hangingPunct="1">
       <a:defRPr sz="1800" kern="1200">
         <a:solidFill>
           <a:schemeClr val="tx1"/>
@@ -114,7 +114,7 @@
         <a:cs typeface="+mn-cs"/>
       </a:defRPr>
     </a:lvl8pPr>
-    <a:lvl9pPr marL="3657600" algn="l" defTabSz="914400" rtl="0" eaLnBrk="1" latinLnBrk="0" hangingPunct="1">
+    <a:lvl9pPr marL="3657600" algn="l" defTabSz="457200" rtl="0" eaLnBrk="1" latinLnBrk="0" hangingPunct="1">
       <a:defRPr sz="1800" kern="1200">
         <a:solidFill>
           <a:schemeClr val="tx1"/>
@@ -136,7 +136,7 @@
 <file path=ppt/charts/chart1.xml><?xml version="1.0" encoding="utf-8"?>
 <c:chartSpace xmlns:c="http://schemas.openxmlformats.org/drawingml/2006/chart" xmlns:a="http://schemas.openxmlformats.org/drawingml/2006/main" xmlns:r="http://schemas.openxmlformats.org/officeDocument/2006/relationships" xmlns:c16r2="http://schemas.microsoft.com/office/drawing/2015/06/chart">
   <c:date1904 val="0"/>
-  <c:lang val="en-US"/>
+  <c:lang val="de-DE"/>
   <c:roundedCorners val="0"/>
   <mc:AlternateContent xmlns:mc="http://schemas.openxmlformats.org/markup-compatibility/2006">
     <mc:Choice xmlns:c14="http://schemas.microsoft.com/office/drawing/2007/8/2/chart" Requires="c14">
@@ -173,7 +173,7 @@
               <a:cs typeface="+mn-cs"/>
             </a:defRPr>
           </a:pPr>
-          <a:endParaRPr lang="en-US"/>
+          <a:endParaRPr lang="en-DE"/>
         </a:p>
       </c:txPr>
     </c:title>
@@ -209,21 +209,22 @@
           </c:spPr>
           <c:invertIfNegative val="0"/>
           <c:cat>
-            <c:strRef>
+            <c:numRef>
               <c:f>Tabelle1!$A$2:$A$4</c:f>
-              <c:strCache>
+              <c:numCache>
+                <c:formatCode>General</c:formatCode>
                 <c:ptCount val="3"/>
                 <c:pt idx="0">
-                  <c:v>1970s</c:v>
+                  <c:v>1971</c:v>
                 </c:pt>
                 <c:pt idx="1">
-                  <c:v>1980s</c:v>
+                  <c:v>1984</c:v>
                 </c:pt>
                 <c:pt idx="2">
-                  <c:v>1990s</c:v>
+                  <c:v>1997</c:v>
                 </c:pt>
-              </c:strCache>
-            </c:strRef>
+              </c:numCache>
+            </c:numRef>
           </c:cat>
           <c:val>
             <c:numRef>
@@ -303,7 +304,7 @@
                 <a:cs typeface="+mn-cs"/>
               </a:defRPr>
             </a:pPr>
-            <a:endParaRPr lang="en-US"/>
+            <a:endParaRPr lang="en-DE"/>
           </a:p>
         </c:txPr>
         <c:crossAx val="1877788272"/>
@@ -362,7 +363,7 @@
                 <a:cs typeface="+mn-cs"/>
               </a:defRPr>
             </a:pPr>
-            <a:endParaRPr lang="en-US"/>
+            <a:endParaRPr lang="en-DE"/>
           </a:p>
         </c:txPr>
         <c:crossAx val="1926732080"/>
@@ -402,7 +403,7 @@
       <a:pPr>
         <a:defRPr/>
       </a:pPr>
-      <a:endParaRPr lang="en-US"/>
+      <a:endParaRPr lang="en-DE"/>
     </a:p>
   </c:txPr>
   <c:externalData r:id="rId3">
@@ -1194,7 +1195,7 @@
           <a:p>
             <a:fld id="{3A08C91C-33B4-40AA-981F-C4EDAC7C6C8B}" type="slidenum">
               <a:rPr lang="en-US" smtClean="0"/>
-              <a:t>‹#›</a:t>
+              <a:t>‹Nr.›</a:t>
             </a:fld>
             <a:endParaRPr lang="en-US"/>
           </a:p>
@@ -1984,9 +1985,17 @@
 </p:notes>
 </file>
 
-<file path=ppt/notesSlides/notesSlide5.xml><?xml version="1.0" encoding="utf-8"?>
-<p:notes xmlns:a="http://schemas.openxmlformats.org/drawingml/2006/main" xmlns:r="http://schemas.openxmlformats.org/officeDocument/2006/relationships" xmlns:p="http://schemas.openxmlformats.org/presentationml/2006/main">
-  <p:cSld>
+<file path=ppt/slideLayouts/slideLayout1.xml><?xml version="1.0" encoding="utf-8"?>
+<p:sldLayout xmlns:a="http://schemas.openxmlformats.org/drawingml/2006/main" xmlns:r="http://schemas.openxmlformats.org/officeDocument/2006/relationships" xmlns:p="http://schemas.openxmlformats.org/presentationml/2006/main" type="title" preserve="1">
+  <p:cSld name="Titelfolie">
+    <p:bg>
+      <p:bgPr>
+        <a:solidFill>
+          <a:schemeClr val="accent1"/>
+        </a:solidFill>
+        <a:effectLst/>
+      </p:bgPr>
+    </p:bg>
     <p:spTree>
       <p:nvGrpSpPr>
         <p:cNvPr id="1" name=""/>
@@ -2003,139 +2012,242 @@
       </p:grpSpPr>
       <p:sp>
         <p:nvSpPr>
-          <p:cNvPr id="2" name="Folienbildplatzhalter 1"/>
-          <p:cNvSpPr>
-            <a:spLocks noGrp="1" noRot="1" noChangeAspect="1"/>
-          </p:cNvSpPr>
-          <p:nvPr>
-            <p:ph type="sldImg"/>
+          <p:cNvPr id="4" name="Rectangle 3"/>
+          <p:cNvSpPr/>
+          <p:nvPr/>
+        </p:nvSpPr>
+        <p:spPr>
+          <a:xfrm>
+            <a:off x="0" y="0"/>
+            <a:ext cx="12192000" cy="6858000"/>
+          </a:xfrm>
+          <a:prstGeom prst="rect">
+            <a:avLst/>
+          </a:prstGeom>
+          <a:ln>
+            <a:noFill/>
+          </a:ln>
+        </p:spPr>
+        <p:style>
+          <a:lnRef idx="2">
+            <a:schemeClr val="accent1">
+              <a:shade val="50000"/>
+            </a:schemeClr>
+          </a:lnRef>
+          <a:fillRef idx="1">
+            <a:schemeClr val="accent1"/>
+          </a:fillRef>
+          <a:effectRef idx="0">
+            <a:schemeClr val="accent1"/>
+          </a:effectRef>
+          <a:fontRef idx="minor">
+            <a:schemeClr val="lt1"/>
+          </a:fontRef>
+        </p:style>
+      </p:sp>
+      <p:sp>
+        <p:nvSpPr>
+          <p:cNvPr id="2" name="Title 1"/>
+          <p:cNvSpPr>
+            <a:spLocks noGrp="1"/>
+          </p:cNvSpPr>
+          <p:nvPr>
+            <p:ph type="ctrTitle"/>
+          </p:nvPr>
+        </p:nvSpPr>
+        <p:spPr>
+          <a:xfrm>
+            <a:off x="603504" y="770467"/>
+            <a:ext cx="10782300" cy="3352800"/>
+          </a:xfrm>
+        </p:spPr>
+        <p:txBody>
+          <a:bodyPr anchor="b">
+            <a:noAutofit/>
+          </a:bodyPr>
+          <a:lstStyle>
+            <a:lvl1pPr algn="l">
+              <a:lnSpc>
+                <a:spcPct val="80000"/>
+              </a:lnSpc>
+              <a:defRPr sz="8800" spc="-120" baseline="0">
+                <a:solidFill>
+                  <a:srgbClr val="FFFFFF"/>
+                </a:solidFill>
+              </a:defRPr>
+            </a:lvl1pPr>
+          </a:lstStyle>
+          <a:p>
+            <a:r>
+              <a:rPr lang="de-DE"/>
+              <a:t>Mastertitelformat bearbeiten</a:t>
+            </a:r>
+            <a:endParaRPr lang="en-US" dirty="0"/>
+          </a:p>
+        </p:txBody>
+      </p:sp>
+      <p:sp>
+        <p:nvSpPr>
+          <p:cNvPr id="3" name="Subtitle 2"/>
+          <p:cNvSpPr>
+            <a:spLocks noGrp="1"/>
+          </p:cNvSpPr>
+          <p:nvPr>
+            <p:ph type="subTitle" idx="1"/>
+          </p:nvPr>
+        </p:nvSpPr>
+        <p:spPr>
+          <a:xfrm>
+            <a:off x="667512" y="4206876"/>
+            <a:ext cx="9228201" cy="1645920"/>
+          </a:xfrm>
+        </p:spPr>
+        <p:txBody>
+          <a:bodyPr>
+            <a:normAutofit/>
+          </a:bodyPr>
+          <a:lstStyle>
+            <a:lvl1pPr marL="0" indent="0" algn="l">
+              <a:buNone/>
+              <a:defRPr sz="3200">
+                <a:solidFill>
+                  <a:srgbClr val="262626"/>
+                </a:solidFill>
+                <a:latin typeface="+mj-lt"/>
+              </a:defRPr>
+            </a:lvl1pPr>
+            <a:lvl2pPr marL="457200" indent="0" algn="ctr">
+              <a:buNone/>
+              <a:defRPr sz="2800"/>
+            </a:lvl2pPr>
+            <a:lvl3pPr marL="914400" indent="0" algn="ctr">
+              <a:buNone/>
+              <a:defRPr sz="2400"/>
+            </a:lvl3pPr>
+            <a:lvl4pPr marL="1371600" indent="0" algn="ctr">
+              <a:buNone/>
+              <a:defRPr sz="2000"/>
+            </a:lvl4pPr>
+            <a:lvl5pPr marL="1828800" indent="0" algn="ctr">
+              <a:buNone/>
+              <a:defRPr sz="2000"/>
+            </a:lvl5pPr>
+            <a:lvl6pPr marL="2286000" indent="0" algn="ctr">
+              <a:buNone/>
+              <a:defRPr sz="2000"/>
+            </a:lvl6pPr>
+            <a:lvl7pPr marL="2743200" indent="0" algn="ctr">
+              <a:buNone/>
+              <a:defRPr sz="2000"/>
+            </a:lvl7pPr>
+            <a:lvl8pPr marL="3200400" indent="0" algn="ctr">
+              <a:buNone/>
+              <a:defRPr sz="2000"/>
+            </a:lvl8pPr>
+            <a:lvl9pPr marL="3657600" indent="0" algn="ctr">
+              <a:buNone/>
+              <a:defRPr sz="2000"/>
+            </a:lvl9pPr>
+          </a:lstStyle>
+          <a:p>
+            <a:r>
+              <a:rPr lang="de-DE"/>
+              <a:t>Master-Untertitelformat bearbeiten</a:t>
+            </a:r>
+            <a:endParaRPr lang="en-US" dirty="0"/>
+          </a:p>
+        </p:txBody>
+      </p:sp>
+      <p:sp>
+        <p:nvSpPr>
+          <p:cNvPr id="7" name="Date Placeholder 6"/>
+          <p:cNvSpPr>
+            <a:spLocks noGrp="1"/>
+          </p:cNvSpPr>
+          <p:nvPr>
+            <p:ph type="dt" sz="half" idx="10"/>
           </p:nvPr>
         </p:nvSpPr>
         <p:spPr/>
-      </p:sp>
-      <p:sp>
-        <p:nvSpPr>
-          <p:cNvPr id="3" name="Notizenplatzhalter 2"/>
-          <p:cNvSpPr>
-            <a:spLocks noGrp="1"/>
-          </p:cNvSpPr>
-          <p:nvPr>
-            <p:ph type="body" idx="1"/>
+        <p:txBody>
+          <a:bodyPr/>
+          <a:lstStyle>
+            <a:lvl1pPr>
+              <a:defRPr>
+                <a:solidFill>
+                  <a:srgbClr val="FFFFFF">
+                    <a:alpha val="80000"/>
+                  </a:srgbClr>
+                </a:solidFill>
+              </a:defRPr>
+            </a:lvl1pPr>
+          </a:lstStyle>
+          <a:p>
+            <a:fld id="{DCDACB0D-BBD2-40D0-A893-CF04513F27FC}" type="datetimeFigureOut">
+              <a:rPr lang="en-US" smtClean="0"/>
+              <a:t>1/31/2020</a:t>
+            </a:fld>
+            <a:endParaRPr lang="en-US"/>
+          </a:p>
+        </p:txBody>
+      </p:sp>
+      <p:sp>
+        <p:nvSpPr>
+          <p:cNvPr id="8" name="Footer Placeholder 7"/>
+          <p:cNvSpPr>
+            <a:spLocks noGrp="1"/>
+          </p:cNvSpPr>
+          <p:nvPr>
+            <p:ph type="ftr" sz="quarter" idx="11"/>
           </p:nvPr>
         </p:nvSpPr>
         <p:spPr/>
         <p:txBody>
           <a:bodyPr/>
-          <a:lstStyle/>
-          <a:p>
-            <a:r>
-              <a:rPr lang="de-AT" dirty="0"/>
-              <a:t>Men -&gt; </a:t>
-            </a:r>
-            <a:r>
-              <a:rPr lang="de-AT" dirty="0" err="1"/>
-              <a:t>start</a:t>
-            </a:r>
-            <a:r>
-              <a:rPr lang="de-AT" dirty="0"/>
-              <a:t> </a:t>
-            </a:r>
-            <a:r>
-              <a:rPr lang="de-AT" dirty="0" err="1"/>
-              <a:t>of</a:t>
-            </a:r>
-            <a:r>
-              <a:rPr lang="de-AT" dirty="0"/>
-              <a:t> </a:t>
-            </a:r>
-            <a:r>
-              <a:rPr lang="de-AT" dirty="0" err="1"/>
-              <a:t>university</a:t>
-            </a:r>
-            <a:r>
-              <a:rPr lang="de-AT" dirty="0"/>
-              <a:t>; Women -&gt; </a:t>
-            </a:r>
-            <a:r>
-              <a:rPr lang="de-AT" dirty="0" err="1"/>
-              <a:t>pursue</a:t>
-            </a:r>
-            <a:r>
-              <a:rPr lang="de-AT" dirty="0"/>
-              <a:t> a </a:t>
-            </a:r>
-            <a:r>
-              <a:rPr lang="de-AT" dirty="0" err="1"/>
-              <a:t>career</a:t>
-            </a:r>
-            <a:endParaRPr lang="de-AT" dirty="0"/>
-          </a:p>
-          <a:p>
-            <a:r>
-              <a:rPr lang="de-AT" dirty="0"/>
-              <a:t>Men -&gt; source code </a:t>
-            </a:r>
-            <a:r>
-              <a:rPr lang="de-AT" dirty="0" err="1"/>
-              <a:t>contributions</a:t>
-            </a:r>
-            <a:r>
-              <a:rPr lang="de-AT" dirty="0"/>
-              <a:t>; </a:t>
-            </a:r>
-            <a:r>
-              <a:rPr lang="de-AT" dirty="0" err="1"/>
-              <a:t>women</a:t>
-            </a:r>
-            <a:r>
-              <a:rPr lang="de-AT" dirty="0"/>
-              <a:t>: </a:t>
-            </a:r>
-            <a:r>
-              <a:rPr lang="de-AT" dirty="0" err="1"/>
-              <a:t>documentation</a:t>
-            </a:r>
-            <a:r>
-              <a:rPr lang="de-AT" dirty="0"/>
-              <a:t>, </a:t>
-            </a:r>
-            <a:r>
-              <a:rPr lang="de-AT" dirty="0" err="1"/>
-              <a:t>testing</a:t>
-            </a:r>
-            <a:r>
-              <a:rPr lang="de-AT" dirty="0"/>
-              <a:t>, </a:t>
-            </a:r>
-            <a:r>
-              <a:rPr lang="de-AT" dirty="0" err="1"/>
-              <a:t>translations</a:t>
-            </a:r>
-            <a:r>
-              <a:rPr lang="de-AT" dirty="0"/>
-              <a:t>, etc.</a:t>
-            </a:r>
-          </a:p>
-        </p:txBody>
-      </p:sp>
-      <p:sp>
-        <p:nvSpPr>
-          <p:cNvPr id="4" name="Foliennummernplatzhalter 3"/>
-          <p:cNvSpPr>
-            <a:spLocks noGrp="1"/>
-          </p:cNvSpPr>
-          <p:nvPr>
-            <p:ph type="sldNum" sz="quarter" idx="5"/>
+          <a:lstStyle>
+            <a:lvl1pPr>
+              <a:defRPr>
+                <a:solidFill>
+                  <a:srgbClr val="FFFFFF">
+                    <a:alpha val="80000"/>
+                  </a:srgbClr>
+                </a:solidFill>
+              </a:defRPr>
+            </a:lvl1pPr>
+          </a:lstStyle>
+          <a:p>
+            <a:endParaRPr lang="en-US"/>
+          </a:p>
+        </p:txBody>
+      </p:sp>
+      <p:sp>
+        <p:nvSpPr>
+          <p:cNvPr id="9" name="Slide Number Placeholder 8"/>
+          <p:cNvSpPr>
+            <a:spLocks noGrp="1"/>
+          </p:cNvSpPr>
+          <p:nvPr>
+            <p:ph type="sldNum" sz="quarter" idx="12"/>
           </p:nvPr>
         </p:nvSpPr>
         <p:spPr/>
         <p:txBody>
           <a:bodyPr/>
-          <a:lstStyle/>
-          <a:p>
-            <a:fld id="{3A08C91C-33B4-40AA-981F-C4EDAC7C6C8B}" type="slidenum">
+          <a:lstStyle>
+            <a:lvl1pPr>
+              <a:defRPr>
+                <a:solidFill>
+                  <a:srgbClr val="FFFFFF">
+                    <a:alpha val="25000"/>
+                  </a:srgbClr>
+                </a:solidFill>
+              </a:defRPr>
+            </a:lvl1pPr>
+          </a:lstStyle>
+          <a:p>
+            <a:fld id="{C5DB2A98-4B90-4FDA-B1BD-5751ADF6E510}" type="slidenum">
               <a:rPr lang="en-US" smtClean="0"/>
-              <a:t>19</a:t>
+              <a:t>‹Nr.›</a:t>
             </a:fld>
             <a:endParaRPr lang="en-US"/>
           </a:p>
@@ -2144,19 +2256,19 @@
     </p:spTree>
     <p:extLst>
       <p:ext uri="{BB962C8B-B14F-4D97-AF65-F5344CB8AC3E}">
-        <p14:creationId xmlns:p14="http://schemas.microsoft.com/office/powerpoint/2010/main" val="1000988566"/>
+        <p14:creationId xmlns:p14="http://schemas.microsoft.com/office/powerpoint/2010/main" val="1595050325"/>
       </p:ext>
     </p:extLst>
   </p:cSld>
   <p:clrMapOvr>
     <a:masterClrMapping/>
   </p:clrMapOvr>
-</p:notes>
+</p:sldLayout>
 </file>
 
-<file path=ppt/slideLayouts/slideLayout1.xml><?xml version="1.0" encoding="utf-8"?>
-<p:sldLayout xmlns:a="http://schemas.openxmlformats.org/drawingml/2006/main" xmlns:r="http://schemas.openxmlformats.org/officeDocument/2006/relationships" xmlns:p="http://schemas.openxmlformats.org/presentationml/2006/main" type="title" preserve="1">
-  <p:cSld name="Title Slide">
+<file path=ppt/slideLayouts/slideLayout10.xml><?xml version="1.0" encoding="utf-8"?>
+<p:sldLayout xmlns:a="http://schemas.openxmlformats.org/drawingml/2006/main" xmlns:r="http://schemas.openxmlformats.org/officeDocument/2006/relationships" xmlns:p="http://schemas.openxmlformats.org/presentationml/2006/main" type="vertTx" preserve="1">
+  <p:cSld name="Titel und vertikaler Text">
     <p:spTree>
       <p:nvGrpSpPr>
         <p:cNvPr id="1" name=""/>
@@ -2173,120 +2285,82 @@
       </p:grpSpPr>
       <p:sp>
         <p:nvSpPr>
-          <p:cNvPr id="2" name="Title 1">
-            <a:extLst>
-              <a:ext uri="{FF2B5EF4-FFF2-40B4-BE49-F238E27FC236}">
-                <a16:creationId xmlns:a16="http://schemas.microsoft.com/office/drawing/2014/main" id="{0FDF3D08-E0FA-49FA-BC7D-60CA086ED3C2}"/>
-              </a:ext>
-            </a:extLst>
-          </p:cNvPr>
-          <p:cNvSpPr>
-            <a:spLocks noGrp="1"/>
-          </p:cNvSpPr>
-          <p:nvPr>
-            <p:ph type="ctrTitle"/>
-          </p:nvPr>
-        </p:nvSpPr>
-        <p:spPr>
-          <a:xfrm>
-            <a:off x="1524000" y="1122363"/>
-            <a:ext cx="9144000" cy="2387600"/>
-          </a:xfrm>
-        </p:spPr>
-        <p:txBody>
-          <a:bodyPr anchor="b"/>
-          <a:lstStyle>
-            <a:lvl1pPr algn="ctr">
-              <a:defRPr sz="6000"/>
-            </a:lvl1pPr>
-          </a:lstStyle>
-          <a:p>
-            <a:r>
-              <a:rPr lang="en-US"/>
-              <a:t>Click to edit Master title style</a:t>
-            </a:r>
-          </a:p>
-        </p:txBody>
-      </p:sp>
-      <p:sp>
-        <p:nvSpPr>
-          <p:cNvPr id="3" name="Subtitle 2">
-            <a:extLst>
-              <a:ext uri="{FF2B5EF4-FFF2-40B4-BE49-F238E27FC236}">
-                <a16:creationId xmlns:a16="http://schemas.microsoft.com/office/drawing/2014/main" id="{704A1326-2270-43A5-829E-2442C9BAFC1E}"/>
-              </a:ext>
-            </a:extLst>
-          </p:cNvPr>
-          <p:cNvSpPr>
-            <a:spLocks noGrp="1"/>
-          </p:cNvSpPr>
-          <p:nvPr>
-            <p:ph type="subTitle" idx="1"/>
-          </p:nvPr>
-        </p:nvSpPr>
-        <p:spPr>
-          <a:xfrm>
-            <a:off x="1524000" y="3602038"/>
-            <a:ext cx="9144000" cy="1655762"/>
-          </a:xfrm>
-        </p:spPr>
+          <p:cNvPr id="2" name="Title 1"/>
+          <p:cNvSpPr>
+            <a:spLocks noGrp="1"/>
+          </p:cNvSpPr>
+          <p:nvPr>
+            <p:ph type="title"/>
+          </p:nvPr>
+        </p:nvSpPr>
+        <p:spPr/>
         <p:txBody>
           <a:bodyPr/>
-          <a:lstStyle>
-            <a:lvl1pPr marL="0" indent="0" algn="ctr">
-              <a:buNone/>
-              <a:defRPr sz="2400"/>
-            </a:lvl1pPr>
-            <a:lvl2pPr marL="457200" indent="0" algn="ctr">
-              <a:buNone/>
-              <a:defRPr sz="2000"/>
-            </a:lvl2pPr>
-            <a:lvl3pPr marL="914400" indent="0" algn="ctr">
-              <a:buNone/>
-              <a:defRPr sz="1800"/>
-            </a:lvl3pPr>
-            <a:lvl4pPr marL="1371600" indent="0" algn="ctr">
-              <a:buNone/>
-              <a:defRPr sz="1600"/>
-            </a:lvl4pPr>
-            <a:lvl5pPr marL="1828800" indent="0" algn="ctr">
-              <a:buNone/>
-              <a:defRPr sz="1600"/>
-            </a:lvl5pPr>
-            <a:lvl6pPr marL="2286000" indent="0" algn="ctr">
-              <a:buNone/>
-              <a:defRPr sz="1600"/>
-            </a:lvl6pPr>
-            <a:lvl7pPr marL="2743200" indent="0" algn="ctr">
-              <a:buNone/>
-              <a:defRPr sz="1600"/>
-            </a:lvl7pPr>
-            <a:lvl8pPr marL="3200400" indent="0" algn="ctr">
-              <a:buNone/>
-              <a:defRPr sz="1600"/>
-            </a:lvl8pPr>
-            <a:lvl9pPr marL="3657600" indent="0" algn="ctr">
-              <a:buNone/>
-              <a:defRPr sz="1600"/>
-            </a:lvl9pPr>
-          </a:lstStyle>
-          <a:p>
-            <a:r>
-              <a:rPr lang="en-US"/>
-              <a:t>Click to edit Master subtitle style</a:t>
-            </a:r>
-          </a:p>
-        </p:txBody>
-      </p:sp>
-      <p:sp>
-        <p:nvSpPr>
-          <p:cNvPr id="4" name="Date Placeholder 3">
-            <a:extLst>
-              <a:ext uri="{FF2B5EF4-FFF2-40B4-BE49-F238E27FC236}">
-                <a16:creationId xmlns:a16="http://schemas.microsoft.com/office/drawing/2014/main" id="{9F7495D7-7BD5-4E55-8DE4-4F81EF2E25CC}"/>
-              </a:ext>
-            </a:extLst>
-          </p:cNvPr>
+          <a:lstStyle/>
+          <a:p>
+            <a:r>
+              <a:rPr lang="de-DE"/>
+              <a:t>Mastertitelformat bearbeiten</a:t>
+            </a:r>
+            <a:endParaRPr lang="en-US" dirty="0"/>
+          </a:p>
+        </p:txBody>
+      </p:sp>
+      <p:sp>
+        <p:nvSpPr>
+          <p:cNvPr id="3" name="Vertical Text Placeholder 2"/>
+          <p:cNvSpPr>
+            <a:spLocks noGrp="1"/>
+          </p:cNvSpPr>
+          <p:nvPr>
+            <p:ph type="body" orient="vert" idx="1"/>
+          </p:nvPr>
+        </p:nvSpPr>
+        <p:spPr/>
+        <p:txBody>
+          <a:bodyPr vert="eaVert"/>
+          <a:lstStyle/>
+          <a:p>
+            <a:pPr lvl="0"/>
+            <a:r>
+              <a:rPr lang="de-DE"/>
+              <a:t>Mastertextformat bearbeiten</a:t>
+            </a:r>
+          </a:p>
+          <a:p>
+            <a:pPr lvl="1"/>
+            <a:r>
+              <a:rPr lang="de-DE"/>
+              <a:t>Zweite Ebene</a:t>
+            </a:r>
+          </a:p>
+          <a:p>
+            <a:pPr lvl="2"/>
+            <a:r>
+              <a:rPr lang="de-DE"/>
+              <a:t>Dritte Ebene</a:t>
+            </a:r>
+          </a:p>
+          <a:p>
+            <a:pPr lvl="3"/>
+            <a:r>
+              <a:rPr lang="de-DE"/>
+              <a:t>Vierte Ebene</a:t>
+            </a:r>
+          </a:p>
+          <a:p>
+            <a:pPr lvl="4"/>
+            <a:r>
+              <a:rPr lang="de-DE"/>
+              <a:t>Fünfte Ebene</a:t>
+            </a:r>
+            <a:endParaRPr lang="en-US" dirty="0"/>
+          </a:p>
+        </p:txBody>
+      </p:sp>
+      <p:sp>
+        <p:nvSpPr>
+          <p:cNvPr id="4" name="Date Placeholder 3"/>
           <p:cNvSpPr>
             <a:spLocks noGrp="1"/>
           </p:cNvSpPr>
@@ -2309,13 +2383,7 @@
       </p:sp>
       <p:sp>
         <p:nvSpPr>
-          <p:cNvPr id="5" name="Footer Placeholder 4">
-            <a:extLst>
-              <a:ext uri="{FF2B5EF4-FFF2-40B4-BE49-F238E27FC236}">
-                <a16:creationId xmlns:a16="http://schemas.microsoft.com/office/drawing/2014/main" id="{B2BFB2C5-A285-4109-9959-CBF983EB78D3}"/>
-              </a:ext>
-            </a:extLst>
-          </p:cNvPr>
+          <p:cNvPr id="5" name="Footer Placeholder 4"/>
           <p:cNvSpPr>
             <a:spLocks noGrp="1"/>
           </p:cNvSpPr>
@@ -2334,13 +2402,7 @@
       </p:sp>
       <p:sp>
         <p:nvSpPr>
-          <p:cNvPr id="6" name="Slide Number Placeholder 5">
-            <a:extLst>
-              <a:ext uri="{FF2B5EF4-FFF2-40B4-BE49-F238E27FC236}">
-                <a16:creationId xmlns:a16="http://schemas.microsoft.com/office/drawing/2014/main" id="{83F50189-FD62-4C1B-A9A8-B155539CB4D1}"/>
-              </a:ext>
-            </a:extLst>
-          </p:cNvPr>
+          <p:cNvPr id="6" name="Slide Number Placeholder 5"/>
           <p:cNvSpPr>
             <a:spLocks noGrp="1"/>
           </p:cNvSpPr>
@@ -2355,7 +2417,7 @@
           <a:p>
             <a:fld id="{C5DB2A98-4B90-4FDA-B1BD-5751ADF6E510}" type="slidenum">
               <a:rPr lang="en-US" smtClean="0"/>
-              <a:t>‹#›</a:t>
+              <a:t>‹Nr.›</a:t>
             </a:fld>
             <a:endParaRPr lang="en-US"/>
           </a:p>
@@ -2364,7 +2426,7 @@
     </p:spTree>
     <p:extLst>
       <p:ext uri="{BB962C8B-B14F-4D97-AF65-F5344CB8AC3E}">
-        <p14:creationId xmlns:p14="http://schemas.microsoft.com/office/powerpoint/2010/main" val="2856499652"/>
+        <p14:creationId xmlns:p14="http://schemas.microsoft.com/office/powerpoint/2010/main" val="2864810477"/>
       </p:ext>
     </p:extLst>
   </p:cSld>
@@ -2374,9 +2436,9 @@
 </p:sldLayout>
 </file>
 
-<file path=ppt/slideLayouts/slideLayout10.xml><?xml version="1.0" encoding="utf-8"?>
-<p:sldLayout xmlns:a="http://schemas.openxmlformats.org/drawingml/2006/main" xmlns:r="http://schemas.openxmlformats.org/officeDocument/2006/relationships" xmlns:p="http://schemas.openxmlformats.org/presentationml/2006/main" type="vertTx" preserve="1">
-  <p:cSld name="Title and Vertical Text">
+<file path=ppt/slideLayouts/slideLayout11.xml><?xml version="1.0" encoding="utf-8"?>
+<p:sldLayout xmlns:a="http://schemas.openxmlformats.org/drawingml/2006/main" xmlns:r="http://schemas.openxmlformats.org/officeDocument/2006/relationships" xmlns:p="http://schemas.openxmlformats.org/presentationml/2006/main" type="vertTitleAndTx" preserve="1">
+  <p:cSld name="Vertikaler Titel und Text">
     <p:spTree>
       <p:nvGrpSpPr>
         <p:cNvPr id="1" name=""/>
@@ -2393,98 +2455,92 @@
       </p:grpSpPr>
       <p:sp>
         <p:nvSpPr>
-          <p:cNvPr id="2" name="Title 1">
-            <a:extLst>
-              <a:ext uri="{FF2B5EF4-FFF2-40B4-BE49-F238E27FC236}">
-                <a16:creationId xmlns:a16="http://schemas.microsoft.com/office/drawing/2014/main" id="{91D82226-3256-4297-B240-1D6B20A5C22B}"/>
-              </a:ext>
-            </a:extLst>
-          </p:cNvPr>
-          <p:cNvSpPr>
-            <a:spLocks noGrp="1"/>
-          </p:cNvSpPr>
-          <p:nvPr>
-            <p:ph type="title"/>
-          </p:nvPr>
-        </p:nvSpPr>
-        <p:spPr/>
-        <p:txBody>
-          <a:bodyPr/>
-          <a:lstStyle/>
-          <a:p>
-            <a:r>
-              <a:rPr lang="en-US"/>
-              <a:t>Click to edit Master title style</a:t>
-            </a:r>
-          </a:p>
-        </p:txBody>
-      </p:sp>
-      <p:sp>
-        <p:nvSpPr>
-          <p:cNvPr id="3" name="Vertical Text Placeholder 2">
-            <a:extLst>
-              <a:ext uri="{FF2B5EF4-FFF2-40B4-BE49-F238E27FC236}">
-                <a16:creationId xmlns:a16="http://schemas.microsoft.com/office/drawing/2014/main" id="{43D59371-8ED9-4A6D-A6F1-AC502171D594}"/>
-              </a:ext>
-            </a:extLst>
-          </p:cNvPr>
-          <p:cNvSpPr>
-            <a:spLocks noGrp="1"/>
-          </p:cNvSpPr>
-          <p:nvPr>
-            <p:ph type="body" orient="vert" idx="1"/>
-          </p:nvPr>
-        </p:nvSpPr>
-        <p:spPr/>
+          <p:cNvPr id="2" name="Vertical Title 1"/>
+          <p:cNvSpPr>
+            <a:spLocks noGrp="1"/>
+          </p:cNvSpPr>
+          <p:nvPr>
+            <p:ph type="title" orient="vert"/>
+          </p:nvPr>
+        </p:nvSpPr>
+        <p:spPr>
+          <a:xfrm>
+            <a:off x="8743950" y="695325"/>
+            <a:ext cx="2628900" cy="4800600"/>
+          </a:xfrm>
+        </p:spPr>
         <p:txBody>
           <a:bodyPr vert="eaVert"/>
           <a:lstStyle/>
           <a:p>
+            <a:r>
+              <a:rPr lang="de-DE"/>
+              <a:t>Mastertitelformat bearbeiten</a:t>
+            </a:r>
+            <a:endParaRPr lang="en-US" dirty="0"/>
+          </a:p>
+        </p:txBody>
+      </p:sp>
+      <p:sp>
+        <p:nvSpPr>
+          <p:cNvPr id="3" name="Vertical Text Placeholder 2"/>
+          <p:cNvSpPr>
+            <a:spLocks noGrp="1"/>
+          </p:cNvSpPr>
+          <p:nvPr>
+            <p:ph type="body" orient="vert" idx="1"/>
+          </p:nvPr>
+        </p:nvSpPr>
+        <p:spPr>
+          <a:xfrm>
+            <a:off x="771525" y="714375"/>
+            <a:ext cx="7734300" cy="5400675"/>
+          </a:xfrm>
+        </p:spPr>
+        <p:txBody>
+          <a:bodyPr vert="eaVert"/>
+          <a:lstStyle/>
+          <a:p>
             <a:pPr lvl="0"/>
             <a:r>
-              <a:rPr lang="en-US"/>
-              <a:t>Click to edit Master text styles</a:t>
+              <a:rPr lang="de-DE"/>
+              <a:t>Mastertextformat bearbeiten</a:t>
             </a:r>
           </a:p>
           <a:p>
             <a:pPr lvl="1"/>
             <a:r>
-              <a:rPr lang="en-US"/>
-              <a:t>Second level</a:t>
+              <a:rPr lang="de-DE"/>
+              <a:t>Zweite Ebene</a:t>
             </a:r>
           </a:p>
           <a:p>
             <a:pPr lvl="2"/>
             <a:r>
-              <a:rPr lang="en-US"/>
-              <a:t>Third level</a:t>
+              <a:rPr lang="de-DE"/>
+              <a:t>Dritte Ebene</a:t>
             </a:r>
           </a:p>
           <a:p>
             <a:pPr lvl="3"/>
             <a:r>
-              <a:rPr lang="en-US"/>
-              <a:t>Fourth level</a:t>
+              <a:rPr lang="de-DE"/>
+              <a:t>Vierte Ebene</a:t>
             </a:r>
           </a:p>
           <a:p>
             <a:pPr lvl="4"/>
             <a:r>
-              <a:rPr lang="en-US"/>
-              <a:t>Fifth level</a:t>
-            </a:r>
-          </a:p>
-        </p:txBody>
-      </p:sp>
-      <p:sp>
-        <p:nvSpPr>
-          <p:cNvPr id="4" name="Date Placeholder 3">
-            <a:extLst>
-              <a:ext uri="{FF2B5EF4-FFF2-40B4-BE49-F238E27FC236}">
-                <a16:creationId xmlns:a16="http://schemas.microsoft.com/office/drawing/2014/main" id="{2E7755AD-5DB2-40E0-8DC9-F75F1A828219}"/>
-              </a:ext>
-            </a:extLst>
-          </p:cNvPr>
+              <a:rPr lang="de-DE"/>
+              <a:t>Fünfte Ebene</a:t>
+            </a:r>
+            <a:endParaRPr lang="en-US" dirty="0"/>
+          </a:p>
+        </p:txBody>
+      </p:sp>
+      <p:sp>
+        <p:nvSpPr>
+          <p:cNvPr id="4" name="Date Placeholder 3"/>
           <p:cNvSpPr>
             <a:spLocks noGrp="1"/>
           </p:cNvSpPr>
@@ -2507,13 +2563,7 @@
       </p:sp>
       <p:sp>
         <p:nvSpPr>
-          <p:cNvPr id="5" name="Footer Placeholder 4">
-            <a:extLst>
-              <a:ext uri="{FF2B5EF4-FFF2-40B4-BE49-F238E27FC236}">
-                <a16:creationId xmlns:a16="http://schemas.microsoft.com/office/drawing/2014/main" id="{2F609FFE-D1F9-470E-903D-A7E331BC7EB2}"/>
-              </a:ext>
-            </a:extLst>
-          </p:cNvPr>
+          <p:cNvPr id="5" name="Footer Placeholder 4"/>
           <p:cNvSpPr>
             <a:spLocks noGrp="1"/>
           </p:cNvSpPr>
@@ -2532,13 +2582,7 @@
       </p:sp>
       <p:sp>
         <p:nvSpPr>
-          <p:cNvPr id="6" name="Slide Number Placeholder 5">
-            <a:extLst>
-              <a:ext uri="{FF2B5EF4-FFF2-40B4-BE49-F238E27FC236}">
-                <a16:creationId xmlns:a16="http://schemas.microsoft.com/office/drawing/2014/main" id="{EA754F3B-CADB-42B8-A01A-EC6F902420A7}"/>
-              </a:ext>
-            </a:extLst>
-          </p:cNvPr>
+          <p:cNvPr id="6" name="Slide Number Placeholder 5"/>
           <p:cNvSpPr>
             <a:spLocks noGrp="1"/>
           </p:cNvSpPr>
@@ -2553,7 +2597,7 @@
           <a:p>
             <a:fld id="{C5DB2A98-4B90-4FDA-B1BD-5751ADF6E510}" type="slidenum">
               <a:rPr lang="en-US" smtClean="0"/>
-              <a:t>‹#›</a:t>
+              <a:t>‹Nr.›</a:t>
             </a:fld>
             <a:endParaRPr lang="en-US"/>
           </a:p>
@@ -2562,7 +2606,7 @@
     </p:spTree>
     <p:extLst>
       <p:ext uri="{BB962C8B-B14F-4D97-AF65-F5344CB8AC3E}">
-        <p14:creationId xmlns:p14="http://schemas.microsoft.com/office/powerpoint/2010/main" val="810090071"/>
+        <p14:creationId xmlns:p14="http://schemas.microsoft.com/office/powerpoint/2010/main" val="3465585230"/>
       </p:ext>
     </p:extLst>
   </p:cSld>
@@ -2572,9 +2616,9 @@
 </p:sldLayout>
 </file>
 
-<file path=ppt/slideLayouts/slideLayout11.xml><?xml version="1.0" encoding="utf-8"?>
-<p:sldLayout xmlns:a="http://schemas.openxmlformats.org/drawingml/2006/main" xmlns:r="http://schemas.openxmlformats.org/officeDocument/2006/relationships" xmlns:p="http://schemas.openxmlformats.org/presentationml/2006/main" type="vertTitleAndTx" preserve="1">
-  <p:cSld name="Vertical Title and Text">
+<file path=ppt/slideLayouts/slideLayout2.xml><?xml version="1.0" encoding="utf-8"?>
+<p:sldLayout xmlns:a="http://schemas.openxmlformats.org/drawingml/2006/main" xmlns:r="http://schemas.openxmlformats.org/officeDocument/2006/relationships" xmlns:p="http://schemas.openxmlformats.org/presentationml/2006/main" type="obj" preserve="1">
+  <p:cSld name="Titel und Inhalt">
     <p:spTree>
       <p:nvGrpSpPr>
         <p:cNvPr id="1" name=""/>
@@ -2591,108 +2635,82 @@
       </p:grpSpPr>
       <p:sp>
         <p:nvSpPr>
-          <p:cNvPr id="2" name="Vertical Title 1">
-            <a:extLst>
-              <a:ext uri="{FF2B5EF4-FFF2-40B4-BE49-F238E27FC236}">
-                <a16:creationId xmlns:a16="http://schemas.microsoft.com/office/drawing/2014/main" id="{3B5CFF51-EECE-4EE7-BABE-5AC9E98B1A17}"/>
-              </a:ext>
-            </a:extLst>
-          </p:cNvPr>
-          <p:cNvSpPr>
-            <a:spLocks noGrp="1"/>
-          </p:cNvSpPr>
-          <p:nvPr>
-            <p:ph type="title" orient="vert"/>
-          </p:nvPr>
-        </p:nvSpPr>
-        <p:spPr>
-          <a:xfrm>
-            <a:off x="8724900" y="365125"/>
-            <a:ext cx="2628900" cy="5811838"/>
-          </a:xfrm>
-        </p:spPr>
-        <p:txBody>
-          <a:bodyPr vert="eaVert"/>
+          <p:cNvPr id="2" name="Title 1"/>
+          <p:cNvSpPr>
+            <a:spLocks noGrp="1"/>
+          </p:cNvSpPr>
+          <p:nvPr>
+            <p:ph type="title"/>
+          </p:nvPr>
+        </p:nvSpPr>
+        <p:spPr/>
+        <p:txBody>
+          <a:bodyPr/>
           <a:lstStyle/>
           <a:p>
             <a:r>
-              <a:rPr lang="en-US"/>
-              <a:t>Click to edit Master title style</a:t>
-            </a:r>
-          </a:p>
-        </p:txBody>
-      </p:sp>
-      <p:sp>
-        <p:nvSpPr>
-          <p:cNvPr id="3" name="Vertical Text Placeholder 2">
-            <a:extLst>
-              <a:ext uri="{FF2B5EF4-FFF2-40B4-BE49-F238E27FC236}">
-                <a16:creationId xmlns:a16="http://schemas.microsoft.com/office/drawing/2014/main" id="{66A903F7-CE7A-4689-903A-61126CBAAD8C}"/>
-              </a:ext>
-            </a:extLst>
-          </p:cNvPr>
-          <p:cNvSpPr>
-            <a:spLocks noGrp="1"/>
-          </p:cNvSpPr>
-          <p:nvPr>
-            <p:ph type="body" orient="vert" idx="1"/>
-          </p:nvPr>
-        </p:nvSpPr>
-        <p:spPr>
-          <a:xfrm>
-            <a:off x="838200" y="365125"/>
-            <a:ext cx="7734300" cy="5811838"/>
-          </a:xfrm>
-        </p:spPr>
-        <p:txBody>
-          <a:bodyPr vert="eaVert"/>
+              <a:rPr lang="de-DE"/>
+              <a:t>Mastertitelformat bearbeiten</a:t>
+            </a:r>
+            <a:endParaRPr lang="en-US" dirty="0"/>
+          </a:p>
+        </p:txBody>
+      </p:sp>
+      <p:sp>
+        <p:nvSpPr>
+          <p:cNvPr id="3" name="Content Placeholder 2"/>
+          <p:cNvSpPr>
+            <a:spLocks noGrp="1"/>
+          </p:cNvSpPr>
+          <p:nvPr>
+            <p:ph idx="1"/>
+          </p:nvPr>
+        </p:nvSpPr>
+        <p:spPr/>
+        <p:txBody>
+          <a:bodyPr/>
           <a:lstStyle/>
           <a:p>
             <a:pPr lvl="0"/>
             <a:r>
-              <a:rPr lang="en-US"/>
-              <a:t>Click to edit Master text styles</a:t>
+              <a:rPr lang="de-DE"/>
+              <a:t>Mastertextformat bearbeiten</a:t>
             </a:r>
           </a:p>
           <a:p>
             <a:pPr lvl="1"/>
             <a:r>
-              <a:rPr lang="en-US"/>
-              <a:t>Second level</a:t>
+              <a:rPr lang="de-DE"/>
+              <a:t>Zweite Ebene</a:t>
             </a:r>
           </a:p>
           <a:p>
             <a:pPr lvl="2"/>
             <a:r>
-              <a:rPr lang="en-US"/>
-              <a:t>Third level</a:t>
+              <a:rPr lang="de-DE"/>
+              <a:t>Dritte Ebene</a:t>
             </a:r>
           </a:p>
           <a:p>
             <a:pPr lvl="3"/>
             <a:r>
-              <a:rPr lang="en-US"/>
-              <a:t>Fourth level</a:t>
+              <a:rPr lang="de-DE"/>
+              <a:t>Vierte Ebene</a:t>
             </a:r>
           </a:p>
           <a:p>
             <a:pPr lvl="4"/>
             <a:r>
-              <a:rPr lang="en-US"/>
-              <a:t>Fifth level</a:t>
-            </a:r>
-          </a:p>
-        </p:txBody>
-      </p:sp>
-      <p:sp>
-        <p:nvSpPr>
-          <p:cNvPr id="4" name="Date Placeholder 3">
-            <a:extLst>
-              <a:ext uri="{FF2B5EF4-FFF2-40B4-BE49-F238E27FC236}">
-                <a16:creationId xmlns:a16="http://schemas.microsoft.com/office/drawing/2014/main" id="{5F57732B-44A5-4117-95F1-82F9C5B8727E}"/>
-              </a:ext>
-            </a:extLst>
-          </p:cNvPr>
+              <a:rPr lang="de-DE"/>
+              <a:t>Fünfte Ebene</a:t>
+            </a:r>
+            <a:endParaRPr lang="en-US" dirty="0"/>
+          </a:p>
+        </p:txBody>
+      </p:sp>
+      <p:sp>
+        <p:nvSpPr>
+          <p:cNvPr id="4" name="Date Placeholder 3"/>
           <p:cNvSpPr>
             <a:spLocks noGrp="1"/>
           </p:cNvSpPr>
@@ -2715,13 +2733,7 @@
       </p:sp>
       <p:sp>
         <p:nvSpPr>
-          <p:cNvPr id="5" name="Footer Placeholder 4">
-            <a:extLst>
-              <a:ext uri="{FF2B5EF4-FFF2-40B4-BE49-F238E27FC236}">
-                <a16:creationId xmlns:a16="http://schemas.microsoft.com/office/drawing/2014/main" id="{D203F3BF-ED89-4511-9EEC-51A1EFEB0D79}"/>
-              </a:ext>
-            </a:extLst>
-          </p:cNvPr>
+          <p:cNvPr id="5" name="Footer Placeholder 4"/>
           <p:cNvSpPr>
             <a:spLocks noGrp="1"/>
           </p:cNvSpPr>
@@ -2740,13 +2752,7 @@
       </p:sp>
       <p:sp>
         <p:nvSpPr>
-          <p:cNvPr id="6" name="Slide Number Placeholder 5">
-            <a:extLst>
-              <a:ext uri="{FF2B5EF4-FFF2-40B4-BE49-F238E27FC236}">
-                <a16:creationId xmlns:a16="http://schemas.microsoft.com/office/drawing/2014/main" id="{02F45D45-B8F3-47A1-B1EE-43E384AB8303}"/>
-              </a:ext>
-            </a:extLst>
-          </p:cNvPr>
+          <p:cNvPr id="6" name="Slide Number Placeholder 5"/>
           <p:cNvSpPr>
             <a:spLocks noGrp="1"/>
           </p:cNvSpPr>
@@ -2761,7 +2767,7 @@
           <a:p>
             <a:fld id="{C5DB2A98-4B90-4FDA-B1BD-5751ADF6E510}" type="slidenum">
               <a:rPr lang="en-US" smtClean="0"/>
-              <a:t>‹#›</a:t>
+              <a:t>‹Nr.›</a:t>
             </a:fld>
             <a:endParaRPr lang="en-US"/>
           </a:p>
@@ -2770,7 +2776,7 @@
     </p:spTree>
     <p:extLst>
       <p:ext uri="{BB962C8B-B14F-4D97-AF65-F5344CB8AC3E}">
-        <p14:creationId xmlns:p14="http://schemas.microsoft.com/office/powerpoint/2010/main" val="3918250309"/>
+        <p14:creationId xmlns:p14="http://schemas.microsoft.com/office/powerpoint/2010/main" val="2020393933"/>
       </p:ext>
     </p:extLst>
   </p:cSld>
@@ -2780,9 +2786,9 @@
 </p:sldLayout>
 </file>
 
-<file path=ppt/slideLayouts/slideLayout2.xml><?xml version="1.0" encoding="utf-8"?>
-<p:sldLayout xmlns:a="http://schemas.openxmlformats.org/drawingml/2006/main" xmlns:r="http://schemas.openxmlformats.org/officeDocument/2006/relationships" xmlns:p="http://schemas.openxmlformats.org/presentationml/2006/main" type="obj" preserve="1">
-  <p:cSld name="Title and Content">
+<file path=ppt/slideLayouts/slideLayout3.xml><?xml version="1.0" encoding="utf-8"?>
+<p:sldLayout xmlns:a="http://schemas.openxmlformats.org/drawingml/2006/main" xmlns:r="http://schemas.openxmlformats.org/officeDocument/2006/relationships" xmlns:p="http://schemas.openxmlformats.org/presentationml/2006/main" type="secHead" preserve="1">
+  <p:cSld name="Abschnitts-&#10;überschrift">
     <p:spTree>
       <p:nvGrpSpPr>
         <p:cNvPr id="1" name=""/>
@@ -2799,13 +2805,7 @@
       </p:grpSpPr>
       <p:sp>
         <p:nvSpPr>
-          <p:cNvPr id="2" name="Title 1">
-            <a:extLst>
-              <a:ext uri="{FF2B5EF4-FFF2-40B4-BE49-F238E27FC236}">
-                <a16:creationId xmlns:a16="http://schemas.microsoft.com/office/drawing/2014/main" id="{1FE3683D-F7BE-4EC4-AF5D-42AECD39F4F4}"/>
-              </a:ext>
-            </a:extLst>
-          </p:cNvPr>
+          <p:cNvPr id="2" name="Title 1"/>
           <p:cNvSpPr>
             <a:spLocks noGrp="1"/>
           </p:cNvSpPr>
@@ -2813,84 +2813,160 @@
             <p:ph type="title"/>
           </p:nvPr>
         </p:nvSpPr>
-        <p:spPr/>
-        <p:txBody>
-          <a:bodyPr/>
-          <a:lstStyle/>
-          <a:p>
-            <a:r>
-              <a:rPr lang="en-US"/>
-              <a:t>Click to edit Master title style</a:t>
-            </a:r>
-          </a:p>
-        </p:txBody>
-      </p:sp>
-      <p:sp>
-        <p:nvSpPr>
-          <p:cNvPr id="3" name="Content Placeholder 2">
-            <a:extLst>
-              <a:ext uri="{FF2B5EF4-FFF2-40B4-BE49-F238E27FC236}">
-                <a16:creationId xmlns:a16="http://schemas.microsoft.com/office/drawing/2014/main" id="{F994E6C4-F78F-41D8-A760-DBDC116025C7}"/>
-              </a:ext>
-            </a:extLst>
-          </p:cNvPr>
-          <p:cNvSpPr>
-            <a:spLocks noGrp="1"/>
-          </p:cNvSpPr>
-          <p:nvPr>
-            <p:ph idx="1"/>
-          </p:nvPr>
-        </p:nvSpPr>
-        <p:spPr/>
-        <p:txBody>
-          <a:bodyPr/>
-          <a:lstStyle/>
+        <p:spPr>
+          <a:xfrm>
+            <a:off x="603504" y="767419"/>
+            <a:ext cx="10780776" cy="3355848"/>
+          </a:xfrm>
+        </p:spPr>
+        <p:txBody>
+          <a:bodyPr anchor="b">
+            <a:normAutofit/>
+          </a:bodyPr>
+          <a:lstStyle>
+            <a:lvl1pPr>
+              <a:lnSpc>
+                <a:spcPct val="80000"/>
+              </a:lnSpc>
+              <a:defRPr sz="8800" b="0" baseline="0">
+                <a:solidFill>
+                  <a:schemeClr val="accent1"/>
+                </a:solidFill>
+              </a:defRPr>
+            </a:lvl1pPr>
+          </a:lstStyle>
+          <a:p>
+            <a:r>
+              <a:rPr lang="de-DE"/>
+              <a:t>Mastertitelformat bearbeiten</a:t>
+            </a:r>
+            <a:endParaRPr lang="en-US" dirty="0"/>
+          </a:p>
+        </p:txBody>
+      </p:sp>
+      <p:sp>
+        <p:nvSpPr>
+          <p:cNvPr id="3" name="Text Placeholder 2"/>
+          <p:cNvSpPr>
+            <a:spLocks noGrp="1"/>
+          </p:cNvSpPr>
+          <p:nvPr>
+            <p:ph type="body" idx="1"/>
+          </p:nvPr>
+        </p:nvSpPr>
+        <p:spPr>
+          <a:xfrm>
+            <a:off x="667512" y="4204209"/>
+            <a:ext cx="9226296" cy="1645920"/>
+          </a:xfrm>
+        </p:spPr>
+        <p:txBody>
+          <a:bodyPr anchor="t">
+            <a:normAutofit/>
+          </a:bodyPr>
+          <a:lstStyle>
+            <a:lvl1pPr marL="0" indent="0">
+              <a:buNone/>
+              <a:defRPr sz="3200">
+                <a:solidFill>
+                  <a:schemeClr val="tx1"/>
+                </a:solidFill>
+                <a:latin typeface="+mj-lt"/>
+              </a:defRPr>
+            </a:lvl1pPr>
+            <a:lvl2pPr marL="457200" indent="0">
+              <a:buNone/>
+              <a:defRPr sz="1800">
+                <a:solidFill>
+                  <a:schemeClr val="tx1">
+                    <a:tint val="75000"/>
+                  </a:schemeClr>
+                </a:solidFill>
+              </a:defRPr>
+            </a:lvl2pPr>
+            <a:lvl3pPr marL="914400" indent="0">
+              <a:buNone/>
+              <a:defRPr sz="1600">
+                <a:solidFill>
+                  <a:schemeClr val="tx1">
+                    <a:tint val="75000"/>
+                  </a:schemeClr>
+                </a:solidFill>
+              </a:defRPr>
+            </a:lvl3pPr>
+            <a:lvl4pPr marL="1371600" indent="0">
+              <a:buNone/>
+              <a:defRPr sz="1400">
+                <a:solidFill>
+                  <a:schemeClr val="tx1">
+                    <a:tint val="75000"/>
+                  </a:schemeClr>
+                </a:solidFill>
+              </a:defRPr>
+            </a:lvl4pPr>
+            <a:lvl5pPr marL="1828800" indent="0">
+              <a:buNone/>
+              <a:defRPr sz="1400">
+                <a:solidFill>
+                  <a:schemeClr val="tx1">
+                    <a:tint val="75000"/>
+                  </a:schemeClr>
+                </a:solidFill>
+              </a:defRPr>
+            </a:lvl5pPr>
+            <a:lvl6pPr marL="2286000" indent="0">
+              <a:buNone/>
+              <a:defRPr sz="1400">
+                <a:solidFill>
+                  <a:schemeClr val="tx1">
+                    <a:tint val="75000"/>
+                  </a:schemeClr>
+                </a:solidFill>
+              </a:defRPr>
+            </a:lvl6pPr>
+            <a:lvl7pPr marL="2743200" indent="0">
+              <a:buNone/>
+              <a:defRPr sz="1400">
+                <a:solidFill>
+                  <a:schemeClr val="tx1">
+                    <a:tint val="75000"/>
+                  </a:schemeClr>
+                </a:solidFill>
+              </a:defRPr>
+            </a:lvl7pPr>
+            <a:lvl8pPr marL="3200400" indent="0">
+              <a:buNone/>
+              <a:defRPr sz="1400">
+                <a:solidFill>
+                  <a:schemeClr val="tx1">
+                    <a:tint val="75000"/>
+                  </a:schemeClr>
+                </a:solidFill>
+              </a:defRPr>
+            </a:lvl8pPr>
+            <a:lvl9pPr marL="3657600" indent="0">
+              <a:buNone/>
+              <a:defRPr sz="1400">
+                <a:solidFill>
+                  <a:schemeClr val="tx1">
+                    <a:tint val="75000"/>
+                  </a:schemeClr>
+                </a:solidFill>
+              </a:defRPr>
+            </a:lvl9pPr>
+          </a:lstStyle>
           <a:p>
             <a:pPr lvl="0"/>
             <a:r>
-              <a:rPr lang="en-US"/>
-              <a:t>Click to edit Master text styles</a:t>
-            </a:r>
-          </a:p>
-          <a:p>
-            <a:pPr lvl="1"/>
-            <a:r>
-              <a:rPr lang="en-US"/>
-              <a:t>Second level</a:t>
-            </a:r>
-          </a:p>
-          <a:p>
-            <a:pPr lvl="2"/>
-            <a:r>
-              <a:rPr lang="en-US"/>
-              <a:t>Third level</a:t>
-            </a:r>
-          </a:p>
-          <a:p>
-            <a:pPr lvl="3"/>
-            <a:r>
-              <a:rPr lang="en-US"/>
-              <a:t>Fourth level</a:t>
-            </a:r>
-          </a:p>
-          <a:p>
-            <a:pPr lvl="4"/>
-            <a:r>
-              <a:rPr lang="en-US"/>
-              <a:t>Fifth level</a:t>
-            </a:r>
-          </a:p>
-        </p:txBody>
-      </p:sp>
-      <p:sp>
-        <p:nvSpPr>
-          <p:cNvPr id="4" name="Date Placeholder 3">
-            <a:extLst>
-              <a:ext uri="{FF2B5EF4-FFF2-40B4-BE49-F238E27FC236}">
-                <a16:creationId xmlns:a16="http://schemas.microsoft.com/office/drawing/2014/main" id="{0F01D2BF-6320-4BE3-B985-C5EA1FF6C80B}"/>
-              </a:ext>
-            </a:extLst>
-          </p:cNvPr>
+              <a:rPr lang="de-DE"/>
+              <a:t>Mastertextformat bearbeiten</a:t>
+            </a:r>
+          </a:p>
+        </p:txBody>
+      </p:sp>
+      <p:sp>
+        <p:nvSpPr>
+          <p:cNvPr id="4" name="Date Placeholder 3"/>
           <p:cNvSpPr>
             <a:spLocks noGrp="1"/>
           </p:cNvSpPr>
@@ -2913,13 +2989,7 @@
       </p:sp>
       <p:sp>
         <p:nvSpPr>
-          <p:cNvPr id="5" name="Footer Placeholder 4">
-            <a:extLst>
-              <a:ext uri="{FF2B5EF4-FFF2-40B4-BE49-F238E27FC236}">
-                <a16:creationId xmlns:a16="http://schemas.microsoft.com/office/drawing/2014/main" id="{E201CA2C-7126-487B-A62D-BA28F9B186BC}"/>
-              </a:ext>
-            </a:extLst>
-          </p:cNvPr>
+          <p:cNvPr id="5" name="Footer Placeholder 4"/>
           <p:cNvSpPr>
             <a:spLocks noGrp="1"/>
           </p:cNvSpPr>
@@ -2938,13 +3008,7 @@
       </p:sp>
       <p:sp>
         <p:nvSpPr>
-          <p:cNvPr id="6" name="Slide Number Placeholder 5">
-            <a:extLst>
-              <a:ext uri="{FF2B5EF4-FFF2-40B4-BE49-F238E27FC236}">
-                <a16:creationId xmlns:a16="http://schemas.microsoft.com/office/drawing/2014/main" id="{F2CF4A48-579D-42A1-83FE-4376C603B5A9}"/>
-              </a:ext>
-            </a:extLst>
-          </p:cNvPr>
+          <p:cNvPr id="6" name="Slide Number Placeholder 5"/>
           <p:cNvSpPr>
             <a:spLocks noGrp="1"/>
           </p:cNvSpPr>
@@ -2959,7 +3023,7 @@
           <a:p>
             <a:fld id="{C5DB2A98-4B90-4FDA-B1BD-5751ADF6E510}" type="slidenum">
               <a:rPr lang="en-US" smtClean="0"/>
-              <a:t>‹#›</a:t>
+              <a:t>‹Nr.›</a:t>
             </a:fld>
             <a:endParaRPr lang="en-US"/>
           </a:p>
@@ -2968,7 +3032,7 @@
     </p:spTree>
     <p:extLst>
       <p:ext uri="{BB962C8B-B14F-4D97-AF65-F5344CB8AC3E}">
-        <p14:creationId xmlns:p14="http://schemas.microsoft.com/office/powerpoint/2010/main" val="1698624207"/>
+        <p14:creationId xmlns:p14="http://schemas.microsoft.com/office/powerpoint/2010/main" val="2007740977"/>
       </p:ext>
     </p:extLst>
   </p:cSld>
@@ -2978,9 +3042,9 @@
 </p:sldLayout>
 </file>
 
-<file path=ppt/slideLayouts/slideLayout3.xml><?xml version="1.0" encoding="utf-8"?>
-<p:sldLayout xmlns:a="http://schemas.openxmlformats.org/drawingml/2006/main" xmlns:r="http://schemas.openxmlformats.org/officeDocument/2006/relationships" xmlns:p="http://schemas.openxmlformats.org/presentationml/2006/main" type="secHead" preserve="1">
-  <p:cSld name="Section Header">
+<file path=ppt/slideLayouts/slideLayout4.xml><?xml version="1.0" encoding="utf-8"?>
+<p:sldLayout xmlns:a="http://schemas.openxmlformats.org/drawingml/2006/main" xmlns:r="http://schemas.openxmlformats.org/officeDocument/2006/relationships" xmlns:p="http://schemas.openxmlformats.org/presentationml/2006/main" type="twoObj" preserve="1">
+  <p:cSld name="Zwei Inhalte">
     <p:spTree>
       <p:nvGrpSpPr>
         <p:cNvPr id="1" name=""/>
@@ -2997,175 +3061,200 @@
       </p:grpSpPr>
       <p:sp>
         <p:nvSpPr>
-          <p:cNvPr id="2" name="Title 1">
-            <a:extLst>
-              <a:ext uri="{FF2B5EF4-FFF2-40B4-BE49-F238E27FC236}">
-                <a16:creationId xmlns:a16="http://schemas.microsoft.com/office/drawing/2014/main" id="{3034784F-4177-4A30-AB3C-D5B1E77B78B7}"/>
-              </a:ext>
-            </a:extLst>
-          </p:cNvPr>
+          <p:cNvPr id="2" name="Title 1"/>
           <p:cNvSpPr>
             <a:spLocks noGrp="1"/>
           </p:cNvSpPr>
           <p:nvPr>
             <p:ph type="title"/>
+          </p:nvPr>
+        </p:nvSpPr>
+        <p:spPr/>
+        <p:txBody>
+          <a:bodyPr/>
+          <a:lstStyle/>
+          <a:p>
+            <a:r>
+              <a:rPr lang="de-DE"/>
+              <a:t>Mastertitelformat bearbeiten</a:t>
+            </a:r>
+            <a:endParaRPr lang="en-US" dirty="0"/>
+          </a:p>
+        </p:txBody>
+      </p:sp>
+      <p:sp>
+        <p:nvSpPr>
+          <p:cNvPr id="3" name="Content Placeholder 2"/>
+          <p:cNvSpPr>
+            <a:spLocks noGrp="1"/>
+          </p:cNvSpPr>
+          <p:nvPr>
+            <p:ph sz="half" idx="1"/>
           </p:nvPr>
         </p:nvSpPr>
         <p:spPr>
           <a:xfrm>
-            <a:off x="831850" y="1709738"/>
-            <a:ext cx="10515600" cy="2852737"/>
+            <a:off x="676656" y="1998134"/>
+            <a:ext cx="4663440" cy="3767328"/>
           </a:xfrm>
         </p:spPr>
         <p:txBody>
-          <a:bodyPr anchor="b"/>
+          <a:bodyPr/>
           <a:lstStyle>
             <a:lvl1pPr>
-              <a:defRPr sz="6000"/>
+              <a:defRPr sz="2400"/>
             </a:lvl1pPr>
+            <a:lvl2pPr>
+              <a:defRPr sz="2000"/>
+            </a:lvl2pPr>
+            <a:lvl3pPr>
+              <a:defRPr sz="1800"/>
+            </a:lvl3pPr>
+            <a:lvl4pPr>
+              <a:defRPr sz="1600"/>
+            </a:lvl4pPr>
+            <a:lvl5pPr>
+              <a:defRPr sz="1600"/>
+            </a:lvl5pPr>
+            <a:lvl6pPr>
+              <a:defRPr sz="1600"/>
+            </a:lvl6pPr>
+            <a:lvl7pPr>
+              <a:defRPr sz="1600"/>
+            </a:lvl7pPr>
+            <a:lvl8pPr>
+              <a:defRPr sz="1600"/>
+            </a:lvl8pPr>
+            <a:lvl9pPr>
+              <a:defRPr sz="1600"/>
+            </a:lvl9pPr>
           </a:lstStyle>
           <a:p>
-            <a:r>
-              <a:rPr lang="en-US"/>
-              <a:t>Click to edit Master title style</a:t>
-            </a:r>
-          </a:p>
-        </p:txBody>
-      </p:sp>
-      <p:sp>
-        <p:nvSpPr>
-          <p:cNvPr id="3" name="Text Placeholder 2">
-            <a:extLst>
-              <a:ext uri="{FF2B5EF4-FFF2-40B4-BE49-F238E27FC236}">
-                <a16:creationId xmlns:a16="http://schemas.microsoft.com/office/drawing/2014/main" id="{A47B6B26-1D23-4099-9F00-40475411E27F}"/>
-              </a:ext>
-            </a:extLst>
-          </p:cNvPr>
-          <p:cNvSpPr>
-            <a:spLocks noGrp="1"/>
-          </p:cNvSpPr>
-          <p:nvPr>
-            <p:ph type="body" idx="1"/>
+            <a:pPr lvl="0"/>
+            <a:r>
+              <a:rPr lang="de-DE"/>
+              <a:t>Mastertextformat bearbeiten</a:t>
+            </a:r>
+          </a:p>
+          <a:p>
+            <a:pPr lvl="1"/>
+            <a:r>
+              <a:rPr lang="de-DE"/>
+              <a:t>Zweite Ebene</a:t>
+            </a:r>
+          </a:p>
+          <a:p>
+            <a:pPr lvl="2"/>
+            <a:r>
+              <a:rPr lang="de-DE"/>
+              <a:t>Dritte Ebene</a:t>
+            </a:r>
+          </a:p>
+          <a:p>
+            <a:pPr lvl="3"/>
+            <a:r>
+              <a:rPr lang="de-DE"/>
+              <a:t>Vierte Ebene</a:t>
+            </a:r>
+          </a:p>
+          <a:p>
+            <a:pPr lvl="4"/>
+            <a:r>
+              <a:rPr lang="de-DE"/>
+              <a:t>Fünfte Ebene</a:t>
+            </a:r>
+            <a:endParaRPr lang="en-US" dirty="0"/>
+          </a:p>
+        </p:txBody>
+      </p:sp>
+      <p:sp>
+        <p:nvSpPr>
+          <p:cNvPr id="4" name="Content Placeholder 3"/>
+          <p:cNvSpPr>
+            <a:spLocks noGrp="1"/>
+          </p:cNvSpPr>
+          <p:nvPr>
+            <p:ph sz="half" idx="2"/>
           </p:nvPr>
         </p:nvSpPr>
         <p:spPr>
           <a:xfrm>
-            <a:off x="831850" y="4589463"/>
-            <a:ext cx="10515600" cy="1500187"/>
+            <a:off x="6011330" y="1998134"/>
+            <a:ext cx="4663440" cy="3767328"/>
           </a:xfrm>
         </p:spPr>
         <p:txBody>
           <a:bodyPr/>
           <a:lstStyle>
-            <a:lvl1pPr marL="0" indent="0">
-              <a:buNone/>
-              <a:defRPr sz="2400">
-                <a:solidFill>
-                  <a:schemeClr val="tx1">
-                    <a:tint val="75000"/>
-                  </a:schemeClr>
-                </a:solidFill>
-              </a:defRPr>
+            <a:lvl1pPr>
+              <a:defRPr sz="2400"/>
             </a:lvl1pPr>
-            <a:lvl2pPr marL="457200" indent="0">
-              <a:buNone/>
-              <a:defRPr sz="2000">
-                <a:solidFill>
-                  <a:schemeClr val="tx1">
-                    <a:tint val="75000"/>
-                  </a:schemeClr>
-                </a:solidFill>
-              </a:defRPr>
+            <a:lvl2pPr>
+              <a:defRPr sz="2000"/>
             </a:lvl2pPr>
-            <a:lvl3pPr marL="914400" indent="0">
-              <a:buNone/>
-              <a:defRPr sz="1800">
-                <a:solidFill>
-                  <a:schemeClr val="tx1">
-                    <a:tint val="75000"/>
-                  </a:schemeClr>
-                </a:solidFill>
-              </a:defRPr>
+            <a:lvl3pPr>
+              <a:defRPr sz="1800"/>
             </a:lvl3pPr>
-            <a:lvl4pPr marL="1371600" indent="0">
-              <a:buNone/>
-              <a:defRPr sz="1600">
-                <a:solidFill>
-                  <a:schemeClr val="tx1">
-                    <a:tint val="75000"/>
-                  </a:schemeClr>
-                </a:solidFill>
-              </a:defRPr>
+            <a:lvl4pPr>
+              <a:defRPr sz="1600"/>
             </a:lvl4pPr>
-            <a:lvl5pPr marL="1828800" indent="0">
-              <a:buNone/>
-              <a:defRPr sz="1600">
-                <a:solidFill>
-                  <a:schemeClr val="tx1">
-                    <a:tint val="75000"/>
-                  </a:schemeClr>
-                </a:solidFill>
-              </a:defRPr>
+            <a:lvl5pPr>
+              <a:defRPr sz="1600"/>
             </a:lvl5pPr>
-            <a:lvl6pPr marL="2286000" indent="0">
-              <a:buNone/>
-              <a:defRPr sz="1600">
-                <a:solidFill>
-                  <a:schemeClr val="tx1">
-                    <a:tint val="75000"/>
-                  </a:schemeClr>
-                </a:solidFill>
-              </a:defRPr>
+            <a:lvl6pPr>
+              <a:defRPr sz="1600"/>
             </a:lvl6pPr>
-            <a:lvl7pPr marL="2743200" indent="0">
-              <a:buNone/>
-              <a:defRPr sz="1600">
-                <a:solidFill>
-                  <a:schemeClr val="tx1">
-                    <a:tint val="75000"/>
-                  </a:schemeClr>
-                </a:solidFill>
-              </a:defRPr>
+            <a:lvl7pPr>
+              <a:defRPr sz="1600"/>
             </a:lvl7pPr>
-            <a:lvl8pPr marL="3200400" indent="0">
-              <a:buNone/>
-              <a:defRPr sz="1600">
-                <a:solidFill>
-                  <a:schemeClr val="tx1">
-                    <a:tint val="75000"/>
-                  </a:schemeClr>
-                </a:solidFill>
-              </a:defRPr>
+            <a:lvl8pPr>
+              <a:defRPr sz="1600"/>
             </a:lvl8pPr>
-            <a:lvl9pPr marL="3657600" indent="0">
-              <a:buNone/>
-              <a:defRPr sz="1600">
-                <a:solidFill>
-                  <a:schemeClr val="tx1">
-                    <a:tint val="75000"/>
-                  </a:schemeClr>
-                </a:solidFill>
-              </a:defRPr>
+            <a:lvl9pPr>
+              <a:defRPr sz="1600"/>
             </a:lvl9pPr>
           </a:lstStyle>
           <a:p>
             <a:pPr lvl="0"/>
             <a:r>
-              <a:rPr lang="en-US"/>
-              <a:t>Click to edit Master text styles</a:t>
-            </a:r>
-          </a:p>
-        </p:txBody>
-      </p:sp>
-      <p:sp>
-        <p:nvSpPr>
-          <p:cNvPr id="4" name="Date Placeholder 3">
-            <a:extLst>
-              <a:ext uri="{FF2B5EF4-FFF2-40B4-BE49-F238E27FC236}">
-                <a16:creationId xmlns:a16="http://schemas.microsoft.com/office/drawing/2014/main" id="{6EF966DC-4D70-4427-B8F1-90510F22E093}"/>
-              </a:ext>
-            </a:extLst>
-          </p:cNvPr>
+              <a:rPr lang="de-DE"/>
+              <a:t>Mastertextformat bearbeiten</a:t>
+            </a:r>
+          </a:p>
+          <a:p>
+            <a:pPr lvl="1"/>
+            <a:r>
+              <a:rPr lang="de-DE"/>
+              <a:t>Zweite Ebene</a:t>
+            </a:r>
+          </a:p>
+          <a:p>
+            <a:pPr lvl="2"/>
+            <a:r>
+              <a:rPr lang="de-DE"/>
+              <a:t>Dritte Ebene</a:t>
+            </a:r>
+          </a:p>
+          <a:p>
+            <a:pPr lvl="3"/>
+            <a:r>
+              <a:rPr lang="de-DE"/>
+              <a:t>Vierte Ebene</a:t>
+            </a:r>
+          </a:p>
+          <a:p>
+            <a:pPr lvl="4"/>
+            <a:r>
+              <a:rPr lang="de-DE"/>
+              <a:t>Fünfte Ebene</a:t>
+            </a:r>
+            <a:endParaRPr lang="en-US" dirty="0"/>
+          </a:p>
+        </p:txBody>
+      </p:sp>
+      <p:sp>
+        <p:nvSpPr>
+          <p:cNvPr id="5" name="Date Placeholder 4"/>
           <p:cNvSpPr>
             <a:spLocks noGrp="1"/>
           </p:cNvSpPr>
@@ -3188,13 +3277,7 @@
       </p:sp>
       <p:sp>
         <p:nvSpPr>
-          <p:cNvPr id="5" name="Footer Placeholder 4">
-            <a:extLst>
-              <a:ext uri="{FF2B5EF4-FFF2-40B4-BE49-F238E27FC236}">
-                <a16:creationId xmlns:a16="http://schemas.microsoft.com/office/drawing/2014/main" id="{00AB6772-6DF1-4A45-9923-522625D8414B}"/>
-              </a:ext>
-            </a:extLst>
-          </p:cNvPr>
+          <p:cNvPr id="6" name="Footer Placeholder 5"/>
           <p:cNvSpPr>
             <a:spLocks noGrp="1"/>
           </p:cNvSpPr>
@@ -3213,13 +3296,7 @@
       </p:sp>
       <p:sp>
         <p:nvSpPr>
-          <p:cNvPr id="6" name="Slide Number Placeholder 5">
-            <a:extLst>
-              <a:ext uri="{FF2B5EF4-FFF2-40B4-BE49-F238E27FC236}">
-                <a16:creationId xmlns:a16="http://schemas.microsoft.com/office/drawing/2014/main" id="{0DF6653B-060A-4C96-87C0-29DDCFD1F849}"/>
-              </a:ext>
-            </a:extLst>
-          </p:cNvPr>
+          <p:cNvPr id="7" name="Slide Number Placeholder 6"/>
           <p:cNvSpPr>
             <a:spLocks noGrp="1"/>
           </p:cNvSpPr>
@@ -3234,7 +3311,7 @@
           <a:p>
             <a:fld id="{C5DB2A98-4B90-4FDA-B1BD-5751ADF6E510}" type="slidenum">
               <a:rPr lang="en-US" smtClean="0"/>
-              <a:t>‹#›</a:t>
+              <a:t>‹Nr.›</a:t>
             </a:fld>
             <a:endParaRPr lang="en-US"/>
           </a:p>
@@ -3243,7 +3320,7 @@
     </p:spTree>
     <p:extLst>
       <p:ext uri="{BB962C8B-B14F-4D97-AF65-F5344CB8AC3E}">
-        <p14:creationId xmlns:p14="http://schemas.microsoft.com/office/powerpoint/2010/main" val="1122812119"/>
+        <p14:creationId xmlns:p14="http://schemas.microsoft.com/office/powerpoint/2010/main" val="366273422"/>
       </p:ext>
     </p:extLst>
   </p:cSld>
@@ -3253,9 +3330,9 @@
 </p:sldLayout>
 </file>
 
-<file path=ppt/slideLayouts/slideLayout4.xml><?xml version="1.0" encoding="utf-8"?>
-<p:sldLayout xmlns:a="http://schemas.openxmlformats.org/drawingml/2006/main" xmlns:r="http://schemas.openxmlformats.org/officeDocument/2006/relationships" xmlns:p="http://schemas.openxmlformats.org/presentationml/2006/main" type="twoObj" preserve="1">
-  <p:cSld name="Two Content">
+<file path=ppt/slideLayouts/slideLayout5.xml><?xml version="1.0" encoding="utf-8"?>
+<p:sldLayout xmlns:a="http://schemas.openxmlformats.org/drawingml/2006/main" xmlns:r="http://schemas.openxmlformats.org/officeDocument/2006/relationships" xmlns:p="http://schemas.openxmlformats.org/presentationml/2006/main" type="twoTxTwoObj" preserve="1">
+  <p:cSld name="Vergleich">
     <p:spTree>
       <p:nvGrpSpPr>
         <p:cNvPr id="1" name=""/>
@@ -3272,13 +3349,7 @@
       </p:grpSpPr>
       <p:sp>
         <p:nvSpPr>
-          <p:cNvPr id="2" name="Title 1">
-            <a:extLst>
-              <a:ext uri="{FF2B5EF4-FFF2-40B4-BE49-F238E27FC236}">
-                <a16:creationId xmlns:a16="http://schemas.microsoft.com/office/drawing/2014/main" id="{B329F76F-9F4D-4BC4-88AA-DF4FE9043437}"/>
-              </a:ext>
-            </a:extLst>
-          </p:cNvPr>
+          <p:cNvPr id="10" name="Title 9"/>
           <p:cNvSpPr>
             <a:spLocks noGrp="1"/>
           </p:cNvSpPr>
@@ -3292,310 +3363,45 @@
           <a:lstStyle/>
           <a:p>
             <a:r>
-              <a:rPr lang="en-US"/>
-              <a:t>Click to edit Master title style</a:t>
-            </a:r>
-          </a:p>
-        </p:txBody>
-      </p:sp>
-      <p:sp>
-        <p:nvSpPr>
-          <p:cNvPr id="3" name="Content Placeholder 2">
-            <a:extLst>
-              <a:ext uri="{FF2B5EF4-FFF2-40B4-BE49-F238E27FC236}">
-                <a16:creationId xmlns:a16="http://schemas.microsoft.com/office/drawing/2014/main" id="{E3888A6A-F652-4753-90E3-472681A9D183}"/>
-              </a:ext>
-            </a:extLst>
-          </p:cNvPr>
-          <p:cNvSpPr>
-            <a:spLocks noGrp="1"/>
-          </p:cNvSpPr>
-          <p:nvPr>
-            <p:ph sz="half" idx="1"/>
+              <a:rPr lang="de-DE"/>
+              <a:t>Mastertitelformat bearbeiten</a:t>
+            </a:r>
+            <a:endParaRPr lang="en-US" dirty="0"/>
+          </a:p>
+        </p:txBody>
+      </p:sp>
+      <p:sp>
+        <p:nvSpPr>
+          <p:cNvPr id="3" name="Text Placeholder 2"/>
+          <p:cNvSpPr>
+            <a:spLocks noGrp="1"/>
+          </p:cNvSpPr>
+          <p:nvPr>
+            <p:ph type="body" idx="1"/>
           </p:nvPr>
         </p:nvSpPr>
         <p:spPr>
           <a:xfrm>
-            <a:off x="838200" y="1825625"/>
-            <a:ext cx="5181600" cy="4351338"/>
+            <a:off x="676656" y="2040467"/>
+            <a:ext cx="4663440" cy="723400"/>
           </a:xfrm>
         </p:spPr>
         <p:txBody>
-          <a:bodyPr/>
-          <a:lstStyle/>
-          <a:p>
-            <a:pPr lvl="0"/>
-            <a:r>
-              <a:rPr lang="en-US"/>
-              <a:t>Click to edit Master text styles</a:t>
-            </a:r>
-          </a:p>
-          <a:p>
-            <a:pPr lvl="1"/>
-            <a:r>
-              <a:rPr lang="en-US"/>
-              <a:t>Second level</a:t>
-            </a:r>
-          </a:p>
-          <a:p>
-            <a:pPr lvl="2"/>
-            <a:r>
-              <a:rPr lang="en-US"/>
-              <a:t>Third level</a:t>
-            </a:r>
-          </a:p>
-          <a:p>
-            <a:pPr lvl="3"/>
-            <a:r>
-              <a:rPr lang="en-US"/>
-              <a:t>Fourth level</a:t>
-            </a:r>
-          </a:p>
-          <a:p>
-            <a:pPr lvl="4"/>
-            <a:r>
-              <a:rPr lang="en-US"/>
-              <a:t>Fifth level</a:t>
-            </a:r>
-          </a:p>
-        </p:txBody>
-      </p:sp>
-      <p:sp>
-        <p:nvSpPr>
-          <p:cNvPr id="4" name="Content Placeholder 3">
-            <a:extLst>
-              <a:ext uri="{FF2B5EF4-FFF2-40B4-BE49-F238E27FC236}">
-                <a16:creationId xmlns:a16="http://schemas.microsoft.com/office/drawing/2014/main" id="{6C8B1204-DB1D-4AD9-A5EF-5F538AF4D239}"/>
-              </a:ext>
-            </a:extLst>
-          </p:cNvPr>
-          <p:cNvSpPr>
-            <a:spLocks noGrp="1"/>
-          </p:cNvSpPr>
-          <p:nvPr>
-            <p:ph sz="half" idx="2"/>
-          </p:nvPr>
-        </p:nvSpPr>
-        <p:spPr>
-          <a:xfrm>
-            <a:off x="6172200" y="1825625"/>
-            <a:ext cx="5181600" cy="4351338"/>
-          </a:xfrm>
-        </p:spPr>
-        <p:txBody>
-          <a:bodyPr/>
-          <a:lstStyle/>
-          <a:p>
-            <a:pPr lvl="0"/>
-            <a:r>
-              <a:rPr lang="en-US"/>
-              <a:t>Click to edit Master text styles</a:t>
-            </a:r>
-          </a:p>
-          <a:p>
-            <a:pPr lvl="1"/>
-            <a:r>
-              <a:rPr lang="en-US"/>
-              <a:t>Second level</a:t>
-            </a:r>
-          </a:p>
-          <a:p>
-            <a:pPr lvl="2"/>
-            <a:r>
-              <a:rPr lang="en-US"/>
-              <a:t>Third level</a:t>
-            </a:r>
-          </a:p>
-          <a:p>
-            <a:pPr lvl="3"/>
-            <a:r>
-              <a:rPr lang="en-US"/>
-              <a:t>Fourth level</a:t>
-            </a:r>
-          </a:p>
-          <a:p>
-            <a:pPr lvl="4"/>
-            <a:r>
-              <a:rPr lang="en-US"/>
-              <a:t>Fifth level</a:t>
-            </a:r>
-          </a:p>
-        </p:txBody>
-      </p:sp>
-      <p:sp>
-        <p:nvSpPr>
-          <p:cNvPr id="5" name="Date Placeholder 4">
-            <a:extLst>
-              <a:ext uri="{FF2B5EF4-FFF2-40B4-BE49-F238E27FC236}">
-                <a16:creationId xmlns:a16="http://schemas.microsoft.com/office/drawing/2014/main" id="{065B79D1-8B99-4969-82B2-9989436E3FA2}"/>
-              </a:ext>
-            </a:extLst>
-          </p:cNvPr>
-          <p:cNvSpPr>
-            <a:spLocks noGrp="1"/>
-          </p:cNvSpPr>
-          <p:nvPr>
-            <p:ph type="dt" sz="half" idx="10"/>
-          </p:nvPr>
-        </p:nvSpPr>
-        <p:spPr/>
-        <p:txBody>
-          <a:bodyPr/>
-          <a:lstStyle/>
-          <a:p>
-            <a:fld id="{DCDACB0D-BBD2-40D0-A893-CF04513F27FC}" type="datetimeFigureOut">
-              <a:rPr lang="en-US" smtClean="0"/>
-              <a:t>1/31/2020</a:t>
-            </a:fld>
-            <a:endParaRPr lang="en-US"/>
-          </a:p>
-        </p:txBody>
-      </p:sp>
-      <p:sp>
-        <p:nvSpPr>
-          <p:cNvPr id="6" name="Footer Placeholder 5">
-            <a:extLst>
-              <a:ext uri="{FF2B5EF4-FFF2-40B4-BE49-F238E27FC236}">
-                <a16:creationId xmlns:a16="http://schemas.microsoft.com/office/drawing/2014/main" id="{D9206FFB-FBC5-4628-B8BE-F28D892188BE}"/>
-              </a:ext>
-            </a:extLst>
-          </p:cNvPr>
-          <p:cNvSpPr>
-            <a:spLocks noGrp="1"/>
-          </p:cNvSpPr>
-          <p:nvPr>
-            <p:ph type="ftr" sz="quarter" idx="11"/>
-          </p:nvPr>
-        </p:nvSpPr>
-        <p:spPr/>
-        <p:txBody>
-          <a:bodyPr/>
-          <a:lstStyle/>
-          <a:p>
-            <a:endParaRPr lang="en-US"/>
-          </a:p>
-        </p:txBody>
-      </p:sp>
-      <p:sp>
-        <p:nvSpPr>
-          <p:cNvPr id="7" name="Slide Number Placeholder 6">
-            <a:extLst>
-              <a:ext uri="{FF2B5EF4-FFF2-40B4-BE49-F238E27FC236}">
-                <a16:creationId xmlns:a16="http://schemas.microsoft.com/office/drawing/2014/main" id="{46759A84-834C-4908-8DAD-2FD7863BBDB2}"/>
-              </a:ext>
-            </a:extLst>
-          </p:cNvPr>
-          <p:cNvSpPr>
-            <a:spLocks noGrp="1"/>
-          </p:cNvSpPr>
-          <p:nvPr>
-            <p:ph type="sldNum" sz="quarter" idx="12"/>
-          </p:nvPr>
-        </p:nvSpPr>
-        <p:spPr/>
-        <p:txBody>
-          <a:bodyPr/>
-          <a:lstStyle/>
-          <a:p>
-            <a:fld id="{C5DB2A98-4B90-4FDA-B1BD-5751ADF6E510}" type="slidenum">
-              <a:rPr lang="en-US" smtClean="0"/>
-              <a:t>‹#›</a:t>
-            </a:fld>
-            <a:endParaRPr lang="en-US"/>
-          </a:p>
-        </p:txBody>
-      </p:sp>
-    </p:spTree>
-    <p:extLst>
-      <p:ext uri="{BB962C8B-B14F-4D97-AF65-F5344CB8AC3E}">
-        <p14:creationId xmlns:p14="http://schemas.microsoft.com/office/powerpoint/2010/main" val="3091045872"/>
-      </p:ext>
-    </p:extLst>
-  </p:cSld>
-  <p:clrMapOvr>
-    <a:masterClrMapping/>
-  </p:clrMapOvr>
-</p:sldLayout>
-</file>
-
-<file path=ppt/slideLayouts/slideLayout5.xml><?xml version="1.0" encoding="utf-8"?>
-<p:sldLayout xmlns:a="http://schemas.openxmlformats.org/drawingml/2006/main" xmlns:r="http://schemas.openxmlformats.org/officeDocument/2006/relationships" xmlns:p="http://schemas.openxmlformats.org/presentationml/2006/main" type="twoTxTwoObj" preserve="1">
-  <p:cSld name="Comparison">
-    <p:spTree>
-      <p:nvGrpSpPr>
-        <p:cNvPr id="1" name=""/>
-        <p:cNvGrpSpPr/>
-        <p:nvPr/>
-      </p:nvGrpSpPr>
-      <p:grpSpPr>
-        <a:xfrm>
-          <a:off x="0" y="0"/>
-          <a:ext cx="0" cy="0"/>
-          <a:chOff x="0" y="0"/>
-          <a:chExt cx="0" cy="0"/>
-        </a:xfrm>
-      </p:grpSpPr>
-      <p:sp>
-        <p:nvSpPr>
-          <p:cNvPr id="2" name="Title 1">
-            <a:extLst>
-              <a:ext uri="{FF2B5EF4-FFF2-40B4-BE49-F238E27FC236}">
-                <a16:creationId xmlns:a16="http://schemas.microsoft.com/office/drawing/2014/main" id="{6E5569F4-1892-42E6-9A80-CE859B35E25F}"/>
-              </a:ext>
-            </a:extLst>
-          </p:cNvPr>
-          <p:cNvSpPr>
-            <a:spLocks noGrp="1"/>
-          </p:cNvSpPr>
-          <p:nvPr>
-            <p:ph type="title"/>
-          </p:nvPr>
-        </p:nvSpPr>
-        <p:spPr>
-          <a:xfrm>
-            <a:off x="839788" y="365125"/>
-            <a:ext cx="10515600" cy="1325563"/>
-          </a:xfrm>
-        </p:spPr>
-        <p:txBody>
-          <a:bodyPr/>
-          <a:lstStyle/>
-          <a:p>
-            <a:r>
-              <a:rPr lang="en-US"/>
-              <a:t>Click to edit Master title style</a:t>
-            </a:r>
-          </a:p>
-        </p:txBody>
-      </p:sp>
-      <p:sp>
-        <p:nvSpPr>
-          <p:cNvPr id="3" name="Text Placeholder 2">
-            <a:extLst>
-              <a:ext uri="{FF2B5EF4-FFF2-40B4-BE49-F238E27FC236}">
-                <a16:creationId xmlns:a16="http://schemas.microsoft.com/office/drawing/2014/main" id="{FB4CA275-FEA9-4E63-B877-A7C77F2D38CF}"/>
-              </a:ext>
-            </a:extLst>
-          </p:cNvPr>
-          <p:cNvSpPr>
-            <a:spLocks noGrp="1"/>
-          </p:cNvSpPr>
-          <p:nvPr>
-            <p:ph type="body" idx="1"/>
-          </p:nvPr>
-        </p:nvSpPr>
-        <p:spPr>
-          <a:xfrm>
-            <a:off x="839788" y="1681163"/>
-            <a:ext cx="5157787" cy="823912"/>
-          </a:xfrm>
-        </p:spPr>
-        <p:txBody>
-          <a:bodyPr anchor="b"/>
+          <a:bodyPr anchor="ctr">
+            <a:normAutofit/>
+          </a:bodyPr>
           <a:lstStyle>
             <a:lvl1pPr marL="0" indent="0">
               <a:buNone/>
-              <a:defRPr sz="2400" b="1"/>
+              <a:defRPr sz="2200" b="0" cap="all" baseline="0">
+                <a:solidFill>
+                  <a:schemeClr val="tx1">
+                    <a:lumMod val="85000"/>
+                    <a:lumOff val="15000"/>
+                  </a:schemeClr>
+                </a:solidFill>
+                <a:latin typeface="+mj-lt"/>
+              </a:defRPr>
             </a:lvl1pPr>
             <a:lvl2pPr marL="457200" indent="0">
               <a:buNone/>
@@ -3633,21 +3439,15 @@
           <a:p>
             <a:pPr lvl="0"/>
             <a:r>
-              <a:rPr lang="en-US"/>
-              <a:t>Click to edit Master text styles</a:t>
-            </a:r>
-          </a:p>
-        </p:txBody>
-      </p:sp>
-      <p:sp>
-        <p:nvSpPr>
-          <p:cNvPr id="4" name="Content Placeholder 3">
-            <a:extLst>
-              <a:ext uri="{FF2B5EF4-FFF2-40B4-BE49-F238E27FC236}">
-                <a16:creationId xmlns:a16="http://schemas.microsoft.com/office/drawing/2014/main" id="{706BEE3F-DE80-4958-AE0D-FB6EA0383DB0}"/>
-              </a:ext>
-            </a:extLst>
-          </p:cNvPr>
+              <a:rPr lang="de-DE"/>
+              <a:t>Mastertextformat bearbeiten</a:t>
+            </a:r>
+          </a:p>
+        </p:txBody>
+      </p:sp>
+      <p:sp>
+        <p:nvSpPr>
+          <p:cNvPr id="4" name="Content Placeholder 3"/>
           <p:cNvSpPr>
             <a:spLocks noGrp="1"/>
           </p:cNvSpPr>
@@ -3657,59 +3457,82 @@
         </p:nvSpPr>
         <p:spPr>
           <a:xfrm>
-            <a:off x="839788" y="2505075"/>
-            <a:ext cx="5157787" cy="3684588"/>
+            <a:off x="676656" y="2753084"/>
+            <a:ext cx="4663440" cy="3200400"/>
           </a:xfrm>
         </p:spPr>
         <p:txBody>
           <a:bodyPr/>
-          <a:lstStyle/>
+          <a:lstStyle>
+            <a:lvl1pPr>
+              <a:defRPr sz="2400"/>
+            </a:lvl1pPr>
+            <a:lvl2pPr>
+              <a:defRPr sz="2000"/>
+            </a:lvl2pPr>
+            <a:lvl3pPr>
+              <a:defRPr sz="1800"/>
+            </a:lvl3pPr>
+            <a:lvl4pPr>
+              <a:defRPr sz="1600"/>
+            </a:lvl4pPr>
+            <a:lvl5pPr>
+              <a:defRPr sz="1600"/>
+            </a:lvl5pPr>
+            <a:lvl6pPr>
+              <a:defRPr sz="1600"/>
+            </a:lvl6pPr>
+            <a:lvl7pPr>
+              <a:defRPr sz="1600"/>
+            </a:lvl7pPr>
+            <a:lvl8pPr>
+              <a:defRPr sz="1600"/>
+            </a:lvl8pPr>
+            <a:lvl9pPr>
+              <a:defRPr sz="1600"/>
+            </a:lvl9pPr>
+          </a:lstStyle>
           <a:p>
             <a:pPr lvl="0"/>
             <a:r>
-              <a:rPr lang="en-US"/>
-              <a:t>Click to edit Master text styles</a:t>
+              <a:rPr lang="de-DE"/>
+              <a:t>Mastertextformat bearbeiten</a:t>
             </a:r>
           </a:p>
           <a:p>
             <a:pPr lvl="1"/>
             <a:r>
-              <a:rPr lang="en-US"/>
-              <a:t>Second level</a:t>
+              <a:rPr lang="de-DE"/>
+              <a:t>Zweite Ebene</a:t>
             </a:r>
           </a:p>
           <a:p>
             <a:pPr lvl="2"/>
             <a:r>
-              <a:rPr lang="en-US"/>
-              <a:t>Third level</a:t>
+              <a:rPr lang="de-DE"/>
+              <a:t>Dritte Ebene</a:t>
             </a:r>
           </a:p>
           <a:p>
             <a:pPr lvl="3"/>
             <a:r>
-              <a:rPr lang="en-US"/>
-              <a:t>Fourth level</a:t>
+              <a:rPr lang="de-DE"/>
+              <a:t>Vierte Ebene</a:t>
             </a:r>
           </a:p>
           <a:p>
             <a:pPr lvl="4"/>
             <a:r>
-              <a:rPr lang="en-US"/>
-              <a:t>Fifth level</a:t>
-            </a:r>
-          </a:p>
-        </p:txBody>
-      </p:sp>
-      <p:sp>
-        <p:nvSpPr>
-          <p:cNvPr id="5" name="Text Placeholder 4">
-            <a:extLst>
-              <a:ext uri="{FF2B5EF4-FFF2-40B4-BE49-F238E27FC236}">
-                <a16:creationId xmlns:a16="http://schemas.microsoft.com/office/drawing/2014/main" id="{A7184D1A-B2EB-446F-B500-02EF997442B9}"/>
-              </a:ext>
-            </a:extLst>
-          </p:cNvPr>
+              <a:rPr lang="de-DE"/>
+              <a:t>Fünfte Ebene</a:t>
+            </a:r>
+            <a:endParaRPr lang="en-US" dirty="0"/>
+          </a:p>
+        </p:txBody>
+      </p:sp>
+      <p:sp>
+        <p:nvSpPr>
+          <p:cNvPr id="5" name="Text Placeholder 4"/>
           <p:cNvSpPr>
             <a:spLocks noGrp="1"/>
           </p:cNvSpPr>
@@ -3719,16 +3542,26 @@
         </p:nvSpPr>
         <p:spPr>
           <a:xfrm>
-            <a:off x="6172200" y="1681163"/>
-            <a:ext cx="5183188" cy="823912"/>
+            <a:off x="6007608" y="2038435"/>
+            <a:ext cx="4663440" cy="722376"/>
           </a:xfrm>
         </p:spPr>
         <p:txBody>
-          <a:bodyPr anchor="b"/>
+          <a:bodyPr anchor="ctr">
+            <a:normAutofit/>
+          </a:bodyPr>
           <a:lstStyle>
             <a:lvl1pPr marL="0" indent="0">
               <a:buNone/>
-              <a:defRPr sz="2400" b="1"/>
+              <a:defRPr sz="2200" b="0" cap="all" baseline="0">
+                <a:solidFill>
+                  <a:schemeClr val="tx1">
+                    <a:lumMod val="85000"/>
+                    <a:lumOff val="15000"/>
+                  </a:schemeClr>
+                </a:solidFill>
+                <a:latin typeface="+mj-lt"/>
+              </a:defRPr>
             </a:lvl1pPr>
             <a:lvl2pPr marL="457200" indent="0">
               <a:buNone/>
@@ -3766,21 +3599,15 @@
           <a:p>
             <a:pPr lvl="0"/>
             <a:r>
-              <a:rPr lang="en-US"/>
-              <a:t>Click to edit Master text styles</a:t>
-            </a:r>
-          </a:p>
-        </p:txBody>
-      </p:sp>
-      <p:sp>
-        <p:nvSpPr>
-          <p:cNvPr id="6" name="Content Placeholder 5">
-            <a:extLst>
-              <a:ext uri="{FF2B5EF4-FFF2-40B4-BE49-F238E27FC236}">
-                <a16:creationId xmlns:a16="http://schemas.microsoft.com/office/drawing/2014/main" id="{FFE58F22-2771-46B6-8072-73664145F6C6}"/>
-              </a:ext>
-            </a:extLst>
-          </p:cNvPr>
+              <a:rPr lang="de-DE"/>
+              <a:t>Mastertextformat bearbeiten</a:t>
+            </a:r>
+          </a:p>
+        </p:txBody>
+      </p:sp>
+      <p:sp>
+        <p:nvSpPr>
+          <p:cNvPr id="6" name="Content Placeholder 5"/>
           <p:cNvSpPr>
             <a:spLocks noGrp="1"/>
           </p:cNvSpPr>
@@ -3790,59 +3617,82 @@
         </p:nvSpPr>
         <p:spPr>
           <a:xfrm>
-            <a:off x="6172200" y="2505075"/>
-            <a:ext cx="5183188" cy="3684588"/>
+            <a:off x="6007608" y="2750990"/>
+            <a:ext cx="4663440" cy="3200400"/>
           </a:xfrm>
         </p:spPr>
         <p:txBody>
           <a:bodyPr/>
-          <a:lstStyle/>
+          <a:lstStyle>
+            <a:lvl1pPr>
+              <a:defRPr sz="2400"/>
+            </a:lvl1pPr>
+            <a:lvl2pPr>
+              <a:defRPr sz="2000"/>
+            </a:lvl2pPr>
+            <a:lvl3pPr>
+              <a:defRPr sz="1800"/>
+            </a:lvl3pPr>
+            <a:lvl4pPr>
+              <a:defRPr sz="1600"/>
+            </a:lvl4pPr>
+            <a:lvl5pPr>
+              <a:defRPr sz="1600"/>
+            </a:lvl5pPr>
+            <a:lvl6pPr>
+              <a:defRPr sz="1600"/>
+            </a:lvl6pPr>
+            <a:lvl7pPr>
+              <a:defRPr sz="1600"/>
+            </a:lvl7pPr>
+            <a:lvl8pPr>
+              <a:defRPr sz="1600"/>
+            </a:lvl8pPr>
+            <a:lvl9pPr>
+              <a:defRPr sz="1600"/>
+            </a:lvl9pPr>
+          </a:lstStyle>
           <a:p>
             <a:pPr lvl="0"/>
             <a:r>
-              <a:rPr lang="en-US"/>
-              <a:t>Click to edit Master text styles</a:t>
+              <a:rPr lang="de-DE"/>
+              <a:t>Mastertextformat bearbeiten</a:t>
             </a:r>
           </a:p>
           <a:p>
             <a:pPr lvl="1"/>
             <a:r>
-              <a:rPr lang="en-US"/>
-              <a:t>Second level</a:t>
+              <a:rPr lang="de-DE"/>
+              <a:t>Zweite Ebene</a:t>
             </a:r>
           </a:p>
           <a:p>
             <a:pPr lvl="2"/>
             <a:r>
-              <a:rPr lang="en-US"/>
-              <a:t>Third level</a:t>
+              <a:rPr lang="de-DE"/>
+              <a:t>Dritte Ebene</a:t>
             </a:r>
           </a:p>
           <a:p>
             <a:pPr lvl="3"/>
             <a:r>
-              <a:rPr lang="en-US"/>
-              <a:t>Fourth level</a:t>
+              <a:rPr lang="de-DE"/>
+              <a:t>Vierte Ebene</a:t>
             </a:r>
           </a:p>
           <a:p>
             <a:pPr lvl="4"/>
             <a:r>
-              <a:rPr lang="en-US"/>
-              <a:t>Fifth level</a:t>
-            </a:r>
-          </a:p>
-        </p:txBody>
-      </p:sp>
-      <p:sp>
-        <p:nvSpPr>
-          <p:cNvPr id="7" name="Date Placeholder 6">
-            <a:extLst>
-              <a:ext uri="{FF2B5EF4-FFF2-40B4-BE49-F238E27FC236}">
-                <a16:creationId xmlns:a16="http://schemas.microsoft.com/office/drawing/2014/main" id="{8E6615C8-7E1A-44FA-B774-6336BEFD599B}"/>
-              </a:ext>
-            </a:extLst>
-          </p:cNvPr>
+              <a:rPr lang="de-DE"/>
+              <a:t>Fünfte Ebene</a:t>
+            </a:r>
+            <a:endParaRPr lang="en-US" dirty="0"/>
+          </a:p>
+        </p:txBody>
+      </p:sp>
+      <p:sp>
+        <p:nvSpPr>
+          <p:cNvPr id="7" name="Date Placeholder 6"/>
           <p:cNvSpPr>
             <a:spLocks noGrp="1"/>
           </p:cNvSpPr>
@@ -3865,13 +3715,7 @@
       </p:sp>
       <p:sp>
         <p:nvSpPr>
-          <p:cNvPr id="8" name="Footer Placeholder 7">
-            <a:extLst>
-              <a:ext uri="{FF2B5EF4-FFF2-40B4-BE49-F238E27FC236}">
-                <a16:creationId xmlns:a16="http://schemas.microsoft.com/office/drawing/2014/main" id="{85E3317A-5A8A-4816-8E46-1175774A8501}"/>
-              </a:ext>
-            </a:extLst>
-          </p:cNvPr>
+          <p:cNvPr id="8" name="Footer Placeholder 7"/>
           <p:cNvSpPr>
             <a:spLocks noGrp="1"/>
           </p:cNvSpPr>
@@ -3890,13 +3734,7 @@
       </p:sp>
       <p:sp>
         <p:nvSpPr>
-          <p:cNvPr id="9" name="Slide Number Placeholder 8">
-            <a:extLst>
-              <a:ext uri="{FF2B5EF4-FFF2-40B4-BE49-F238E27FC236}">
-                <a16:creationId xmlns:a16="http://schemas.microsoft.com/office/drawing/2014/main" id="{5CEC3261-FF19-46C4-9731-53ECF462F5C3}"/>
-              </a:ext>
-            </a:extLst>
-          </p:cNvPr>
+          <p:cNvPr id="9" name="Slide Number Placeholder 8"/>
           <p:cNvSpPr>
             <a:spLocks noGrp="1"/>
           </p:cNvSpPr>
@@ -3911,7 +3749,7 @@
           <a:p>
             <a:fld id="{C5DB2A98-4B90-4FDA-B1BD-5751ADF6E510}" type="slidenum">
               <a:rPr lang="en-US" smtClean="0"/>
-              <a:t>‹#›</a:t>
+              <a:t>‹Nr.›</a:t>
             </a:fld>
             <a:endParaRPr lang="en-US"/>
           </a:p>
@@ -3920,7 +3758,7 @@
     </p:spTree>
     <p:extLst>
       <p:ext uri="{BB962C8B-B14F-4D97-AF65-F5344CB8AC3E}">
-        <p14:creationId xmlns:p14="http://schemas.microsoft.com/office/powerpoint/2010/main" val="3608883907"/>
+        <p14:creationId xmlns:p14="http://schemas.microsoft.com/office/powerpoint/2010/main" val="3118555110"/>
       </p:ext>
     </p:extLst>
   </p:cSld>
@@ -3932,7 +3770,7 @@
 
 <file path=ppt/slideLayouts/slideLayout6.xml><?xml version="1.0" encoding="utf-8"?>
 <p:sldLayout xmlns:a="http://schemas.openxmlformats.org/drawingml/2006/main" xmlns:r="http://schemas.openxmlformats.org/officeDocument/2006/relationships" xmlns:p="http://schemas.openxmlformats.org/presentationml/2006/main" type="titleOnly" preserve="1">
-  <p:cSld name="Title Only">
+  <p:cSld name="Nur Titel">
     <p:spTree>
       <p:nvGrpSpPr>
         <p:cNvPr id="1" name=""/>
@@ -3949,13 +3787,7 @@
       </p:grpSpPr>
       <p:sp>
         <p:nvSpPr>
-          <p:cNvPr id="2" name="Title 1">
-            <a:extLst>
-              <a:ext uri="{FF2B5EF4-FFF2-40B4-BE49-F238E27FC236}">
-                <a16:creationId xmlns:a16="http://schemas.microsoft.com/office/drawing/2014/main" id="{8B0FD027-CF56-46C2-A78E-2713D08FB9B6}"/>
-              </a:ext>
-            </a:extLst>
-          </p:cNvPr>
+          <p:cNvPr id="6" name="Title 5"/>
           <p:cNvSpPr>
             <a:spLocks noGrp="1"/>
           </p:cNvSpPr>
@@ -3969,21 +3801,16 @@
           <a:lstStyle/>
           <a:p>
             <a:r>
-              <a:rPr lang="en-US"/>
-              <a:t>Click to edit Master title style</a:t>
-            </a:r>
-          </a:p>
-        </p:txBody>
-      </p:sp>
-      <p:sp>
-        <p:nvSpPr>
-          <p:cNvPr id="3" name="Date Placeholder 2">
-            <a:extLst>
-              <a:ext uri="{FF2B5EF4-FFF2-40B4-BE49-F238E27FC236}">
-                <a16:creationId xmlns:a16="http://schemas.microsoft.com/office/drawing/2014/main" id="{472470FD-1220-4504-9A48-85C8A38E6A8F}"/>
-              </a:ext>
-            </a:extLst>
-          </p:cNvPr>
+              <a:rPr lang="de-DE"/>
+              <a:t>Mastertitelformat bearbeiten</a:t>
+            </a:r>
+            <a:endParaRPr lang="en-US" dirty="0"/>
+          </a:p>
+        </p:txBody>
+      </p:sp>
+      <p:sp>
+        <p:nvSpPr>
+          <p:cNvPr id="3" name="Date Placeholder 2"/>
           <p:cNvSpPr>
             <a:spLocks noGrp="1"/>
           </p:cNvSpPr>
@@ -4006,13 +3833,7 @@
       </p:sp>
       <p:sp>
         <p:nvSpPr>
-          <p:cNvPr id="4" name="Footer Placeholder 3">
-            <a:extLst>
-              <a:ext uri="{FF2B5EF4-FFF2-40B4-BE49-F238E27FC236}">
-                <a16:creationId xmlns:a16="http://schemas.microsoft.com/office/drawing/2014/main" id="{B60F3161-CD60-4507-8D51-7C94B2568044}"/>
-              </a:ext>
-            </a:extLst>
-          </p:cNvPr>
+          <p:cNvPr id="4" name="Footer Placeholder 3"/>
           <p:cNvSpPr>
             <a:spLocks noGrp="1"/>
           </p:cNvSpPr>
@@ -4031,13 +3852,7 @@
       </p:sp>
       <p:sp>
         <p:nvSpPr>
-          <p:cNvPr id="5" name="Slide Number Placeholder 4">
-            <a:extLst>
-              <a:ext uri="{FF2B5EF4-FFF2-40B4-BE49-F238E27FC236}">
-                <a16:creationId xmlns:a16="http://schemas.microsoft.com/office/drawing/2014/main" id="{564849CA-E323-490F-A707-1F088D6C32BB}"/>
-              </a:ext>
-            </a:extLst>
-          </p:cNvPr>
+          <p:cNvPr id="5" name="Slide Number Placeholder 4"/>
           <p:cNvSpPr>
             <a:spLocks noGrp="1"/>
           </p:cNvSpPr>
@@ -4052,7 +3867,7 @@
           <a:p>
             <a:fld id="{C5DB2A98-4B90-4FDA-B1BD-5751ADF6E510}" type="slidenum">
               <a:rPr lang="en-US" smtClean="0"/>
-              <a:t>‹#›</a:t>
+              <a:t>‹Nr.›</a:t>
             </a:fld>
             <a:endParaRPr lang="en-US"/>
           </a:p>
@@ -4061,7 +3876,7 @@
     </p:spTree>
     <p:extLst>
       <p:ext uri="{BB962C8B-B14F-4D97-AF65-F5344CB8AC3E}">
-        <p14:creationId xmlns:p14="http://schemas.microsoft.com/office/powerpoint/2010/main" val="1777974171"/>
+        <p14:creationId xmlns:p14="http://schemas.microsoft.com/office/powerpoint/2010/main" val="2611587079"/>
       </p:ext>
     </p:extLst>
   </p:cSld>
@@ -4073,7 +3888,7 @@
 
 <file path=ppt/slideLayouts/slideLayout7.xml><?xml version="1.0" encoding="utf-8"?>
 <p:sldLayout xmlns:a="http://schemas.openxmlformats.org/drawingml/2006/main" xmlns:r="http://schemas.openxmlformats.org/officeDocument/2006/relationships" xmlns:p="http://schemas.openxmlformats.org/presentationml/2006/main" type="blank" preserve="1">
-  <p:cSld name="Blank">
+  <p:cSld name="Leer">
     <p:spTree>
       <p:nvGrpSpPr>
         <p:cNvPr id="1" name=""/>
@@ -4090,13 +3905,7 @@
       </p:grpSpPr>
       <p:sp>
         <p:nvSpPr>
-          <p:cNvPr id="2" name="Date Placeholder 1">
-            <a:extLst>
-              <a:ext uri="{FF2B5EF4-FFF2-40B4-BE49-F238E27FC236}">
-                <a16:creationId xmlns:a16="http://schemas.microsoft.com/office/drawing/2014/main" id="{F2B6C28D-3F2B-4D5A-BA3E-3FB6CF48A49C}"/>
-              </a:ext>
-            </a:extLst>
-          </p:cNvPr>
+          <p:cNvPr id="2" name="Date Placeholder 1"/>
           <p:cNvSpPr>
             <a:spLocks noGrp="1"/>
           </p:cNvSpPr>
@@ -4119,13 +3928,7 @@
       </p:sp>
       <p:sp>
         <p:nvSpPr>
-          <p:cNvPr id="3" name="Footer Placeholder 2">
-            <a:extLst>
-              <a:ext uri="{FF2B5EF4-FFF2-40B4-BE49-F238E27FC236}">
-                <a16:creationId xmlns:a16="http://schemas.microsoft.com/office/drawing/2014/main" id="{EA5F7603-5811-48D1-9419-8DB70C69DB9D}"/>
-              </a:ext>
-            </a:extLst>
-          </p:cNvPr>
+          <p:cNvPr id="3" name="Footer Placeholder 2"/>
           <p:cNvSpPr>
             <a:spLocks noGrp="1"/>
           </p:cNvSpPr>
@@ -4144,13 +3947,7 @@
       </p:sp>
       <p:sp>
         <p:nvSpPr>
-          <p:cNvPr id="4" name="Slide Number Placeholder 3">
-            <a:extLst>
-              <a:ext uri="{FF2B5EF4-FFF2-40B4-BE49-F238E27FC236}">
-                <a16:creationId xmlns:a16="http://schemas.microsoft.com/office/drawing/2014/main" id="{4A8A8AF5-96F7-4590-B6C5-C4E7CCFABBF4}"/>
-              </a:ext>
-            </a:extLst>
-          </p:cNvPr>
+          <p:cNvPr id="4" name="Slide Number Placeholder 3"/>
           <p:cNvSpPr>
             <a:spLocks noGrp="1"/>
           </p:cNvSpPr>
@@ -4165,7 +3962,7 @@
           <a:p>
             <a:fld id="{C5DB2A98-4B90-4FDA-B1BD-5751ADF6E510}" type="slidenum">
               <a:rPr lang="en-US" smtClean="0"/>
-              <a:t>‹#›</a:t>
+              <a:t>‹Nr.›</a:t>
             </a:fld>
             <a:endParaRPr lang="en-US"/>
           </a:p>
@@ -4174,7 +3971,7 @@
     </p:spTree>
     <p:extLst>
       <p:ext uri="{BB962C8B-B14F-4D97-AF65-F5344CB8AC3E}">
-        <p14:creationId xmlns:p14="http://schemas.microsoft.com/office/powerpoint/2010/main" val="4011728247"/>
+        <p14:creationId xmlns:p14="http://schemas.microsoft.com/office/powerpoint/2010/main" val="2139429730"/>
       </p:ext>
     </p:extLst>
   </p:cSld>
@@ -4186,7 +3983,7 @@
 
 <file path=ppt/slideLayouts/slideLayout8.xml><?xml version="1.0" encoding="utf-8"?>
 <p:sldLayout xmlns:a="http://schemas.openxmlformats.org/drawingml/2006/main" xmlns:r="http://schemas.openxmlformats.org/officeDocument/2006/relationships" xmlns:p="http://schemas.openxmlformats.org/presentationml/2006/main" type="objTx" preserve="1">
-  <p:cSld name="Content with Caption">
+  <p:cSld name="Inhalt mit Überschrift">
     <p:spTree>
       <p:nvGrpSpPr>
         <p:cNvPr id="1" name=""/>
@@ -4203,50 +4000,83 @@
       </p:grpSpPr>
       <p:sp>
         <p:nvSpPr>
-          <p:cNvPr id="2" name="Title 1">
-            <a:extLst>
-              <a:ext uri="{FF2B5EF4-FFF2-40B4-BE49-F238E27FC236}">
-                <a16:creationId xmlns:a16="http://schemas.microsoft.com/office/drawing/2014/main" id="{A28D65CD-14E3-43FD-91FC-66C23B83B6B3}"/>
-              </a:ext>
-            </a:extLst>
-          </p:cNvPr>
-          <p:cNvSpPr>
-            <a:spLocks noGrp="1"/>
-          </p:cNvSpPr>
-          <p:nvPr>
-            <p:ph type="title"/>
-          </p:nvPr>
+          <p:cNvPr id="2" name="Rectangle 1"/>
+          <p:cNvSpPr/>
+          <p:nvPr/>
         </p:nvSpPr>
         <p:spPr>
           <a:xfrm>
-            <a:off x="839788" y="457200"/>
-            <a:ext cx="3932237" cy="1600200"/>
+            <a:off x="7620000" y="0"/>
+            <a:ext cx="4572000" cy="6858000"/>
+          </a:xfrm>
+          <a:prstGeom prst="rect">
+            <a:avLst/>
+          </a:prstGeom>
+          <a:ln>
+            <a:noFill/>
+          </a:ln>
+        </p:spPr>
+        <p:style>
+          <a:lnRef idx="2">
+            <a:schemeClr val="accent1">
+              <a:shade val="50000"/>
+            </a:schemeClr>
+          </a:lnRef>
+          <a:fillRef idx="1">
+            <a:schemeClr val="accent1"/>
+          </a:fillRef>
+          <a:effectRef idx="0">
+            <a:schemeClr val="accent1"/>
+          </a:effectRef>
+          <a:fontRef idx="minor">
+            <a:schemeClr val="lt1"/>
+          </a:fontRef>
+        </p:style>
+      </p:sp>
+      <p:sp>
+        <p:nvSpPr>
+          <p:cNvPr id="9" name="Title 8"/>
+          <p:cNvSpPr>
+            <a:spLocks noGrp="1"/>
+          </p:cNvSpPr>
+          <p:nvPr>
+            <p:ph type="title"/>
+          </p:nvPr>
+        </p:nvSpPr>
+        <p:spPr>
+          <a:xfrm>
+            <a:off x="8261404" y="542282"/>
+            <a:ext cx="3383280" cy="1920240"/>
           </a:xfrm>
         </p:spPr>
         <p:txBody>
-          <a:bodyPr anchor="b"/>
+          <a:bodyPr anchor="b">
+            <a:noAutofit/>
+          </a:bodyPr>
           <a:lstStyle>
             <a:lvl1pPr>
-              <a:defRPr sz="3200"/>
+              <a:lnSpc>
+                <a:spcPct val="85000"/>
+              </a:lnSpc>
+              <a:defRPr sz="4000">
+                <a:solidFill>
+                  <a:srgbClr val="FFFFFF"/>
+                </a:solidFill>
+              </a:defRPr>
             </a:lvl1pPr>
           </a:lstStyle>
           <a:p>
             <a:r>
-              <a:rPr lang="en-US"/>
-              <a:t>Click to edit Master title style</a:t>
-            </a:r>
-          </a:p>
-        </p:txBody>
-      </p:sp>
-      <p:sp>
-        <p:nvSpPr>
-          <p:cNvPr id="3" name="Content Placeholder 2">
-            <a:extLst>
-              <a:ext uri="{FF2B5EF4-FFF2-40B4-BE49-F238E27FC236}">
-                <a16:creationId xmlns:a16="http://schemas.microsoft.com/office/drawing/2014/main" id="{10681865-2ABD-4FBD-B8B1-91C3A02E6EDD}"/>
-              </a:ext>
-            </a:extLst>
-          </p:cNvPr>
+              <a:rPr lang="de-DE"/>
+              <a:t>Mastertitelformat bearbeiten</a:t>
+            </a:r>
+            <a:endParaRPr lang="en-US" dirty="0"/>
+          </a:p>
+        </p:txBody>
+      </p:sp>
+      <p:sp>
+        <p:nvSpPr>
+          <p:cNvPr id="3" name="Content Placeholder 2"/>
           <p:cNvSpPr>
             <a:spLocks noGrp="1"/>
           </p:cNvSpPr>
@@ -4256,8 +4086,8 @@
         </p:nvSpPr>
         <p:spPr>
           <a:xfrm>
-            <a:off x="5183188" y="987425"/>
-            <a:ext cx="6172200" cy="4873625"/>
+            <a:off x="762000" y="762000"/>
+            <a:ext cx="6096000" cy="4572000"/>
           </a:xfrm>
         </p:spPr>
         <p:txBody>
@@ -4294,49 +4124,44 @@
           <a:p>
             <a:pPr lvl="0"/>
             <a:r>
-              <a:rPr lang="en-US"/>
-              <a:t>Click to edit Master text styles</a:t>
+              <a:rPr lang="de-DE"/>
+              <a:t>Mastertextformat bearbeiten</a:t>
             </a:r>
           </a:p>
           <a:p>
             <a:pPr lvl="1"/>
             <a:r>
-              <a:rPr lang="en-US"/>
-              <a:t>Second level</a:t>
+              <a:rPr lang="de-DE"/>
+              <a:t>Zweite Ebene</a:t>
             </a:r>
           </a:p>
           <a:p>
             <a:pPr lvl="2"/>
             <a:r>
-              <a:rPr lang="en-US"/>
-              <a:t>Third level</a:t>
+              <a:rPr lang="de-DE"/>
+              <a:t>Dritte Ebene</a:t>
             </a:r>
           </a:p>
           <a:p>
             <a:pPr lvl="3"/>
             <a:r>
-              <a:rPr lang="en-US"/>
-              <a:t>Fourth level</a:t>
+              <a:rPr lang="de-DE"/>
+              <a:t>Vierte Ebene</a:t>
             </a:r>
           </a:p>
           <a:p>
             <a:pPr lvl="4"/>
             <a:r>
-              <a:rPr lang="en-US"/>
-              <a:t>Fifth level</a:t>
-            </a:r>
-          </a:p>
-        </p:txBody>
-      </p:sp>
-      <p:sp>
-        <p:nvSpPr>
-          <p:cNvPr id="4" name="Text Placeholder 3">
-            <a:extLst>
-              <a:ext uri="{FF2B5EF4-FFF2-40B4-BE49-F238E27FC236}">
-                <a16:creationId xmlns:a16="http://schemas.microsoft.com/office/drawing/2014/main" id="{8DC8CBD7-0DA2-4BD0-9B18-3AB4EC50D8BF}"/>
-              </a:ext>
-            </a:extLst>
-          </p:cNvPr>
+              <a:rPr lang="de-DE"/>
+              <a:t>Fünfte Ebene</a:t>
+            </a:r>
+            <a:endParaRPr lang="en-US" dirty="0"/>
+          </a:p>
+        </p:txBody>
+      </p:sp>
+      <p:sp>
+        <p:nvSpPr>
+          <p:cNvPr id="4" name="Text Placeholder 3"/>
           <p:cNvSpPr>
             <a:spLocks noGrp="1"/>
           </p:cNvSpPr>
@@ -4346,68 +4171,97 @@
         </p:nvSpPr>
         <p:spPr>
           <a:xfrm>
-            <a:off x="839788" y="2057400"/>
-            <a:ext cx="3932237" cy="3811588"/>
+            <a:off x="8275982" y="2511813"/>
+            <a:ext cx="3398520" cy="3126987"/>
           </a:xfrm>
         </p:spPr>
         <p:txBody>
-          <a:bodyPr/>
+          <a:bodyPr>
+            <a:normAutofit/>
+          </a:bodyPr>
           <a:lstStyle>
-            <a:lvl1pPr marL="0" indent="0">
+            <a:lvl1pPr marL="0" marR="0" indent="0" algn="l" defTabSz="914400" rtl="0" eaLnBrk="1" fontAlgn="auto" latinLnBrk="0" hangingPunct="1">
+              <a:lnSpc>
+                <a:spcPct val="100000"/>
+              </a:lnSpc>
+              <a:spcBef>
+                <a:spcPts val="1200"/>
+              </a:spcBef>
+              <a:spcAft>
+                <a:spcPts val="0"/>
+              </a:spcAft>
+              <a:buClrTx/>
+              <a:buSzTx/>
+              <a:buFontTx/>
               <a:buNone/>
-              <a:defRPr sz="1600"/>
+              <a:tabLst/>
+              <a:defRPr sz="1800">
+                <a:solidFill>
+                  <a:srgbClr val="262626"/>
+                </a:solidFill>
+              </a:defRPr>
             </a:lvl1pPr>
             <a:lvl2pPr marL="457200" indent="0">
               <a:buNone/>
-              <a:defRPr sz="1400"/>
+              <a:defRPr sz="1200"/>
             </a:lvl2pPr>
             <a:lvl3pPr marL="914400" indent="0">
               <a:buNone/>
-              <a:defRPr sz="1200"/>
+              <a:defRPr sz="1000"/>
             </a:lvl3pPr>
             <a:lvl4pPr marL="1371600" indent="0">
               <a:buNone/>
-              <a:defRPr sz="1000"/>
+              <a:defRPr sz="900"/>
             </a:lvl4pPr>
             <a:lvl5pPr marL="1828800" indent="0">
               <a:buNone/>
-              <a:defRPr sz="1000"/>
+              <a:defRPr sz="900"/>
             </a:lvl5pPr>
             <a:lvl6pPr marL="2286000" indent="0">
               <a:buNone/>
-              <a:defRPr sz="1000"/>
+              <a:defRPr sz="900"/>
             </a:lvl6pPr>
             <a:lvl7pPr marL="2743200" indent="0">
               <a:buNone/>
-              <a:defRPr sz="1000"/>
+              <a:defRPr sz="900"/>
             </a:lvl7pPr>
             <a:lvl8pPr marL="3200400" indent="0">
               <a:buNone/>
-              <a:defRPr sz="1000"/>
+              <a:defRPr sz="900"/>
             </a:lvl8pPr>
             <a:lvl9pPr marL="3657600" indent="0">
               <a:buNone/>
-              <a:defRPr sz="1000"/>
+              <a:defRPr sz="900"/>
             </a:lvl9pPr>
           </a:lstStyle>
           <a:p>
-            <a:pPr lvl="0"/>
-            <a:r>
-              <a:rPr lang="en-US"/>
-              <a:t>Click to edit Master text styles</a:t>
-            </a:r>
-          </a:p>
-        </p:txBody>
-      </p:sp>
-      <p:sp>
-        <p:nvSpPr>
-          <p:cNvPr id="5" name="Date Placeholder 4">
-            <a:extLst>
-              <a:ext uri="{FF2B5EF4-FFF2-40B4-BE49-F238E27FC236}">
-                <a16:creationId xmlns:a16="http://schemas.microsoft.com/office/drawing/2014/main" id="{1C5A5346-E283-43A2-993E-C7CE49E24C0C}"/>
-              </a:ext>
-            </a:extLst>
-          </p:cNvPr>
+            <a:pPr marL="0" marR="0" lvl="0" indent="0" algn="l" defTabSz="914400" rtl="0" eaLnBrk="1" fontAlgn="auto" latinLnBrk="0" hangingPunct="1">
+              <a:lnSpc>
+                <a:spcPct val="100000"/>
+              </a:lnSpc>
+              <a:spcBef>
+                <a:spcPts val="1400"/>
+              </a:spcBef>
+              <a:spcAft>
+                <a:spcPts val="0"/>
+              </a:spcAft>
+              <a:buClrTx/>
+              <a:buSzTx/>
+              <a:buFontTx/>
+              <a:buNone/>
+              <a:tabLst/>
+              <a:defRPr/>
+            </a:pPr>
+            <a:r>
+              <a:rPr lang="de-DE"/>
+              <a:t>Mastertextformat bearbeiten</a:t>
+            </a:r>
+          </a:p>
+        </p:txBody>
+      </p:sp>
+      <p:sp>
+        <p:nvSpPr>
+          <p:cNvPr id="5" name="Date Placeholder 4"/>
           <p:cNvSpPr>
             <a:spLocks noGrp="1"/>
           </p:cNvSpPr>
@@ -4430,13 +4284,7 @@
       </p:sp>
       <p:sp>
         <p:nvSpPr>
-          <p:cNvPr id="6" name="Footer Placeholder 5">
-            <a:extLst>
-              <a:ext uri="{FF2B5EF4-FFF2-40B4-BE49-F238E27FC236}">
-                <a16:creationId xmlns:a16="http://schemas.microsoft.com/office/drawing/2014/main" id="{CD0D77A4-8718-4301-B17C-D3BA3AE065D4}"/>
-              </a:ext>
-            </a:extLst>
-          </p:cNvPr>
+          <p:cNvPr id="6" name="Footer Placeholder 5"/>
           <p:cNvSpPr>
             <a:spLocks noGrp="1"/>
           </p:cNvSpPr>
@@ -4455,13 +4303,7 @@
       </p:sp>
       <p:sp>
         <p:nvSpPr>
-          <p:cNvPr id="7" name="Slide Number Placeholder 6">
-            <a:extLst>
-              <a:ext uri="{FF2B5EF4-FFF2-40B4-BE49-F238E27FC236}">
-                <a16:creationId xmlns:a16="http://schemas.microsoft.com/office/drawing/2014/main" id="{F3BA194F-41C2-4769-A187-0E9B0C982AAD}"/>
-              </a:ext>
-            </a:extLst>
-          </p:cNvPr>
+          <p:cNvPr id="7" name="Slide Number Placeholder 6"/>
           <p:cNvSpPr>
             <a:spLocks noGrp="1"/>
           </p:cNvSpPr>
@@ -4472,11 +4314,21 @@
         <p:spPr/>
         <p:txBody>
           <a:bodyPr/>
-          <a:lstStyle/>
+          <a:lstStyle>
+            <a:lvl1pPr>
+              <a:defRPr>
+                <a:solidFill>
+                  <a:srgbClr val="FFFFFF">
+                    <a:alpha val="20000"/>
+                  </a:srgbClr>
+                </a:solidFill>
+              </a:defRPr>
+            </a:lvl1pPr>
+          </a:lstStyle>
           <a:p>
             <a:fld id="{C5DB2A98-4B90-4FDA-B1BD-5751ADF6E510}" type="slidenum">
               <a:rPr lang="en-US" smtClean="0"/>
-              <a:t>‹#›</a:t>
+              <a:t>‹Nr.›</a:t>
             </a:fld>
             <a:endParaRPr lang="en-US"/>
           </a:p>
@@ -4485,7 +4337,7 @@
     </p:spTree>
     <p:extLst>
       <p:ext uri="{BB962C8B-B14F-4D97-AF65-F5344CB8AC3E}">
-        <p14:creationId xmlns:p14="http://schemas.microsoft.com/office/powerpoint/2010/main" val="3834446746"/>
+        <p14:creationId xmlns:p14="http://schemas.microsoft.com/office/powerpoint/2010/main" val="2893613041"/>
       </p:ext>
     </p:extLst>
   </p:cSld>
@@ -4497,7 +4349,15 @@
 
 <file path=ppt/slideLayouts/slideLayout9.xml><?xml version="1.0" encoding="utf-8"?>
 <p:sldLayout xmlns:a="http://schemas.openxmlformats.org/drawingml/2006/main" xmlns:r="http://schemas.openxmlformats.org/officeDocument/2006/relationships" xmlns:p="http://schemas.openxmlformats.org/presentationml/2006/main" type="picTx" preserve="1">
-  <p:cSld name="Picture with Caption">
+  <p:cSld name="Bild mit Überschrift">
+    <p:bg>
+      <p:bgPr>
+        <a:solidFill>
+          <a:schemeClr val="accent1"/>
+        </a:solidFill>
+        <a:effectLst/>
+      </p:bgPr>
+    </p:bg>
     <p:spTree>
       <p:nvGrpSpPr>
         <p:cNvPr id="1" name=""/>
@@ -4514,13 +4374,7 @@
       </p:grpSpPr>
       <p:sp>
         <p:nvSpPr>
-          <p:cNvPr id="2" name="Title 1">
-            <a:extLst>
-              <a:ext uri="{FF2B5EF4-FFF2-40B4-BE49-F238E27FC236}">
-                <a16:creationId xmlns:a16="http://schemas.microsoft.com/office/drawing/2014/main" id="{C52C3269-6522-4F75-AC61-BCD0C233D72B}"/>
-              </a:ext>
-            </a:extLst>
-          </p:cNvPr>
+          <p:cNvPr id="2" name="Title 1"/>
           <p:cNvSpPr>
             <a:spLocks noGrp="1"/>
           </p:cNvSpPr>
@@ -4530,36 +4384,37 @@
         </p:nvSpPr>
         <p:spPr>
           <a:xfrm>
-            <a:off x="839788" y="457200"/>
-            <a:ext cx="3932237" cy="1600200"/>
+            <a:off x="649224" y="5418667"/>
+            <a:ext cx="10780776" cy="613283"/>
           </a:xfrm>
         </p:spPr>
         <p:txBody>
-          <a:bodyPr anchor="b"/>
+          <a:bodyPr anchor="b">
+            <a:normAutofit/>
+          </a:bodyPr>
           <a:lstStyle>
             <a:lvl1pPr>
-              <a:defRPr sz="3200"/>
+              <a:defRPr sz="3200" b="0">
+                <a:solidFill>
+                  <a:srgbClr val="FFFFFF"/>
+                </a:solidFill>
+              </a:defRPr>
             </a:lvl1pPr>
           </a:lstStyle>
           <a:p>
             <a:r>
-              <a:rPr lang="en-US"/>
-              <a:t>Click to edit Master title style</a:t>
-            </a:r>
-          </a:p>
-        </p:txBody>
-      </p:sp>
-      <p:sp>
-        <p:nvSpPr>
-          <p:cNvPr id="3" name="Picture Placeholder 2">
-            <a:extLst>
-              <a:ext uri="{FF2B5EF4-FFF2-40B4-BE49-F238E27FC236}">
-                <a16:creationId xmlns:a16="http://schemas.microsoft.com/office/drawing/2014/main" id="{6D24EA8A-2557-41A2-B1EC-356B96639750}"/>
-              </a:ext>
-            </a:extLst>
-          </p:cNvPr>
-          <p:cNvSpPr>
-            <a:spLocks noGrp="1"/>
+              <a:rPr lang="de-DE"/>
+              <a:t>Mastertitelformat bearbeiten</a:t>
+            </a:r>
+            <a:endParaRPr lang="en-US" dirty="0"/>
+          </a:p>
+        </p:txBody>
+      </p:sp>
+      <p:sp>
+        <p:nvSpPr>
+          <p:cNvPr id="3" name="Picture Placeholder 2"/>
+          <p:cNvSpPr>
+            <a:spLocks noGrp="1" noChangeAspect="1"/>
           </p:cNvSpPr>
           <p:nvPr>
             <p:ph type="pic" idx="1"/>
@@ -4567,16 +4422,32 @@
         </p:nvSpPr>
         <p:spPr>
           <a:xfrm>
-            <a:off x="5183188" y="987425"/>
-            <a:ext cx="6172200" cy="4873625"/>
+            <a:off x="0" y="0"/>
+            <a:ext cx="12192000" cy="5330952"/>
           </a:xfrm>
+          <a:solidFill>
+            <a:schemeClr val="accent1">
+              <a:lumMod val="20000"/>
+              <a:lumOff val="80000"/>
+            </a:schemeClr>
+          </a:solidFill>
         </p:spPr>
         <p:txBody>
-          <a:bodyPr/>
+          <a:bodyPr anchor="t"/>
           <a:lstStyle>
-            <a:lvl1pPr marL="0" indent="0">
+            <a:lvl1pPr marL="0" indent="0" algn="ctr">
+              <a:spcBef>
+                <a:spcPts val="800"/>
+              </a:spcBef>
               <a:buNone/>
-              <a:defRPr sz="3200"/>
+              <a:defRPr sz="3200">
+                <a:solidFill>
+                  <a:schemeClr val="tx1">
+                    <a:lumMod val="75000"/>
+                    <a:lumOff val="25000"/>
+                  </a:schemeClr>
+                </a:solidFill>
+              </a:defRPr>
             </a:lvl1pPr>
             <a:lvl2pPr marL="457200" indent="0">
               <a:buNone/>
@@ -4612,19 +4483,17 @@
             </a:lvl9pPr>
           </a:lstStyle>
           <a:p>
-            <a:endParaRPr lang="en-US"/>
-          </a:p>
-        </p:txBody>
-      </p:sp>
-      <p:sp>
-        <p:nvSpPr>
-          <p:cNvPr id="4" name="Text Placeholder 3">
-            <a:extLst>
-              <a:ext uri="{FF2B5EF4-FFF2-40B4-BE49-F238E27FC236}">
-                <a16:creationId xmlns:a16="http://schemas.microsoft.com/office/drawing/2014/main" id="{22E4B7F1-A541-4BF9-90B7-89390F073F1A}"/>
-              </a:ext>
-            </a:extLst>
-          </p:cNvPr>
+            <a:r>
+              <a:rPr lang="de-DE"/>
+              <a:t>Bild durch Klicken auf Symbol hinzufügen</a:t>
+            </a:r>
+            <a:endParaRPr lang="en-US" dirty="0"/>
+          </a:p>
+        </p:txBody>
+      </p:sp>
+      <p:sp>
+        <p:nvSpPr>
+          <p:cNvPr id="4" name="Text Placeholder 3"/>
           <p:cNvSpPr>
             <a:spLocks noGrp="1"/>
           </p:cNvSpPr>
@@ -4634,68 +4503,71 @@
         </p:nvSpPr>
         <p:spPr>
           <a:xfrm>
-            <a:off x="839788" y="2057400"/>
-            <a:ext cx="3932237" cy="3811588"/>
+            <a:off x="676656" y="5909735"/>
+            <a:ext cx="9229344" cy="533400"/>
           </a:xfrm>
         </p:spPr>
         <p:txBody>
-          <a:bodyPr/>
+          <a:bodyPr>
+            <a:normAutofit/>
+          </a:bodyPr>
           <a:lstStyle>
             <a:lvl1pPr marL="0" indent="0">
+              <a:lnSpc>
+                <a:spcPct val="90000"/>
+              </a:lnSpc>
               <a:buNone/>
-              <a:defRPr sz="1600"/>
+              <a:defRPr sz="1400">
+                <a:solidFill>
+                  <a:srgbClr val="262626"/>
+                </a:solidFill>
+              </a:defRPr>
             </a:lvl1pPr>
             <a:lvl2pPr marL="457200" indent="0">
               <a:buNone/>
-              <a:defRPr sz="1400"/>
+              <a:defRPr sz="1200"/>
             </a:lvl2pPr>
             <a:lvl3pPr marL="914400" indent="0">
               <a:buNone/>
-              <a:defRPr sz="1200"/>
+              <a:defRPr sz="1000"/>
             </a:lvl3pPr>
             <a:lvl4pPr marL="1371600" indent="0">
               <a:buNone/>
-              <a:defRPr sz="1000"/>
+              <a:defRPr sz="900"/>
             </a:lvl4pPr>
             <a:lvl5pPr marL="1828800" indent="0">
               <a:buNone/>
-              <a:defRPr sz="1000"/>
+              <a:defRPr sz="900"/>
             </a:lvl5pPr>
             <a:lvl6pPr marL="2286000" indent="0">
               <a:buNone/>
-              <a:defRPr sz="1000"/>
+              <a:defRPr sz="900"/>
             </a:lvl6pPr>
             <a:lvl7pPr marL="2743200" indent="0">
               <a:buNone/>
-              <a:defRPr sz="1000"/>
+              <a:defRPr sz="900"/>
             </a:lvl7pPr>
             <a:lvl8pPr marL="3200400" indent="0">
               <a:buNone/>
-              <a:defRPr sz="1000"/>
+              <a:defRPr sz="900"/>
             </a:lvl8pPr>
             <a:lvl9pPr marL="3657600" indent="0">
               <a:buNone/>
-              <a:defRPr sz="1000"/>
+              <a:defRPr sz="900"/>
             </a:lvl9pPr>
           </a:lstStyle>
           <a:p>
             <a:pPr lvl="0"/>
             <a:r>
-              <a:rPr lang="en-US"/>
-              <a:t>Click to edit Master text styles</a:t>
-            </a:r>
-          </a:p>
-        </p:txBody>
-      </p:sp>
-      <p:sp>
-        <p:nvSpPr>
-          <p:cNvPr id="5" name="Date Placeholder 4">
-            <a:extLst>
-              <a:ext uri="{FF2B5EF4-FFF2-40B4-BE49-F238E27FC236}">
-                <a16:creationId xmlns:a16="http://schemas.microsoft.com/office/drawing/2014/main" id="{5CC2C717-99E0-4729-A11A-3F95486F667C}"/>
-              </a:ext>
-            </a:extLst>
-          </p:cNvPr>
+              <a:rPr lang="de-DE"/>
+              <a:t>Mastertextformat bearbeiten</a:t>
+            </a:r>
+          </a:p>
+        </p:txBody>
+      </p:sp>
+      <p:sp>
+        <p:nvSpPr>
+          <p:cNvPr id="12" name="Date Placeholder 11"/>
           <p:cNvSpPr>
             <a:spLocks noGrp="1"/>
           </p:cNvSpPr>
@@ -4706,7 +4578,17 @@
         <p:spPr/>
         <p:txBody>
           <a:bodyPr/>
-          <a:lstStyle/>
+          <a:lstStyle>
+            <a:lvl1pPr>
+              <a:defRPr>
+                <a:solidFill>
+                  <a:srgbClr val="FFFFFF">
+                    <a:alpha val="80000"/>
+                  </a:srgbClr>
+                </a:solidFill>
+              </a:defRPr>
+            </a:lvl1pPr>
+          </a:lstStyle>
           <a:p>
             <a:fld id="{DCDACB0D-BBD2-40D0-A893-CF04513F27FC}" type="datetimeFigureOut">
               <a:rPr lang="en-US" smtClean="0"/>
@@ -4718,13 +4600,7 @@
       </p:sp>
       <p:sp>
         <p:nvSpPr>
-          <p:cNvPr id="6" name="Footer Placeholder 5">
-            <a:extLst>
-              <a:ext uri="{FF2B5EF4-FFF2-40B4-BE49-F238E27FC236}">
-                <a16:creationId xmlns:a16="http://schemas.microsoft.com/office/drawing/2014/main" id="{EDB9A02B-3AF7-42AF-9D89-347FF3B481B8}"/>
-              </a:ext>
-            </a:extLst>
-          </p:cNvPr>
+          <p:cNvPr id="13" name="Footer Placeholder 12"/>
           <p:cNvSpPr>
             <a:spLocks noGrp="1"/>
           </p:cNvSpPr>
@@ -4735,7 +4611,17 @@
         <p:spPr/>
         <p:txBody>
           <a:bodyPr/>
-          <a:lstStyle/>
+          <a:lstStyle>
+            <a:lvl1pPr>
+              <a:defRPr>
+                <a:solidFill>
+                  <a:srgbClr val="FFFFFF">
+                    <a:alpha val="80000"/>
+                  </a:srgbClr>
+                </a:solidFill>
+              </a:defRPr>
+            </a:lvl1pPr>
+          </a:lstStyle>
           <a:p>
             <a:endParaRPr lang="en-US"/>
           </a:p>
@@ -4743,13 +4629,7 @@
       </p:sp>
       <p:sp>
         <p:nvSpPr>
-          <p:cNvPr id="7" name="Slide Number Placeholder 6">
-            <a:extLst>
-              <a:ext uri="{FF2B5EF4-FFF2-40B4-BE49-F238E27FC236}">
-                <a16:creationId xmlns:a16="http://schemas.microsoft.com/office/drawing/2014/main" id="{1A89B780-491E-4724-A316-1798B1E8503A}"/>
-              </a:ext>
-            </a:extLst>
-          </p:cNvPr>
+          <p:cNvPr id="14" name="Slide Number Placeholder 13"/>
           <p:cNvSpPr>
             <a:spLocks noGrp="1"/>
           </p:cNvSpPr>
@@ -4760,11 +4640,21 @@
         <p:spPr/>
         <p:txBody>
           <a:bodyPr/>
-          <a:lstStyle/>
+          <a:lstStyle>
+            <a:lvl1pPr>
+              <a:defRPr>
+                <a:solidFill>
+                  <a:srgbClr val="FFFFFF">
+                    <a:alpha val="25000"/>
+                  </a:srgbClr>
+                </a:solidFill>
+              </a:defRPr>
+            </a:lvl1pPr>
+          </a:lstStyle>
           <a:p>
             <a:fld id="{C5DB2A98-4B90-4FDA-B1BD-5751ADF6E510}" type="slidenum">
               <a:rPr lang="en-US" smtClean="0"/>
-              <a:t>‹#›</a:t>
+              <a:t>‹Nr.›</a:t>
             </a:fld>
             <a:endParaRPr lang="en-US"/>
           </a:p>
@@ -4773,12 +4663,12 @@
     </p:spTree>
     <p:extLst>
       <p:ext uri="{BB962C8B-B14F-4D97-AF65-F5344CB8AC3E}">
-        <p14:creationId xmlns:p14="http://schemas.microsoft.com/office/powerpoint/2010/main" val="1146533467"/>
+        <p14:creationId xmlns:p14="http://schemas.microsoft.com/office/powerpoint/2010/main" val="880766891"/>
       </p:ext>
     </p:extLst>
   </p:cSld>
   <p:clrMapOvr>
-    <a:masterClrMapping/>
+    <a:overrideClrMapping bg1="lt1" tx1="dk1" bg2="lt2" tx2="dk2" accent1="accent1" accent2="accent2" accent3="accent3" accent4="accent4" accent5="accent5" accent6="accent6" hlink="hlink" folHlink="folHlink"/>
   </p:clrMapOvr>
 </p:sldLayout>
 </file>
@@ -4807,13 +4697,7 @@
       </p:grpSpPr>
       <p:sp>
         <p:nvSpPr>
-          <p:cNvPr id="2" name="Title Placeholder 1">
-            <a:extLst>
-              <a:ext uri="{FF2B5EF4-FFF2-40B4-BE49-F238E27FC236}">
-                <a16:creationId xmlns:a16="http://schemas.microsoft.com/office/drawing/2014/main" id="{CA52F102-875F-4BB2-A5C4-CF12673AD176}"/>
-              </a:ext>
-            </a:extLst>
-          </p:cNvPr>
+          <p:cNvPr id="2" name="Title Placeholder 1"/>
           <p:cNvSpPr>
             <a:spLocks noGrp="1"/>
           </p:cNvSpPr>
@@ -4823,8 +4707,8 @@
         </p:nvSpPr>
         <p:spPr>
           <a:xfrm>
-            <a:off x="838200" y="365125"/>
-            <a:ext cx="10515600" cy="1325563"/>
+            <a:off x="657224" y="499533"/>
+            <a:ext cx="10772775" cy="1658198"/>
           </a:xfrm>
           <a:prstGeom prst="rect">
             <a:avLst/>
@@ -4837,21 +4721,16 @@
           <a:lstStyle/>
           <a:p>
             <a:r>
-              <a:rPr lang="en-US"/>
-              <a:t>Click to edit Master title style</a:t>
-            </a:r>
-          </a:p>
-        </p:txBody>
-      </p:sp>
-      <p:sp>
-        <p:nvSpPr>
-          <p:cNvPr id="3" name="Text Placeholder 2">
-            <a:extLst>
-              <a:ext uri="{FF2B5EF4-FFF2-40B4-BE49-F238E27FC236}">
-                <a16:creationId xmlns:a16="http://schemas.microsoft.com/office/drawing/2014/main" id="{77A9882A-2D41-4782-9EA4-4C08C7BC58EE}"/>
-              </a:ext>
-            </a:extLst>
-          </p:cNvPr>
+              <a:rPr lang="de-DE"/>
+              <a:t>Mastertitelformat bearbeiten</a:t>
+            </a:r>
+            <a:endParaRPr lang="en-US" dirty="0"/>
+          </a:p>
+        </p:txBody>
+      </p:sp>
+      <p:sp>
+        <p:nvSpPr>
+          <p:cNvPr id="3" name="Text Placeholder 2"/>
           <p:cNvSpPr>
             <a:spLocks noGrp="1"/>
           </p:cNvSpPr>
@@ -4861,8 +4740,8 @@
         </p:nvSpPr>
         <p:spPr>
           <a:xfrm>
-            <a:off x="838200" y="1825625"/>
-            <a:ext cx="10515600" cy="4351338"/>
+            <a:off x="676656" y="2011680"/>
+            <a:ext cx="10753725" cy="3766185"/>
           </a:xfrm>
           <a:prstGeom prst="rect">
             <a:avLst/>
@@ -4876,49 +4755,44 @@
           <a:p>
             <a:pPr lvl="0"/>
             <a:r>
-              <a:rPr lang="en-US"/>
-              <a:t>Click to edit Master text styles</a:t>
+              <a:rPr lang="de-DE"/>
+              <a:t>Mastertextformat bearbeiten</a:t>
             </a:r>
           </a:p>
           <a:p>
             <a:pPr lvl="1"/>
             <a:r>
-              <a:rPr lang="en-US"/>
-              <a:t>Second level</a:t>
+              <a:rPr lang="de-DE"/>
+              <a:t>Zweite Ebene</a:t>
             </a:r>
           </a:p>
           <a:p>
             <a:pPr lvl="2"/>
             <a:r>
-              <a:rPr lang="en-US"/>
-              <a:t>Third level</a:t>
+              <a:rPr lang="de-DE"/>
+              <a:t>Dritte Ebene</a:t>
             </a:r>
           </a:p>
           <a:p>
             <a:pPr lvl="3"/>
             <a:r>
-              <a:rPr lang="en-US"/>
-              <a:t>Fourth level</a:t>
+              <a:rPr lang="de-DE"/>
+              <a:t>Vierte Ebene</a:t>
             </a:r>
           </a:p>
           <a:p>
             <a:pPr lvl="4"/>
             <a:r>
-              <a:rPr lang="en-US"/>
-              <a:t>Fifth level</a:t>
-            </a:r>
-          </a:p>
-        </p:txBody>
-      </p:sp>
-      <p:sp>
-        <p:nvSpPr>
-          <p:cNvPr id="4" name="Date Placeholder 3">
-            <a:extLst>
-              <a:ext uri="{FF2B5EF4-FFF2-40B4-BE49-F238E27FC236}">
-                <a16:creationId xmlns:a16="http://schemas.microsoft.com/office/drawing/2014/main" id="{00382CE9-DF71-41A9-8927-794850DC963B}"/>
-              </a:ext>
-            </a:extLst>
-          </p:cNvPr>
+              <a:rPr lang="de-DE"/>
+              <a:t>Fünfte Ebene</a:t>
+            </a:r>
+            <a:endParaRPr lang="en-US" dirty="0"/>
+          </a:p>
+        </p:txBody>
+      </p:sp>
+      <p:sp>
+        <p:nvSpPr>
+          <p:cNvPr id="4" name="Date Placeholder 3"/>
           <p:cNvSpPr>
             <a:spLocks noGrp="1"/>
           </p:cNvSpPr>
@@ -4928,8 +4802,8 @@
         </p:nvSpPr>
         <p:spPr>
           <a:xfrm>
-            <a:off x="838200" y="6356350"/>
-            <a:ext cx="2743200" cy="365125"/>
+            <a:off x="685800" y="6412447"/>
+            <a:ext cx="4114800" cy="228600"/>
           </a:xfrm>
           <a:prstGeom prst="rect">
             <a:avLst/>
@@ -4939,10 +4813,10 @@
           <a:bodyPr vert="horz" lIns="91440" tIns="45720" rIns="91440" bIns="45720" rtlCol="0" anchor="ctr"/>
           <a:lstStyle>
             <a:lvl1pPr algn="l">
-              <a:defRPr sz="1200">
+              <a:defRPr sz="950">
                 <a:solidFill>
                   <a:schemeClr val="tx1">
-                    <a:tint val="75000"/>
+                    <a:alpha val="80000"/>
                   </a:schemeClr>
                 </a:solidFill>
               </a:defRPr>
@@ -4959,13 +4833,7 @@
       </p:sp>
       <p:sp>
         <p:nvSpPr>
-          <p:cNvPr id="5" name="Footer Placeholder 4">
-            <a:extLst>
-              <a:ext uri="{FF2B5EF4-FFF2-40B4-BE49-F238E27FC236}">
-                <a16:creationId xmlns:a16="http://schemas.microsoft.com/office/drawing/2014/main" id="{888B9363-D769-4A32-A556-DF2585AA7082}"/>
-              </a:ext>
-            </a:extLst>
-          </p:cNvPr>
+          <p:cNvPr id="5" name="Footer Placeholder 4"/>
           <p:cNvSpPr>
             <a:spLocks noGrp="1"/>
           </p:cNvSpPr>
@@ -4975,8 +4843,8 @@
         </p:nvSpPr>
         <p:spPr>
           <a:xfrm>
-            <a:off x="4038600" y="6356350"/>
-            <a:ext cx="4114800" cy="365125"/>
+            <a:off x="685800" y="6554697"/>
+            <a:ext cx="5029200" cy="228600"/>
           </a:xfrm>
           <a:prstGeom prst="rect">
             <a:avLst/>
@@ -4985,11 +4853,11 @@
         <p:txBody>
           <a:bodyPr vert="horz" lIns="91440" tIns="45720" rIns="91440" bIns="45720" rtlCol="0" anchor="ctr"/>
           <a:lstStyle>
-            <a:lvl1pPr algn="ctr">
-              <a:defRPr sz="1200">
+            <a:lvl1pPr algn="l">
+              <a:defRPr sz="950" cap="all" baseline="0">
                 <a:solidFill>
                   <a:schemeClr val="tx1">
-                    <a:tint val="75000"/>
+                    <a:alpha val="80000"/>
                   </a:schemeClr>
                 </a:solidFill>
               </a:defRPr>
@@ -5002,13 +4870,7 @@
       </p:sp>
       <p:sp>
         <p:nvSpPr>
-          <p:cNvPr id="6" name="Slide Number Placeholder 5">
-            <a:extLst>
-              <a:ext uri="{FF2B5EF4-FFF2-40B4-BE49-F238E27FC236}">
-                <a16:creationId xmlns:a16="http://schemas.microsoft.com/office/drawing/2014/main" id="{DC7C20E3-27F2-4D1C-942A-8BF44CB4C5C6}"/>
-              </a:ext>
-            </a:extLst>
-          </p:cNvPr>
+          <p:cNvPr id="6" name="Slide Number Placeholder 5"/>
           <p:cNvSpPr>
             <a:spLocks noGrp="1"/>
           </p:cNvSpPr>
@@ -5018,30 +4880,34 @@
         </p:nvSpPr>
         <p:spPr>
           <a:xfrm>
-            <a:off x="8610600" y="6356350"/>
-            <a:ext cx="2743200" cy="365125"/>
+            <a:off x="8763926" y="5876412"/>
+            <a:ext cx="2926080" cy="1397039"/>
           </a:xfrm>
           <a:prstGeom prst="rect">
             <a:avLst/>
           </a:prstGeom>
         </p:spPr>
         <p:txBody>
-          <a:bodyPr vert="horz" lIns="91440" tIns="45720" rIns="91440" bIns="45720" rtlCol="0" anchor="ctr"/>
+          <a:bodyPr vert="horz" lIns="91440" tIns="45720" rIns="91440" bIns="45720" rtlCol="0" anchor="b"/>
           <a:lstStyle>
             <a:lvl1pPr algn="r">
-              <a:defRPr sz="1200">
+              <a:defRPr sz="10300" b="0">
+                <a:ln>
+                  <a:noFill/>
+                </a:ln>
                 <a:solidFill>
-                  <a:schemeClr val="tx1">
-                    <a:tint val="75000"/>
+                  <a:schemeClr val="accent1">
+                    <a:alpha val="25000"/>
                   </a:schemeClr>
                 </a:solidFill>
+                <a:latin typeface="+mj-lt"/>
               </a:defRPr>
             </a:lvl1pPr>
           </a:lstStyle>
           <a:p>
             <a:fld id="{C5DB2A98-4B90-4FDA-B1BD-5751ADF6E510}" type="slidenum">
               <a:rPr lang="en-US" smtClean="0"/>
-              <a:t>‹#›</a:t>
+              <a:t>‹Nr.›</a:t>
             </a:fld>
             <a:endParaRPr lang="en-US"/>
           </a:p>
@@ -5050,37 +4916,37 @@
     </p:spTree>
     <p:extLst>
       <p:ext uri="{BB962C8B-B14F-4D97-AF65-F5344CB8AC3E}">
-        <p14:creationId xmlns:p14="http://schemas.microsoft.com/office/powerpoint/2010/main" val="1840531361"/>
+        <p14:creationId xmlns:p14="http://schemas.microsoft.com/office/powerpoint/2010/main" val="1692725321"/>
       </p:ext>
     </p:extLst>
   </p:cSld>
   <p:clrMap bg1="lt1" tx1="dk1" bg2="lt2" tx2="dk2" accent1="accent1" accent2="accent2" accent3="accent3" accent4="accent4" accent5="accent5" accent6="accent6" hlink="hlink" folHlink="folHlink"/>
   <p:sldLayoutIdLst>
-    <p:sldLayoutId id="2147483649" r:id="rId1"/>
-    <p:sldLayoutId id="2147483650" r:id="rId2"/>
-    <p:sldLayoutId id="2147483651" r:id="rId3"/>
-    <p:sldLayoutId id="2147483652" r:id="rId4"/>
-    <p:sldLayoutId id="2147483653" r:id="rId5"/>
-    <p:sldLayoutId id="2147483654" r:id="rId6"/>
-    <p:sldLayoutId id="2147483655" r:id="rId7"/>
-    <p:sldLayoutId id="2147483656" r:id="rId8"/>
-    <p:sldLayoutId id="2147483657" r:id="rId9"/>
-    <p:sldLayoutId id="2147483658" r:id="rId10"/>
-    <p:sldLayoutId id="2147483659" r:id="rId11"/>
+    <p:sldLayoutId id="2147483697" r:id="rId1"/>
+    <p:sldLayoutId id="2147483698" r:id="rId2"/>
+    <p:sldLayoutId id="2147483699" r:id="rId3"/>
+    <p:sldLayoutId id="2147483700" r:id="rId4"/>
+    <p:sldLayoutId id="2147483701" r:id="rId5"/>
+    <p:sldLayoutId id="2147483702" r:id="rId6"/>
+    <p:sldLayoutId id="2147483703" r:id="rId7"/>
+    <p:sldLayoutId id="2147483704" r:id="rId8"/>
+    <p:sldLayoutId id="2147483705" r:id="rId9"/>
+    <p:sldLayoutId id="2147483706" r:id="rId10"/>
+    <p:sldLayoutId id="2147483707" r:id="rId11"/>
   </p:sldLayoutIdLst>
   <p:txStyles>
     <p:titleStyle>
       <a:lvl1pPr algn="l" defTabSz="914400" rtl="0" eaLnBrk="1" latinLnBrk="0" hangingPunct="1">
         <a:lnSpc>
-          <a:spcPct val="90000"/>
+          <a:spcPct val="85000"/>
         </a:lnSpc>
         <a:spcBef>
           <a:spcPct val="0"/>
         </a:spcBef>
         <a:buNone/>
-        <a:defRPr sz="4400" kern="1200">
+        <a:defRPr sz="5400" kern="1200" spc="-120" baseline="0">
           <a:solidFill>
-            <a:schemeClr val="tx1"/>
+            <a:schemeClr val="accent1"/>
           </a:solidFill>
           <a:latin typeface="+mj-lt"/>
           <a:ea typeface="+mj-ea"/>
@@ -5089,162 +4955,189 @@
       </a:lvl1pPr>
     </p:titleStyle>
     <p:bodyStyle>
-      <a:lvl1pPr marL="228600" indent="-228600" algn="l" defTabSz="914400" rtl="0" eaLnBrk="1" latinLnBrk="0" hangingPunct="1">
+      <a:lvl1pPr marL="91440" indent="-91440" algn="l" defTabSz="914400" rtl="0" eaLnBrk="1" latinLnBrk="0" hangingPunct="1">
         <a:lnSpc>
-          <a:spcPct val="90000"/>
+          <a:spcPct val="85000"/>
         </a:lnSpc>
         <a:spcBef>
-          <a:spcPts val="1000"/>
+          <a:spcPts val="1300"/>
         </a:spcBef>
-        <a:buFont typeface="Arial" panose="020B0604020202020204" pitchFamily="34" charset="0"/>
-        <a:buChar char="•"/>
-        <a:defRPr sz="2800" kern="1200">
+        <a:buFont typeface="Arial" pitchFamily="34" charset="0"/>
+        <a:buChar char=" "/>
+        <a:defRPr sz="2400" kern="1200">
           <a:solidFill>
-            <a:schemeClr val="tx1"/>
+            <a:schemeClr val="tx1">
+              <a:lumMod val="85000"/>
+              <a:lumOff val="15000"/>
+            </a:schemeClr>
           </a:solidFill>
           <a:latin typeface="+mn-lt"/>
           <a:ea typeface="+mn-ea"/>
           <a:cs typeface="+mn-cs"/>
         </a:defRPr>
       </a:lvl1pPr>
-      <a:lvl2pPr marL="685800" indent="-228600" algn="l" defTabSz="914400" rtl="0" eaLnBrk="1" latinLnBrk="0" hangingPunct="1">
+      <a:lvl2pPr marL="347472" indent="-342900" algn="l" defTabSz="914400" rtl="0" eaLnBrk="1" latinLnBrk="0" hangingPunct="1">
         <a:lnSpc>
-          <a:spcPct val="90000"/>
+          <a:spcPct val="85000"/>
         </a:lnSpc>
         <a:spcBef>
-          <a:spcPts val="500"/>
+          <a:spcPts val="600"/>
         </a:spcBef>
-        <a:buFont typeface="Arial" panose="020B0604020202020204" pitchFamily="34" charset="0"/>
-        <a:buChar char="•"/>
+        <a:buFont typeface="Arial" pitchFamily="34" charset="0"/>
+        <a:buChar char=" "/>
         <a:defRPr sz="2400" kern="1200">
           <a:solidFill>
-            <a:schemeClr val="tx1"/>
+            <a:schemeClr val="tx1">
+              <a:lumMod val="85000"/>
+              <a:lumOff val="15000"/>
+            </a:schemeClr>
           </a:solidFill>
           <a:latin typeface="+mn-lt"/>
           <a:ea typeface="+mn-ea"/>
           <a:cs typeface="+mn-cs"/>
         </a:defRPr>
       </a:lvl2pPr>
-      <a:lvl3pPr marL="1143000" indent="-228600" algn="l" defTabSz="914400" rtl="0" eaLnBrk="1" latinLnBrk="0" hangingPunct="1">
+      <a:lvl3pPr marL="548640" indent="-548640" algn="l" defTabSz="914400" rtl="0" eaLnBrk="1" latinLnBrk="0" hangingPunct="1">
         <a:lnSpc>
-          <a:spcPct val="90000"/>
+          <a:spcPct val="85000"/>
         </a:lnSpc>
         <a:spcBef>
-          <a:spcPts val="500"/>
+          <a:spcPts val="600"/>
         </a:spcBef>
-        <a:buFont typeface="Arial" panose="020B0604020202020204" pitchFamily="34" charset="0"/>
-        <a:buChar char="•"/>
-        <a:defRPr sz="2000" kern="1200">
+        <a:buFont typeface="Arial" pitchFamily="34" charset="0"/>
+        <a:buChar char=" "/>
+        <a:defRPr sz="2000" i="1" kern="1200">
           <a:solidFill>
-            <a:schemeClr val="tx1"/>
+            <a:schemeClr val="tx1">
+              <a:lumMod val="85000"/>
+              <a:lumOff val="15000"/>
+            </a:schemeClr>
           </a:solidFill>
           <a:latin typeface="+mn-lt"/>
           <a:ea typeface="+mn-ea"/>
           <a:cs typeface="+mn-cs"/>
         </a:defRPr>
       </a:lvl3pPr>
-      <a:lvl4pPr marL="1600200" indent="-228600" algn="l" defTabSz="914400" rtl="0" eaLnBrk="1" latinLnBrk="0" hangingPunct="1">
+      <a:lvl4pPr marL="822960" indent="-822960" algn="l" defTabSz="914400" rtl="0" eaLnBrk="1" latinLnBrk="0" hangingPunct="1">
         <a:lnSpc>
-          <a:spcPct val="90000"/>
+          <a:spcPct val="85000"/>
         </a:lnSpc>
         <a:spcBef>
-          <a:spcPts val="500"/>
+          <a:spcPts val="600"/>
         </a:spcBef>
-        <a:buFont typeface="Arial" panose="020B0604020202020204" pitchFamily="34" charset="0"/>
-        <a:buChar char="•"/>
+        <a:buFont typeface="Arial" pitchFamily="34" charset="0"/>
+        <a:buChar char=" "/>
         <a:defRPr sz="1800" kern="1200">
           <a:solidFill>
-            <a:schemeClr val="tx1"/>
+            <a:schemeClr val="tx1">
+              <a:lumMod val="85000"/>
+              <a:lumOff val="15000"/>
+            </a:schemeClr>
           </a:solidFill>
           <a:latin typeface="+mn-lt"/>
           <a:ea typeface="+mn-ea"/>
           <a:cs typeface="+mn-cs"/>
         </a:defRPr>
       </a:lvl4pPr>
-      <a:lvl5pPr marL="2057400" indent="-228600" algn="l" defTabSz="914400" rtl="0" eaLnBrk="1" latinLnBrk="0" hangingPunct="1">
+      <a:lvl5pPr marL="1097280" indent="-1097280" algn="l" defTabSz="914400" rtl="0" eaLnBrk="1" latinLnBrk="0" hangingPunct="1">
         <a:lnSpc>
-          <a:spcPct val="90000"/>
+          <a:spcPct val="85000"/>
         </a:lnSpc>
         <a:spcBef>
-          <a:spcPts val="500"/>
+          <a:spcPts val="600"/>
         </a:spcBef>
-        <a:buFont typeface="Arial" panose="020B0604020202020204" pitchFamily="34" charset="0"/>
-        <a:buChar char="•"/>
+        <a:buFont typeface="Arial" pitchFamily="34" charset="0"/>
+        <a:buChar char=" "/>
         <a:defRPr sz="1800" kern="1200">
           <a:solidFill>
-            <a:schemeClr val="tx1"/>
+            <a:schemeClr val="tx1">
+              <a:lumMod val="85000"/>
+              <a:lumOff val="15000"/>
+            </a:schemeClr>
           </a:solidFill>
           <a:latin typeface="+mn-lt"/>
           <a:ea typeface="+mn-ea"/>
           <a:cs typeface="+mn-cs"/>
         </a:defRPr>
       </a:lvl5pPr>
-      <a:lvl6pPr marL="2514600" indent="-228600" algn="l" defTabSz="914400" rtl="0" eaLnBrk="1" latinLnBrk="0" hangingPunct="1">
+      <a:lvl6pPr marL="1200000" indent="-228600" algn="l" defTabSz="914400" rtl="0" eaLnBrk="1" latinLnBrk="0" hangingPunct="1">
         <a:lnSpc>
-          <a:spcPct val="90000"/>
+          <a:spcPct val="85000"/>
         </a:lnSpc>
         <a:spcBef>
-          <a:spcPts val="500"/>
+          <a:spcPts val="600"/>
         </a:spcBef>
-        <a:buFont typeface="Arial" panose="020B0604020202020204" pitchFamily="34" charset="0"/>
-        <a:buChar char="•"/>
+        <a:buFont typeface="Arial" pitchFamily="34" charset="0"/>
+        <a:buChar char=" "/>
         <a:defRPr sz="1800" kern="1200">
           <a:solidFill>
-            <a:schemeClr val="tx1"/>
+            <a:schemeClr val="tx1">
+              <a:lumMod val="85000"/>
+              <a:lumOff val="15000"/>
+            </a:schemeClr>
           </a:solidFill>
           <a:latin typeface="+mn-lt"/>
           <a:ea typeface="+mn-ea"/>
           <a:cs typeface="+mn-cs"/>
         </a:defRPr>
       </a:lvl6pPr>
-      <a:lvl7pPr marL="2971800" indent="-228600" algn="l" defTabSz="914400" rtl="0" eaLnBrk="1" latinLnBrk="0" hangingPunct="1">
+      <a:lvl7pPr marL="1400000" indent="-228600" algn="l" defTabSz="914400" rtl="0" eaLnBrk="1" latinLnBrk="0" hangingPunct="1">
         <a:lnSpc>
-          <a:spcPct val="90000"/>
+          <a:spcPct val="85000"/>
         </a:lnSpc>
         <a:spcBef>
-          <a:spcPts val="500"/>
+          <a:spcPts val="600"/>
         </a:spcBef>
-        <a:buFont typeface="Arial" panose="020B0604020202020204" pitchFamily="34" charset="0"/>
-        <a:buChar char="•"/>
+        <a:buFont typeface="Arial" pitchFamily="34" charset="0"/>
+        <a:buChar char=" "/>
         <a:defRPr sz="1800" kern="1200">
           <a:solidFill>
-            <a:schemeClr val="tx1"/>
+            <a:schemeClr val="tx1">
+              <a:lumMod val="85000"/>
+              <a:lumOff val="15000"/>
+            </a:schemeClr>
           </a:solidFill>
           <a:latin typeface="+mn-lt"/>
           <a:ea typeface="+mn-ea"/>
           <a:cs typeface="+mn-cs"/>
         </a:defRPr>
       </a:lvl7pPr>
-      <a:lvl8pPr marL="3429000" indent="-228600" algn="l" defTabSz="914400" rtl="0" eaLnBrk="1" latinLnBrk="0" hangingPunct="1">
+      <a:lvl8pPr marL="1600000" indent="-228600" algn="l" defTabSz="914400" rtl="0" eaLnBrk="1" latinLnBrk="0" hangingPunct="1">
         <a:lnSpc>
-          <a:spcPct val="90000"/>
+          <a:spcPct val="85000"/>
         </a:lnSpc>
         <a:spcBef>
-          <a:spcPts val="500"/>
+          <a:spcPts val="600"/>
         </a:spcBef>
-        <a:buFont typeface="Arial" panose="020B0604020202020204" pitchFamily="34" charset="0"/>
-        <a:buChar char="•"/>
+        <a:buFont typeface="Arial" pitchFamily="34" charset="0"/>
+        <a:buChar char=" "/>
         <a:defRPr sz="1800" kern="1200">
           <a:solidFill>
-            <a:schemeClr val="tx1"/>
+            <a:schemeClr val="tx1">
+              <a:lumMod val="85000"/>
+              <a:lumOff val="15000"/>
+            </a:schemeClr>
           </a:solidFill>
           <a:latin typeface="+mn-lt"/>
           <a:ea typeface="+mn-ea"/>
           <a:cs typeface="+mn-cs"/>
         </a:defRPr>
       </a:lvl8pPr>
-      <a:lvl9pPr marL="3886200" indent="-228600" algn="l" defTabSz="914400" rtl="0" eaLnBrk="1" latinLnBrk="0" hangingPunct="1">
+      <a:lvl9pPr marL="1800000" indent="-228600" algn="l" defTabSz="914400" rtl="0" eaLnBrk="1" latinLnBrk="0" hangingPunct="1">
         <a:lnSpc>
-          <a:spcPct val="90000"/>
+          <a:spcPct val="85000"/>
         </a:lnSpc>
         <a:spcBef>
-          <a:spcPts val="500"/>
+          <a:spcPts val="600"/>
         </a:spcBef>
-        <a:buFont typeface="Arial" panose="020B0604020202020204" pitchFamily="34" charset="0"/>
-        <a:buChar char="•"/>
+        <a:buFont typeface="Arial" pitchFamily="34" charset="0"/>
+        <a:buChar char=" "/>
         <a:defRPr sz="1800" kern="1200">
           <a:solidFill>
-            <a:schemeClr val="tx1"/>
+            <a:schemeClr val="tx1">
+              <a:lumMod val="85000"/>
+              <a:lumOff val="15000"/>
+            </a:schemeClr>
           </a:solidFill>
           <a:latin typeface="+mn-lt"/>
           <a:ea typeface="+mn-ea"/>
@@ -5417,7 +5310,7 @@
         <p:spPr/>
         <p:txBody>
           <a:bodyPr>
-            <a:normAutofit/>
+            <a:normAutofit fontScale="92500" lnSpcReduction="10000"/>
           </a:bodyPr>
           <a:lstStyle/>
           <a:p>
@@ -5654,7 +5547,7 @@
           <a:p>
             <a:r>
               <a:rPr lang="en-US" dirty="0"/>
-              <a:t>Lam et al:</a:t>
+              <a:t>Lam et al.:</a:t>
             </a:r>
           </a:p>
           <a:p>
@@ -5874,7 +5767,9 @@
         </p:nvSpPr>
         <p:spPr/>
         <p:txBody>
-          <a:bodyPr/>
+          <a:bodyPr>
+            <a:normAutofit fontScale="90000"/>
+          </a:bodyPr>
           <a:lstStyle/>
           <a:p>
             <a:pPr algn="ctr"/>
@@ -6042,14 +5937,14 @@
             <p:ph idx="1"/>
             <p:extLst>
               <p:ext uri="{D42A27DB-BD31-4B8C-83A1-F6EECF244321}">
-                <p14:modId xmlns:p14="http://schemas.microsoft.com/office/powerpoint/2010/main" val="626852798"/>
+                <p14:modId xmlns:p14="http://schemas.microsoft.com/office/powerpoint/2010/main" val="3107809922"/>
               </p:ext>
             </p:extLst>
           </p:nvPr>
         </p:nvGraphicFramePr>
         <p:xfrm>
-          <a:off x="838200" y="1825625"/>
-          <a:ext cx="10515600" cy="4351338"/>
+          <a:off x="676275" y="2011363"/>
+          <a:ext cx="10753725" cy="3767137"/>
         </p:xfrm>
         <a:graphic>
           <a:graphicData uri="http://schemas.openxmlformats.org/drawingml/2006/chart">
@@ -6485,7 +6380,9 @@
         </p:nvSpPr>
         <p:spPr/>
         <p:txBody>
-          <a:bodyPr/>
+          <a:bodyPr>
+            <a:normAutofit lnSpcReduction="10000"/>
+          </a:bodyPr>
           <a:lstStyle/>
           <a:p>
             <a:r>
@@ -7433,7 +7330,7 @@
           <p:cNvPr id="2" name="Titel 1">
             <a:extLst>
               <a:ext uri="{FF2B5EF4-FFF2-40B4-BE49-F238E27FC236}">
-                <a16:creationId xmlns:a16="http://schemas.microsoft.com/office/drawing/2014/main" id="{5D0657ED-4773-4312-A05E-E7C6F3E0CDCF}"/>
+                <a16:creationId xmlns:a16="http://schemas.microsoft.com/office/drawing/2014/main" id="{7901207E-7F0B-4BF4-A2BD-CDF65DE7B9A0}"/>
               </a:ext>
             </a:extLst>
           </p:cNvPr>
@@ -7444,164 +7341,41 @@
             <p:ph type="title"/>
           </p:nvPr>
         </p:nvSpPr>
-        <p:spPr/>
-        <p:txBody>
-          <a:bodyPr/>
-          <a:lstStyle/>
-          <a:p>
-            <a:r>
-              <a:rPr lang="de-AT" dirty="0"/>
-              <a:t>Women in FLOSS</a:t>
-            </a:r>
-          </a:p>
-        </p:txBody>
-      </p:sp>
-      <p:sp>
-        <p:nvSpPr>
-          <p:cNvPr id="3" name="Inhaltsplatzhalter 2">
-            <a:extLst>
-              <a:ext uri="{FF2B5EF4-FFF2-40B4-BE49-F238E27FC236}">
-                <a16:creationId xmlns:a16="http://schemas.microsoft.com/office/drawing/2014/main" id="{7EC31AEF-1FBD-4C12-82E9-43AD495B7D25}"/>
-              </a:ext>
-            </a:extLst>
-          </p:cNvPr>
-          <p:cNvSpPr>
-            <a:spLocks noGrp="1"/>
-          </p:cNvSpPr>
-          <p:nvPr>
-            <p:ph idx="1"/>
-          </p:nvPr>
-        </p:nvSpPr>
         <p:spPr>
           <a:xfrm>
-            <a:off x="838200" y="1825625"/>
-            <a:ext cx="10515600" cy="4220612"/>
+            <a:off x="657224" y="499533"/>
+            <a:ext cx="10772775" cy="5762722"/>
           </a:xfrm>
         </p:spPr>
         <p:txBody>
-          <a:bodyPr/>
+          <a:bodyPr>
+            <a:normAutofit/>
+          </a:bodyPr>
           <a:lstStyle/>
           <a:p>
-            <a:r>
-              <a:rPr lang="de-AT" dirty="0"/>
-              <a:t>Women </a:t>
-            </a:r>
-            <a:r>
-              <a:rPr lang="de-AT" dirty="0" err="1"/>
-              <a:t>make</a:t>
-            </a:r>
-            <a:r>
-              <a:rPr lang="de-AT" dirty="0"/>
-              <a:t> </a:t>
-            </a:r>
-            <a:r>
-              <a:rPr lang="de-AT" dirty="0" err="1"/>
-              <a:t>first</a:t>
-            </a:r>
-            <a:r>
-              <a:rPr lang="de-AT" dirty="0"/>
-              <a:t> </a:t>
-            </a:r>
-            <a:r>
-              <a:rPr lang="de-AT" dirty="0" err="1"/>
-              <a:t>contributions</a:t>
-            </a:r>
-            <a:r>
-              <a:rPr lang="de-AT" dirty="0"/>
-              <a:t> </a:t>
-            </a:r>
-            <a:r>
-              <a:rPr lang="de-AT" dirty="0" err="1"/>
-              <a:t>later</a:t>
-            </a:r>
-            <a:r>
-              <a:rPr lang="de-AT" dirty="0"/>
-              <a:t> in </a:t>
-            </a:r>
-            <a:r>
-              <a:rPr lang="de-AT" dirty="0" err="1"/>
-              <a:t>life</a:t>
-            </a:r>
-            <a:endParaRPr lang="de-AT" dirty="0"/>
-          </a:p>
-          <a:p>
-            <a:endParaRPr lang="de-AT" dirty="0"/>
-          </a:p>
-          <a:p>
-            <a:r>
-              <a:rPr lang="de-AT" dirty="0"/>
-              <a:t>2010-2013</a:t>
-            </a:r>
-          </a:p>
-          <a:p>
-            <a:pPr lvl="1"/>
-            <a:r>
-              <a:rPr lang="de-AT" dirty="0"/>
-              <a:t>39% </a:t>
-            </a:r>
-            <a:r>
-              <a:rPr lang="de-AT" dirty="0" err="1"/>
-              <a:t>new</a:t>
-            </a:r>
-            <a:r>
-              <a:rPr lang="de-AT" dirty="0"/>
-              <a:t> </a:t>
-            </a:r>
-            <a:r>
-              <a:rPr lang="de-AT" dirty="0" err="1"/>
-              <a:t>female</a:t>
-            </a:r>
-            <a:r>
-              <a:rPr lang="de-AT" dirty="0"/>
-              <a:t> </a:t>
-            </a:r>
-            <a:r>
-              <a:rPr lang="de-AT" dirty="0" err="1"/>
-              <a:t>contributors</a:t>
-            </a:r>
-            <a:endParaRPr lang="de-AT" dirty="0"/>
-          </a:p>
-          <a:p>
-            <a:pPr lvl="1"/>
-            <a:r>
-              <a:rPr lang="de-AT" dirty="0"/>
-              <a:t>19% </a:t>
-            </a:r>
-            <a:r>
-              <a:rPr lang="de-AT" dirty="0" err="1"/>
-              <a:t>new</a:t>
-            </a:r>
-            <a:r>
-              <a:rPr lang="de-AT" dirty="0"/>
-              <a:t> male </a:t>
-            </a:r>
-            <a:r>
-              <a:rPr lang="de-AT" dirty="0" err="1"/>
-              <a:t>contributors</a:t>
-            </a:r>
-            <a:endParaRPr lang="de-AT" dirty="0"/>
-          </a:p>
-          <a:p>
-            <a:pPr lvl="1"/>
-            <a:endParaRPr lang="de-AT" dirty="0"/>
-          </a:p>
-          <a:p>
-            <a:r>
-              <a:rPr lang="de-AT" dirty="0"/>
-              <a:t>Women code </a:t>
-            </a:r>
-            <a:r>
-              <a:rPr lang="de-AT" dirty="0" err="1"/>
-              <a:t>less</a:t>
-            </a:r>
-            <a:endParaRPr lang="de-AT" dirty="0"/>
+            <a:pPr algn="ctr"/>
+            <a:r>
+              <a:rPr lang="en-US" sz="8000" dirty="0"/>
+              <a:t>Thank you!</a:t>
+            </a:r>
+            <a:br>
+              <a:rPr lang="en-US" sz="8000" dirty="0"/>
+            </a:br>
+            <a:br>
+              <a:rPr lang="en-US" sz="8000" dirty="0"/>
+            </a:br>
+            <a:r>
+              <a:rPr lang="en-US" sz="8000" dirty="0"/>
+              <a:t>Q &amp; A</a:t>
+            </a:r>
+            <a:endParaRPr lang="en-DE" sz="8000" dirty="0"/>
           </a:p>
         </p:txBody>
       </p:sp>
     </p:spTree>
     <p:extLst>
       <p:ext uri="{BB962C8B-B14F-4D97-AF65-F5344CB8AC3E}">
-        <p14:creationId xmlns:p14="http://schemas.microsoft.com/office/powerpoint/2010/main" val="712326883"/>
+        <p14:creationId xmlns:p14="http://schemas.microsoft.com/office/powerpoint/2010/main" val="3506556528"/>
       </p:ext>
     </p:extLst>
   </p:cSld>
@@ -8110,11 +7884,11 @@
             </a:avLst>
           </a:prstGeom>
           <a:solidFill>
-            <a:srgbClr val="FF0000"/>
+            <a:srgbClr val="92D050"/>
           </a:solidFill>
           <a:ln>
             <a:solidFill>
-              <a:srgbClr val="FF0000"/>
+              <a:srgbClr val="92D050"/>
             </a:solidFill>
           </a:ln>
         </p:spPr>
@@ -8139,7 +7913,7 @@
           <a:lstStyle/>
           <a:p>
             <a:pPr algn="ctr"/>
-            <a:endParaRPr lang="en-US"/>
+            <a:endParaRPr lang="en-US" dirty="0"/>
           </a:p>
         </p:txBody>
       </p:sp>
@@ -8167,11 +7941,11 @@
             </a:avLst>
           </a:prstGeom>
           <a:solidFill>
-            <a:srgbClr val="FF0000"/>
+            <a:srgbClr val="92D050"/>
           </a:solidFill>
           <a:ln>
             <a:solidFill>
-              <a:srgbClr val="FF0000"/>
+              <a:srgbClr val="92D050"/>
             </a:solidFill>
           </a:ln>
         </p:spPr>
@@ -8477,12 +8251,7 @@
             <p:ph type="title"/>
           </p:nvPr>
         </p:nvSpPr>
-        <p:spPr>
-          <a:xfrm>
-            <a:off x="838200" y="365125"/>
-            <a:ext cx="10515600" cy="1325563"/>
-          </a:xfrm>
-        </p:spPr>
+        <p:spPr/>
         <p:txBody>
           <a:bodyPr>
             <a:normAutofit/>
@@ -8580,7 +8349,7 @@
         </p:blipFill>
         <p:spPr>
           <a:xfrm>
-            <a:off x="4748361" y="1377544"/>
+            <a:off x="4748361" y="1647924"/>
             <a:ext cx="6605439" cy="4529039"/>
           </a:xfrm>
           <a:prstGeom prst="rect">
@@ -8602,9 +8371,9 @@
 </file>
 
 <file path=ppt/theme/theme1.xml><?xml version="1.0" encoding="utf-8"?>
-<a:theme xmlns:a="http://schemas.openxmlformats.org/drawingml/2006/main" name="Office Theme">
+<a:theme xmlns:a="http://schemas.openxmlformats.org/drawingml/2006/main" name="Metropolitan">
   <a:themeElements>
-    <a:clrScheme name="Office">
+    <a:clrScheme name="Metropolitan">
       <a:dk1>
         <a:sysClr val="windowText" lastClr="000000"/>
       </a:dk1>
@@ -8612,44 +8381,44 @@
         <a:sysClr val="window" lastClr="FFFFFF"/>
       </a:lt1>
       <a:dk2>
-        <a:srgbClr val="44546A"/>
+        <a:srgbClr val="471101"/>
       </a:dk2>
       <a:lt2>
-        <a:srgbClr val="E7E6E6"/>
+        <a:srgbClr val="E7E8E2"/>
       </a:lt2>
       <a:accent1>
-        <a:srgbClr val="4472C4"/>
+        <a:srgbClr val="A6B727"/>
       </a:accent1>
       <a:accent2>
-        <a:srgbClr val="ED7D31"/>
+        <a:srgbClr val="F04304"/>
       </a:accent2>
       <a:accent3>
-        <a:srgbClr val="A5A5A5"/>
+        <a:srgbClr val="EF8606"/>
       </a:accent3>
       <a:accent4>
-        <a:srgbClr val="FFC000"/>
+        <a:srgbClr val="F2C100"/>
       </a:accent4>
       <a:accent5>
-        <a:srgbClr val="5B9BD5"/>
+        <a:srgbClr val="A65001"/>
       </a:accent5>
       <a:accent6>
-        <a:srgbClr val="70AD47"/>
+        <a:srgbClr val="BA9585"/>
       </a:accent6>
       <a:hlink>
-        <a:srgbClr val="0563C1"/>
+        <a:srgbClr val="00B0F0"/>
       </a:hlink>
       <a:folHlink>
-        <a:srgbClr val="954F72"/>
+        <a:srgbClr val="7F7F7F"/>
       </a:folHlink>
     </a:clrScheme>
-    <a:fontScheme name="Office">
+    <a:fontScheme name="Metropolitan">
       <a:majorFont>
         <a:latin typeface="Calibri Light" panose="020F0302020204030204"/>
         <a:ea typeface=""/>
         <a:cs typeface=""/>
-        <a:font script="Jpan" typeface="游ゴシック Light"/>
+        <a:font script="Jpan" typeface="ＭＳ Ｐゴシック"/>
         <a:font script="Hang" typeface="맑은 고딕"/>
-        <a:font script="Hans" typeface="等线 Light"/>
+        <a:font script="Hans" typeface="宋体"/>
         <a:font script="Hant" typeface="新細明體"/>
         <a:font script="Arab" typeface="Times New Roman"/>
         <a:font script="Hebr" typeface="Times New Roman"/>
@@ -8677,39 +8446,22 @@
         <a:font script="Viet" typeface="Times New Roman"/>
         <a:font script="Uigh" typeface="Microsoft Uighur"/>
         <a:font script="Geor" typeface="Sylfaen"/>
-        <a:font script="Armn" typeface="Arial"/>
-        <a:font script="Bugi" typeface="Leelawadee UI"/>
-        <a:font script="Bopo" typeface="Microsoft JhengHei"/>
-        <a:font script="Java" typeface="Javanese Text"/>
-        <a:font script="Lisu" typeface="Segoe UI"/>
-        <a:font script="Mymr" typeface="Myanmar Text"/>
-        <a:font script="Nkoo" typeface="Ebrima"/>
-        <a:font script="Olck" typeface="Nirmala UI"/>
-        <a:font script="Osma" typeface="Ebrima"/>
-        <a:font script="Phag" typeface="Phagspa"/>
-        <a:font script="Syrn" typeface="Estrangelo Edessa"/>
-        <a:font script="Syrj" typeface="Estrangelo Edessa"/>
-        <a:font script="Syre" typeface="Estrangelo Edessa"/>
-        <a:font script="Sora" typeface="Nirmala UI"/>
-        <a:font script="Tale" typeface="Microsoft Tai Le"/>
-        <a:font script="Talu" typeface="Microsoft New Tai Lue"/>
-        <a:font script="Tfng" typeface="Ebrima"/>
       </a:majorFont>
       <a:minorFont>
-        <a:latin typeface="Calibri" panose="020F0502020204030204"/>
+        <a:latin typeface="Calibri Light" panose="020F0302020204030204"/>
         <a:ea typeface=""/>
         <a:cs typeface=""/>
-        <a:font script="Jpan" typeface="游ゴシック"/>
+        <a:font script="Jpan" typeface="ＭＳ Ｐゴシック"/>
         <a:font script="Hang" typeface="맑은 고딕"/>
-        <a:font script="Hans" typeface="等线"/>
+        <a:font script="Hans" typeface="宋体"/>
         <a:font script="Hant" typeface="新細明體"/>
-        <a:font script="Arab" typeface="Arial"/>
-        <a:font script="Hebr" typeface="Arial"/>
-        <a:font script="Thai" typeface="Cordia New"/>
+        <a:font script="Arab" typeface="Times New Roman"/>
+        <a:font script="Hebr" typeface="Times New Roman"/>
+        <a:font script="Thai" typeface="Angsana New"/>
         <a:font script="Ethi" typeface="Nyala"/>
         <a:font script="Beng" typeface="Vrinda"/>
         <a:font script="Gujr" typeface="Shruti"/>
-        <a:font script="Khmr" typeface="DaunPenh"/>
+        <a:font script="Khmr" typeface="MoolBoran"/>
         <a:font script="Knda" typeface="Tunga"/>
         <a:font script="Guru" typeface="Raavi"/>
         <a:font script="Cans" typeface="Euphemia"/>
@@ -8726,29 +8478,12 @@
         <a:font script="Laoo" typeface="DokChampa"/>
         <a:font script="Sinh" typeface="Iskoola Pota"/>
         <a:font script="Mong" typeface="Mongolian Baiti"/>
-        <a:font script="Viet" typeface="Arial"/>
+        <a:font script="Viet" typeface="Times New Roman"/>
         <a:font script="Uigh" typeface="Microsoft Uighur"/>
         <a:font script="Geor" typeface="Sylfaen"/>
-        <a:font script="Armn" typeface="Arial"/>
-        <a:font script="Bugi" typeface="Leelawadee UI"/>
-        <a:font script="Bopo" typeface="Microsoft JhengHei"/>
-        <a:font script="Java" typeface="Javanese Text"/>
-        <a:font script="Lisu" typeface="Segoe UI"/>
-        <a:font script="Mymr" typeface="Myanmar Text"/>
-        <a:font script="Nkoo" typeface="Ebrima"/>
-        <a:font script="Olck" typeface="Nirmala UI"/>
-        <a:font script="Osma" typeface="Ebrima"/>
-        <a:font script="Phag" typeface="Phagspa"/>
-        <a:font script="Syrn" typeface="Estrangelo Edessa"/>
-        <a:font script="Syrj" typeface="Estrangelo Edessa"/>
-        <a:font script="Syre" typeface="Estrangelo Edessa"/>
-        <a:font script="Sora" typeface="Nirmala UI"/>
-        <a:font script="Tale" typeface="Microsoft Tai Le"/>
-        <a:font script="Talu" typeface="Microsoft New Tai Lue"/>
-        <a:font script="Tfng" typeface="Ebrima"/>
       </a:minorFont>
     </a:fontScheme>
-    <a:fmtScheme name="Office">
+    <a:fmtScheme name="Metropolitan">
       <a:fillStyleLst>
         <a:solidFill>
           <a:schemeClr val="phClr"/>
@@ -8757,76 +8492,73 @@
           <a:gsLst>
             <a:gs pos="0">
               <a:schemeClr val="phClr">
+                <a:tint val="70000"/>
+                <a:satMod val="100000"/>
                 <a:lumMod val="110000"/>
-                <a:satMod val="105000"/>
-                <a:tint val="67000"/>
               </a:schemeClr>
             </a:gs>
             <a:gs pos="50000">
               <a:schemeClr val="phClr">
+                <a:tint val="75000"/>
+                <a:satMod val="101000"/>
                 <a:lumMod val="105000"/>
-                <a:satMod val="103000"/>
-                <a:tint val="73000"/>
               </a:schemeClr>
             </a:gs>
             <a:gs pos="100000">
               <a:schemeClr val="phClr">
+                <a:tint val="82000"/>
+                <a:satMod val="104000"/>
                 <a:lumMod val="105000"/>
-                <a:satMod val="109000"/>
-                <a:tint val="81000"/>
               </a:schemeClr>
             </a:gs>
           </a:gsLst>
-          <a:lin ang="5400000" scaled="0"/>
+          <a:lin ang="2700000" scaled="0"/>
         </a:gradFill>
         <a:gradFill rotWithShape="1">
           <a:gsLst>
             <a:gs pos="0">
               <a:schemeClr val="phClr">
-                <a:satMod val="103000"/>
+                <a:tint val="97000"/>
+                <a:satMod val="100000"/>
                 <a:lumMod val="102000"/>
-                <a:tint val="94000"/>
               </a:schemeClr>
             </a:gs>
             <a:gs pos="50000">
               <a:schemeClr val="phClr">
-                <a:satMod val="110000"/>
+                <a:shade val="100000"/>
+                <a:satMod val="100000"/>
                 <a:lumMod val="100000"/>
-                <a:shade val="100000"/>
               </a:schemeClr>
             </a:gs>
             <a:gs pos="100000">
               <a:schemeClr val="phClr">
+                <a:shade val="80000"/>
+                <a:satMod val="100000"/>
                 <a:lumMod val="99000"/>
-                <a:satMod val="120000"/>
-                <a:shade val="78000"/>
               </a:schemeClr>
             </a:gs>
           </a:gsLst>
-          <a:lin ang="5400000" scaled="0"/>
+          <a:lin ang="2700000" scaled="0"/>
         </a:gradFill>
       </a:fillStyleLst>
       <a:lnStyleLst>
-        <a:ln w="6350" cap="flat" cmpd="sng" algn="ctr">
+        <a:ln w="9525" cap="flat" cmpd="sng" algn="ctr">
           <a:solidFill>
             <a:schemeClr val="phClr"/>
           </a:solidFill>
           <a:prstDash val="solid"/>
-          <a:miter lim="800000"/>
         </a:ln>
         <a:ln w="12700" cap="flat" cmpd="sng" algn="ctr">
           <a:solidFill>
             <a:schemeClr val="phClr"/>
           </a:solidFill>
           <a:prstDash val="solid"/>
-          <a:miter lim="800000"/>
         </a:ln>
         <a:ln w="19050" cap="flat" cmpd="sng" algn="ctr">
           <a:solidFill>
             <a:schemeClr val="phClr"/>
           </a:solidFill>
           <a:prstDash val="solid"/>
-          <a:miter lim="800000"/>
         </a:ln>
       </a:lnStyleLst>
       <a:effectStyleLst>
@@ -8856,33 +8588,12 @@
             <a:satMod val="170000"/>
           </a:schemeClr>
         </a:solidFill>
-        <a:gradFill rotWithShape="1">
-          <a:gsLst>
-            <a:gs pos="0">
-              <a:schemeClr val="phClr">
-                <a:tint val="93000"/>
-                <a:satMod val="150000"/>
-                <a:shade val="98000"/>
-                <a:lumMod val="102000"/>
-              </a:schemeClr>
-            </a:gs>
-            <a:gs pos="50000">
-              <a:schemeClr val="phClr">
-                <a:tint val="98000"/>
-                <a:satMod val="130000"/>
-                <a:shade val="90000"/>
-                <a:lumMod val="103000"/>
-              </a:schemeClr>
-            </a:gs>
-            <a:gs pos="100000">
-              <a:schemeClr val="phClr">
-                <a:shade val="63000"/>
-                <a:satMod val="120000"/>
-              </a:schemeClr>
-            </a:gs>
-          </a:gsLst>
-          <a:lin ang="5400000" scaled="0"/>
-        </a:gradFill>
+        <a:solidFill>
+          <a:schemeClr val="phClr">
+            <a:shade val="95000"/>
+            <a:satMod val="170000"/>
+          </a:schemeClr>
+        </a:solidFill>
       </a:bgFillStyleLst>
     </a:fmtScheme>
   </a:themeElements>
@@ -8890,7 +8601,7 @@
   <a:extraClrSchemeLst/>
   <a:extLst>
     <a:ext uri="{05A4C25C-085E-4340-85A3-A5531E510DB2}">
-      <thm15:themeFamily xmlns:thm15="http://schemas.microsoft.com/office/thememl/2012/main" name="Office Theme" id="{62F939B6-93AF-4DB8-9C6B-D6C7DFDC589F}" vid="{4A3C46E8-61CC-4603-A589-7422A47A8E4A}"/>
+      <thm15:themeFamily xmlns:thm15="http://schemas.microsoft.com/office/thememl/2012/main" name="Metropolitan" id="{4C5440D6-04D2-4954-96CF-F251137069B2}" vid="{3A8A2BB7-7C5E-4EB2-B1F1-CFFF0F57E773}"/>
     </a:ext>
   </a:extLst>
 </a:theme>

</xml_diff>